<commit_message>
exercises: review ; vector challenge problem
</commit_message>
<xml_diff>
--- a/slides/review.pptx
+++ b/slides/review.pptx
@@ -5,7 +5,7 @@
     <p:sldMasterId id="2147484294" r:id="rId1"/>
   </p:sldMasterIdLst>
   <p:notesMasterIdLst>
-    <p:notesMasterId r:id="rId22"/>
+    <p:notesMasterId r:id="rId23"/>
   </p:notesMasterIdLst>
   <p:sldIdLst>
     <p:sldId id="256" r:id="rId2"/>
@@ -21,13 +21,14 @@
     <p:sldId id="261" r:id="rId12"/>
     <p:sldId id="263" r:id="rId13"/>
     <p:sldId id="272" r:id="rId14"/>
-    <p:sldId id="264" r:id="rId15"/>
-    <p:sldId id="265" r:id="rId16"/>
-    <p:sldId id="267" r:id="rId17"/>
-    <p:sldId id="266" r:id="rId18"/>
-    <p:sldId id="268" r:id="rId19"/>
-    <p:sldId id="269" r:id="rId20"/>
-    <p:sldId id="270" r:id="rId21"/>
+    <p:sldId id="276" r:id="rId15"/>
+    <p:sldId id="264" r:id="rId16"/>
+    <p:sldId id="265" r:id="rId17"/>
+    <p:sldId id="267" r:id="rId18"/>
+    <p:sldId id="266" r:id="rId19"/>
+    <p:sldId id="268" r:id="rId20"/>
+    <p:sldId id="269" r:id="rId21"/>
+    <p:sldId id="270" r:id="rId22"/>
   </p:sldIdLst>
   <p:sldSz cx="12192000" cy="6858000"/>
   <p:notesSz cx="6858000" cy="9144000"/>
@@ -216,7 +217,7 @@
           <a:p>
             <a:fld id="{3E00069D-D4B1-DA43-B156-1FB9179E1249}" type="datetimeFigureOut">
               <a:rPr lang="en-US" smtClean="0"/>
-              <a:t>5/6/20</a:t>
+              <a:t>5/7/20</a:t>
             </a:fld>
             <a:endParaRPr lang="en-US"/>
           </a:p>
@@ -762,7 +763,7 @@
           <a:p>
             <a:fld id="{51673806-0BCD-1F42-BAA8-2011034B3C6A}" type="datetimeFigureOut">
               <a:rPr lang="en-US" smtClean="0"/>
-              <a:t>5/6/20</a:t>
+              <a:t>5/7/20</a:t>
             </a:fld>
             <a:endParaRPr lang="en-US" dirty="0"/>
           </a:p>
@@ -1176,7 +1177,7 @@
           <a:p>
             <a:fld id="{51673806-0BCD-1F42-BAA8-2011034B3C6A}" type="datetimeFigureOut">
               <a:rPr lang="en-US" smtClean="0"/>
-              <a:t>5/6/20</a:t>
+              <a:t>5/7/20</a:t>
             </a:fld>
             <a:endParaRPr lang="en-US" dirty="0"/>
           </a:p>
@@ -1507,7 +1508,7 @@
           <a:p>
             <a:fld id="{51673806-0BCD-1F42-BAA8-2011034B3C6A}" type="datetimeFigureOut">
               <a:rPr lang="en-US" smtClean="0"/>
-              <a:t>5/6/20</a:t>
+              <a:t>5/7/20</a:t>
             </a:fld>
             <a:endParaRPr lang="en-US" dirty="0"/>
           </a:p>
@@ -1907,7 +1908,7 @@
           <a:p>
             <a:fld id="{51673806-0BCD-1F42-BAA8-2011034B3C6A}" type="datetimeFigureOut">
               <a:rPr lang="en-US" smtClean="0"/>
-              <a:t>5/6/20</a:t>
+              <a:t>5/7/20</a:t>
             </a:fld>
             <a:endParaRPr lang="en-US" dirty="0"/>
           </a:p>
@@ -2470,7 +2471,7 @@
           <a:p>
             <a:fld id="{51673806-0BCD-1F42-BAA8-2011034B3C6A}" type="datetimeFigureOut">
               <a:rPr lang="en-US" smtClean="0"/>
-              <a:t>5/6/20</a:t>
+              <a:t>5/7/20</a:t>
             </a:fld>
             <a:endParaRPr lang="en-US" dirty="0"/>
           </a:p>
@@ -3146,7 +3147,7 @@
           <a:p>
             <a:fld id="{51673806-0BCD-1F42-BAA8-2011034B3C6A}" type="datetimeFigureOut">
               <a:rPr lang="en-US" smtClean="0"/>
-              <a:t>5/6/20</a:t>
+              <a:t>5/7/20</a:t>
             </a:fld>
             <a:endParaRPr lang="en-US" dirty="0"/>
           </a:p>
@@ -4054,7 +4055,7 @@
           <a:p>
             <a:fld id="{51673806-0BCD-1F42-BAA8-2011034B3C6A}" type="datetimeFigureOut">
               <a:rPr lang="en-US" smtClean="0"/>
-              <a:t>5/6/20</a:t>
+              <a:t>5/7/20</a:t>
             </a:fld>
             <a:endParaRPr lang="en-US" dirty="0"/>
           </a:p>
@@ -4362,7 +4363,7 @@
           <a:p>
             <a:fld id="{51673806-0BCD-1F42-BAA8-2011034B3C6A}" type="datetimeFigureOut">
               <a:rPr lang="en-US" smtClean="0"/>
-              <a:t>5/6/20</a:t>
+              <a:t>5/7/20</a:t>
             </a:fld>
             <a:endParaRPr lang="en-US" dirty="0"/>
           </a:p>
@@ -4621,7 +4622,7 @@
           <a:p>
             <a:fld id="{51673806-0BCD-1F42-BAA8-2011034B3C6A}" type="datetimeFigureOut">
               <a:rPr lang="en-US" smtClean="0"/>
-              <a:t>5/6/20</a:t>
+              <a:t>5/7/20</a:t>
             </a:fld>
             <a:endParaRPr lang="en-US" dirty="0"/>
           </a:p>
@@ -4944,7 +4945,7 @@
           <a:p>
             <a:fld id="{51673806-0BCD-1F42-BAA8-2011034B3C6A}" type="datetimeFigureOut">
               <a:rPr lang="en-US" smtClean="0"/>
-              <a:t>5/6/20</a:t>
+              <a:t>5/7/20</a:t>
             </a:fld>
             <a:endParaRPr lang="en-US" dirty="0"/>
           </a:p>
@@ -5328,7 +5329,7 @@
           <a:p>
             <a:fld id="{51673806-0BCD-1F42-BAA8-2011034B3C6A}" type="datetimeFigureOut">
               <a:rPr lang="en-US" smtClean="0"/>
-              <a:t>5/6/20</a:t>
+              <a:t>5/7/20</a:t>
             </a:fld>
             <a:endParaRPr lang="en-US" dirty="0"/>
           </a:p>
@@ -5704,7 +5705,7 @@
           <a:p>
             <a:fld id="{51673806-0BCD-1F42-BAA8-2011034B3C6A}" type="datetimeFigureOut">
               <a:rPr lang="en-US" smtClean="0"/>
-              <a:t>5/6/20</a:t>
+              <a:t>5/7/20</a:t>
             </a:fld>
             <a:endParaRPr lang="en-US" dirty="0"/>
           </a:p>
@@ -6210,7 +6211,7 @@
           <a:p>
             <a:fld id="{51673806-0BCD-1F42-BAA8-2011034B3C6A}" type="datetimeFigureOut">
               <a:rPr lang="en-US" smtClean="0"/>
-              <a:t>5/6/20</a:t>
+              <a:t>5/7/20</a:t>
             </a:fld>
             <a:endParaRPr lang="en-US" dirty="0"/>
           </a:p>
@@ -6467,7 +6468,7 @@
           <a:p>
             <a:fld id="{51673806-0BCD-1F42-BAA8-2011034B3C6A}" type="datetimeFigureOut">
               <a:rPr lang="en-US" smtClean="0"/>
-              <a:t>5/6/20</a:t>
+              <a:t>5/7/20</a:t>
             </a:fld>
             <a:endParaRPr lang="en-US" dirty="0"/>
           </a:p>
@@ -6625,7 +6626,7 @@
           <a:p>
             <a:fld id="{51673806-0BCD-1F42-BAA8-2011034B3C6A}" type="datetimeFigureOut">
               <a:rPr lang="en-US" smtClean="0"/>
-              <a:t>5/6/20</a:t>
+              <a:t>5/7/20</a:t>
             </a:fld>
             <a:endParaRPr lang="en-US" dirty="0"/>
           </a:p>
@@ -7015,7 +7016,7 @@
           <a:p>
             <a:fld id="{51673806-0BCD-1F42-BAA8-2011034B3C6A}" type="datetimeFigureOut">
               <a:rPr lang="en-US" smtClean="0"/>
-              <a:t>5/6/20</a:t>
+              <a:t>5/7/20</a:t>
             </a:fld>
             <a:endParaRPr lang="en-US" dirty="0"/>
           </a:p>
@@ -7424,7 +7425,7 @@
           <a:p>
             <a:fld id="{51673806-0BCD-1F42-BAA8-2011034B3C6A}" type="datetimeFigureOut">
               <a:rPr lang="en-US" smtClean="0"/>
-              <a:t>5/6/20</a:t>
+              <a:t>5/7/20</a:t>
             </a:fld>
             <a:endParaRPr lang="en-US" dirty="0"/>
           </a:p>
@@ -7672,7 +7673,7 @@
             <a:fld id="{51673806-0BCD-1F42-BAA8-2011034B3C6A}" type="datetimeFigureOut">
               <a:rPr lang="en-US" smtClean="0"/>
               <a:pPr/>
-              <a:t>5/6/20</a:t>
+              <a:t>5/7/20</a:t>
             </a:fld>
             <a:endParaRPr lang="en-US" dirty="0"/>
           </a:p>
@@ -8570,15 +8571,7 @@
             </a:r>
             <a:r>
               <a:rPr lang="en-US" dirty="0" smtClean="0"/>
-              <a:t>meant to store </a:t>
-            </a:r>
-            <a:r>
-              <a:rPr lang="en-US" dirty="0" smtClean="0"/>
-              <a:t>similar </a:t>
-            </a:r>
-            <a:r>
-              <a:rPr lang="en-US" dirty="0" smtClean="0"/>
-              <a:t>data </a:t>
+              <a:t>meant to store similar data </a:t>
             </a:r>
           </a:p>
           <a:p>
@@ -8744,15 +8737,7 @@
             </a:r>
             <a:r>
               <a:rPr lang="en-US" dirty="0" smtClean="0"/>
-              <a:t>meant to store </a:t>
-            </a:r>
-            <a:r>
-              <a:rPr lang="en-US" dirty="0" smtClean="0"/>
-              <a:t>similar </a:t>
-            </a:r>
-            <a:r>
-              <a:rPr lang="en-US" dirty="0" smtClean="0"/>
-              <a:t>data </a:t>
+              <a:t>meant to store similar data </a:t>
             </a:r>
           </a:p>
           <a:p>
@@ -8864,7 +8849,7 @@
           <a:p>
             <a:r>
               <a:rPr lang="en-US" dirty="0" smtClean="0"/>
-              <a:t>Conditions</a:t>
+              <a:t>Slicing</a:t>
             </a:r>
             <a:endParaRPr lang="en-US" dirty="0"/>
           </a:p>
@@ -8882,68 +8867,165 @@
         </p:nvSpPr>
         <p:spPr>
           <a:xfrm>
-            <a:off x="680321" y="2336872"/>
-            <a:ext cx="5912983" cy="3991739"/>
-          </a:xfrm>
-        </p:spPr>
-        <p:txBody>
-          <a:bodyPr>
-            <a:normAutofit/>
-          </a:bodyPr>
+            <a:off x="680320" y="2336873"/>
+            <a:ext cx="5034679" cy="4201622"/>
+          </a:xfrm>
+        </p:spPr>
+        <p:txBody>
+          <a:bodyPr/>
           <a:lstStyle/>
           <a:p>
-            <a:pPr marL="0" indent="0">
-              <a:buNone/>
+            <a:pPr marL="0" marR="0" lvl="0" indent="0" defTabSz="914400" eaLnBrk="1" fontAlgn="auto" latinLnBrk="0" hangingPunct="1">
+              <a:lnSpc>
+                <a:spcPct val="100000"/>
+              </a:lnSpc>
+              <a:spcBef>
+                <a:spcPts val="0"/>
+              </a:spcBef>
+              <a:spcAft>
+                <a:spcPts val="0"/>
+              </a:spcAft>
+              <a:buClrTx/>
+              <a:buSzTx/>
+              <a:buFontTx/>
+              <a:buNone/>
+              <a:tabLst/>
+              <a:defRPr/>
             </a:pPr>
             <a:r>
               <a:rPr lang="en-US" dirty="0" smtClean="0"/>
-              <a:t>Conduct different operations based on whether or not a given condition is satisfied </a:t>
-            </a:r>
-          </a:p>
-          <a:p>
-            <a:pPr marL="0" indent="0">
-              <a:buNone/>
+              <a:t>A technique used to pull multiple items from array-like objects </a:t>
+            </a:r>
+          </a:p>
+          <a:p>
+            <a:pPr marL="0" marR="0" lvl="0" indent="0" defTabSz="914400" eaLnBrk="1" fontAlgn="auto" latinLnBrk="0" hangingPunct="1">
+              <a:lnSpc>
+                <a:spcPct val="100000"/>
+              </a:lnSpc>
+              <a:spcBef>
+                <a:spcPts val="0"/>
+              </a:spcBef>
+              <a:spcAft>
+                <a:spcPts val="0"/>
+              </a:spcAft>
+              <a:buClrTx/>
+              <a:buSzTx/>
+              <a:buFontTx/>
+              <a:buNone/>
+              <a:tabLst/>
+              <a:defRPr/>
             </a:pPr>
             <a:endParaRPr lang="en-US" dirty="0"/>
           </a:p>
           <a:p>
-            <a:pPr marL="0" indent="0">
-              <a:buNone/>
-            </a:pPr>
-            <a:r>
-              <a:rPr lang="en-US" dirty="0" smtClean="0"/>
-              <a:t>Uses </a:t>
-            </a:r>
-            <a:r>
-              <a:rPr lang="en-US" dirty="0" err="1" smtClean="0"/>
-              <a:t>boolean</a:t>
-            </a:r>
-            <a:r>
-              <a:rPr lang="en-US" dirty="0" smtClean="0"/>
-              <a:t> logic: True and False </a:t>
-            </a:r>
-          </a:p>
-          <a:p>
-            <a:pPr marL="0" indent="0">
-              <a:buNone/>
+            <a:pPr marL="0" marR="0" lvl="0" indent="0" defTabSz="914400" eaLnBrk="1" fontAlgn="auto" latinLnBrk="0" hangingPunct="1">
+              <a:lnSpc>
+                <a:spcPct val="100000"/>
+              </a:lnSpc>
+              <a:spcBef>
+                <a:spcPts val="0"/>
+              </a:spcBef>
+              <a:spcAft>
+                <a:spcPts val="0"/>
+              </a:spcAft>
+              <a:buClrTx/>
+              <a:buSzTx/>
+              <a:buFontTx/>
+              <a:buNone/>
+              <a:tabLst/>
+              <a:defRPr/>
             </a:pPr>
             <a:endParaRPr lang="en-US" dirty="0" smtClean="0"/>
           </a:p>
           <a:p>
-            <a:pPr marL="0" indent="0">
-              <a:buNone/>
+            <a:pPr marL="0" marR="0" lvl="0" indent="0" defTabSz="914400" eaLnBrk="1" fontAlgn="auto" latinLnBrk="0" hangingPunct="1">
+              <a:lnSpc>
+                <a:spcPct val="100000"/>
+              </a:lnSpc>
+              <a:spcBef>
+                <a:spcPts val="0"/>
+              </a:spcBef>
+              <a:spcAft>
+                <a:spcPts val="0"/>
+              </a:spcAft>
+              <a:buClrTx/>
+              <a:buSzTx/>
+              <a:buFontTx/>
+              <a:buNone/>
+              <a:tabLst/>
+              <a:defRPr/>
             </a:pPr>
             <a:r>
               <a:rPr lang="en-US" dirty="0" smtClean="0"/>
-              <a:t>Note: Numbers can be used as well </a:t>
-            </a:r>
-            <a:r>
-              <a:rPr lang="mr-IN" dirty="0" smtClean="0"/>
-              <a:t>–</a:t>
-            </a:r>
-            <a:r>
-              <a:rPr lang="en-US" dirty="0" smtClean="0"/>
-              <a:t> anything nonzero evaluates to True. </a:t>
+              <a:t>Achieved by separating </a:t>
+            </a:r>
+            <a:r>
+              <a:rPr lang="en-US" smtClean="0"/>
+              <a:t>two indices with a colon</a:t>
+            </a:r>
+            <a:endParaRPr lang="en-US" dirty="0" smtClean="0"/>
+          </a:p>
+          <a:p>
+            <a:pPr marL="0" marR="0" lvl="0" indent="0" defTabSz="914400" eaLnBrk="1" fontAlgn="auto" latinLnBrk="0" hangingPunct="1">
+              <a:lnSpc>
+                <a:spcPct val="100000"/>
+              </a:lnSpc>
+              <a:spcBef>
+                <a:spcPts val="0"/>
+              </a:spcBef>
+              <a:spcAft>
+                <a:spcPts val="0"/>
+              </a:spcAft>
+              <a:buClrTx/>
+              <a:buSzTx/>
+              <a:buFontTx/>
+              <a:buNone/>
+              <a:tabLst/>
+              <a:defRPr/>
+            </a:pPr>
+            <a:endParaRPr lang="en-US" dirty="0" smtClean="0"/>
+          </a:p>
+          <a:p>
+            <a:pPr marL="0" marR="0" lvl="0" indent="0" defTabSz="914400" eaLnBrk="1" fontAlgn="auto" latinLnBrk="0" hangingPunct="1">
+              <a:lnSpc>
+                <a:spcPct val="100000"/>
+              </a:lnSpc>
+              <a:spcBef>
+                <a:spcPts val="0"/>
+              </a:spcBef>
+              <a:spcAft>
+                <a:spcPts val="0"/>
+              </a:spcAft>
+              <a:buClrTx/>
+              <a:buSzTx/>
+              <a:buFontTx/>
+              <a:buNone/>
+              <a:tabLst/>
+              <a:defRPr/>
+            </a:pPr>
+            <a:endParaRPr lang="en-US" dirty="0"/>
+          </a:p>
+          <a:p>
+            <a:pPr marL="0" marR="0" lvl="0" indent="0" defTabSz="914400" eaLnBrk="1" fontAlgn="auto" latinLnBrk="0" hangingPunct="1">
+              <a:lnSpc>
+                <a:spcPct val="100000"/>
+              </a:lnSpc>
+              <a:spcBef>
+                <a:spcPts val="0"/>
+              </a:spcBef>
+              <a:spcAft>
+                <a:spcPts val="0"/>
+              </a:spcAft>
+              <a:buClrTx/>
+              <a:buSzTx/>
+              <a:buFontTx/>
+              <a:buNone/>
+              <a:tabLst/>
+              <a:defRPr/>
+            </a:pPr>
+            <a:r>
+              <a:rPr lang="en-US" dirty="0" smtClean="0"/>
+              <a:t>If either start or end are absent, it takes the beginning and end </a:t>
             </a:r>
           </a:p>
         </p:txBody>
@@ -8970,8 +9052,8 @@
         </p:blipFill>
         <p:spPr>
           <a:xfrm>
-            <a:off x="7657432" y="0"/>
-            <a:ext cx="3282566" cy="6858000"/>
+            <a:off x="6738182" y="2207795"/>
+            <a:ext cx="3556000" cy="4330700"/>
           </a:xfrm>
           <a:prstGeom prst="rect">
             <a:avLst/>
@@ -8981,7 +9063,7 @@
     </p:spTree>
     <p:extLst>
       <p:ext uri="{BB962C8B-B14F-4D97-AF65-F5344CB8AC3E}">
-        <p14:creationId xmlns:p14="http://schemas.microsoft.com/office/powerpoint/2010/main" val="1736834906"/>
+        <p14:creationId xmlns:p14="http://schemas.microsoft.com/office/powerpoint/2010/main" val="736711663"/>
       </p:ext>
     </p:extLst>
   </p:cSld>
@@ -9043,12 +9125,14 @@
         </p:nvSpPr>
         <p:spPr>
           <a:xfrm>
-            <a:off x="680321" y="2336873"/>
-            <a:ext cx="5912983" cy="4316590"/>
-          </a:xfrm>
-        </p:spPr>
-        <p:txBody>
-          <a:bodyPr/>
+            <a:off x="680321" y="2336872"/>
+            <a:ext cx="5912983" cy="3991739"/>
+          </a:xfrm>
+        </p:spPr>
+        <p:txBody>
+          <a:bodyPr>
+            <a:normAutofit/>
+          </a:bodyPr>
           <a:lstStyle/>
           <a:p>
             <a:pPr marL="0" indent="0">
@@ -9105,59 +9189,11 @@
               <a:t> anything nonzero evaluates to True. </a:t>
             </a:r>
           </a:p>
-          <a:p>
-            <a:pPr marL="0" indent="0">
-              <a:buNone/>
-            </a:pPr>
-            <a:endParaRPr lang="en-US" dirty="0"/>
-          </a:p>
-          <a:p>
-            <a:pPr marL="0" indent="0">
-              <a:buNone/>
-            </a:pPr>
-            <a:r>
-              <a:rPr lang="en-US" dirty="0" smtClean="0"/>
-              <a:t>Note: </a:t>
-            </a:r>
-            <a:r>
-              <a:rPr lang="en-US" i="1" dirty="0" smtClean="0"/>
-              <a:t>if</a:t>
-            </a:r>
-            <a:r>
-              <a:rPr lang="en-US" dirty="0" smtClean="0"/>
-              <a:t>/</a:t>
-            </a:r>
-            <a:r>
-              <a:rPr lang="en-US" i="1" dirty="0" err="1" smtClean="0"/>
-              <a:t>elif</a:t>
-            </a:r>
-            <a:r>
-              <a:rPr lang="en-US" dirty="0" smtClean="0"/>
-              <a:t>/</a:t>
-            </a:r>
-            <a:r>
-              <a:rPr lang="en-US" i="1" dirty="0" smtClean="0"/>
-              <a:t>else</a:t>
-            </a:r>
-            <a:r>
-              <a:rPr lang="en-US" dirty="0" smtClean="0"/>
-              <a:t> blocks executed </a:t>
-            </a:r>
-            <a:r>
-              <a:rPr lang="en-US" i="1" dirty="0" smtClean="0"/>
-              <a:t>in order</a:t>
-            </a:r>
-            <a:r>
-              <a:rPr lang="en-US" dirty="0" smtClean="0"/>
-              <a:t>. </a:t>
-            </a:r>
-            <a:endParaRPr lang="en-US" dirty="0"/>
-          </a:p>
         </p:txBody>
       </p:sp>
       <p:pic>
         <p:nvPicPr>
-          <p:cNvPr id="5" name="Picture 4"/>
+          <p:cNvPr id="4" name="Picture 3"/>
           <p:cNvPicPr>
             <a:picLocks noChangeAspect="1"/>
           </p:cNvPicPr>
@@ -9177,8 +9213,8 @@
         </p:blipFill>
         <p:spPr>
           <a:xfrm>
-            <a:off x="7652753" y="0"/>
-            <a:ext cx="3337316" cy="6858000"/>
+            <a:off x="7657432" y="0"/>
+            <a:ext cx="3282566" cy="6858000"/>
           </a:xfrm>
           <a:prstGeom prst="rect">
             <a:avLst/>
@@ -9188,7 +9224,7 @@
     </p:spTree>
     <p:extLst>
       <p:ext uri="{BB962C8B-B14F-4D97-AF65-F5344CB8AC3E}">
-        <p14:creationId xmlns:p14="http://schemas.microsoft.com/office/powerpoint/2010/main" val="492525298"/>
+        <p14:creationId xmlns:p14="http://schemas.microsoft.com/office/powerpoint/2010/main" val="1736834906"/>
       </p:ext>
     </p:extLst>
   </p:cSld>
@@ -9232,7 +9268,7 @@
           <a:p>
             <a:r>
               <a:rPr lang="en-US" dirty="0" smtClean="0"/>
-              <a:t>Loops </a:t>
+              <a:t>Conditions</a:t>
             </a:r>
             <a:endParaRPr lang="en-US" dirty="0"/>
           </a:p>
@@ -9250,8 +9286,8 @@
         </p:nvSpPr>
         <p:spPr>
           <a:xfrm>
-            <a:off x="680322" y="2336873"/>
-            <a:ext cx="8367426" cy="3599316"/>
+            <a:off x="680321" y="2336873"/>
+            <a:ext cx="5912983" cy="4316590"/>
           </a:xfrm>
         </p:spPr>
         <p:txBody>
@@ -9263,14 +9299,30 @@
             </a:pPr>
             <a:r>
               <a:rPr lang="en-US" dirty="0" smtClean="0"/>
-              <a:t>Two types</a:t>
-            </a:r>
-          </a:p>
-          <a:p>
-            <a:pPr lvl="1"/>
-            <a:r>
-              <a:rPr lang="en-US" dirty="0" smtClean="0"/>
-              <a:t>For- and while-loops </a:t>
+              <a:t>Conduct different operations based on whether or not a given condition is satisfied </a:t>
+            </a:r>
+          </a:p>
+          <a:p>
+            <a:pPr marL="0" indent="0">
+              <a:buNone/>
+            </a:pPr>
+            <a:endParaRPr lang="en-US" dirty="0"/>
+          </a:p>
+          <a:p>
+            <a:pPr marL="0" indent="0">
+              <a:buNone/>
+            </a:pPr>
+            <a:r>
+              <a:rPr lang="en-US" dirty="0" smtClean="0"/>
+              <a:t>Uses </a:t>
+            </a:r>
+            <a:r>
+              <a:rPr lang="en-US" dirty="0" err="1" smtClean="0"/>
+              <a:t>boolean</a:t>
+            </a:r>
+            <a:r>
+              <a:rPr lang="en-US" dirty="0" smtClean="0"/>
+              <a:t> logic: True and False </a:t>
             </a:r>
           </a:p>
           <a:p>
@@ -9285,7 +9337,15 @@
             </a:pPr>
             <a:r>
               <a:rPr lang="en-US" dirty="0" smtClean="0"/>
-              <a:t>Both execute the same block of code some number of times </a:t>
+              <a:t>Note: Numbers can be used as well </a:t>
+            </a:r>
+            <a:r>
+              <a:rPr lang="mr-IN" dirty="0" smtClean="0"/>
+              <a:t>–</a:t>
+            </a:r>
+            <a:r>
+              <a:rPr lang="en-US" dirty="0" smtClean="0"/>
+              <a:t> anything nonzero evaluates to True. </a:t>
             </a:r>
           </a:p>
           <a:p>
@@ -9300,16 +9360,78 @@
             </a:pPr>
             <a:r>
               <a:rPr lang="en-US" dirty="0" smtClean="0"/>
-              <a:t>Both types of loops can be forced to terminate with the command “break”, and to start the next iteration with “continue” </a:t>
-            </a:r>
-            <a:endParaRPr lang="en-US" dirty="0"/>
-          </a:p>
-        </p:txBody>
-      </p:sp>
+              <a:t>Note: </a:t>
+            </a:r>
+            <a:r>
+              <a:rPr lang="en-US" i="1" dirty="0" smtClean="0"/>
+              <a:t>if</a:t>
+            </a:r>
+            <a:r>
+              <a:rPr lang="en-US" dirty="0" smtClean="0"/>
+              <a:t>/</a:t>
+            </a:r>
+            <a:r>
+              <a:rPr lang="en-US" i="1" dirty="0" err="1" smtClean="0"/>
+              <a:t>elif</a:t>
+            </a:r>
+            <a:r>
+              <a:rPr lang="en-US" dirty="0" smtClean="0"/>
+              <a:t>/</a:t>
+            </a:r>
+            <a:r>
+              <a:rPr lang="en-US" i="1" dirty="0" smtClean="0"/>
+              <a:t>else</a:t>
+            </a:r>
+            <a:r>
+              <a:rPr lang="en-US" dirty="0" smtClean="0"/>
+              <a:t> blocks executed </a:t>
+            </a:r>
+            <a:r>
+              <a:rPr lang="en-US" i="1" dirty="0" smtClean="0"/>
+              <a:t>in order</a:t>
+            </a:r>
+            <a:r>
+              <a:rPr lang="en-US" dirty="0" smtClean="0"/>
+              <a:t>. </a:t>
+            </a:r>
+            <a:endParaRPr lang="en-US" dirty="0"/>
+          </a:p>
+        </p:txBody>
+      </p:sp>
+      <p:pic>
+        <p:nvPicPr>
+          <p:cNvPr id="5" name="Picture 4"/>
+          <p:cNvPicPr>
+            <a:picLocks noChangeAspect="1"/>
+          </p:cNvPicPr>
+          <p:nvPr/>
+        </p:nvPicPr>
+        <p:blipFill>
+          <a:blip r:embed="rId2">
+            <a:extLst>
+              <a:ext uri="{28A0092B-C50C-407E-A947-70E740481C1C}">
+                <a14:useLocalDpi xmlns:a14="http://schemas.microsoft.com/office/drawing/2010/main" val="0"/>
+              </a:ext>
+            </a:extLst>
+          </a:blip>
+          <a:stretch>
+            <a:fillRect/>
+          </a:stretch>
+        </p:blipFill>
+        <p:spPr>
+          <a:xfrm>
+            <a:off x="7652753" y="0"/>
+            <a:ext cx="3337316" cy="6858000"/>
+          </a:xfrm>
+          <a:prstGeom prst="rect">
+            <a:avLst/>
+          </a:prstGeom>
+        </p:spPr>
+      </p:pic>
     </p:spTree>
     <p:extLst>
       <p:ext uri="{BB962C8B-B14F-4D97-AF65-F5344CB8AC3E}">
-        <p14:creationId xmlns:p14="http://schemas.microsoft.com/office/powerpoint/2010/main" val="501260096"/>
+        <p14:creationId xmlns:p14="http://schemas.microsoft.com/office/powerpoint/2010/main" val="492525298"/>
       </p:ext>
     </p:extLst>
   </p:cSld>
@@ -9353,7 +9475,7 @@
           <a:p>
             <a:r>
               <a:rPr lang="en-US" dirty="0" smtClean="0"/>
-              <a:t>For-loops </a:t>
+              <a:t>Loops </a:t>
             </a:r>
             <a:endParaRPr lang="en-US" dirty="0"/>
           </a:p>
@@ -9372,227 +9494,65 @@
         <p:spPr>
           <a:xfrm>
             <a:off x="680322" y="2336873"/>
-            <a:ext cx="6273932" cy="3599316"/>
+            <a:ext cx="8367426" cy="3599316"/>
           </a:xfrm>
         </p:spPr>
         <p:txBody>
           <a:bodyPr/>
           <a:lstStyle/>
           <a:p>
-            <a:pPr marL="0" marR="0" lvl="0" indent="0" defTabSz="914400" eaLnBrk="1" fontAlgn="auto" latinLnBrk="0" hangingPunct="1">
-              <a:lnSpc>
-                <a:spcPct val="100000"/>
-              </a:lnSpc>
-              <a:spcBef>
-                <a:spcPts val="0"/>
-              </a:spcBef>
-              <a:spcAft>
-                <a:spcPts val="0"/>
-              </a:spcAft>
-              <a:buClrTx/>
-              <a:buSzTx/>
-              <a:buFontTx/>
-              <a:buNone/>
-              <a:tabLst/>
-              <a:defRPr/>
+            <a:pPr marL="0" indent="0">
+              <a:buNone/>
             </a:pPr>
             <a:r>
               <a:rPr lang="en-US" dirty="0" smtClean="0"/>
-              <a:t>Should be used when you know </a:t>
-            </a:r>
-            <a:r>
-              <a:rPr lang="en-US" i="1" dirty="0" smtClean="0"/>
-              <a:t>exactly </a:t>
-            </a:r>
-            <a:r>
-              <a:rPr lang="en-US" dirty="0" smtClean="0"/>
-              <a:t>how many times the block should repeat </a:t>
-            </a:r>
-          </a:p>
-          <a:p>
-            <a:pPr marL="0" marR="0" lvl="0" indent="0" defTabSz="914400" eaLnBrk="1" fontAlgn="auto" latinLnBrk="0" hangingPunct="1">
-              <a:lnSpc>
-                <a:spcPct val="100000"/>
-              </a:lnSpc>
-              <a:spcBef>
-                <a:spcPts val="0"/>
-              </a:spcBef>
-              <a:spcAft>
-                <a:spcPts val="0"/>
-              </a:spcAft>
-              <a:buClrTx/>
-              <a:buSzTx/>
-              <a:buFontTx/>
-              <a:buNone/>
-              <a:tabLst/>
-              <a:defRPr/>
-            </a:pPr>
-            <a:endParaRPr lang="en-US" dirty="0"/>
-          </a:p>
-          <a:p>
-            <a:pPr marL="0" marR="0" lvl="0" indent="0" defTabSz="914400" eaLnBrk="1" fontAlgn="auto" latinLnBrk="0" hangingPunct="1">
-              <a:lnSpc>
-                <a:spcPct val="100000"/>
-              </a:lnSpc>
-              <a:spcBef>
-                <a:spcPts val="0"/>
-              </a:spcBef>
-              <a:spcAft>
-                <a:spcPts val="0"/>
-              </a:spcAft>
-              <a:buClrTx/>
-              <a:buSzTx/>
-              <a:buFontTx/>
-              <a:buNone/>
-              <a:tabLst/>
-              <a:defRPr/>
+              <a:t>Two types</a:t>
+            </a:r>
+          </a:p>
+          <a:p>
+            <a:pPr lvl="1"/>
+            <a:r>
+              <a:rPr lang="en-US" dirty="0" smtClean="0"/>
+              <a:t>For- and while-loops </a:t>
+            </a:r>
+          </a:p>
+          <a:p>
+            <a:pPr marL="0" indent="0">
+              <a:buNone/>
             </a:pPr>
             <a:endParaRPr lang="en-US" dirty="0" smtClean="0"/>
           </a:p>
           <a:p>
-            <a:pPr marL="0" marR="0" lvl="0" indent="0" defTabSz="914400" eaLnBrk="1" fontAlgn="auto" latinLnBrk="0" hangingPunct="1">
-              <a:lnSpc>
-                <a:spcPct val="100000"/>
-              </a:lnSpc>
-              <a:spcBef>
-                <a:spcPts val="0"/>
-              </a:spcBef>
-              <a:spcAft>
-                <a:spcPts val="0"/>
-              </a:spcAft>
-              <a:buClrTx/>
-              <a:buSzTx/>
-              <a:buFontTx/>
-              <a:buNone/>
-              <a:tabLst/>
-              <a:defRPr/>
+            <a:pPr marL="0" indent="0">
+              <a:buNone/>
             </a:pPr>
             <a:r>
               <a:rPr lang="en-US" dirty="0" smtClean="0"/>
-              <a:t>Come in two flavors: </a:t>
-            </a:r>
-          </a:p>
-          <a:p>
-            <a:pPr lvl="1">
-              <a:lnSpc>
-                <a:spcPct val="100000"/>
-              </a:lnSpc>
-              <a:spcBef>
-                <a:spcPts val="0"/>
-              </a:spcBef>
+              <a:t>Both execute the same block of code some number of times </a:t>
+            </a:r>
+          </a:p>
+          <a:p>
+            <a:pPr marL="0" indent="0">
+              <a:buNone/>
             </a:pPr>
-            <a:r>
-              <a:rPr lang="en-US" i="1" dirty="0" smtClean="0"/>
-              <a:t>Explicit</a:t>
-            </a:r>
-            <a:r>
-              <a:rPr lang="en-US" dirty="0" smtClean="0"/>
-              <a:t> for loop: “</a:t>
-            </a:r>
-            <a:r>
-              <a:rPr lang="en-US" i="1" dirty="0" smtClean="0"/>
-              <a:t>for </a:t>
-            </a:r>
-            <a:r>
-              <a:rPr lang="en-US" i="1" dirty="0" err="1" smtClean="0"/>
-              <a:t>i</a:t>
-            </a:r>
-            <a:r>
-              <a:rPr lang="en-US" i="1" dirty="0" smtClean="0"/>
-              <a:t> in &lt;some </a:t>
-            </a:r>
-            <a:r>
-              <a:rPr lang="en-US" i="1" dirty="0" err="1" smtClean="0"/>
-              <a:t>iterable</a:t>
-            </a:r>
-            <a:r>
-              <a:rPr lang="en-US" i="1" dirty="0" smtClean="0"/>
-              <a:t>&gt;”</a:t>
-            </a:r>
-            <a:r>
-              <a:rPr lang="en-US" dirty="0" smtClean="0"/>
-              <a:t> </a:t>
-            </a:r>
-            <a:r>
-              <a:rPr lang="en-US" dirty="0" smtClean="0"/>
-              <a:t>followed by an indented block (example: top) </a:t>
-            </a:r>
-          </a:p>
-          <a:p>
-            <a:pPr lvl="1">
-              <a:lnSpc>
-                <a:spcPct val="100000"/>
-              </a:lnSpc>
-              <a:spcBef>
-                <a:spcPts val="0"/>
-              </a:spcBef>
+            <a:endParaRPr lang="en-US" dirty="0"/>
+          </a:p>
+          <a:p>
+            <a:pPr marL="0" indent="0">
+              <a:buNone/>
             </a:pPr>
             <a:r>
-              <a:rPr lang="en-US" i="1" dirty="0" smtClean="0"/>
-              <a:t>Implicit</a:t>
-            </a:r>
-            <a:r>
-              <a:rPr lang="en-US" dirty="0" smtClean="0"/>
-              <a:t> for loop: occurs within a list comprehension (example: bottom) </a:t>
-            </a:r>
-            <a:endParaRPr lang="en-US" i="1" dirty="0" smtClean="0"/>
-          </a:p>
-          <a:p>
-            <a:pPr marL="0" marR="0" lvl="0" indent="0" defTabSz="914400" eaLnBrk="1" fontAlgn="auto" latinLnBrk="0" hangingPunct="1">
-              <a:lnSpc>
-                <a:spcPct val="100000"/>
-              </a:lnSpc>
-              <a:spcBef>
-                <a:spcPts val="0"/>
-              </a:spcBef>
-              <a:spcAft>
-                <a:spcPts val="0"/>
-              </a:spcAft>
-              <a:buClrTx/>
-              <a:buSzTx/>
-              <a:buFontTx/>
-              <a:buNone/>
-              <a:tabLst/>
-              <a:defRPr/>
-            </a:pPr>
-            <a:endParaRPr lang="en-US" dirty="0"/>
-          </a:p>
-        </p:txBody>
-      </p:sp>
-      <p:pic>
-        <p:nvPicPr>
-          <p:cNvPr id="7" name="Picture 6"/>
-          <p:cNvPicPr>
-            <a:picLocks noChangeAspect="1"/>
-          </p:cNvPicPr>
-          <p:nvPr/>
-        </p:nvPicPr>
-        <p:blipFill>
-          <a:blip r:embed="rId2">
-            <a:extLst>
-              <a:ext uri="{28A0092B-C50C-407E-A947-70E740481C1C}">
-                <a14:useLocalDpi xmlns:a14="http://schemas.microsoft.com/office/drawing/2010/main" val="0"/>
-              </a:ext>
-            </a:extLst>
-          </a:blip>
-          <a:stretch>
-            <a:fillRect/>
-          </a:stretch>
-        </p:blipFill>
-        <p:spPr>
-          <a:xfrm>
-            <a:off x="7177505" y="2336873"/>
-            <a:ext cx="4396874" cy="3833860"/>
-          </a:xfrm>
-          <a:prstGeom prst="rect">
-            <a:avLst/>
-          </a:prstGeom>
-        </p:spPr>
-      </p:pic>
+              <a:rPr lang="en-US" dirty="0" smtClean="0"/>
+              <a:t>Both types of loops can be forced to terminate with the command “break”, and to start the next iteration with “continue” </a:t>
+            </a:r>
+            <a:endParaRPr lang="en-US" dirty="0"/>
+          </a:p>
+        </p:txBody>
+      </p:sp>
     </p:spTree>
     <p:extLst>
       <p:ext uri="{BB962C8B-B14F-4D97-AF65-F5344CB8AC3E}">
-        <p14:creationId xmlns:p14="http://schemas.microsoft.com/office/powerpoint/2010/main" val="720703814"/>
+        <p14:creationId xmlns:p14="http://schemas.microsoft.com/office/powerpoint/2010/main" val="501260096"/>
       </p:ext>
     </p:extLst>
   </p:cSld>
@@ -9636,7 +9596,7 @@
           <a:p>
             <a:r>
               <a:rPr lang="en-US" dirty="0" smtClean="0"/>
-              <a:t>While-loops </a:t>
+              <a:t>For-loops </a:t>
             </a:r>
             <a:endParaRPr lang="en-US" dirty="0"/>
           </a:p>
@@ -9654,8 +9614,8 @@
         </p:nvSpPr>
         <p:spPr>
           <a:xfrm>
-            <a:off x="680321" y="2336873"/>
-            <a:ext cx="7092079" cy="3599316"/>
+            <a:off x="680322" y="2336873"/>
+            <a:ext cx="6273932" cy="3599316"/>
           </a:xfrm>
         </p:spPr>
         <p:txBody>
@@ -9681,66 +9641,78 @@
             </a:pPr>
             <a:r>
               <a:rPr lang="en-US" dirty="0" smtClean="0"/>
-              <a:t>Should be used when you </a:t>
+              <a:t>Should be used when you know </a:t>
             </a:r>
             <a:r>
               <a:rPr lang="en-US" i="1" dirty="0" smtClean="0"/>
-              <a:t>don’t</a:t>
-            </a:r>
-            <a:r>
-              <a:rPr lang="en-US" dirty="0" smtClean="0"/>
-              <a:t> know how many times the block should repeat </a:t>
-            </a:r>
-          </a:p>
-          <a:p>
-            <a:pPr marL="0" indent="0">
+              <a:t>exactly </a:t>
+            </a:r>
+            <a:r>
+              <a:rPr lang="en-US" dirty="0" smtClean="0"/>
+              <a:t>how many times the block should repeat </a:t>
+            </a:r>
+          </a:p>
+          <a:p>
+            <a:pPr marL="0" marR="0" lvl="0" indent="0" defTabSz="914400" eaLnBrk="1" fontAlgn="auto" latinLnBrk="0" hangingPunct="1">
               <a:lnSpc>
                 <a:spcPct val="100000"/>
               </a:lnSpc>
               <a:spcBef>
                 <a:spcPts val="0"/>
               </a:spcBef>
-              <a:buNone/>
+              <a:spcAft>
+                <a:spcPts val="0"/>
+              </a:spcAft>
+              <a:buClrTx/>
+              <a:buSzTx/>
+              <a:buFontTx/>
+              <a:buNone/>
+              <a:tabLst/>
+              <a:defRPr/>
             </a:pPr>
-            <a:endParaRPr lang="en-US" i="1" dirty="0" smtClean="0"/>
-          </a:p>
-          <a:p>
-            <a:pPr marL="0" indent="0">
+            <a:endParaRPr lang="en-US" dirty="0"/>
+          </a:p>
+          <a:p>
+            <a:pPr marL="0" marR="0" lvl="0" indent="0" defTabSz="914400" eaLnBrk="1" fontAlgn="auto" latinLnBrk="0" hangingPunct="1">
               <a:lnSpc>
                 <a:spcPct val="100000"/>
               </a:lnSpc>
               <a:spcBef>
                 <a:spcPts val="0"/>
               </a:spcBef>
-              <a:buNone/>
+              <a:spcAft>
+                <a:spcPts val="0"/>
+              </a:spcAft>
+              <a:buClrTx/>
+              <a:buSzTx/>
+              <a:buFontTx/>
+              <a:buNone/>
+              <a:tabLst/>
+              <a:defRPr/>
             </a:pPr>
-            <a:endParaRPr lang="en-US" i="1" dirty="0" smtClean="0"/>
-          </a:p>
-          <a:p>
-            <a:pPr marL="0" indent="0">
+            <a:endParaRPr lang="en-US" dirty="0" smtClean="0"/>
+          </a:p>
+          <a:p>
+            <a:pPr marL="0" marR="0" lvl="0" indent="0" defTabSz="914400" eaLnBrk="1" fontAlgn="auto" latinLnBrk="0" hangingPunct="1">
               <a:lnSpc>
                 <a:spcPct val="100000"/>
               </a:lnSpc>
               <a:spcBef>
                 <a:spcPts val="0"/>
               </a:spcBef>
-              <a:buNone/>
+              <a:spcAft>
+                <a:spcPts val="0"/>
+              </a:spcAft>
+              <a:buClrTx/>
+              <a:buSzTx/>
+              <a:buFontTx/>
+              <a:buNone/>
+              <a:tabLst/>
+              <a:defRPr/>
             </a:pPr>
             <a:r>
-              <a:rPr lang="en-US" i="1" dirty="0" smtClean="0"/>
-              <a:t>while True: &lt;</a:t>
-            </a:r>
-            <a:r>
-              <a:rPr lang="mr-IN" i="1" dirty="0" smtClean="0"/>
-              <a:t>…</a:t>
-            </a:r>
-            <a:r>
-              <a:rPr lang="en-US" i="1" dirty="0" smtClean="0"/>
-              <a:t>&gt; break </a:t>
-            </a:r>
-            <a:r>
-              <a:rPr lang="en-US" dirty="0" smtClean="0"/>
-              <a:t>is not uncommon, but generally considered bad practice </a:t>
+              <a:rPr lang="en-US" dirty="0" smtClean="0"/>
+              <a:t>Come in two flavors: </a:t>
             </a:r>
           </a:p>
           <a:p>
@@ -9753,55 +9725,82 @@
               </a:spcBef>
             </a:pPr>
             <a:r>
-              <a:rPr lang="en-US" dirty="0" smtClean="0"/>
-              <a:t>Advantage: The loop will </a:t>
-            </a:r>
-            <a:r>
               <a:rPr lang="en-US" i="1" dirty="0" smtClean="0"/>
-              <a:t>always</a:t>
-            </a:r>
-            <a:r>
-              <a:rPr lang="en-US" dirty="0" smtClean="0"/>
-              <a:t> execute at least once. Other languages achieve this with what is called a </a:t>
+              <a:t>Explicit</a:t>
+            </a:r>
+            <a:r>
+              <a:rPr lang="en-US" dirty="0" smtClean="0"/>
+              <a:t> for loop: “</a:t>
             </a:r>
             <a:r>
               <a:rPr lang="en-US" i="1" dirty="0" smtClean="0"/>
-              <a:t>do-while</a:t>
-            </a:r>
-            <a:r>
-              <a:rPr lang="en-US" dirty="0" smtClean="0"/>
-              <a:t> loop. </a:t>
-            </a:r>
-          </a:p>
-          <a:p>
-            <a:pPr marL="0" indent="0">
+              <a:t>for </a:t>
+            </a:r>
+            <a:r>
+              <a:rPr lang="en-US" i="1" dirty="0" err="1" smtClean="0"/>
+              <a:t>i</a:t>
+            </a:r>
+            <a:r>
+              <a:rPr lang="en-US" i="1" dirty="0" smtClean="0"/>
+              <a:t> in &lt;some </a:t>
+            </a:r>
+            <a:r>
+              <a:rPr lang="en-US" i="1" dirty="0" err="1" smtClean="0"/>
+              <a:t>iterable</a:t>
+            </a:r>
+            <a:r>
+              <a:rPr lang="en-US" i="1" dirty="0" smtClean="0"/>
+              <a:t>&gt;”</a:t>
+            </a:r>
+            <a:r>
+              <a:rPr lang="en-US" dirty="0" smtClean="0"/>
+              <a:t> followed by an indented block (example: top) </a:t>
+            </a:r>
+          </a:p>
+          <a:p>
+            <a:pPr lvl="1">
               <a:lnSpc>
                 <a:spcPct val="100000"/>
               </a:lnSpc>
               <a:spcBef>
                 <a:spcPts val="0"/>
               </a:spcBef>
-              <a:buNone/>
             </a:pPr>
+            <a:r>
+              <a:rPr lang="en-US" i="1" dirty="0" smtClean="0"/>
+              <a:t>Implicit</a:t>
+            </a:r>
+            <a:r>
+              <a:rPr lang="en-US" dirty="0" smtClean="0"/>
+              <a:t> for loop: occurs within a list comprehension (example: bottom) </a:t>
+            </a:r>
             <a:endParaRPr lang="en-US" i="1" dirty="0" smtClean="0"/>
           </a:p>
           <a:p>
-            <a:pPr marL="0" indent="0">
+            <a:pPr marL="0" marR="0" lvl="0" indent="0" defTabSz="914400" eaLnBrk="1" fontAlgn="auto" latinLnBrk="0" hangingPunct="1">
               <a:lnSpc>
                 <a:spcPct val="100000"/>
               </a:lnSpc>
               <a:spcBef>
                 <a:spcPts val="0"/>
               </a:spcBef>
-              <a:buNone/>
+              <a:spcAft>
+                <a:spcPts val="0"/>
+              </a:spcAft>
+              <a:buClrTx/>
+              <a:buSzTx/>
+              <a:buFontTx/>
+              <a:buNone/>
+              <a:tabLst/>
+              <a:defRPr/>
             </a:pPr>
-            <a:endParaRPr lang="en-US" i="1" dirty="0"/>
+            <a:endParaRPr lang="en-US" dirty="0"/>
           </a:p>
         </p:txBody>
       </p:sp>
       <p:pic>
         <p:nvPicPr>
-          <p:cNvPr id="4" name="Picture 3"/>
+          <p:cNvPr id="7" name="Picture 6"/>
           <p:cNvPicPr>
             <a:picLocks noChangeAspect="1"/>
           </p:cNvPicPr>
@@ -9821,8 +9820,8 @@
         </p:blipFill>
         <p:spPr>
           <a:xfrm>
-            <a:off x="8121984" y="0"/>
-            <a:ext cx="3021806" cy="6858000"/>
+            <a:off x="7177505" y="2336873"/>
+            <a:ext cx="4396874" cy="3833860"/>
           </a:xfrm>
           <a:prstGeom prst="rect">
             <a:avLst/>
@@ -9832,7 +9831,7 @@
     </p:spTree>
     <p:extLst>
       <p:ext uri="{BB962C8B-B14F-4D97-AF65-F5344CB8AC3E}">
-        <p14:creationId xmlns:p14="http://schemas.microsoft.com/office/powerpoint/2010/main" val="409787854"/>
+        <p14:creationId xmlns:p14="http://schemas.microsoft.com/office/powerpoint/2010/main" val="720703814"/>
       </p:ext>
     </p:extLst>
   </p:cSld>
@@ -9876,7 +9875,7 @@
           <a:p>
             <a:r>
               <a:rPr lang="en-US" dirty="0" smtClean="0"/>
-              <a:t>Functions </a:t>
+              <a:t>While-loops </a:t>
             </a:r>
             <a:endParaRPr lang="en-US" dirty="0"/>
           </a:p>
@@ -9894,86 +9893,148 @@
         </p:nvSpPr>
         <p:spPr>
           <a:xfrm>
-            <a:off x="680321" y="2229257"/>
-            <a:ext cx="6490500" cy="4015132"/>
-          </a:xfrm>
-        </p:spPr>
-        <p:txBody>
-          <a:bodyPr>
-            <a:normAutofit/>
-          </a:bodyPr>
+            <a:off x="680321" y="2336873"/>
+            <a:ext cx="7092079" cy="3599316"/>
+          </a:xfrm>
+        </p:spPr>
+        <p:txBody>
+          <a:bodyPr/>
           <a:lstStyle/>
           <a:p>
+            <a:pPr marL="0" marR="0" lvl="0" indent="0" defTabSz="914400" eaLnBrk="1" fontAlgn="auto" latinLnBrk="0" hangingPunct="1">
+              <a:lnSpc>
+                <a:spcPct val="100000"/>
+              </a:lnSpc>
+              <a:spcBef>
+                <a:spcPts val="0"/>
+              </a:spcBef>
+              <a:spcAft>
+                <a:spcPts val="0"/>
+              </a:spcAft>
+              <a:buClrTx/>
+              <a:buSzTx/>
+              <a:buFontTx/>
+              <a:buNone/>
+              <a:tabLst/>
+              <a:defRPr/>
+            </a:pPr>
+            <a:r>
+              <a:rPr lang="en-US" dirty="0" smtClean="0"/>
+              <a:t>Should be used when you </a:t>
+            </a:r>
+            <a:r>
+              <a:rPr lang="en-US" i="1" dirty="0" smtClean="0"/>
+              <a:t>don’t</a:t>
+            </a:r>
+            <a:r>
+              <a:rPr lang="en-US" dirty="0" smtClean="0"/>
+              <a:t> know how many times the block should repeat </a:t>
+            </a:r>
+          </a:p>
+          <a:p>
             <a:pPr marL="0" indent="0">
+              <a:lnSpc>
+                <a:spcPct val="100000"/>
+              </a:lnSpc>
+              <a:spcBef>
+                <a:spcPts val="0"/>
+              </a:spcBef>
               <a:buNone/>
             </a:pPr>
-            <a:r>
-              <a:rPr lang="en-US" dirty="0" smtClean="0"/>
-              <a:t>Often referred to as “methods” in other languages </a:t>
-            </a:r>
+            <a:endParaRPr lang="en-US" i="1" dirty="0" smtClean="0"/>
           </a:p>
           <a:p>
             <a:pPr marL="0" indent="0">
+              <a:lnSpc>
+                <a:spcPct val="100000"/>
+              </a:lnSpc>
+              <a:spcBef>
+                <a:spcPts val="0"/>
+              </a:spcBef>
               <a:buNone/>
             </a:pPr>
-            <a:endParaRPr lang="en-US" dirty="0"/>
+            <a:endParaRPr lang="en-US" i="1" dirty="0" smtClean="0"/>
           </a:p>
           <a:p>
             <a:pPr marL="0" indent="0">
+              <a:lnSpc>
+                <a:spcPct val="100000"/>
+              </a:lnSpc>
+              <a:spcBef>
+                <a:spcPts val="0"/>
+              </a:spcBef>
               <a:buNone/>
             </a:pPr>
             <a:r>
-              <a:rPr lang="en-US" dirty="0" smtClean="0"/>
-              <a:t>Created with the </a:t>
-            </a:r>
-            <a:r>
-              <a:rPr lang="en-US" i="1" dirty="0" err="1" smtClean="0"/>
-              <a:t>def</a:t>
-            </a:r>
-            <a:r>
-              <a:rPr lang="en-US" dirty="0" smtClean="0"/>
-              <a:t> keyword followed by an indented block. Between the </a:t>
-            </a:r>
-            <a:r>
-              <a:rPr lang="en-US" i="1" dirty="0" err="1" smtClean="0"/>
-              <a:t>def</a:t>
-            </a:r>
-            <a:r>
-              <a:rPr lang="en-US" dirty="0" smtClean="0"/>
-              <a:t> statement and the body of the function is where you should put a </a:t>
-            </a:r>
-            <a:r>
-              <a:rPr lang="en-US" i="1" dirty="0" err="1" smtClean="0"/>
-              <a:t>docstring</a:t>
-            </a:r>
-            <a:r>
-              <a:rPr lang="en-US" dirty="0" smtClean="0"/>
-              <a:t>. </a:t>
+              <a:rPr lang="en-US" i="1" dirty="0" smtClean="0"/>
+              <a:t>while True: &lt;</a:t>
+            </a:r>
+            <a:r>
+              <a:rPr lang="mr-IN" i="1" dirty="0" smtClean="0"/>
+              <a:t>…</a:t>
+            </a:r>
+            <a:r>
+              <a:rPr lang="en-US" i="1" dirty="0" smtClean="0"/>
+              <a:t>&gt; break </a:t>
+            </a:r>
+            <a:r>
+              <a:rPr lang="en-US" dirty="0" smtClean="0"/>
+              <a:t>is not uncommon, but generally considered bad practice </a:t>
+            </a:r>
+          </a:p>
+          <a:p>
+            <a:pPr lvl="1">
+              <a:lnSpc>
+                <a:spcPct val="100000"/>
+              </a:lnSpc>
+              <a:spcBef>
+                <a:spcPts val="0"/>
+              </a:spcBef>
+            </a:pPr>
+            <a:r>
+              <a:rPr lang="en-US" dirty="0" smtClean="0"/>
+              <a:t>Advantage: The loop will </a:t>
+            </a:r>
+            <a:r>
+              <a:rPr lang="en-US" i="1" dirty="0" smtClean="0"/>
+              <a:t>always</a:t>
+            </a:r>
+            <a:r>
+              <a:rPr lang="en-US" dirty="0" smtClean="0"/>
+              <a:t> execute at least once. Other languages achieve this with what is called a </a:t>
+            </a:r>
+            <a:r>
+              <a:rPr lang="en-US" i="1" dirty="0" smtClean="0"/>
+              <a:t>do-while</a:t>
+            </a:r>
+            <a:r>
+              <a:rPr lang="en-US" dirty="0" smtClean="0"/>
+              <a:t> loop. </a:t>
             </a:r>
           </a:p>
           <a:p>
             <a:pPr marL="0" indent="0">
+              <a:lnSpc>
+                <a:spcPct val="100000"/>
+              </a:lnSpc>
+              <a:spcBef>
+                <a:spcPts val="0"/>
+              </a:spcBef>
               <a:buNone/>
             </a:pPr>
-            <a:endParaRPr lang="en-US" dirty="0"/>
+            <a:endParaRPr lang="en-US" i="1" dirty="0" smtClean="0"/>
           </a:p>
           <a:p>
             <a:pPr marL="0" indent="0">
+              <a:lnSpc>
+                <a:spcPct val="100000"/>
+              </a:lnSpc>
+              <a:spcBef>
+                <a:spcPts val="0"/>
+              </a:spcBef>
               <a:buNone/>
             </a:pPr>
-            <a:r>
-              <a:rPr lang="en-US" dirty="0" smtClean="0"/>
-              <a:t>Astronomers (and scientists in general) are </a:t>
-            </a:r>
-            <a:r>
-              <a:rPr lang="en-US" i="1" dirty="0" smtClean="0"/>
-              <a:t>notorious </a:t>
-            </a:r>
-            <a:r>
-              <a:rPr lang="en-US" dirty="0" smtClean="0"/>
-              <a:t>for thin documentation if they document at all. </a:t>
-            </a:r>
-            <a:endParaRPr lang="en-US" dirty="0"/>
+            <a:endParaRPr lang="en-US" i="1" dirty="0"/>
           </a:p>
         </p:txBody>
       </p:sp>
@@ -9999,8 +10060,8 @@
         </p:blipFill>
         <p:spPr>
           <a:xfrm>
-            <a:off x="7343274" y="889668"/>
-            <a:ext cx="4267200" cy="5511800"/>
+            <a:off x="8121984" y="0"/>
+            <a:ext cx="3021806" cy="6858000"/>
           </a:xfrm>
           <a:prstGeom prst="rect">
             <a:avLst/>
@@ -10010,7 +10071,7 @@
     </p:spTree>
     <p:extLst>
       <p:ext uri="{BB962C8B-B14F-4D97-AF65-F5344CB8AC3E}">
-        <p14:creationId xmlns:p14="http://schemas.microsoft.com/office/powerpoint/2010/main" val="1274892126"/>
+        <p14:creationId xmlns:p14="http://schemas.microsoft.com/office/powerpoint/2010/main" val="409787854"/>
       </p:ext>
     </p:extLst>
   </p:cSld>
@@ -10217,6 +10278,184 @@
 </file>
 
 <file path=ppt/slides/slide20.xml><?xml version="1.0" encoding="utf-8"?>
+<p:sld xmlns:a="http://schemas.openxmlformats.org/drawingml/2006/main" xmlns:r="http://schemas.openxmlformats.org/officeDocument/2006/relationships" xmlns:p="http://schemas.openxmlformats.org/presentationml/2006/main">
+  <p:cSld>
+    <p:spTree>
+      <p:nvGrpSpPr>
+        <p:cNvPr id="1" name=""/>
+        <p:cNvGrpSpPr/>
+        <p:nvPr/>
+      </p:nvGrpSpPr>
+      <p:grpSpPr>
+        <a:xfrm>
+          <a:off x="0" y="0"/>
+          <a:ext cx="0" cy="0"/>
+          <a:chOff x="0" y="0"/>
+          <a:chExt cx="0" cy="0"/>
+        </a:xfrm>
+      </p:grpSpPr>
+      <p:sp>
+        <p:nvSpPr>
+          <p:cNvPr id="2" name="Title 1"/>
+          <p:cNvSpPr>
+            <a:spLocks noGrp="1"/>
+          </p:cNvSpPr>
+          <p:nvPr>
+            <p:ph type="title"/>
+          </p:nvPr>
+        </p:nvSpPr>
+        <p:spPr/>
+        <p:txBody>
+          <a:bodyPr/>
+          <a:lstStyle/>
+          <a:p>
+            <a:r>
+              <a:rPr lang="en-US" dirty="0" smtClean="0"/>
+              <a:t>Functions </a:t>
+            </a:r>
+            <a:endParaRPr lang="en-US" dirty="0"/>
+          </a:p>
+        </p:txBody>
+      </p:sp>
+      <p:sp>
+        <p:nvSpPr>
+          <p:cNvPr id="3" name="Content Placeholder 2"/>
+          <p:cNvSpPr>
+            <a:spLocks noGrp="1"/>
+          </p:cNvSpPr>
+          <p:nvPr>
+            <p:ph idx="1"/>
+          </p:nvPr>
+        </p:nvSpPr>
+        <p:spPr>
+          <a:xfrm>
+            <a:off x="680321" y="2229257"/>
+            <a:ext cx="6490500" cy="4015132"/>
+          </a:xfrm>
+        </p:spPr>
+        <p:txBody>
+          <a:bodyPr>
+            <a:normAutofit/>
+          </a:bodyPr>
+          <a:lstStyle/>
+          <a:p>
+            <a:pPr marL="0" indent="0">
+              <a:buNone/>
+            </a:pPr>
+            <a:r>
+              <a:rPr lang="en-US" dirty="0" smtClean="0"/>
+              <a:t>Often referred to as “methods” in other languages </a:t>
+            </a:r>
+          </a:p>
+          <a:p>
+            <a:pPr marL="0" indent="0">
+              <a:buNone/>
+            </a:pPr>
+            <a:endParaRPr lang="en-US" dirty="0"/>
+          </a:p>
+          <a:p>
+            <a:pPr marL="0" indent="0">
+              <a:buNone/>
+            </a:pPr>
+            <a:r>
+              <a:rPr lang="en-US" dirty="0" smtClean="0"/>
+              <a:t>Created with the </a:t>
+            </a:r>
+            <a:r>
+              <a:rPr lang="en-US" i="1" dirty="0" err="1" smtClean="0"/>
+              <a:t>def</a:t>
+            </a:r>
+            <a:r>
+              <a:rPr lang="en-US" dirty="0" smtClean="0"/>
+              <a:t> keyword followed by an indented block. Between the </a:t>
+            </a:r>
+            <a:r>
+              <a:rPr lang="en-US" i="1" dirty="0" err="1" smtClean="0"/>
+              <a:t>def</a:t>
+            </a:r>
+            <a:r>
+              <a:rPr lang="en-US" dirty="0" smtClean="0"/>
+              <a:t> statement and the body of the function is where you should put a </a:t>
+            </a:r>
+            <a:r>
+              <a:rPr lang="en-US" i="1" dirty="0" err="1" smtClean="0"/>
+              <a:t>docstring</a:t>
+            </a:r>
+            <a:r>
+              <a:rPr lang="en-US" dirty="0" smtClean="0"/>
+              <a:t>. </a:t>
+            </a:r>
+          </a:p>
+          <a:p>
+            <a:pPr marL="0" indent="0">
+              <a:buNone/>
+            </a:pPr>
+            <a:endParaRPr lang="en-US" dirty="0"/>
+          </a:p>
+          <a:p>
+            <a:pPr marL="0" indent="0">
+              <a:buNone/>
+            </a:pPr>
+            <a:r>
+              <a:rPr lang="en-US" dirty="0" smtClean="0"/>
+              <a:t>Astronomers (and scientists in general) are </a:t>
+            </a:r>
+            <a:r>
+              <a:rPr lang="en-US" i="1" dirty="0" smtClean="0"/>
+              <a:t>notorious </a:t>
+            </a:r>
+            <a:r>
+              <a:rPr lang="en-US" dirty="0" smtClean="0"/>
+              <a:t>for thin documentation if they document at all. </a:t>
+            </a:r>
+            <a:endParaRPr lang="en-US" dirty="0"/>
+          </a:p>
+        </p:txBody>
+      </p:sp>
+      <p:pic>
+        <p:nvPicPr>
+          <p:cNvPr id="4" name="Picture 3"/>
+          <p:cNvPicPr>
+            <a:picLocks noChangeAspect="1"/>
+          </p:cNvPicPr>
+          <p:nvPr/>
+        </p:nvPicPr>
+        <p:blipFill>
+          <a:blip r:embed="rId2">
+            <a:extLst>
+              <a:ext uri="{28A0092B-C50C-407E-A947-70E740481C1C}">
+                <a14:useLocalDpi xmlns:a14="http://schemas.microsoft.com/office/drawing/2010/main" val="0"/>
+              </a:ext>
+            </a:extLst>
+          </a:blip>
+          <a:stretch>
+            <a:fillRect/>
+          </a:stretch>
+        </p:blipFill>
+        <p:spPr>
+          <a:xfrm>
+            <a:off x="7343274" y="889668"/>
+            <a:ext cx="4267200" cy="5511800"/>
+          </a:xfrm>
+          <a:prstGeom prst="rect">
+            <a:avLst/>
+          </a:prstGeom>
+        </p:spPr>
+      </p:pic>
+    </p:spTree>
+    <p:extLst>
+      <p:ext uri="{BB962C8B-B14F-4D97-AF65-F5344CB8AC3E}">
+        <p14:creationId xmlns:p14="http://schemas.microsoft.com/office/powerpoint/2010/main" val="1274892126"/>
+      </p:ext>
+    </p:extLst>
+  </p:cSld>
+  <p:clrMapOvr>
+    <a:masterClrMapping/>
+  </p:clrMapOvr>
+</p:sld>
+</file>
+
+<file path=ppt/slides/slide21.xml><?xml version="1.0" encoding="utf-8"?>
 <p:sld xmlns:a="http://schemas.openxmlformats.org/drawingml/2006/main" xmlns:r="http://schemas.openxmlformats.org/officeDocument/2006/relationships" xmlns:p="http://schemas.openxmlformats.org/presentationml/2006/main">
   <p:cSld>
     <p:spTree>

</xml_diff>

<commit_message>
slides: classes, minor revision to others ; exercises: deck of cards challenge problem
</commit_message>
<xml_diff>
--- a/slides/review.pptx
+++ b/slides/review.pptx
@@ -5,7 +5,7 @@
     <p:sldMasterId id="2147484294" r:id="rId1"/>
   </p:sldMasterIdLst>
   <p:notesMasterIdLst>
-    <p:notesMasterId r:id="rId26"/>
+    <p:notesMasterId r:id="rId28"/>
   </p:notesMasterIdLst>
   <p:sldIdLst>
     <p:sldId id="256" r:id="rId2"/>
@@ -17,21 +17,23 @@
     <p:sldId id="271" r:id="rId8"/>
     <p:sldId id="258" r:id="rId9"/>
     <p:sldId id="259" r:id="rId10"/>
-    <p:sldId id="260" r:id="rId11"/>
-    <p:sldId id="261" r:id="rId12"/>
-    <p:sldId id="263" r:id="rId13"/>
-    <p:sldId id="272" r:id="rId14"/>
-    <p:sldId id="276" r:id="rId15"/>
-    <p:sldId id="264" r:id="rId16"/>
-    <p:sldId id="265" r:id="rId17"/>
-    <p:sldId id="267" r:id="rId18"/>
-    <p:sldId id="266" r:id="rId19"/>
-    <p:sldId id="268" r:id="rId20"/>
-    <p:sldId id="269" r:id="rId21"/>
-    <p:sldId id="270" r:id="rId22"/>
-    <p:sldId id="277" r:id="rId23"/>
-    <p:sldId id="278" r:id="rId24"/>
-    <p:sldId id="279" r:id="rId25"/>
+    <p:sldId id="280" r:id="rId11"/>
+    <p:sldId id="260" r:id="rId12"/>
+    <p:sldId id="281" r:id="rId13"/>
+    <p:sldId id="261" r:id="rId14"/>
+    <p:sldId id="263" r:id="rId15"/>
+    <p:sldId id="272" r:id="rId16"/>
+    <p:sldId id="276" r:id="rId17"/>
+    <p:sldId id="264" r:id="rId18"/>
+    <p:sldId id="265" r:id="rId19"/>
+    <p:sldId id="267" r:id="rId20"/>
+    <p:sldId id="266" r:id="rId21"/>
+    <p:sldId id="268" r:id="rId22"/>
+    <p:sldId id="269" r:id="rId23"/>
+    <p:sldId id="270" r:id="rId24"/>
+    <p:sldId id="277" r:id="rId25"/>
+    <p:sldId id="278" r:id="rId26"/>
+    <p:sldId id="279" r:id="rId27"/>
   </p:sldIdLst>
   <p:sldSz cx="12192000" cy="6858000"/>
   <p:notesSz cx="6858000" cy="9144000"/>
@@ -220,7 +222,7 @@
           <a:p>
             <a:fld id="{3E00069D-D4B1-DA43-B156-1FB9179E1249}" type="datetimeFigureOut">
               <a:rPr lang="en-US" smtClean="0"/>
-              <a:t>5/11/20</a:t>
+              <a:t>5/12/20</a:t>
             </a:fld>
             <a:endParaRPr lang="en-US"/>
           </a:p>
@@ -766,7 +768,7 @@
           <a:p>
             <a:fld id="{51673806-0BCD-1F42-BAA8-2011034B3C6A}" type="datetimeFigureOut">
               <a:rPr lang="en-US" smtClean="0"/>
-              <a:t>5/11/20</a:t>
+              <a:t>5/12/20</a:t>
             </a:fld>
             <a:endParaRPr lang="en-US" dirty="0"/>
           </a:p>
@@ -1180,7 +1182,7 @@
           <a:p>
             <a:fld id="{51673806-0BCD-1F42-BAA8-2011034B3C6A}" type="datetimeFigureOut">
               <a:rPr lang="en-US" smtClean="0"/>
-              <a:t>5/11/20</a:t>
+              <a:t>5/12/20</a:t>
             </a:fld>
             <a:endParaRPr lang="en-US" dirty="0"/>
           </a:p>
@@ -1511,7 +1513,7 @@
           <a:p>
             <a:fld id="{51673806-0BCD-1F42-BAA8-2011034B3C6A}" type="datetimeFigureOut">
               <a:rPr lang="en-US" smtClean="0"/>
-              <a:t>5/11/20</a:t>
+              <a:t>5/12/20</a:t>
             </a:fld>
             <a:endParaRPr lang="en-US" dirty="0"/>
           </a:p>
@@ -1911,7 +1913,7 @@
           <a:p>
             <a:fld id="{51673806-0BCD-1F42-BAA8-2011034B3C6A}" type="datetimeFigureOut">
               <a:rPr lang="en-US" smtClean="0"/>
-              <a:t>5/11/20</a:t>
+              <a:t>5/12/20</a:t>
             </a:fld>
             <a:endParaRPr lang="en-US" dirty="0"/>
           </a:p>
@@ -2474,7 +2476,7 @@
           <a:p>
             <a:fld id="{51673806-0BCD-1F42-BAA8-2011034B3C6A}" type="datetimeFigureOut">
               <a:rPr lang="en-US" smtClean="0"/>
-              <a:t>5/11/20</a:t>
+              <a:t>5/12/20</a:t>
             </a:fld>
             <a:endParaRPr lang="en-US" dirty="0"/>
           </a:p>
@@ -3150,7 +3152,7 @@
           <a:p>
             <a:fld id="{51673806-0BCD-1F42-BAA8-2011034B3C6A}" type="datetimeFigureOut">
               <a:rPr lang="en-US" smtClean="0"/>
-              <a:t>5/11/20</a:t>
+              <a:t>5/12/20</a:t>
             </a:fld>
             <a:endParaRPr lang="en-US" dirty="0"/>
           </a:p>
@@ -4058,7 +4060,7 @@
           <a:p>
             <a:fld id="{51673806-0BCD-1F42-BAA8-2011034B3C6A}" type="datetimeFigureOut">
               <a:rPr lang="en-US" smtClean="0"/>
-              <a:t>5/11/20</a:t>
+              <a:t>5/12/20</a:t>
             </a:fld>
             <a:endParaRPr lang="en-US" dirty="0"/>
           </a:p>
@@ -4366,7 +4368,7 @@
           <a:p>
             <a:fld id="{51673806-0BCD-1F42-BAA8-2011034B3C6A}" type="datetimeFigureOut">
               <a:rPr lang="en-US" smtClean="0"/>
-              <a:t>5/11/20</a:t>
+              <a:t>5/12/20</a:t>
             </a:fld>
             <a:endParaRPr lang="en-US" dirty="0"/>
           </a:p>
@@ -4625,7 +4627,7 @@
           <a:p>
             <a:fld id="{51673806-0BCD-1F42-BAA8-2011034B3C6A}" type="datetimeFigureOut">
               <a:rPr lang="en-US" smtClean="0"/>
-              <a:t>5/11/20</a:t>
+              <a:t>5/12/20</a:t>
             </a:fld>
             <a:endParaRPr lang="en-US" dirty="0"/>
           </a:p>
@@ -4948,7 +4950,7 @@
           <a:p>
             <a:fld id="{51673806-0BCD-1F42-BAA8-2011034B3C6A}" type="datetimeFigureOut">
               <a:rPr lang="en-US" smtClean="0"/>
-              <a:t>5/11/20</a:t>
+              <a:t>5/12/20</a:t>
             </a:fld>
             <a:endParaRPr lang="en-US" dirty="0"/>
           </a:p>
@@ -5332,7 +5334,7 @@
           <a:p>
             <a:fld id="{51673806-0BCD-1F42-BAA8-2011034B3C6A}" type="datetimeFigureOut">
               <a:rPr lang="en-US" smtClean="0"/>
-              <a:t>5/11/20</a:t>
+              <a:t>5/12/20</a:t>
             </a:fld>
             <a:endParaRPr lang="en-US" dirty="0"/>
           </a:p>
@@ -5708,7 +5710,7 @@
           <a:p>
             <a:fld id="{51673806-0BCD-1F42-BAA8-2011034B3C6A}" type="datetimeFigureOut">
               <a:rPr lang="en-US" smtClean="0"/>
-              <a:t>5/11/20</a:t>
+              <a:t>5/12/20</a:t>
             </a:fld>
             <a:endParaRPr lang="en-US" dirty="0"/>
           </a:p>
@@ -6214,7 +6216,7 @@
           <a:p>
             <a:fld id="{51673806-0BCD-1F42-BAA8-2011034B3C6A}" type="datetimeFigureOut">
               <a:rPr lang="en-US" smtClean="0"/>
-              <a:t>5/11/20</a:t>
+              <a:t>5/12/20</a:t>
             </a:fld>
             <a:endParaRPr lang="en-US" dirty="0"/>
           </a:p>
@@ -6471,7 +6473,7 @@
           <a:p>
             <a:fld id="{51673806-0BCD-1F42-BAA8-2011034B3C6A}" type="datetimeFigureOut">
               <a:rPr lang="en-US" smtClean="0"/>
-              <a:t>5/11/20</a:t>
+              <a:t>5/12/20</a:t>
             </a:fld>
             <a:endParaRPr lang="en-US" dirty="0"/>
           </a:p>
@@ -6629,7 +6631,7 @@
           <a:p>
             <a:fld id="{51673806-0BCD-1F42-BAA8-2011034B3C6A}" type="datetimeFigureOut">
               <a:rPr lang="en-US" smtClean="0"/>
-              <a:t>5/11/20</a:t>
+              <a:t>5/12/20</a:t>
             </a:fld>
             <a:endParaRPr lang="en-US" dirty="0"/>
           </a:p>
@@ -7019,7 +7021,7 @@
           <a:p>
             <a:fld id="{51673806-0BCD-1F42-BAA8-2011034B3C6A}" type="datetimeFigureOut">
               <a:rPr lang="en-US" smtClean="0"/>
-              <a:t>5/11/20</a:t>
+              <a:t>5/12/20</a:t>
             </a:fld>
             <a:endParaRPr lang="en-US" dirty="0"/>
           </a:p>
@@ -7428,7 +7430,7 @@
           <a:p>
             <a:fld id="{51673806-0BCD-1F42-BAA8-2011034B3C6A}" type="datetimeFigureOut">
               <a:rPr lang="en-US" smtClean="0"/>
-              <a:t>5/11/20</a:t>
+              <a:t>5/12/20</a:t>
             </a:fld>
             <a:endParaRPr lang="en-US" dirty="0"/>
           </a:p>
@@ -7676,7 +7678,7 @@
             <a:fld id="{51673806-0BCD-1F42-BAA8-2011034B3C6A}" type="datetimeFigureOut">
               <a:rPr lang="en-US" smtClean="0"/>
               <a:pPr/>
-              <a:t>5/11/20</a:t>
+              <a:t>5/12/20</a:t>
             </a:fld>
             <a:endParaRPr lang="en-US" dirty="0"/>
           </a:p>
@@ -8210,7 +8212,7 @@
           <a:p>
             <a:r>
               <a:rPr lang="en-US" dirty="0" smtClean="0"/>
-              <a:t>Dictionary</a:t>
+              <a:t>Set</a:t>
             </a:r>
             <a:endParaRPr lang="en-US" dirty="0"/>
           </a:p>
@@ -8228,73 +8230,124 @@
         </p:nvSpPr>
         <p:spPr>
           <a:xfrm>
-            <a:off x="680322" y="2336873"/>
-            <a:ext cx="4423941" cy="3599316"/>
+            <a:off x="680321" y="2336873"/>
+            <a:ext cx="5574175" cy="3599316"/>
           </a:xfrm>
         </p:spPr>
         <p:txBody>
           <a:bodyPr/>
           <a:lstStyle/>
           <a:p>
-            <a:pPr marL="0" indent="0">
-              <a:buNone/>
+            <a:pPr marL="0" marR="0" lvl="0" indent="0" defTabSz="914400" eaLnBrk="1" fontAlgn="auto" latinLnBrk="0" hangingPunct="1">
+              <a:lnSpc>
+                <a:spcPct val="100000"/>
+              </a:lnSpc>
+              <a:spcBef>
+                <a:spcPts val="0"/>
+              </a:spcBef>
+              <a:spcAft>
+                <a:spcPts val="0"/>
+              </a:spcAft>
+              <a:buClrTx/>
+              <a:buSzTx/>
+              <a:buFontTx/>
+              <a:buNone/>
+              <a:tabLst/>
+              <a:defRPr/>
             </a:pPr>
             <a:r>
               <a:rPr lang="en-US" dirty="0" smtClean="0"/>
-              <a:t>Python’s version of a</a:t>
-            </a:r>
+              <a:t>Ensure uniqueness</a:t>
+            </a:r>
+          </a:p>
+          <a:p>
+            <a:pPr lvl="1">
+              <a:lnSpc>
+                <a:spcPct val="100000"/>
+              </a:lnSpc>
+              <a:spcBef>
+                <a:spcPts val="0"/>
+              </a:spcBef>
+            </a:pPr>
             <a:r>
               <a:rPr lang="en-US" i="1" dirty="0"/>
-              <a:t> </a:t>
+              <a:t>l</a:t>
             </a:r>
             <a:r>
               <a:rPr lang="en-US" i="1" dirty="0" smtClean="0"/>
-              <a:t>hash table</a:t>
-            </a:r>
-            <a:r>
-              <a:rPr lang="en-US" dirty="0" smtClean="0"/>
-              <a:t>. </a:t>
-            </a:r>
-          </a:p>
-          <a:p>
-            <a:pPr lvl="1"/>
-            <a:r>
-              <a:rPr lang="en-US" dirty="0" smtClean="0"/>
-              <a:t>Can be used to map objects to other objects </a:t>
-            </a:r>
-          </a:p>
-          <a:p>
-            <a:pPr lvl="1"/>
-            <a:r>
-              <a:rPr lang="en-US" dirty="0" smtClean="0"/>
-              <a:t>Stored values can be accessed via their </a:t>
+              <a:t>ist(set(</a:t>
+            </a:r>
+            <a:r>
+              <a:rPr lang="en-US" i="1" dirty="0" err="1" smtClean="0"/>
+              <a:t>some_list</a:t>
             </a:r>
             <a:r>
               <a:rPr lang="en-US" i="1" dirty="0" smtClean="0"/>
-              <a:t>key</a:t>
-            </a:r>
-            <a:r>
-              <a:rPr lang="en-US" dirty="0" smtClean="0"/>
-              <a:t> </a:t>
-            </a:r>
-          </a:p>
-          <a:p>
-            <a:pPr lvl="1"/>
+              <a:t>))</a:t>
+            </a:r>
+            <a:r>
+              <a:rPr lang="en-US" dirty="0" smtClean="0"/>
+              <a:t> will remove duplicate elements </a:t>
+            </a:r>
+          </a:p>
+          <a:p>
+            <a:pPr lvl="1">
+              <a:lnSpc>
+                <a:spcPct val="100000"/>
+              </a:lnSpc>
+              <a:spcBef>
+                <a:spcPts val="0"/>
+              </a:spcBef>
+            </a:pPr>
+            <a:r>
+              <a:rPr lang="en-US" dirty="0" smtClean="0"/>
+              <a:t>Created with the </a:t>
+            </a:r>
             <a:r>
               <a:rPr lang="en-US" i="1" dirty="0" smtClean="0"/>
-              <a:t>keys() </a:t>
-            </a:r>
-            <a:r>
-              <a:rPr lang="en-US" dirty="0" smtClean="0"/>
-              <a:t>function returns each key </a:t>
-            </a:r>
-          </a:p>
-          <a:p>
-            <a:pPr lvl="1"/>
-            <a:r>
-              <a:rPr lang="en-US" dirty="0" smtClean="0"/>
-              <a:t>Popular method of storing data b/c keys can be strings which describe the data, allowing very readable code </a:t>
-            </a:r>
+              <a:t>set()</a:t>
+            </a:r>
+            <a:r>
+              <a:rPr lang="en-US" dirty="0" smtClean="0"/>
+              <a:t> function or with {} enclosing elements (be careful w/this, see next slide) </a:t>
+            </a:r>
+          </a:p>
+          <a:p>
+            <a:pPr lvl="1">
+              <a:lnSpc>
+                <a:spcPct val="100000"/>
+              </a:lnSpc>
+              <a:spcBef>
+                <a:spcPts val="0"/>
+              </a:spcBef>
+            </a:pPr>
+            <a:r>
+              <a:rPr lang="en-US" dirty="0" smtClean="0"/>
+              <a:t>Don</a:t>
+            </a:r>
+            <a:r>
+              <a:rPr lang="mr-IN" dirty="0" smtClean="0"/>
+              <a:t>’</a:t>
+            </a:r>
+            <a:r>
+              <a:rPr lang="en-US" dirty="0" smtClean="0"/>
+              <a:t>t allow indexing, so aren’t as commonly used as lists, tuples, and dictionaries </a:t>
+            </a:r>
+          </a:p>
+          <a:p>
+            <a:pPr lvl="1">
+              <a:lnSpc>
+                <a:spcPct val="100000"/>
+              </a:lnSpc>
+              <a:spcBef>
+                <a:spcPts val="0"/>
+              </a:spcBef>
+            </a:pPr>
+            <a:r>
+              <a:rPr lang="en-US" dirty="0" smtClean="0"/>
+              <a:t>Have some other useful function such as union and intersection (‘|’ and ‘&amp;’) </a:t>
+            </a:r>
+            <a:endParaRPr lang="en-US" dirty="0"/>
           </a:p>
         </p:txBody>
       </p:sp>
@@ -8320,8 +8373,8 @@
         </p:blipFill>
         <p:spPr>
           <a:xfrm>
-            <a:off x="5277893" y="2336873"/>
-            <a:ext cx="6591300" cy="3429000"/>
+            <a:off x="7169404" y="2726831"/>
+            <a:ext cx="3619500" cy="2819400"/>
           </a:xfrm>
           <a:prstGeom prst="rect">
             <a:avLst/>
@@ -8331,20 +8384,13 @@
     </p:spTree>
     <p:extLst>
       <p:ext uri="{BB962C8B-B14F-4D97-AF65-F5344CB8AC3E}">
-        <p14:creationId xmlns:p14="http://schemas.microsoft.com/office/powerpoint/2010/main" val="1044591151"/>
+        <p14:creationId xmlns:p14="http://schemas.microsoft.com/office/powerpoint/2010/main" val="2107188392"/>
       </p:ext>
     </p:extLst>
   </p:cSld>
   <p:clrMapOvr>
     <a:masterClrMapping/>
   </p:clrMapOvr>
-  <p:timing>
-    <p:tnLst>
-      <p:par>
-        <p:cTn id="1" dur="indefinite" restart="never" nodeType="tmRoot"/>
-      </p:par>
-    </p:tnLst>
-  </p:timing>
 </p:sld>
 </file>
 
@@ -8382,7 +8428,7 @@
           <a:p>
             <a:r>
               <a:rPr lang="en-US" dirty="0" smtClean="0"/>
-              <a:t>Arrays </a:t>
+              <a:t>Dictionary</a:t>
             </a:r>
             <a:endParaRPr lang="en-US" dirty="0"/>
           </a:p>
@@ -8400,14 +8446,12 @@
         </p:nvSpPr>
         <p:spPr>
           <a:xfrm>
-            <a:off x="680321" y="2336872"/>
-            <a:ext cx="9613861" cy="3895485"/>
-          </a:xfrm>
-        </p:spPr>
-        <p:txBody>
-          <a:bodyPr>
-            <a:normAutofit/>
-          </a:bodyPr>
+            <a:off x="680322" y="2336873"/>
+            <a:ext cx="4423941" cy="3599316"/>
+          </a:xfrm>
+        </p:spPr>
+        <p:txBody>
+          <a:bodyPr/>
           <a:lstStyle/>
           <a:p>
             <a:pPr marL="0" indent="0">
@@ -8415,70 +8459,104 @@
             </a:pPr>
             <a:r>
               <a:rPr lang="en-US" dirty="0" smtClean="0"/>
-              <a:t>In practice the same as a list, but has some special implementation of tracking data types under the hood </a:t>
+              <a:t>Python’s version of a</a:t>
+            </a:r>
+            <a:r>
+              <a:rPr lang="en-US" i="1" dirty="0"/>
+              <a:t> </a:t>
+            </a:r>
+            <a:r>
+              <a:rPr lang="en-US" i="1" dirty="0" smtClean="0"/>
+              <a:t>hash table</a:t>
+            </a:r>
+            <a:r>
+              <a:rPr lang="en-US" dirty="0" smtClean="0"/>
+              <a:t>. </a:t>
             </a:r>
           </a:p>
           <a:p>
             <a:pPr lvl="1"/>
             <a:r>
               <a:rPr lang="en-US" dirty="0" smtClean="0"/>
-              <a:t>Can often speed up code </a:t>
+              <a:t>Can be used to map objects to other objects </a:t>
             </a:r>
           </a:p>
           <a:p>
             <a:pPr lvl="1"/>
             <a:r>
               <a:rPr lang="en-US" dirty="0" smtClean="0"/>
-              <a:t>There is a built-in array object, but in practice, most people use the </a:t>
-            </a:r>
-            <a:r>
-              <a:rPr lang="en-US" dirty="0" err="1" smtClean="0"/>
-              <a:t>NumPy</a:t>
-            </a:r>
-            <a:r>
-              <a:rPr lang="en-US" dirty="0" smtClean="0"/>
-              <a:t> array </a:t>
-            </a:r>
-          </a:p>
-          <a:p>
-            <a:pPr marL="0" indent="0">
-              <a:buNone/>
-            </a:pPr>
-            <a:endParaRPr lang="en-US" dirty="0" smtClean="0"/>
-          </a:p>
-          <a:p>
-            <a:pPr marL="0" indent="0">
-              <a:buNone/>
-            </a:pPr>
-            <a:r>
-              <a:rPr lang="en-US" dirty="0" smtClean="0"/>
-              <a:t>The single most important thing to remember about arrays: </a:t>
-            </a:r>
-          </a:p>
-          <a:p>
-            <a:pPr marL="0" indent="0" algn="ctr">
-              <a:buNone/>
-            </a:pPr>
-            <a:r>
-              <a:rPr lang="en-US" sz="4800" dirty="0" smtClean="0"/>
-              <a:t>LISTS AND ARRAYS ARE </a:t>
-            </a:r>
-            <a:r>
-              <a:rPr lang="en-US" sz="4800" b="1" i="1" u="sng" dirty="0" smtClean="0"/>
-              <a:t>NOT</a:t>
-            </a:r>
-            <a:r>
-              <a:rPr lang="en-US" sz="4800" dirty="0" smtClean="0"/>
-              <a:t> THE SAME THING</a:t>
-            </a:r>
-            <a:endParaRPr lang="en-US" sz="4800" dirty="0"/>
-          </a:p>
-        </p:txBody>
-      </p:sp>
+              <a:t>Created with {} </a:t>
+            </a:r>
+          </a:p>
+          <a:p>
+            <a:pPr lvl="1"/>
+            <a:r>
+              <a:rPr lang="en-US" dirty="0" smtClean="0"/>
+              <a:t>Stored values can be accessed via their </a:t>
+            </a:r>
+            <a:r>
+              <a:rPr lang="en-US" i="1" dirty="0" smtClean="0"/>
+              <a:t>key</a:t>
+            </a:r>
+            <a:r>
+              <a:rPr lang="en-US" dirty="0" smtClean="0"/>
+              <a:t> </a:t>
+            </a:r>
+          </a:p>
+          <a:p>
+            <a:pPr lvl="1"/>
+            <a:r>
+              <a:rPr lang="en-US" i="1" dirty="0" smtClean="0"/>
+              <a:t>keys() </a:t>
+            </a:r>
+            <a:r>
+              <a:rPr lang="en-US" dirty="0" smtClean="0"/>
+              <a:t>function returns each key </a:t>
+            </a:r>
+          </a:p>
+          <a:p>
+            <a:pPr lvl="1"/>
+            <a:r>
+              <a:rPr lang="en-US" dirty="0" smtClean="0"/>
+              <a:t>Popular method of storing data b/c keys can be strings which describe the data, allowing very readable code </a:t>
+            </a:r>
+          </a:p>
+        </p:txBody>
+      </p:sp>
+      <p:pic>
+        <p:nvPicPr>
+          <p:cNvPr id="4" name="Picture 3"/>
+          <p:cNvPicPr>
+            <a:picLocks noChangeAspect="1"/>
+          </p:cNvPicPr>
+          <p:nvPr/>
+        </p:nvPicPr>
+        <p:blipFill>
+          <a:blip r:embed="rId2">
+            <a:extLst>
+              <a:ext uri="{28A0092B-C50C-407E-A947-70E740481C1C}">
+                <a14:useLocalDpi xmlns:a14="http://schemas.microsoft.com/office/drawing/2010/main" val="0"/>
+              </a:ext>
+            </a:extLst>
+          </a:blip>
+          <a:stretch>
+            <a:fillRect/>
+          </a:stretch>
+        </p:blipFill>
+        <p:spPr>
+          <a:xfrm>
+            <a:off x="5277893" y="2336873"/>
+            <a:ext cx="6591300" cy="3429000"/>
+          </a:xfrm>
+          <a:prstGeom prst="rect">
+            <a:avLst/>
+          </a:prstGeom>
+        </p:spPr>
+      </p:pic>
     </p:spTree>
     <p:extLst>
       <p:ext uri="{BB962C8B-B14F-4D97-AF65-F5344CB8AC3E}">
-        <p14:creationId xmlns:p14="http://schemas.microsoft.com/office/powerpoint/2010/main" val="1156555604"/>
+        <p14:creationId xmlns:p14="http://schemas.microsoft.com/office/powerpoint/2010/main" val="1044591151"/>
       </p:ext>
     </p:extLst>
   </p:cSld>
@@ -8529,7 +8607,7 @@
           <a:p>
             <a:r>
               <a:rPr lang="en-US" dirty="0" smtClean="0"/>
-              <a:t>Lists vs. Arrays </a:t>
+              <a:t>Which Data Type Should I Use? </a:t>
             </a:r>
             <a:endParaRPr lang="en-US" dirty="0"/>
           </a:p>
@@ -8547,8 +8625,8 @@
         </p:nvSpPr>
         <p:spPr>
           <a:xfrm>
-            <a:off x="680322" y="2336873"/>
-            <a:ext cx="5010616" cy="4208306"/>
+            <a:off x="680321" y="2336872"/>
+            <a:ext cx="9613861" cy="4198039"/>
           </a:xfrm>
         </p:spPr>
         <p:txBody>
@@ -8557,101 +8635,252 @@
           </a:bodyPr>
           <a:lstStyle/>
           <a:p>
-            <a:pPr marL="0" indent="0">
-              <a:buNone/>
+            <a:pPr marL="0" marR="0" lvl="0" indent="0" defTabSz="914400" eaLnBrk="1" fontAlgn="auto" latinLnBrk="0" hangingPunct="1">
+              <a:lnSpc>
+                <a:spcPct val="100000"/>
+              </a:lnSpc>
+              <a:spcBef>
+                <a:spcPts val="0"/>
+              </a:spcBef>
+              <a:spcAft>
+                <a:spcPts val="0"/>
+              </a:spcAft>
+              <a:buClrTx/>
+              <a:buSzTx/>
+              <a:buFontTx/>
+              <a:buNone/>
+              <a:tabLst/>
+              <a:defRPr/>
             </a:pPr>
             <a:r>
               <a:rPr lang="en-US" dirty="0" smtClean="0"/>
-              <a:t>They are </a:t>
-            </a:r>
-            <a:r>
-              <a:rPr lang="en-US" b="1" i="1" dirty="0" smtClean="0"/>
-              <a:t>different objects</a:t>
-            </a:r>
-            <a:r>
-              <a:rPr lang="en-US" b="1" dirty="0" smtClean="0"/>
-              <a:t> </a:t>
-            </a:r>
-            <a:r>
-              <a:rPr lang="en-US" dirty="0" smtClean="0"/>
-              <a:t>meant to store similar data </a:t>
-            </a:r>
-          </a:p>
-          <a:p>
-            <a:pPr marL="0" indent="0">
-              <a:buNone/>
+              <a:t>Do you need a logical </a:t>
+            </a:r>
+            <a:r>
+              <a:rPr lang="en-US" i="1" dirty="0" smtClean="0"/>
+              <a:t>key-value</a:t>
+            </a:r>
+            <a:r>
+              <a:rPr lang="en-US" dirty="0" smtClean="0"/>
+              <a:t> connection? </a:t>
+            </a:r>
+          </a:p>
+          <a:p>
+            <a:pPr marL="0" marR="0" lvl="0" indent="0" defTabSz="914400" eaLnBrk="1" fontAlgn="auto" latinLnBrk="0" hangingPunct="1">
+              <a:lnSpc>
+                <a:spcPct val="100000"/>
+              </a:lnSpc>
+              <a:spcBef>
+                <a:spcPts val="0"/>
+              </a:spcBef>
+              <a:spcAft>
+                <a:spcPts val="0"/>
+              </a:spcAft>
+              <a:buClrTx/>
+              <a:buSzTx/>
+              <a:buFontTx/>
+              <a:buNone/>
+              <a:tabLst/>
+              <a:defRPr/>
             </a:pPr>
-            <a:endParaRPr lang="en-US" dirty="0"/>
-          </a:p>
-          <a:p>
-            <a:pPr marL="0" indent="0">
-              <a:buNone/>
-            </a:pPr>
-            <a:r>
-              <a:rPr lang="en-US" dirty="0" smtClean="0"/>
-              <a:t>Example: </a:t>
-            </a:r>
-            <a:r>
-              <a:rPr lang="en-US" dirty="0" err="1" smtClean="0"/>
-              <a:t>NumPy</a:t>
-            </a:r>
-            <a:r>
-              <a:rPr lang="en-US" dirty="0" smtClean="0"/>
-              <a:t> arrays allow multiplication with another array. A list does not. </a:t>
-            </a:r>
-          </a:p>
-          <a:p>
-            <a:pPr marL="0" indent="0">
-              <a:buNone/>
+            <a:r>
+              <a:rPr lang="en-US" dirty="0"/>
+              <a:t>	</a:t>
+            </a:r>
+            <a:r>
+              <a:rPr lang="en-US" dirty="0" smtClean="0"/>
+              <a:t>If yes: use a dictionary </a:t>
+            </a:r>
+          </a:p>
+          <a:p>
+            <a:pPr marL="0" marR="0" lvl="0" indent="0" defTabSz="914400" eaLnBrk="1" fontAlgn="auto" latinLnBrk="0" hangingPunct="1">
+              <a:lnSpc>
+                <a:spcPct val="100000"/>
+              </a:lnSpc>
+              <a:spcBef>
+                <a:spcPts val="0"/>
+              </a:spcBef>
+              <a:spcAft>
+                <a:spcPts val="0"/>
+              </a:spcAft>
+              <a:buClrTx/>
+              <a:buSzTx/>
+              <a:buFontTx/>
+              <a:buNone/>
+              <a:tabLst/>
+              <a:defRPr/>
             </a:pPr>
             <a:endParaRPr lang="en-US" dirty="0" smtClean="0"/>
           </a:p>
           <a:p>
-            <a:pPr marL="0" indent="0">
-              <a:buNone/>
+            <a:pPr marL="0" marR="0" lvl="0" indent="0" defTabSz="914400" eaLnBrk="1" fontAlgn="auto" latinLnBrk="0" hangingPunct="1">
+              <a:lnSpc>
+                <a:spcPct val="100000"/>
+              </a:lnSpc>
+              <a:spcBef>
+                <a:spcPts val="0"/>
+              </a:spcBef>
+              <a:spcAft>
+                <a:spcPts val="0"/>
+              </a:spcAft>
+              <a:buClrTx/>
+              <a:buSzTx/>
+              <a:buFontTx/>
+              <a:buNone/>
+              <a:tabLst/>
+              <a:defRPr/>
             </a:pPr>
             <a:r>
               <a:rPr lang="en-US" dirty="0" smtClean="0"/>
-              <a:t>Advice: Pick one of either lists or arrays for a given program and stick to it </a:t>
-            </a:r>
-            <a:endParaRPr lang="en-US" dirty="0"/>
-          </a:p>
-        </p:txBody>
-      </p:sp>
-      <p:pic>
-        <p:nvPicPr>
-          <p:cNvPr id="4" name="Picture 3"/>
-          <p:cNvPicPr>
-            <a:picLocks noChangeAspect="1"/>
-          </p:cNvPicPr>
-          <p:nvPr/>
-        </p:nvPicPr>
-        <p:blipFill>
-          <a:blip r:embed="rId2">
-            <a:extLst>
-              <a:ext uri="{28A0092B-C50C-407E-A947-70E740481C1C}">
-                <a14:useLocalDpi xmlns:a14="http://schemas.microsoft.com/office/drawing/2010/main" val="0"/>
-              </a:ext>
-            </a:extLst>
-          </a:blip>
-          <a:stretch>
-            <a:fillRect/>
-          </a:stretch>
-        </p:blipFill>
-        <p:spPr>
-          <a:xfrm>
-            <a:off x="6049211" y="1491915"/>
-            <a:ext cx="5354201" cy="4854742"/>
-          </a:xfrm>
-          <a:prstGeom prst="rect">
-            <a:avLst/>
-          </a:prstGeom>
-        </p:spPr>
-      </p:pic>
+              <a:t>Do you need to ensure uniqueness of each element? </a:t>
+            </a:r>
+          </a:p>
+          <a:p>
+            <a:pPr marL="0" marR="0" lvl="0" indent="0" defTabSz="914400" eaLnBrk="1" fontAlgn="auto" latinLnBrk="0" hangingPunct="1">
+              <a:lnSpc>
+                <a:spcPct val="100000"/>
+              </a:lnSpc>
+              <a:spcBef>
+                <a:spcPts val="0"/>
+              </a:spcBef>
+              <a:spcAft>
+                <a:spcPts val="0"/>
+              </a:spcAft>
+              <a:buClrTx/>
+              <a:buSzTx/>
+              <a:buFontTx/>
+              <a:buNone/>
+              <a:tabLst/>
+              <a:defRPr/>
+            </a:pPr>
+            <a:r>
+              <a:rPr lang="en-US" dirty="0"/>
+              <a:t>	</a:t>
+            </a:r>
+            <a:r>
+              <a:rPr lang="en-US" dirty="0" smtClean="0"/>
+              <a:t>If yes: use a set </a:t>
+            </a:r>
+          </a:p>
+          <a:p>
+            <a:pPr marL="0" marR="0" lvl="0" indent="0" defTabSz="914400" eaLnBrk="1" fontAlgn="auto" latinLnBrk="0" hangingPunct="1">
+              <a:lnSpc>
+                <a:spcPct val="100000"/>
+              </a:lnSpc>
+              <a:spcBef>
+                <a:spcPts val="0"/>
+              </a:spcBef>
+              <a:spcAft>
+                <a:spcPts val="0"/>
+              </a:spcAft>
+              <a:buClrTx/>
+              <a:buSzTx/>
+              <a:buFontTx/>
+              <a:buNone/>
+              <a:tabLst/>
+              <a:defRPr/>
+            </a:pPr>
+            <a:endParaRPr lang="en-US" dirty="0"/>
+          </a:p>
+          <a:p>
+            <a:pPr marL="0" marR="0" lvl="0" indent="0" defTabSz="914400" eaLnBrk="1" fontAlgn="auto" latinLnBrk="0" hangingPunct="1">
+              <a:lnSpc>
+                <a:spcPct val="100000"/>
+              </a:lnSpc>
+              <a:spcBef>
+                <a:spcPts val="0"/>
+              </a:spcBef>
+              <a:spcAft>
+                <a:spcPts val="0"/>
+              </a:spcAft>
+              <a:buClrTx/>
+              <a:buSzTx/>
+              <a:buFontTx/>
+              <a:buNone/>
+              <a:tabLst/>
+              <a:defRPr/>
+            </a:pPr>
+            <a:r>
+              <a:rPr lang="en-US" dirty="0" smtClean="0"/>
+              <a:t>Do you need to ensure that the contents will never change? </a:t>
+            </a:r>
+          </a:p>
+          <a:p>
+            <a:pPr marL="0" marR="0" lvl="0" indent="0" defTabSz="914400" eaLnBrk="1" fontAlgn="auto" latinLnBrk="0" hangingPunct="1">
+              <a:lnSpc>
+                <a:spcPct val="100000"/>
+              </a:lnSpc>
+              <a:spcBef>
+                <a:spcPts val="0"/>
+              </a:spcBef>
+              <a:spcAft>
+                <a:spcPts val="0"/>
+              </a:spcAft>
+              <a:buClrTx/>
+              <a:buSzTx/>
+              <a:buFontTx/>
+              <a:buNone/>
+              <a:tabLst/>
+              <a:defRPr/>
+            </a:pPr>
+            <a:r>
+              <a:rPr lang="en-US" dirty="0"/>
+              <a:t>	</a:t>
+            </a:r>
+            <a:r>
+              <a:rPr lang="en-US" dirty="0" smtClean="0"/>
+              <a:t>If yes: use a tuple </a:t>
+            </a:r>
+          </a:p>
+          <a:p>
+            <a:pPr marL="0" marR="0" lvl="0" indent="0" defTabSz="914400" eaLnBrk="1" fontAlgn="auto" latinLnBrk="0" hangingPunct="1">
+              <a:lnSpc>
+                <a:spcPct val="100000"/>
+              </a:lnSpc>
+              <a:spcBef>
+                <a:spcPts val="0"/>
+              </a:spcBef>
+              <a:spcAft>
+                <a:spcPts val="0"/>
+              </a:spcAft>
+              <a:buClrTx/>
+              <a:buSzTx/>
+              <a:buFontTx/>
+              <a:buNone/>
+              <a:tabLst/>
+              <a:defRPr/>
+            </a:pPr>
+            <a:endParaRPr lang="en-US" dirty="0" smtClean="0"/>
+          </a:p>
+          <a:p>
+            <a:pPr marL="0" marR="0" lvl="0" indent="0" defTabSz="914400" eaLnBrk="1" fontAlgn="auto" latinLnBrk="0" hangingPunct="1">
+              <a:lnSpc>
+                <a:spcPct val="100000"/>
+              </a:lnSpc>
+              <a:spcBef>
+                <a:spcPts val="0"/>
+              </a:spcBef>
+              <a:spcAft>
+                <a:spcPts val="0"/>
+              </a:spcAft>
+              <a:buClrTx/>
+              <a:buSzTx/>
+              <a:buFontTx/>
+              <a:buNone/>
+              <a:tabLst/>
+              <a:defRPr/>
+            </a:pPr>
+            <a:r>
+              <a:rPr lang="en-US" dirty="0" smtClean="0"/>
+              <a:t>If you answered no to all of these, a list should suffice. </a:t>
+            </a:r>
+          </a:p>
+        </p:txBody>
+      </p:sp>
     </p:spTree>
     <p:extLst>
       <p:ext uri="{BB962C8B-B14F-4D97-AF65-F5344CB8AC3E}">
-        <p14:creationId xmlns:p14="http://schemas.microsoft.com/office/powerpoint/2010/main" val="416532481"/>
+        <p14:creationId xmlns:p14="http://schemas.microsoft.com/office/powerpoint/2010/main" val="1830114764"/>
       </p:ext>
     </p:extLst>
   </p:cSld>
@@ -8695,7 +8924,7 @@
           <a:p>
             <a:r>
               <a:rPr lang="en-US" dirty="0" smtClean="0"/>
-              <a:t>Lists vs. Arrays </a:t>
+              <a:t>Arrays </a:t>
             </a:r>
             <a:endParaRPr lang="en-US" dirty="0"/>
           </a:p>
@@ -8713,8 +8942,8 @@
         </p:nvSpPr>
         <p:spPr>
           <a:xfrm>
-            <a:off x="680322" y="2336873"/>
-            <a:ext cx="5010616" cy="4208306"/>
+            <a:off x="680321" y="2336872"/>
+            <a:ext cx="9613861" cy="3895485"/>
           </a:xfrm>
         </p:spPr>
         <p:txBody>
@@ -8728,6 +8957,153 @@
             </a:pPr>
             <a:r>
               <a:rPr lang="en-US" dirty="0" smtClean="0"/>
+              <a:t>In practice the same as a list, but has some special implementation of tracking data types under the hood </a:t>
+            </a:r>
+          </a:p>
+          <a:p>
+            <a:pPr lvl="1"/>
+            <a:r>
+              <a:rPr lang="en-US" dirty="0" smtClean="0"/>
+              <a:t>Can often speed up code </a:t>
+            </a:r>
+          </a:p>
+          <a:p>
+            <a:pPr lvl="1"/>
+            <a:r>
+              <a:rPr lang="en-US" dirty="0" smtClean="0"/>
+              <a:t>There is a built-in array object, but in practice, most people use the </a:t>
+            </a:r>
+            <a:r>
+              <a:rPr lang="en-US" dirty="0" err="1" smtClean="0"/>
+              <a:t>NumPy</a:t>
+            </a:r>
+            <a:r>
+              <a:rPr lang="en-US" dirty="0" smtClean="0"/>
+              <a:t> array </a:t>
+            </a:r>
+          </a:p>
+          <a:p>
+            <a:pPr marL="0" indent="0">
+              <a:buNone/>
+            </a:pPr>
+            <a:endParaRPr lang="en-US" dirty="0" smtClean="0"/>
+          </a:p>
+          <a:p>
+            <a:pPr marL="0" indent="0">
+              <a:buNone/>
+            </a:pPr>
+            <a:r>
+              <a:rPr lang="en-US" dirty="0" smtClean="0"/>
+              <a:t>The single most important thing to remember about arrays: </a:t>
+            </a:r>
+          </a:p>
+          <a:p>
+            <a:pPr marL="0" indent="0" algn="ctr">
+              <a:buNone/>
+            </a:pPr>
+            <a:r>
+              <a:rPr lang="en-US" sz="4800" dirty="0" smtClean="0"/>
+              <a:t>LISTS AND ARRAYS ARE </a:t>
+            </a:r>
+            <a:r>
+              <a:rPr lang="en-US" sz="4800" b="1" i="1" u="sng" dirty="0" smtClean="0"/>
+              <a:t>NOT</a:t>
+            </a:r>
+            <a:r>
+              <a:rPr lang="en-US" sz="4800" dirty="0" smtClean="0"/>
+              <a:t> THE SAME THING</a:t>
+            </a:r>
+            <a:endParaRPr lang="en-US" sz="4800" dirty="0"/>
+          </a:p>
+        </p:txBody>
+      </p:sp>
+    </p:spTree>
+    <p:extLst>
+      <p:ext uri="{BB962C8B-B14F-4D97-AF65-F5344CB8AC3E}">
+        <p14:creationId xmlns:p14="http://schemas.microsoft.com/office/powerpoint/2010/main" val="1156555604"/>
+      </p:ext>
+    </p:extLst>
+  </p:cSld>
+  <p:clrMapOvr>
+    <a:masterClrMapping/>
+  </p:clrMapOvr>
+  <p:timing>
+    <p:tnLst>
+      <p:par>
+        <p:cTn id="1" dur="indefinite" restart="never" nodeType="tmRoot"/>
+      </p:par>
+    </p:tnLst>
+  </p:timing>
+</p:sld>
+</file>
+
+<file path=ppt/slides/slide14.xml><?xml version="1.0" encoding="utf-8"?>
+<p:sld xmlns:a="http://schemas.openxmlformats.org/drawingml/2006/main" xmlns:r="http://schemas.openxmlformats.org/officeDocument/2006/relationships" xmlns:p="http://schemas.openxmlformats.org/presentationml/2006/main">
+  <p:cSld>
+    <p:spTree>
+      <p:nvGrpSpPr>
+        <p:cNvPr id="1" name=""/>
+        <p:cNvGrpSpPr/>
+        <p:nvPr/>
+      </p:nvGrpSpPr>
+      <p:grpSpPr>
+        <a:xfrm>
+          <a:off x="0" y="0"/>
+          <a:ext cx="0" cy="0"/>
+          <a:chOff x="0" y="0"/>
+          <a:chExt cx="0" cy="0"/>
+        </a:xfrm>
+      </p:grpSpPr>
+      <p:sp>
+        <p:nvSpPr>
+          <p:cNvPr id="2" name="Title 1"/>
+          <p:cNvSpPr>
+            <a:spLocks noGrp="1"/>
+          </p:cNvSpPr>
+          <p:nvPr>
+            <p:ph type="title"/>
+          </p:nvPr>
+        </p:nvSpPr>
+        <p:spPr/>
+        <p:txBody>
+          <a:bodyPr/>
+          <a:lstStyle/>
+          <a:p>
+            <a:r>
+              <a:rPr lang="en-US" dirty="0" smtClean="0"/>
+              <a:t>Lists vs. Arrays </a:t>
+            </a:r>
+            <a:endParaRPr lang="en-US" dirty="0"/>
+          </a:p>
+        </p:txBody>
+      </p:sp>
+      <p:sp>
+        <p:nvSpPr>
+          <p:cNvPr id="3" name="Content Placeholder 2"/>
+          <p:cNvSpPr>
+            <a:spLocks noGrp="1"/>
+          </p:cNvSpPr>
+          <p:nvPr>
+            <p:ph idx="1"/>
+          </p:nvPr>
+        </p:nvSpPr>
+        <p:spPr>
+          <a:xfrm>
+            <a:off x="680322" y="2336873"/>
+            <a:ext cx="5010616" cy="4208306"/>
+          </a:xfrm>
+        </p:spPr>
+        <p:txBody>
+          <a:bodyPr>
+            <a:normAutofit/>
+          </a:bodyPr>
+          <a:lstStyle/>
+          <a:p>
+            <a:pPr marL="0" indent="0">
+              <a:buNone/>
+            </a:pPr>
+            <a:r>
+              <a:rPr lang="en-US" dirty="0" smtClean="0"/>
               <a:t>They are </a:t>
             </a:r>
             <a:r>
@@ -8747,21 +9123,15 @@
             <a:pPr marL="0" indent="0">
               <a:buNone/>
             </a:pPr>
-            <a:endParaRPr lang="en-US" dirty="0" smtClean="0"/>
+            <a:endParaRPr lang="en-US" dirty="0"/>
           </a:p>
           <a:p>
             <a:pPr marL="0" indent="0">
               <a:buNone/>
             </a:pPr>
-            <a:endParaRPr lang="en-US" dirty="0"/>
-          </a:p>
-          <a:p>
-            <a:pPr marL="0" indent="0">
-              <a:buNone/>
-            </a:pPr>
-            <a:r>
-              <a:rPr lang="en-US" dirty="0" smtClean="0"/>
-              <a:t>It’s probably safe to say that a large portion of all scientific code is written using </a:t>
+            <a:r>
+              <a:rPr lang="en-US" dirty="0" smtClean="0"/>
+              <a:t>Example: </a:t>
             </a:r>
             <a:r>
               <a:rPr lang="en-US" dirty="0" err="1" smtClean="0"/>
@@ -8769,7 +9139,22 @@
             </a:r>
             <a:r>
               <a:rPr lang="en-US" dirty="0" smtClean="0"/>
-              <a:t> arrays </a:t>
+              <a:t> arrays allow multiplication with another array. A list does not. </a:t>
+            </a:r>
+          </a:p>
+          <a:p>
+            <a:pPr marL="0" indent="0">
+              <a:buNone/>
+            </a:pPr>
+            <a:endParaRPr lang="en-US" dirty="0" smtClean="0"/>
+          </a:p>
+          <a:p>
+            <a:pPr marL="0" indent="0">
+              <a:buNone/>
+            </a:pPr>
+            <a:r>
+              <a:rPr lang="en-US" dirty="0" smtClean="0"/>
+              <a:t>Advice: Pick one of either lists or arrays for a given program and stick to it </a:t>
             </a:r>
             <a:endParaRPr lang="en-US" dirty="0"/>
           </a:p>
@@ -8808,265 +9193,7 @@
     </p:spTree>
     <p:extLst>
       <p:ext uri="{BB962C8B-B14F-4D97-AF65-F5344CB8AC3E}">
-        <p14:creationId xmlns:p14="http://schemas.microsoft.com/office/powerpoint/2010/main" val="1355583242"/>
-      </p:ext>
-    </p:extLst>
-  </p:cSld>
-  <p:clrMapOvr>
-    <a:masterClrMapping/>
-  </p:clrMapOvr>
-</p:sld>
-</file>
-
-<file path=ppt/slides/slide14.xml><?xml version="1.0" encoding="utf-8"?>
-<p:sld xmlns:a="http://schemas.openxmlformats.org/drawingml/2006/main" xmlns:r="http://schemas.openxmlformats.org/officeDocument/2006/relationships" xmlns:p="http://schemas.openxmlformats.org/presentationml/2006/main">
-  <p:cSld>
-    <p:spTree>
-      <p:nvGrpSpPr>
-        <p:cNvPr id="1" name=""/>
-        <p:cNvGrpSpPr/>
-        <p:nvPr/>
-      </p:nvGrpSpPr>
-      <p:grpSpPr>
-        <a:xfrm>
-          <a:off x="0" y="0"/>
-          <a:ext cx="0" cy="0"/>
-          <a:chOff x="0" y="0"/>
-          <a:chExt cx="0" cy="0"/>
-        </a:xfrm>
-      </p:grpSpPr>
-      <p:sp>
-        <p:nvSpPr>
-          <p:cNvPr id="2" name="Title 1"/>
-          <p:cNvSpPr>
-            <a:spLocks noGrp="1"/>
-          </p:cNvSpPr>
-          <p:nvPr>
-            <p:ph type="title"/>
-          </p:nvPr>
-        </p:nvSpPr>
-        <p:spPr/>
-        <p:txBody>
-          <a:bodyPr/>
-          <a:lstStyle/>
-          <a:p>
-            <a:r>
-              <a:rPr lang="en-US" dirty="0" smtClean="0"/>
-              <a:t>Slicing</a:t>
-            </a:r>
-            <a:endParaRPr lang="en-US" dirty="0"/>
-          </a:p>
-        </p:txBody>
-      </p:sp>
-      <p:sp>
-        <p:nvSpPr>
-          <p:cNvPr id="3" name="Content Placeholder 2"/>
-          <p:cNvSpPr>
-            <a:spLocks noGrp="1"/>
-          </p:cNvSpPr>
-          <p:nvPr>
-            <p:ph idx="1"/>
-          </p:nvPr>
-        </p:nvSpPr>
-        <p:spPr>
-          <a:xfrm>
-            <a:off x="680320" y="2336873"/>
-            <a:ext cx="5034679" cy="4201622"/>
-          </a:xfrm>
-        </p:spPr>
-        <p:txBody>
-          <a:bodyPr/>
-          <a:lstStyle/>
-          <a:p>
-            <a:pPr marL="0" marR="0" lvl="0" indent="0" defTabSz="914400" eaLnBrk="1" fontAlgn="auto" latinLnBrk="0" hangingPunct="1">
-              <a:lnSpc>
-                <a:spcPct val="100000"/>
-              </a:lnSpc>
-              <a:spcBef>
-                <a:spcPts val="0"/>
-              </a:spcBef>
-              <a:spcAft>
-                <a:spcPts val="0"/>
-              </a:spcAft>
-              <a:buClrTx/>
-              <a:buSzTx/>
-              <a:buFontTx/>
-              <a:buNone/>
-              <a:tabLst/>
-              <a:defRPr/>
-            </a:pPr>
-            <a:r>
-              <a:rPr lang="en-US" dirty="0" smtClean="0"/>
-              <a:t>A technique used to pull multiple items from array-like objects </a:t>
-            </a:r>
-          </a:p>
-          <a:p>
-            <a:pPr marL="0" marR="0" lvl="0" indent="0" defTabSz="914400" eaLnBrk="1" fontAlgn="auto" latinLnBrk="0" hangingPunct="1">
-              <a:lnSpc>
-                <a:spcPct val="100000"/>
-              </a:lnSpc>
-              <a:spcBef>
-                <a:spcPts val="0"/>
-              </a:spcBef>
-              <a:spcAft>
-                <a:spcPts val="0"/>
-              </a:spcAft>
-              <a:buClrTx/>
-              <a:buSzTx/>
-              <a:buFontTx/>
-              <a:buNone/>
-              <a:tabLst/>
-              <a:defRPr/>
-            </a:pPr>
-            <a:endParaRPr lang="en-US" dirty="0"/>
-          </a:p>
-          <a:p>
-            <a:pPr marL="0" marR="0" lvl="0" indent="0" defTabSz="914400" eaLnBrk="1" fontAlgn="auto" latinLnBrk="0" hangingPunct="1">
-              <a:lnSpc>
-                <a:spcPct val="100000"/>
-              </a:lnSpc>
-              <a:spcBef>
-                <a:spcPts val="0"/>
-              </a:spcBef>
-              <a:spcAft>
-                <a:spcPts val="0"/>
-              </a:spcAft>
-              <a:buClrTx/>
-              <a:buSzTx/>
-              <a:buFontTx/>
-              <a:buNone/>
-              <a:tabLst/>
-              <a:defRPr/>
-            </a:pPr>
-            <a:endParaRPr lang="en-US" dirty="0" smtClean="0"/>
-          </a:p>
-          <a:p>
-            <a:pPr marL="0" marR="0" lvl="0" indent="0" defTabSz="914400" eaLnBrk="1" fontAlgn="auto" latinLnBrk="0" hangingPunct="1">
-              <a:lnSpc>
-                <a:spcPct val="100000"/>
-              </a:lnSpc>
-              <a:spcBef>
-                <a:spcPts val="0"/>
-              </a:spcBef>
-              <a:spcAft>
-                <a:spcPts val="0"/>
-              </a:spcAft>
-              <a:buClrTx/>
-              <a:buSzTx/>
-              <a:buFontTx/>
-              <a:buNone/>
-              <a:tabLst/>
-              <a:defRPr/>
-            </a:pPr>
-            <a:r>
-              <a:rPr lang="en-US" dirty="0" smtClean="0"/>
-              <a:t>Achieved by separating </a:t>
-            </a:r>
-            <a:r>
-              <a:rPr lang="en-US" smtClean="0"/>
-              <a:t>two indices with a colon</a:t>
-            </a:r>
-            <a:endParaRPr lang="en-US" dirty="0" smtClean="0"/>
-          </a:p>
-          <a:p>
-            <a:pPr marL="0" marR="0" lvl="0" indent="0" defTabSz="914400" eaLnBrk="1" fontAlgn="auto" latinLnBrk="0" hangingPunct="1">
-              <a:lnSpc>
-                <a:spcPct val="100000"/>
-              </a:lnSpc>
-              <a:spcBef>
-                <a:spcPts val="0"/>
-              </a:spcBef>
-              <a:spcAft>
-                <a:spcPts val="0"/>
-              </a:spcAft>
-              <a:buClrTx/>
-              <a:buSzTx/>
-              <a:buFontTx/>
-              <a:buNone/>
-              <a:tabLst/>
-              <a:defRPr/>
-            </a:pPr>
-            <a:endParaRPr lang="en-US" dirty="0" smtClean="0"/>
-          </a:p>
-          <a:p>
-            <a:pPr marL="0" marR="0" lvl="0" indent="0" defTabSz="914400" eaLnBrk="1" fontAlgn="auto" latinLnBrk="0" hangingPunct="1">
-              <a:lnSpc>
-                <a:spcPct val="100000"/>
-              </a:lnSpc>
-              <a:spcBef>
-                <a:spcPts val="0"/>
-              </a:spcBef>
-              <a:spcAft>
-                <a:spcPts val="0"/>
-              </a:spcAft>
-              <a:buClrTx/>
-              <a:buSzTx/>
-              <a:buFontTx/>
-              <a:buNone/>
-              <a:tabLst/>
-              <a:defRPr/>
-            </a:pPr>
-            <a:endParaRPr lang="en-US" dirty="0"/>
-          </a:p>
-          <a:p>
-            <a:pPr marL="0" marR="0" lvl="0" indent="0" defTabSz="914400" eaLnBrk="1" fontAlgn="auto" latinLnBrk="0" hangingPunct="1">
-              <a:lnSpc>
-                <a:spcPct val="100000"/>
-              </a:lnSpc>
-              <a:spcBef>
-                <a:spcPts val="0"/>
-              </a:spcBef>
-              <a:spcAft>
-                <a:spcPts val="0"/>
-              </a:spcAft>
-              <a:buClrTx/>
-              <a:buSzTx/>
-              <a:buFontTx/>
-              <a:buNone/>
-              <a:tabLst/>
-              <a:defRPr/>
-            </a:pPr>
-            <a:r>
-              <a:rPr lang="en-US" dirty="0" smtClean="0"/>
-              <a:t>If either start or end are absent, it takes the beginning and end </a:t>
-            </a:r>
-          </a:p>
-        </p:txBody>
-      </p:sp>
-      <p:pic>
-        <p:nvPicPr>
-          <p:cNvPr id="4" name="Picture 3"/>
-          <p:cNvPicPr>
-            <a:picLocks noChangeAspect="1"/>
-          </p:cNvPicPr>
-          <p:nvPr/>
-        </p:nvPicPr>
-        <p:blipFill>
-          <a:blip r:embed="rId2">
-            <a:extLst>
-              <a:ext uri="{28A0092B-C50C-407E-A947-70E740481C1C}">
-                <a14:useLocalDpi xmlns:a14="http://schemas.microsoft.com/office/drawing/2010/main" val="0"/>
-              </a:ext>
-            </a:extLst>
-          </a:blip>
-          <a:stretch>
-            <a:fillRect/>
-          </a:stretch>
-        </p:blipFill>
-        <p:spPr>
-          <a:xfrm>
-            <a:off x="6738182" y="2207795"/>
-            <a:ext cx="3556000" cy="4330700"/>
-          </a:xfrm>
-          <a:prstGeom prst="rect">
-            <a:avLst/>
-          </a:prstGeom>
-        </p:spPr>
-      </p:pic>
-    </p:spTree>
-    <p:extLst>
-      <p:ext uri="{BB962C8B-B14F-4D97-AF65-F5344CB8AC3E}">
-        <p14:creationId xmlns:p14="http://schemas.microsoft.com/office/powerpoint/2010/main" val="736711663"/>
+        <p14:creationId xmlns:p14="http://schemas.microsoft.com/office/powerpoint/2010/main" val="416532481"/>
       </p:ext>
     </p:extLst>
   </p:cSld>
@@ -9110,7 +9237,7 @@
           <a:p>
             <a:r>
               <a:rPr lang="en-US" dirty="0" smtClean="0"/>
-              <a:t>Conditions</a:t>
+              <a:t>Lists vs. Arrays </a:t>
             </a:r>
             <a:endParaRPr lang="en-US" dirty="0"/>
           </a:p>
@@ -9128,8 +9255,8 @@
         </p:nvSpPr>
         <p:spPr>
           <a:xfrm>
-            <a:off x="680321" y="2336872"/>
-            <a:ext cx="5912983" cy="3991739"/>
+            <a:off x="680322" y="2336873"/>
+            <a:ext cx="5010616" cy="4208306"/>
           </a:xfrm>
         </p:spPr>
         <p:txBody>
@@ -9143,30 +9270,19 @@
             </a:pPr>
             <a:r>
               <a:rPr lang="en-US" dirty="0" smtClean="0"/>
-              <a:t>Conduct different operations based on whether or not a given condition is satisfied </a:t>
-            </a:r>
-          </a:p>
-          <a:p>
-            <a:pPr marL="0" indent="0">
-              <a:buNone/>
-            </a:pPr>
-            <a:endParaRPr lang="en-US" dirty="0"/>
-          </a:p>
-          <a:p>
-            <a:pPr marL="0" indent="0">
-              <a:buNone/>
-            </a:pPr>
-            <a:r>
-              <a:rPr lang="en-US" dirty="0" smtClean="0"/>
-              <a:t>Uses </a:t>
-            </a:r>
-            <a:r>
-              <a:rPr lang="en-US" dirty="0" err="1" smtClean="0"/>
-              <a:t>boolean</a:t>
-            </a:r>
-            <a:r>
-              <a:rPr lang="en-US" dirty="0" smtClean="0"/>
-              <a:t> logic: True and False </a:t>
+              <a:t>They are </a:t>
+            </a:r>
+            <a:r>
+              <a:rPr lang="en-US" b="1" i="1" dirty="0" smtClean="0"/>
+              <a:t>different objects</a:t>
+            </a:r>
+            <a:r>
+              <a:rPr lang="en-US" b="1" dirty="0" smtClean="0"/>
+              <a:t> </a:t>
+            </a:r>
+            <a:r>
+              <a:rPr lang="en-US" dirty="0" smtClean="0"/>
+              <a:t>meant to store similar data </a:t>
             </a:r>
           </a:p>
           <a:p>
@@ -9179,18 +9295,25 @@
             <a:pPr marL="0" indent="0">
               <a:buNone/>
             </a:pPr>
-            <a:r>
-              <a:rPr lang="en-US" dirty="0" smtClean="0"/>
-              <a:t>Note: Numbers can be used as well </a:t>
-            </a:r>
-            <a:r>
-              <a:rPr lang="mr-IN" dirty="0" smtClean="0"/>
-              <a:t>–</a:t>
-            </a:r>
-            <a:r>
-              <a:rPr lang="en-US" dirty="0" smtClean="0"/>
-              <a:t> anything nonzero evaluates to True. </a:t>
-            </a:r>
+            <a:endParaRPr lang="en-US" dirty="0"/>
+          </a:p>
+          <a:p>
+            <a:pPr marL="0" indent="0">
+              <a:buNone/>
+            </a:pPr>
+            <a:r>
+              <a:rPr lang="en-US" dirty="0" smtClean="0"/>
+              <a:t>It’s probably safe to say that a large portion of all scientific code is written using </a:t>
+            </a:r>
+            <a:r>
+              <a:rPr lang="en-US" dirty="0" err="1" smtClean="0"/>
+              <a:t>NumPy</a:t>
+            </a:r>
+            <a:r>
+              <a:rPr lang="en-US" dirty="0" smtClean="0"/>
+              <a:t> arrays </a:t>
+            </a:r>
+            <a:endParaRPr lang="en-US" dirty="0"/>
           </a:p>
         </p:txBody>
       </p:sp>
@@ -9216,8 +9339,8 @@
         </p:blipFill>
         <p:spPr>
           <a:xfrm>
-            <a:off x="7657432" y="0"/>
-            <a:ext cx="3282566" cy="6858000"/>
+            <a:off x="6049211" y="1491915"/>
+            <a:ext cx="5354201" cy="4854742"/>
           </a:xfrm>
           <a:prstGeom prst="rect">
             <a:avLst/>
@@ -9227,7 +9350,7 @@
     </p:spTree>
     <p:extLst>
       <p:ext uri="{BB962C8B-B14F-4D97-AF65-F5344CB8AC3E}">
-        <p14:creationId xmlns:p14="http://schemas.microsoft.com/office/powerpoint/2010/main" val="1736834906"/>
+        <p14:creationId xmlns:p14="http://schemas.microsoft.com/office/powerpoint/2010/main" val="1355583242"/>
       </p:ext>
     </p:extLst>
   </p:cSld>
@@ -9271,7 +9394,7 @@
           <a:p>
             <a:r>
               <a:rPr lang="en-US" dirty="0" smtClean="0"/>
-              <a:t>Conditions</a:t>
+              <a:t>Slicing</a:t>
             </a:r>
             <a:endParaRPr lang="en-US" dirty="0"/>
           </a:p>
@@ -9289,121 +9412,172 @@
         </p:nvSpPr>
         <p:spPr>
           <a:xfrm>
-            <a:off x="680321" y="2336873"/>
-            <a:ext cx="5912983" cy="4316590"/>
+            <a:off x="680320" y="2336873"/>
+            <a:ext cx="5034679" cy="4201622"/>
           </a:xfrm>
         </p:spPr>
         <p:txBody>
           <a:bodyPr/>
           <a:lstStyle/>
           <a:p>
-            <a:pPr marL="0" indent="0">
-              <a:buNone/>
+            <a:pPr marL="0" marR="0" lvl="0" indent="0" defTabSz="914400" eaLnBrk="1" fontAlgn="auto" latinLnBrk="0" hangingPunct="1">
+              <a:lnSpc>
+                <a:spcPct val="100000"/>
+              </a:lnSpc>
+              <a:spcBef>
+                <a:spcPts val="0"/>
+              </a:spcBef>
+              <a:spcAft>
+                <a:spcPts val="0"/>
+              </a:spcAft>
+              <a:buClrTx/>
+              <a:buSzTx/>
+              <a:buFontTx/>
+              <a:buNone/>
+              <a:tabLst/>
+              <a:defRPr/>
             </a:pPr>
             <a:r>
               <a:rPr lang="en-US" dirty="0" smtClean="0"/>
-              <a:t>Conduct different operations based on whether or not a given condition is satisfied </a:t>
-            </a:r>
-          </a:p>
-          <a:p>
-            <a:pPr marL="0" indent="0">
-              <a:buNone/>
+              <a:t>A technique used to pull multiple items from array-like objects </a:t>
+            </a:r>
+          </a:p>
+          <a:p>
+            <a:pPr marL="0" marR="0" lvl="0" indent="0" defTabSz="914400" eaLnBrk="1" fontAlgn="auto" latinLnBrk="0" hangingPunct="1">
+              <a:lnSpc>
+                <a:spcPct val="100000"/>
+              </a:lnSpc>
+              <a:spcBef>
+                <a:spcPts val="0"/>
+              </a:spcBef>
+              <a:spcAft>
+                <a:spcPts val="0"/>
+              </a:spcAft>
+              <a:buClrTx/>
+              <a:buSzTx/>
+              <a:buFontTx/>
+              <a:buNone/>
+              <a:tabLst/>
+              <a:defRPr/>
             </a:pPr>
             <a:endParaRPr lang="en-US" dirty="0"/>
           </a:p>
           <a:p>
-            <a:pPr marL="0" indent="0">
-              <a:buNone/>
-            </a:pPr>
-            <a:r>
-              <a:rPr lang="en-US" dirty="0" smtClean="0"/>
-              <a:t>Uses </a:t>
-            </a:r>
-            <a:r>
-              <a:rPr lang="en-US" dirty="0" err="1" smtClean="0"/>
-              <a:t>boolean</a:t>
-            </a:r>
-            <a:r>
-              <a:rPr lang="en-US" dirty="0" smtClean="0"/>
-              <a:t> logic: True and False </a:t>
-            </a:r>
-          </a:p>
-          <a:p>
-            <a:pPr marL="0" indent="0">
-              <a:buNone/>
+            <a:pPr marL="0" marR="0" lvl="0" indent="0" defTabSz="914400" eaLnBrk="1" fontAlgn="auto" latinLnBrk="0" hangingPunct="1">
+              <a:lnSpc>
+                <a:spcPct val="100000"/>
+              </a:lnSpc>
+              <a:spcBef>
+                <a:spcPts val="0"/>
+              </a:spcBef>
+              <a:spcAft>
+                <a:spcPts val="0"/>
+              </a:spcAft>
+              <a:buClrTx/>
+              <a:buSzTx/>
+              <a:buFontTx/>
+              <a:buNone/>
+              <a:tabLst/>
+              <a:defRPr/>
             </a:pPr>
             <a:endParaRPr lang="en-US" dirty="0" smtClean="0"/>
           </a:p>
           <a:p>
-            <a:pPr marL="0" indent="0">
-              <a:buNone/>
+            <a:pPr marL="0" marR="0" lvl="0" indent="0" defTabSz="914400" eaLnBrk="1" fontAlgn="auto" latinLnBrk="0" hangingPunct="1">
+              <a:lnSpc>
+                <a:spcPct val="100000"/>
+              </a:lnSpc>
+              <a:spcBef>
+                <a:spcPts val="0"/>
+              </a:spcBef>
+              <a:spcAft>
+                <a:spcPts val="0"/>
+              </a:spcAft>
+              <a:buClrTx/>
+              <a:buSzTx/>
+              <a:buFontTx/>
+              <a:buNone/>
+              <a:tabLst/>
+              <a:defRPr/>
             </a:pPr>
             <a:r>
               <a:rPr lang="en-US" dirty="0" smtClean="0"/>
-              <a:t>Note: Numbers can be used as well </a:t>
-            </a:r>
-            <a:r>
-              <a:rPr lang="mr-IN" dirty="0" smtClean="0"/>
-              <a:t>–</a:t>
-            </a:r>
-            <a:r>
-              <a:rPr lang="en-US" dirty="0" smtClean="0"/>
-              <a:t> anything nonzero evaluates to True. </a:t>
-            </a:r>
-          </a:p>
-          <a:p>
-            <a:pPr marL="0" indent="0">
-              <a:buNone/>
+              <a:t>Achieved by separating </a:t>
+            </a:r>
+            <a:r>
+              <a:rPr lang="en-US" smtClean="0"/>
+              <a:t>two indices with a colon</a:t>
+            </a:r>
+            <a:endParaRPr lang="en-US" dirty="0" smtClean="0"/>
+          </a:p>
+          <a:p>
+            <a:pPr marL="0" marR="0" lvl="0" indent="0" defTabSz="914400" eaLnBrk="1" fontAlgn="auto" latinLnBrk="0" hangingPunct="1">
+              <a:lnSpc>
+                <a:spcPct val="100000"/>
+              </a:lnSpc>
+              <a:spcBef>
+                <a:spcPts val="0"/>
+              </a:spcBef>
+              <a:spcAft>
+                <a:spcPts val="0"/>
+              </a:spcAft>
+              <a:buClrTx/>
+              <a:buSzTx/>
+              <a:buFontTx/>
+              <a:buNone/>
+              <a:tabLst/>
+              <a:defRPr/>
             </a:pPr>
-            <a:endParaRPr lang="en-US" dirty="0"/>
-          </a:p>
-          <a:p>
-            <a:pPr marL="0" indent="0">
-              <a:buNone/>
+            <a:endParaRPr lang="en-US" dirty="0" smtClean="0"/>
+          </a:p>
+          <a:p>
+            <a:pPr marL="0" marR="0" lvl="0" indent="0" defTabSz="914400" eaLnBrk="1" fontAlgn="auto" latinLnBrk="0" hangingPunct="1">
+              <a:lnSpc>
+                <a:spcPct val="100000"/>
+              </a:lnSpc>
+              <a:spcBef>
+                <a:spcPts val="0"/>
+              </a:spcBef>
+              <a:spcAft>
+                <a:spcPts val="0"/>
+              </a:spcAft>
+              <a:buClrTx/>
+              <a:buSzTx/>
+              <a:buFontTx/>
+              <a:buNone/>
+              <a:tabLst/>
+              <a:defRPr/>
             </a:pPr>
-            <a:r>
-              <a:rPr lang="en-US" dirty="0" smtClean="0"/>
-              <a:t>Note: </a:t>
-            </a:r>
-            <a:r>
-              <a:rPr lang="en-US" i="1" dirty="0" smtClean="0"/>
-              <a:t>if</a:t>
-            </a:r>
-            <a:r>
-              <a:rPr lang="en-US" dirty="0" smtClean="0"/>
-              <a:t>/</a:t>
-            </a:r>
-            <a:r>
-              <a:rPr lang="en-US" i="1" dirty="0" err="1" smtClean="0"/>
-              <a:t>elif</a:t>
-            </a:r>
-            <a:r>
-              <a:rPr lang="en-US" dirty="0" smtClean="0"/>
-              <a:t>/</a:t>
-            </a:r>
-            <a:r>
-              <a:rPr lang="en-US" i="1" dirty="0" smtClean="0"/>
-              <a:t>else</a:t>
-            </a:r>
-            <a:r>
-              <a:rPr lang="en-US" dirty="0" smtClean="0"/>
-              <a:t> blocks executed </a:t>
-            </a:r>
-            <a:r>
-              <a:rPr lang="en-US" i="1" dirty="0" smtClean="0"/>
-              <a:t>in order</a:t>
-            </a:r>
-            <a:r>
-              <a:rPr lang="en-US" dirty="0" smtClean="0"/>
-              <a:t>. </a:t>
-            </a:r>
-            <a:endParaRPr lang="en-US" dirty="0"/>
+            <a:endParaRPr lang="en-US" dirty="0"/>
+          </a:p>
+          <a:p>
+            <a:pPr marL="0" marR="0" lvl="0" indent="0" defTabSz="914400" eaLnBrk="1" fontAlgn="auto" latinLnBrk="0" hangingPunct="1">
+              <a:lnSpc>
+                <a:spcPct val="100000"/>
+              </a:lnSpc>
+              <a:spcBef>
+                <a:spcPts val="0"/>
+              </a:spcBef>
+              <a:spcAft>
+                <a:spcPts val="0"/>
+              </a:spcAft>
+              <a:buClrTx/>
+              <a:buSzTx/>
+              <a:buFontTx/>
+              <a:buNone/>
+              <a:tabLst/>
+              <a:defRPr/>
+            </a:pPr>
+            <a:r>
+              <a:rPr lang="en-US" dirty="0" smtClean="0"/>
+              <a:t>If either start or end are absent, it takes the beginning and end </a:t>
+            </a:r>
           </a:p>
         </p:txBody>
       </p:sp>
       <p:pic>
         <p:nvPicPr>
-          <p:cNvPr id="5" name="Picture 4"/>
+          <p:cNvPr id="4" name="Picture 3"/>
           <p:cNvPicPr>
             <a:picLocks noChangeAspect="1"/>
           </p:cNvPicPr>
@@ -9423,8 +9597,8 @@
         </p:blipFill>
         <p:spPr>
           <a:xfrm>
-            <a:off x="7652753" y="0"/>
-            <a:ext cx="3337316" cy="6858000"/>
+            <a:off x="6738182" y="2207795"/>
+            <a:ext cx="3556000" cy="4330700"/>
           </a:xfrm>
           <a:prstGeom prst="rect">
             <a:avLst/>
@@ -9434,7 +9608,7 @@
     </p:spTree>
     <p:extLst>
       <p:ext uri="{BB962C8B-B14F-4D97-AF65-F5344CB8AC3E}">
-        <p14:creationId xmlns:p14="http://schemas.microsoft.com/office/powerpoint/2010/main" val="492525298"/>
+        <p14:creationId xmlns:p14="http://schemas.microsoft.com/office/powerpoint/2010/main" val="736711663"/>
       </p:ext>
     </p:extLst>
   </p:cSld>
@@ -9478,7 +9652,7 @@
           <a:p>
             <a:r>
               <a:rPr lang="en-US" dirty="0" smtClean="0"/>
-              <a:t>Loops </a:t>
+              <a:t>Conditions</a:t>
             </a:r>
             <a:endParaRPr lang="en-US" dirty="0"/>
           </a:p>
@@ -9496,12 +9670,14 @@
         </p:nvSpPr>
         <p:spPr>
           <a:xfrm>
-            <a:off x="680322" y="2336873"/>
-            <a:ext cx="8367426" cy="3599316"/>
-          </a:xfrm>
-        </p:spPr>
-        <p:txBody>
-          <a:bodyPr/>
+            <a:off x="680321" y="2336872"/>
+            <a:ext cx="5912983" cy="3991739"/>
+          </a:xfrm>
+        </p:spPr>
+        <p:txBody>
+          <a:bodyPr>
+            <a:normAutofit/>
+          </a:bodyPr>
           <a:lstStyle/>
           <a:p>
             <a:pPr marL="0" indent="0">
@@ -9509,14 +9685,30 @@
             </a:pPr>
             <a:r>
               <a:rPr lang="en-US" dirty="0" smtClean="0"/>
-              <a:t>Two types</a:t>
-            </a:r>
-          </a:p>
-          <a:p>
-            <a:pPr lvl="1"/>
-            <a:r>
-              <a:rPr lang="en-US" dirty="0" smtClean="0"/>
-              <a:t>For- and while-loops </a:t>
+              <a:t>Conduct different operations based on whether or not a given condition is satisfied </a:t>
+            </a:r>
+          </a:p>
+          <a:p>
+            <a:pPr marL="0" indent="0">
+              <a:buNone/>
+            </a:pPr>
+            <a:endParaRPr lang="en-US" dirty="0"/>
+          </a:p>
+          <a:p>
+            <a:pPr marL="0" indent="0">
+              <a:buNone/>
+            </a:pPr>
+            <a:r>
+              <a:rPr lang="en-US" dirty="0" smtClean="0"/>
+              <a:t>Uses </a:t>
+            </a:r>
+            <a:r>
+              <a:rPr lang="en-US" dirty="0" err="1" smtClean="0"/>
+              <a:t>boolean</a:t>
+            </a:r>
+            <a:r>
+              <a:rPr lang="en-US" dirty="0" smtClean="0"/>
+              <a:t> logic: True and False </a:t>
             </a:r>
           </a:p>
           <a:p>
@@ -9531,31 +9723,53 @@
             </a:pPr>
             <a:r>
               <a:rPr lang="en-US" dirty="0" smtClean="0"/>
-              <a:t>Both execute the same block of code some number of times </a:t>
-            </a:r>
-          </a:p>
-          <a:p>
-            <a:pPr marL="0" indent="0">
-              <a:buNone/>
-            </a:pPr>
-            <a:endParaRPr lang="en-US" dirty="0"/>
-          </a:p>
-          <a:p>
-            <a:pPr marL="0" indent="0">
-              <a:buNone/>
-            </a:pPr>
-            <a:r>
-              <a:rPr lang="en-US" dirty="0" smtClean="0"/>
-              <a:t>Both types of loops can be forced to terminate with the command “break”, and to start the next iteration with “continue” </a:t>
-            </a:r>
-            <a:endParaRPr lang="en-US" dirty="0"/>
-          </a:p>
-        </p:txBody>
-      </p:sp>
+              <a:t>Note: Numbers can be used as well </a:t>
+            </a:r>
+            <a:r>
+              <a:rPr lang="mr-IN" dirty="0" smtClean="0"/>
+              <a:t>–</a:t>
+            </a:r>
+            <a:r>
+              <a:rPr lang="en-US" dirty="0" smtClean="0"/>
+              <a:t> anything nonzero evaluates to True. </a:t>
+            </a:r>
+          </a:p>
+        </p:txBody>
+      </p:sp>
+      <p:pic>
+        <p:nvPicPr>
+          <p:cNvPr id="4" name="Picture 3"/>
+          <p:cNvPicPr>
+            <a:picLocks noChangeAspect="1"/>
+          </p:cNvPicPr>
+          <p:nvPr/>
+        </p:nvPicPr>
+        <p:blipFill>
+          <a:blip r:embed="rId2">
+            <a:extLst>
+              <a:ext uri="{28A0092B-C50C-407E-A947-70E740481C1C}">
+                <a14:useLocalDpi xmlns:a14="http://schemas.microsoft.com/office/drawing/2010/main" val="0"/>
+              </a:ext>
+            </a:extLst>
+          </a:blip>
+          <a:stretch>
+            <a:fillRect/>
+          </a:stretch>
+        </p:blipFill>
+        <p:spPr>
+          <a:xfrm>
+            <a:off x="7657432" y="0"/>
+            <a:ext cx="3282566" cy="6858000"/>
+          </a:xfrm>
+          <a:prstGeom prst="rect">
+            <a:avLst/>
+          </a:prstGeom>
+        </p:spPr>
+      </p:pic>
     </p:spTree>
     <p:extLst>
       <p:ext uri="{BB962C8B-B14F-4D97-AF65-F5344CB8AC3E}">
-        <p14:creationId xmlns:p14="http://schemas.microsoft.com/office/powerpoint/2010/main" val="501260096"/>
+        <p14:creationId xmlns:p14="http://schemas.microsoft.com/office/powerpoint/2010/main" val="1736834906"/>
       </p:ext>
     </p:extLst>
   </p:cSld>
@@ -9599,7 +9813,7 @@
           <a:p>
             <a:r>
               <a:rPr lang="en-US" dirty="0" smtClean="0"/>
-              <a:t>For-loops </a:t>
+              <a:t>Conditions</a:t>
             </a:r>
             <a:endParaRPr lang="en-US" dirty="0"/>
           </a:p>
@@ -9617,193 +9831,121 @@
         </p:nvSpPr>
         <p:spPr>
           <a:xfrm>
-            <a:off x="680322" y="2336873"/>
-            <a:ext cx="6273932" cy="3599316"/>
+            <a:off x="680321" y="2336873"/>
+            <a:ext cx="5912983" cy="4316590"/>
           </a:xfrm>
         </p:spPr>
         <p:txBody>
           <a:bodyPr/>
           <a:lstStyle/>
           <a:p>
-            <a:pPr marL="0" marR="0" lvl="0" indent="0" defTabSz="914400" eaLnBrk="1" fontAlgn="auto" latinLnBrk="0" hangingPunct="1">
-              <a:lnSpc>
-                <a:spcPct val="100000"/>
-              </a:lnSpc>
-              <a:spcBef>
-                <a:spcPts val="0"/>
-              </a:spcBef>
-              <a:spcAft>
-                <a:spcPts val="0"/>
-              </a:spcAft>
-              <a:buClrTx/>
-              <a:buSzTx/>
-              <a:buFontTx/>
-              <a:buNone/>
-              <a:tabLst/>
-              <a:defRPr/>
+            <a:pPr marL="0" indent="0">
+              <a:buNone/>
             </a:pPr>
             <a:r>
               <a:rPr lang="en-US" dirty="0" smtClean="0"/>
-              <a:t>Should be used when you know </a:t>
-            </a:r>
-            <a:r>
-              <a:rPr lang="en-US" i="1" dirty="0" smtClean="0"/>
-              <a:t>exactly </a:t>
-            </a:r>
-            <a:r>
-              <a:rPr lang="en-US" dirty="0" smtClean="0"/>
-              <a:t>how many times the block should repeat </a:t>
-            </a:r>
-          </a:p>
-          <a:p>
-            <a:pPr marL="0" marR="0" lvl="0" indent="0" defTabSz="914400" eaLnBrk="1" fontAlgn="auto" latinLnBrk="0" hangingPunct="1">
-              <a:lnSpc>
-                <a:spcPct val="100000"/>
-              </a:lnSpc>
-              <a:spcBef>
-                <a:spcPts val="0"/>
-              </a:spcBef>
-              <a:spcAft>
-                <a:spcPts val="0"/>
-              </a:spcAft>
-              <a:buClrTx/>
-              <a:buSzTx/>
-              <a:buFontTx/>
-              <a:buNone/>
-              <a:tabLst/>
-              <a:defRPr/>
+              <a:t>Conduct different operations based on whether or not a given condition is satisfied </a:t>
+            </a:r>
+          </a:p>
+          <a:p>
+            <a:pPr marL="0" indent="0">
+              <a:buNone/>
             </a:pPr>
             <a:endParaRPr lang="en-US" dirty="0"/>
           </a:p>
           <a:p>
-            <a:pPr marL="0" marR="0" lvl="0" indent="0" defTabSz="914400" eaLnBrk="1" fontAlgn="auto" latinLnBrk="0" hangingPunct="1">
-              <a:lnSpc>
-                <a:spcPct val="100000"/>
-              </a:lnSpc>
-              <a:spcBef>
-                <a:spcPts val="0"/>
-              </a:spcBef>
-              <a:spcAft>
-                <a:spcPts val="0"/>
-              </a:spcAft>
-              <a:buClrTx/>
-              <a:buSzTx/>
-              <a:buFontTx/>
-              <a:buNone/>
-              <a:tabLst/>
-              <a:defRPr/>
+            <a:pPr marL="0" indent="0">
+              <a:buNone/>
+            </a:pPr>
+            <a:r>
+              <a:rPr lang="en-US" dirty="0" smtClean="0"/>
+              <a:t>Uses </a:t>
+            </a:r>
+            <a:r>
+              <a:rPr lang="en-US" dirty="0" err="1" smtClean="0"/>
+              <a:t>boolean</a:t>
+            </a:r>
+            <a:r>
+              <a:rPr lang="en-US" dirty="0" smtClean="0"/>
+              <a:t> logic: True and False </a:t>
+            </a:r>
+          </a:p>
+          <a:p>
+            <a:pPr marL="0" indent="0">
+              <a:buNone/>
             </a:pPr>
             <a:endParaRPr lang="en-US" dirty="0" smtClean="0"/>
           </a:p>
           <a:p>
-            <a:pPr marL="0" marR="0" lvl="0" indent="0" defTabSz="914400" eaLnBrk="1" fontAlgn="auto" latinLnBrk="0" hangingPunct="1">
-              <a:lnSpc>
-                <a:spcPct val="100000"/>
-              </a:lnSpc>
-              <a:spcBef>
-                <a:spcPts val="0"/>
-              </a:spcBef>
-              <a:spcAft>
-                <a:spcPts val="0"/>
-              </a:spcAft>
-              <a:buClrTx/>
-              <a:buSzTx/>
-              <a:buFontTx/>
-              <a:buNone/>
-              <a:tabLst/>
-              <a:defRPr/>
+            <a:pPr marL="0" indent="0">
+              <a:buNone/>
             </a:pPr>
             <a:r>
               <a:rPr lang="en-US" dirty="0" smtClean="0"/>
-              <a:t>Come in two flavors: </a:t>
-            </a:r>
-          </a:p>
-          <a:p>
-            <a:pPr lvl="1">
-              <a:lnSpc>
-                <a:spcPct val="100000"/>
-              </a:lnSpc>
-              <a:spcBef>
-                <a:spcPts val="0"/>
-              </a:spcBef>
+              <a:t>Note: Numbers can be used as well </a:t>
+            </a:r>
+            <a:r>
+              <a:rPr lang="mr-IN" dirty="0" smtClean="0"/>
+              <a:t>–</a:t>
+            </a:r>
+            <a:r>
+              <a:rPr lang="en-US" dirty="0" smtClean="0"/>
+              <a:t> anything nonzero evaluates to True. </a:t>
+            </a:r>
+          </a:p>
+          <a:p>
+            <a:pPr marL="0" indent="0">
+              <a:buNone/>
             </a:pPr>
+            <a:endParaRPr lang="en-US" dirty="0"/>
+          </a:p>
+          <a:p>
+            <a:pPr marL="0" indent="0">
+              <a:buNone/>
+            </a:pPr>
+            <a:r>
+              <a:rPr lang="en-US" dirty="0" smtClean="0"/>
+              <a:t>Note: </a:t>
+            </a:r>
             <a:r>
               <a:rPr lang="en-US" i="1" dirty="0" smtClean="0"/>
-              <a:t>Explicit</a:t>
-            </a:r>
-            <a:r>
-              <a:rPr lang="en-US" dirty="0" smtClean="0"/>
-              <a:t> for loop: “</a:t>
+              <a:t>if</a:t>
+            </a:r>
+            <a:r>
+              <a:rPr lang="en-US" dirty="0" smtClean="0"/>
+              <a:t>/</a:t>
+            </a:r>
+            <a:r>
+              <a:rPr lang="en-US" i="1" dirty="0" err="1" smtClean="0"/>
+              <a:t>elif</a:t>
+            </a:r>
+            <a:r>
+              <a:rPr lang="en-US" dirty="0" smtClean="0"/>
+              <a:t>/</a:t>
             </a:r>
             <a:r>
               <a:rPr lang="en-US" i="1" dirty="0" smtClean="0"/>
-              <a:t>for </a:t>
-            </a:r>
-            <a:r>
-              <a:rPr lang="en-US" i="1" dirty="0" err="1" smtClean="0"/>
-              <a:t>i</a:t>
+              <a:t>else</a:t>
+            </a:r>
+            <a:r>
+              <a:rPr lang="en-US" dirty="0" smtClean="0"/>
+              <a:t> blocks executed </a:t>
             </a:r>
             <a:r>
               <a:rPr lang="en-US" i="1" dirty="0" smtClean="0"/>
-              <a:t> in &lt;some </a:t>
-            </a:r>
-            <a:r>
-              <a:rPr lang="en-US" i="1" dirty="0" err="1" smtClean="0"/>
-              <a:t>iterable</a:t>
-            </a:r>
-            <a:r>
-              <a:rPr lang="en-US" i="1" dirty="0" smtClean="0"/>
-              <a:t>&gt;”</a:t>
-            </a:r>
-            <a:r>
-              <a:rPr lang="en-US" dirty="0" smtClean="0"/>
-              <a:t> followed by an indented block (example: top) </a:t>
-            </a:r>
-          </a:p>
-          <a:p>
-            <a:pPr lvl="1">
-              <a:lnSpc>
-                <a:spcPct val="100000"/>
-              </a:lnSpc>
-              <a:spcBef>
-                <a:spcPts val="0"/>
-              </a:spcBef>
-            </a:pPr>
-            <a:r>
-              <a:rPr lang="en-US" i="1" dirty="0" smtClean="0"/>
-              <a:t>Implicit</a:t>
-            </a:r>
-            <a:r>
-              <a:rPr lang="en-US" dirty="0" smtClean="0"/>
-              <a:t> for loop: occurs within a list comprehension (example: bottom) </a:t>
-            </a:r>
-            <a:endParaRPr lang="en-US" i="1" dirty="0" smtClean="0"/>
-          </a:p>
-          <a:p>
-            <a:pPr marL="0" marR="0" lvl="0" indent="0" defTabSz="914400" eaLnBrk="1" fontAlgn="auto" latinLnBrk="0" hangingPunct="1">
-              <a:lnSpc>
-                <a:spcPct val="100000"/>
-              </a:lnSpc>
-              <a:spcBef>
-                <a:spcPts val="0"/>
-              </a:spcBef>
-              <a:spcAft>
-                <a:spcPts val="0"/>
-              </a:spcAft>
-              <a:buClrTx/>
-              <a:buSzTx/>
-              <a:buFontTx/>
-              <a:buNone/>
-              <a:tabLst/>
-              <a:defRPr/>
-            </a:pPr>
+              <a:t>in order</a:t>
+            </a:r>
+            <a:r>
+              <a:rPr lang="en-US" dirty="0" smtClean="0"/>
+              <a:t>. </a:t>
+            </a:r>
             <a:endParaRPr lang="en-US" dirty="0"/>
           </a:p>
         </p:txBody>
       </p:sp>
       <p:pic>
         <p:nvPicPr>
-          <p:cNvPr id="7" name="Picture 6"/>
+          <p:cNvPr id="5" name="Picture 4"/>
           <p:cNvPicPr>
             <a:picLocks noChangeAspect="1"/>
           </p:cNvPicPr>
@@ -9823,8 +9965,8 @@
         </p:blipFill>
         <p:spPr>
           <a:xfrm>
-            <a:off x="7177505" y="2336873"/>
-            <a:ext cx="4396874" cy="3833860"/>
+            <a:off x="7652753" y="0"/>
+            <a:ext cx="3337316" cy="6858000"/>
           </a:xfrm>
           <a:prstGeom prst="rect">
             <a:avLst/>
@@ -9834,7 +9976,7 @@
     </p:spTree>
     <p:extLst>
       <p:ext uri="{BB962C8B-B14F-4D97-AF65-F5344CB8AC3E}">
-        <p14:creationId xmlns:p14="http://schemas.microsoft.com/office/powerpoint/2010/main" val="720703814"/>
+        <p14:creationId xmlns:p14="http://schemas.microsoft.com/office/powerpoint/2010/main" val="492525298"/>
       </p:ext>
     </p:extLst>
   </p:cSld>
@@ -9878,7 +10020,7 @@
           <a:p>
             <a:r>
               <a:rPr lang="en-US" dirty="0" smtClean="0"/>
-              <a:t>While-loops </a:t>
+              <a:t>Loops </a:t>
             </a:r>
             <a:endParaRPr lang="en-US" dirty="0"/>
           </a:p>
@@ -9896,185 +10038,66 @@
         </p:nvSpPr>
         <p:spPr>
           <a:xfrm>
-            <a:off x="680321" y="2336873"/>
-            <a:ext cx="7092079" cy="3599316"/>
+            <a:off x="680322" y="2336873"/>
+            <a:ext cx="8367426" cy="3599316"/>
           </a:xfrm>
         </p:spPr>
         <p:txBody>
           <a:bodyPr/>
           <a:lstStyle/>
           <a:p>
-            <a:pPr marL="0" marR="0" lvl="0" indent="0" defTabSz="914400" eaLnBrk="1" fontAlgn="auto" latinLnBrk="0" hangingPunct="1">
-              <a:lnSpc>
-                <a:spcPct val="100000"/>
-              </a:lnSpc>
-              <a:spcBef>
-                <a:spcPts val="0"/>
-              </a:spcBef>
-              <a:spcAft>
-                <a:spcPts val="0"/>
-              </a:spcAft>
-              <a:buClrTx/>
-              <a:buSzTx/>
-              <a:buFontTx/>
-              <a:buNone/>
-              <a:tabLst/>
-              <a:defRPr/>
+            <a:pPr marL="0" indent="0">
+              <a:buNone/>
             </a:pPr>
             <a:r>
               <a:rPr lang="en-US" dirty="0" smtClean="0"/>
-              <a:t>Should be used when you </a:t>
-            </a:r>
-            <a:r>
-              <a:rPr lang="en-US" i="1" dirty="0" smtClean="0"/>
-              <a:t>don’t</a:t>
-            </a:r>
-            <a:r>
-              <a:rPr lang="en-US" dirty="0" smtClean="0"/>
-              <a:t> know how many times the block should repeat </a:t>
+              <a:t>Two types</a:t>
+            </a:r>
+          </a:p>
+          <a:p>
+            <a:pPr lvl="1"/>
+            <a:r>
+              <a:rPr lang="en-US" dirty="0" smtClean="0"/>
+              <a:t>For- and while-loops </a:t>
             </a:r>
           </a:p>
           <a:p>
             <a:pPr marL="0" indent="0">
-              <a:lnSpc>
-                <a:spcPct val="100000"/>
-              </a:lnSpc>
-              <a:spcBef>
-                <a:spcPts val="0"/>
-              </a:spcBef>
               <a:buNone/>
             </a:pPr>
-            <a:endParaRPr lang="en-US" i="1" dirty="0" smtClean="0"/>
+            <a:endParaRPr lang="en-US" dirty="0" smtClean="0"/>
           </a:p>
           <a:p>
             <a:pPr marL="0" indent="0">
-              <a:lnSpc>
-                <a:spcPct val="100000"/>
-              </a:lnSpc>
-              <a:spcBef>
-                <a:spcPts val="0"/>
-              </a:spcBef>
               <a:buNone/>
             </a:pPr>
-            <a:endParaRPr lang="en-US" i="1" dirty="0" smtClean="0"/>
+            <a:r>
+              <a:rPr lang="en-US" dirty="0" smtClean="0"/>
+              <a:t>Both execute the same block of code some number of times </a:t>
+            </a:r>
           </a:p>
           <a:p>
             <a:pPr marL="0" indent="0">
-              <a:lnSpc>
-                <a:spcPct val="100000"/>
-              </a:lnSpc>
-              <a:spcBef>
-                <a:spcPts val="0"/>
-              </a:spcBef>
               <a:buNone/>
             </a:pPr>
-            <a:r>
-              <a:rPr lang="en-US" i="1" dirty="0" smtClean="0"/>
-              <a:t>while True: &lt;</a:t>
-            </a:r>
-            <a:r>
-              <a:rPr lang="mr-IN" i="1" dirty="0" smtClean="0"/>
-              <a:t>…</a:t>
-            </a:r>
-            <a:r>
-              <a:rPr lang="en-US" i="1" dirty="0" smtClean="0"/>
-              <a:t>&gt; break </a:t>
-            </a:r>
-            <a:r>
-              <a:rPr lang="en-US" dirty="0" smtClean="0"/>
-              <a:t>is not uncommon, but generally considered bad practice </a:t>
-            </a:r>
-          </a:p>
-          <a:p>
-            <a:pPr lvl="1">
-              <a:lnSpc>
-                <a:spcPct val="100000"/>
-              </a:lnSpc>
-              <a:spcBef>
-                <a:spcPts val="0"/>
-              </a:spcBef>
+            <a:endParaRPr lang="en-US" dirty="0"/>
+          </a:p>
+          <a:p>
+            <a:pPr marL="0" indent="0">
+              <a:buNone/>
             </a:pPr>
             <a:r>
               <a:rPr lang="en-US" dirty="0" smtClean="0"/>
-              <a:t>Advantage: The loop will </a:t>
-            </a:r>
-            <a:r>
-              <a:rPr lang="en-US" i="1" dirty="0" smtClean="0"/>
-              <a:t>always</a:t>
-            </a:r>
-            <a:r>
-              <a:rPr lang="en-US" dirty="0" smtClean="0"/>
-              <a:t> execute at least once. Other languages achieve this with what is called a </a:t>
-            </a:r>
-            <a:r>
-              <a:rPr lang="en-US" i="1" dirty="0" smtClean="0"/>
-              <a:t>do-while</a:t>
-            </a:r>
-            <a:r>
-              <a:rPr lang="en-US" dirty="0" smtClean="0"/>
-              <a:t> loop. </a:t>
-            </a:r>
-          </a:p>
-          <a:p>
-            <a:pPr marL="0" indent="0">
-              <a:lnSpc>
-                <a:spcPct val="100000"/>
-              </a:lnSpc>
-              <a:spcBef>
-                <a:spcPts val="0"/>
-              </a:spcBef>
-              <a:buNone/>
-            </a:pPr>
-            <a:endParaRPr lang="en-US" i="1" dirty="0" smtClean="0"/>
-          </a:p>
-          <a:p>
-            <a:pPr marL="0" indent="0">
-              <a:lnSpc>
-                <a:spcPct val="100000"/>
-              </a:lnSpc>
-              <a:spcBef>
-                <a:spcPts val="0"/>
-              </a:spcBef>
-              <a:buNone/>
-            </a:pPr>
-            <a:endParaRPr lang="en-US" i="1" dirty="0"/>
-          </a:p>
-        </p:txBody>
-      </p:sp>
-      <p:pic>
-        <p:nvPicPr>
-          <p:cNvPr id="4" name="Picture 3"/>
-          <p:cNvPicPr>
-            <a:picLocks noChangeAspect="1"/>
-          </p:cNvPicPr>
-          <p:nvPr/>
-        </p:nvPicPr>
-        <p:blipFill>
-          <a:blip r:embed="rId2">
-            <a:extLst>
-              <a:ext uri="{28A0092B-C50C-407E-A947-70E740481C1C}">
-                <a14:useLocalDpi xmlns:a14="http://schemas.microsoft.com/office/drawing/2010/main" val="0"/>
-              </a:ext>
-            </a:extLst>
-          </a:blip>
-          <a:stretch>
-            <a:fillRect/>
-          </a:stretch>
-        </p:blipFill>
-        <p:spPr>
-          <a:xfrm>
-            <a:off x="8121984" y="0"/>
-            <a:ext cx="3021806" cy="6858000"/>
-          </a:xfrm>
-          <a:prstGeom prst="rect">
-            <a:avLst/>
-          </a:prstGeom>
-        </p:spPr>
-      </p:pic>
+              <a:t>Both types of loops can be forced to terminate with the command “break”, and to start the next iteration with “continue” </a:t>
+            </a:r>
+            <a:endParaRPr lang="en-US" dirty="0"/>
+          </a:p>
+        </p:txBody>
+      </p:sp>
     </p:spTree>
     <p:extLst>
       <p:ext uri="{BB962C8B-B14F-4D97-AF65-F5344CB8AC3E}">
-        <p14:creationId xmlns:p14="http://schemas.microsoft.com/office/powerpoint/2010/main" val="409787854"/>
+        <p14:creationId xmlns:p14="http://schemas.microsoft.com/office/powerpoint/2010/main" val="501260096"/>
       </p:ext>
     </p:extLst>
   </p:cSld>
@@ -10344,7 +10367,7 @@
           <a:p>
             <a:r>
               <a:rPr lang="en-US" dirty="0" smtClean="0"/>
-              <a:t>Functions </a:t>
+              <a:t>For-loops </a:t>
             </a:r>
             <a:endParaRPr lang="en-US" dirty="0"/>
           </a:p>
@@ -10362,92 +10385,193 @@
         </p:nvSpPr>
         <p:spPr>
           <a:xfrm>
-            <a:off x="680321" y="2229257"/>
-            <a:ext cx="6490500" cy="4015132"/>
-          </a:xfrm>
-        </p:spPr>
-        <p:txBody>
-          <a:bodyPr>
-            <a:normAutofit/>
-          </a:bodyPr>
+            <a:off x="680322" y="2336873"/>
+            <a:ext cx="6273932" cy="3599316"/>
+          </a:xfrm>
+        </p:spPr>
+        <p:txBody>
+          <a:bodyPr/>
           <a:lstStyle/>
           <a:p>
-            <a:pPr marL="0" indent="0">
-              <a:buNone/>
+            <a:pPr marL="0" marR="0" lvl="0" indent="0" defTabSz="914400" eaLnBrk="1" fontAlgn="auto" latinLnBrk="0" hangingPunct="1">
+              <a:lnSpc>
+                <a:spcPct val="100000"/>
+              </a:lnSpc>
+              <a:spcBef>
+                <a:spcPts val="0"/>
+              </a:spcBef>
+              <a:spcAft>
+                <a:spcPts val="0"/>
+              </a:spcAft>
+              <a:buClrTx/>
+              <a:buSzTx/>
+              <a:buFontTx/>
+              <a:buNone/>
+              <a:tabLst/>
+              <a:defRPr/>
             </a:pPr>
             <a:r>
               <a:rPr lang="en-US" dirty="0" smtClean="0"/>
-              <a:t>Often referred to as “methods” in other languages </a:t>
-            </a:r>
-          </a:p>
-          <a:p>
-            <a:pPr marL="0" indent="0">
-              <a:buNone/>
+              <a:t>Should be used when you know </a:t>
+            </a:r>
+            <a:r>
+              <a:rPr lang="en-US" i="1" dirty="0" smtClean="0"/>
+              <a:t>exactly </a:t>
+            </a:r>
+            <a:r>
+              <a:rPr lang="en-US" dirty="0" smtClean="0"/>
+              <a:t>how many times the block should repeat </a:t>
+            </a:r>
+          </a:p>
+          <a:p>
+            <a:pPr marL="0" marR="0" lvl="0" indent="0" defTabSz="914400" eaLnBrk="1" fontAlgn="auto" latinLnBrk="0" hangingPunct="1">
+              <a:lnSpc>
+                <a:spcPct val="100000"/>
+              </a:lnSpc>
+              <a:spcBef>
+                <a:spcPts val="0"/>
+              </a:spcBef>
+              <a:spcAft>
+                <a:spcPts val="0"/>
+              </a:spcAft>
+              <a:buClrTx/>
+              <a:buSzTx/>
+              <a:buFontTx/>
+              <a:buNone/>
+              <a:tabLst/>
+              <a:defRPr/>
             </a:pPr>
             <a:endParaRPr lang="en-US" dirty="0"/>
           </a:p>
           <a:p>
-            <a:pPr marL="0" indent="0">
-              <a:buNone/>
+            <a:pPr marL="0" marR="0" lvl="0" indent="0" defTabSz="914400" eaLnBrk="1" fontAlgn="auto" latinLnBrk="0" hangingPunct="1">
+              <a:lnSpc>
+                <a:spcPct val="100000"/>
+              </a:lnSpc>
+              <a:spcBef>
+                <a:spcPts val="0"/>
+              </a:spcBef>
+              <a:spcAft>
+                <a:spcPts val="0"/>
+              </a:spcAft>
+              <a:buClrTx/>
+              <a:buSzTx/>
+              <a:buFontTx/>
+              <a:buNone/>
+              <a:tabLst/>
+              <a:defRPr/>
             </a:pPr>
-            <a:r>
-              <a:rPr lang="en-US" dirty="0" smtClean="0"/>
-              <a:t>Created with the </a:t>
+            <a:endParaRPr lang="en-US" dirty="0" smtClean="0"/>
+          </a:p>
+          <a:p>
+            <a:pPr marL="0" marR="0" lvl="0" indent="0" defTabSz="914400" eaLnBrk="1" fontAlgn="auto" latinLnBrk="0" hangingPunct="1">
+              <a:lnSpc>
+                <a:spcPct val="100000"/>
+              </a:lnSpc>
+              <a:spcBef>
+                <a:spcPts val="0"/>
+              </a:spcBef>
+              <a:spcAft>
+                <a:spcPts val="0"/>
+              </a:spcAft>
+              <a:buClrTx/>
+              <a:buSzTx/>
+              <a:buFontTx/>
+              <a:buNone/>
+              <a:tabLst/>
+              <a:defRPr/>
+            </a:pPr>
+            <a:r>
+              <a:rPr lang="en-US" dirty="0" smtClean="0"/>
+              <a:t>Come in two flavors: </a:t>
+            </a:r>
+          </a:p>
+          <a:p>
+            <a:pPr lvl="1">
+              <a:lnSpc>
+                <a:spcPct val="100000"/>
+              </a:lnSpc>
+              <a:spcBef>
+                <a:spcPts val="0"/>
+              </a:spcBef>
+            </a:pPr>
+            <a:r>
+              <a:rPr lang="en-US" i="1" dirty="0" smtClean="0"/>
+              <a:t>Explicit</a:t>
+            </a:r>
+            <a:r>
+              <a:rPr lang="en-US" dirty="0" smtClean="0"/>
+              <a:t> for loop: “</a:t>
+            </a:r>
+            <a:r>
+              <a:rPr lang="en-US" i="1" dirty="0" smtClean="0"/>
+              <a:t>for </a:t>
             </a:r>
             <a:r>
               <a:rPr lang="en-US" i="1" dirty="0" err="1" smtClean="0"/>
-              <a:t>def</a:t>
-            </a:r>
-            <a:r>
-              <a:rPr lang="en-US" dirty="0" smtClean="0"/>
-              <a:t> keyword followed by an indented block. Between the </a:t>
+              <a:t>i</a:t>
+            </a:r>
+            <a:r>
+              <a:rPr lang="en-US" i="1" dirty="0" smtClean="0"/>
+              <a:t> in &lt;some </a:t>
             </a:r>
             <a:r>
               <a:rPr lang="en-US" i="1" dirty="0" err="1" smtClean="0"/>
-              <a:t>def</a:t>
-            </a:r>
-            <a:r>
-              <a:rPr lang="en-US" dirty="0" smtClean="0"/>
-              <a:t> statement and the body of the function is where you should put a </a:t>
-            </a:r>
-            <a:r>
-              <a:rPr lang="en-US" i="1" dirty="0" err="1" smtClean="0"/>
-              <a:t>docstring</a:t>
-            </a:r>
-            <a:r>
-              <a:rPr lang="en-US" dirty="0" smtClean="0"/>
-              <a:t>. </a:t>
-            </a:r>
-          </a:p>
-          <a:p>
-            <a:pPr marL="0" indent="0">
-              <a:buNone/>
+              <a:t>iterable</a:t>
+            </a:r>
+            <a:r>
+              <a:rPr lang="en-US" i="1" dirty="0" smtClean="0"/>
+              <a:t>&gt;”</a:t>
+            </a:r>
+            <a:r>
+              <a:rPr lang="en-US" dirty="0" smtClean="0"/>
+              <a:t> followed by an indented block (example: top) </a:t>
+            </a:r>
+          </a:p>
+          <a:p>
+            <a:pPr lvl="1">
+              <a:lnSpc>
+                <a:spcPct val="100000"/>
+              </a:lnSpc>
+              <a:spcBef>
+                <a:spcPts val="0"/>
+              </a:spcBef>
             </a:pPr>
-            <a:endParaRPr lang="en-US" dirty="0"/>
-          </a:p>
-          <a:p>
-            <a:pPr marL="0" indent="0">
-              <a:buNone/>
+            <a:r>
+              <a:rPr lang="en-US" i="1" dirty="0" smtClean="0"/>
+              <a:t>Implicit</a:t>
+            </a:r>
+            <a:r>
+              <a:rPr lang="en-US" dirty="0" smtClean="0"/>
+              <a:t> for loop: occurs within a list comprehension (example: bottom) </a:t>
+            </a:r>
+            <a:endParaRPr lang="en-US" i="1" dirty="0" smtClean="0"/>
+          </a:p>
+          <a:p>
+            <a:pPr marL="0" marR="0" lvl="0" indent="0" defTabSz="914400" eaLnBrk="1" fontAlgn="auto" latinLnBrk="0" hangingPunct="1">
+              <a:lnSpc>
+                <a:spcPct val="100000"/>
+              </a:lnSpc>
+              <a:spcBef>
+                <a:spcPts val="0"/>
+              </a:spcBef>
+              <a:spcAft>
+                <a:spcPts val="0"/>
+              </a:spcAft>
+              <a:buClrTx/>
+              <a:buSzTx/>
+              <a:buFontTx/>
+              <a:buNone/>
+              <a:tabLst/>
+              <a:defRPr/>
             </a:pPr>
-            <a:r>
-              <a:rPr lang="en-US" dirty="0" smtClean="0"/>
-              <a:t>Astronomers (and scientists in general) are </a:t>
-            </a:r>
-            <a:r>
-              <a:rPr lang="en-US" i="1" dirty="0" smtClean="0"/>
-              <a:t>notorious </a:t>
-            </a:r>
-            <a:r>
-              <a:rPr lang="en-US" dirty="0" smtClean="0"/>
-              <a:t>for thin documentation if they document at all. </a:t>
-            </a:r>
             <a:endParaRPr lang="en-US" dirty="0"/>
           </a:p>
         </p:txBody>
       </p:sp>
       <p:pic>
         <p:nvPicPr>
-          <p:cNvPr id="4" name="Picture 3"/>
+          <p:cNvPr id="7" name="Picture 6"/>
           <p:cNvPicPr>
             <a:picLocks noChangeAspect="1"/>
           </p:cNvPicPr>
@@ -10467,8 +10591,8 @@
         </p:blipFill>
         <p:spPr>
           <a:xfrm>
-            <a:off x="7343274" y="889668"/>
-            <a:ext cx="4267200" cy="5511800"/>
+            <a:off x="7177505" y="2336873"/>
+            <a:ext cx="4396874" cy="3833860"/>
           </a:xfrm>
           <a:prstGeom prst="rect">
             <a:avLst/>
@@ -10478,7 +10602,7 @@
     </p:spTree>
     <p:extLst>
       <p:ext uri="{BB962C8B-B14F-4D97-AF65-F5344CB8AC3E}">
-        <p14:creationId xmlns:p14="http://schemas.microsoft.com/office/powerpoint/2010/main" val="1274892126"/>
+        <p14:creationId xmlns:p14="http://schemas.microsoft.com/office/powerpoint/2010/main" val="720703814"/>
       </p:ext>
     </p:extLst>
   </p:cSld>
@@ -10522,7 +10646,7 @@
           <a:p>
             <a:r>
               <a:rPr lang="en-US" dirty="0" smtClean="0"/>
-              <a:t>Functions: The Implicit Return </a:t>
+              <a:t>While-loops </a:t>
             </a:r>
             <a:endParaRPr lang="en-US" dirty="0"/>
           </a:p>
@@ -10540,76 +10664,154 @@
         </p:nvSpPr>
         <p:spPr>
           <a:xfrm>
-            <a:off x="680321" y="2229257"/>
-            <a:ext cx="6297996" cy="4063259"/>
-          </a:xfrm>
-        </p:spPr>
-        <p:txBody>
-          <a:bodyPr>
-            <a:normAutofit/>
-          </a:bodyPr>
+            <a:off x="680321" y="2336873"/>
+            <a:ext cx="7092079" cy="3599316"/>
+          </a:xfrm>
+        </p:spPr>
+        <p:txBody>
+          <a:bodyPr/>
           <a:lstStyle/>
           <a:p>
+            <a:pPr marL="0" marR="0" lvl="0" indent="0" defTabSz="914400" eaLnBrk="1" fontAlgn="auto" latinLnBrk="0" hangingPunct="1">
+              <a:lnSpc>
+                <a:spcPct val="100000"/>
+              </a:lnSpc>
+              <a:spcBef>
+                <a:spcPts val="0"/>
+              </a:spcBef>
+              <a:spcAft>
+                <a:spcPts val="0"/>
+              </a:spcAft>
+              <a:buClrTx/>
+              <a:buSzTx/>
+              <a:buFontTx/>
+              <a:buNone/>
+              <a:tabLst/>
+              <a:defRPr/>
+            </a:pPr>
+            <a:r>
+              <a:rPr lang="en-US" dirty="0" smtClean="0"/>
+              <a:t>Should be used when you </a:t>
+            </a:r>
+            <a:r>
+              <a:rPr lang="en-US" i="1" dirty="0" smtClean="0"/>
+              <a:t>don’t</a:t>
+            </a:r>
+            <a:r>
+              <a:rPr lang="en-US" dirty="0" smtClean="0"/>
+              <a:t> know how many times the block should repeat </a:t>
+            </a:r>
+          </a:p>
+          <a:p>
             <a:pPr marL="0" indent="0">
+              <a:lnSpc>
+                <a:spcPct val="100000"/>
+              </a:lnSpc>
+              <a:spcBef>
+                <a:spcPts val="0"/>
+              </a:spcBef>
               <a:buNone/>
             </a:pPr>
-            <a:r>
-              <a:rPr lang="en-US" dirty="0" smtClean="0"/>
-              <a:t>Unless otherwise specified, a function will return </a:t>
-            </a:r>
+            <a:endParaRPr lang="en-US" i="1" dirty="0" smtClean="0"/>
+          </a:p>
+          <a:p>
+            <a:pPr marL="0" indent="0">
+              <a:lnSpc>
+                <a:spcPct val="100000"/>
+              </a:lnSpc>
+              <a:spcBef>
+                <a:spcPts val="0"/>
+              </a:spcBef>
+              <a:buNone/>
+            </a:pPr>
+            <a:endParaRPr lang="en-US" i="1" dirty="0" smtClean="0"/>
+          </a:p>
+          <a:p>
+            <a:pPr marL="0" indent="0">
+              <a:lnSpc>
+                <a:spcPct val="100000"/>
+              </a:lnSpc>
+              <a:spcBef>
+                <a:spcPts val="0"/>
+              </a:spcBef>
+              <a:buNone/>
+            </a:pPr>
             <a:r>
               <a:rPr lang="en-US" i="1" dirty="0" smtClean="0"/>
-              <a:t>None</a:t>
-            </a:r>
-            <a:r>
-              <a:rPr lang="en-US" dirty="0" smtClean="0"/>
-              <a:t>. </a:t>
+              <a:t>while True: &lt;</a:t>
+            </a:r>
+            <a:r>
+              <a:rPr lang="mr-IN" i="1" dirty="0" smtClean="0"/>
+              <a:t>…</a:t>
+            </a:r>
+            <a:r>
+              <a:rPr lang="en-US" i="1" dirty="0" smtClean="0"/>
+              <a:t>&gt; break </a:t>
+            </a:r>
+            <a:r>
+              <a:rPr lang="en-US" dirty="0" smtClean="0"/>
+              <a:t>is not uncommon, but generally considered bad practice </a:t>
+            </a:r>
+          </a:p>
+          <a:p>
+            <a:pPr lvl="1">
+              <a:lnSpc>
+                <a:spcPct val="100000"/>
+              </a:lnSpc>
+              <a:spcBef>
+                <a:spcPts val="0"/>
+              </a:spcBef>
+            </a:pPr>
+            <a:r>
+              <a:rPr lang="en-US" dirty="0" smtClean="0"/>
+              <a:t>Advantage: The loop will </a:t>
+            </a:r>
+            <a:r>
+              <a:rPr lang="en-US" i="1" dirty="0" smtClean="0"/>
+              <a:t>always</a:t>
+            </a:r>
+            <a:r>
+              <a:rPr lang="en-US" dirty="0" smtClean="0"/>
+              <a:t> execute at least once. Other languages achieve this with what is called a </a:t>
+            </a:r>
+            <a:r>
+              <a:rPr lang="en-US" i="1" dirty="0" smtClean="0"/>
+              <a:t>do-while</a:t>
+            </a:r>
+            <a:r>
+              <a:rPr lang="en-US" dirty="0" smtClean="0"/>
+              <a:t> loop. </a:t>
             </a:r>
           </a:p>
           <a:p>
             <a:pPr marL="0" indent="0">
+              <a:lnSpc>
+                <a:spcPct val="100000"/>
+              </a:lnSpc>
+              <a:spcBef>
+                <a:spcPts val="0"/>
+              </a:spcBef>
               <a:buNone/>
             </a:pPr>
-            <a:endParaRPr lang="en-US" dirty="0"/>
+            <a:endParaRPr lang="en-US" i="1" dirty="0" smtClean="0"/>
           </a:p>
           <a:p>
             <a:pPr marL="0" indent="0">
+              <a:lnSpc>
+                <a:spcPct val="100000"/>
+              </a:lnSpc>
+              <a:spcBef>
+                <a:spcPts val="0"/>
+              </a:spcBef>
               <a:buNone/>
             </a:pPr>
-            <a:r>
-              <a:rPr lang="en-US" dirty="0" smtClean="0"/>
-              <a:t>In order to obtain an object from a function, you have to override this with a </a:t>
-            </a:r>
-            <a:r>
-              <a:rPr lang="en-US" i="1" dirty="0" smtClean="0"/>
-              <a:t>return</a:t>
-            </a:r>
-            <a:r>
-              <a:rPr lang="en-US" dirty="0" smtClean="0"/>
-              <a:t> statement </a:t>
-            </a:r>
-          </a:p>
-          <a:p>
-            <a:pPr marL="0" indent="0">
-              <a:buNone/>
-            </a:pPr>
-            <a:endParaRPr lang="en-US" dirty="0" smtClean="0"/>
-          </a:p>
-          <a:p>
-            <a:pPr marL="0" indent="0">
-              <a:buNone/>
-            </a:pPr>
-            <a:r>
-              <a:rPr lang="en-US" dirty="0" smtClean="0"/>
-              <a:t>A note about variable scope: variables declared inside a function cannot be accessed outside the function. </a:t>
-            </a:r>
-            <a:endParaRPr lang="en-US" dirty="0"/>
+            <a:endParaRPr lang="en-US" i="1" dirty="0"/>
           </a:p>
         </p:txBody>
       </p:sp>
       <p:pic>
         <p:nvPicPr>
-          <p:cNvPr id="6" name="Picture 5"/>
+          <p:cNvPr id="4" name="Picture 3"/>
           <p:cNvPicPr>
             <a:picLocks noChangeAspect="1"/>
           </p:cNvPicPr>
@@ -10629,8 +10831,8 @@
         </p:blipFill>
         <p:spPr>
           <a:xfrm>
-            <a:off x="7179733" y="342900"/>
-            <a:ext cx="4673600" cy="6172200"/>
+            <a:off x="8121984" y="0"/>
+            <a:ext cx="3021806" cy="6858000"/>
           </a:xfrm>
           <a:prstGeom prst="rect">
             <a:avLst/>
@@ -10640,7 +10842,7 @@
     </p:spTree>
     <p:extLst>
       <p:ext uri="{BB962C8B-B14F-4D97-AF65-F5344CB8AC3E}">
-        <p14:creationId xmlns:p14="http://schemas.microsoft.com/office/powerpoint/2010/main" val="1964281485"/>
+        <p14:creationId xmlns:p14="http://schemas.microsoft.com/office/powerpoint/2010/main" val="409787854"/>
       </p:ext>
     </p:extLst>
   </p:cSld>
@@ -10684,7 +10886,7 @@
           <a:p>
             <a:r>
               <a:rPr lang="en-US" dirty="0" smtClean="0"/>
-              <a:t>Catching Exceptions: try-except</a:t>
+              <a:t>Functions </a:t>
             </a:r>
             <a:endParaRPr lang="en-US" dirty="0"/>
           </a:p>
@@ -10702,117 +10904,84 @@
         </p:nvSpPr>
         <p:spPr>
           <a:xfrm>
-            <a:off x="680321" y="2336873"/>
-            <a:ext cx="5549791" cy="3599316"/>
-          </a:xfrm>
-        </p:spPr>
-        <p:txBody>
-          <a:bodyPr/>
+            <a:off x="680321" y="2229257"/>
+            <a:ext cx="6490500" cy="4015132"/>
+          </a:xfrm>
+        </p:spPr>
+        <p:txBody>
+          <a:bodyPr>
+            <a:normAutofit/>
+          </a:bodyPr>
           <a:lstStyle/>
           <a:p>
-            <a:pPr marL="0" marR="0" lvl="0" indent="0" defTabSz="914400" eaLnBrk="1" fontAlgn="auto" latinLnBrk="0" hangingPunct="1">
-              <a:lnSpc>
-                <a:spcPct val="100000"/>
-              </a:lnSpc>
-              <a:spcBef>
-                <a:spcPts val="0"/>
-              </a:spcBef>
-              <a:spcAft>
-                <a:spcPts val="0"/>
-              </a:spcAft>
-              <a:buClrTx/>
-              <a:buSzTx/>
-              <a:buFontTx/>
-              <a:buNone/>
-              <a:tabLst/>
-              <a:defRPr/>
+            <a:pPr marL="0" indent="0">
+              <a:buNone/>
             </a:pPr>
             <a:r>
               <a:rPr lang="en-US" dirty="0" smtClean="0"/>
-              <a:t>Catch exceptions before their raised and handle them. </a:t>
-            </a:r>
-          </a:p>
-          <a:p>
-            <a:pPr marL="0" marR="0" lvl="0" indent="0" defTabSz="914400" eaLnBrk="1" fontAlgn="auto" latinLnBrk="0" hangingPunct="1">
-              <a:lnSpc>
-                <a:spcPct val="100000"/>
-              </a:lnSpc>
-              <a:spcBef>
-                <a:spcPts val="0"/>
-              </a:spcBef>
-              <a:spcAft>
-                <a:spcPts val="0"/>
-              </a:spcAft>
-              <a:buClrTx/>
-              <a:buSzTx/>
-              <a:buFontTx/>
-              <a:buNone/>
-              <a:tabLst/>
-              <a:defRPr/>
+              <a:t>Often referred to as “methods” in other languages </a:t>
+            </a:r>
+          </a:p>
+          <a:p>
+            <a:pPr marL="0" indent="0">
+              <a:buNone/>
             </a:pPr>
-            <a:endParaRPr lang="en-US" dirty="0" smtClean="0"/>
-          </a:p>
-          <a:p>
-            <a:pPr marL="0" marR="0" lvl="0" indent="0" defTabSz="914400" eaLnBrk="1" fontAlgn="auto" latinLnBrk="0" hangingPunct="1">
-              <a:lnSpc>
-                <a:spcPct val="100000"/>
-              </a:lnSpc>
-              <a:spcBef>
-                <a:spcPts val="0"/>
-              </a:spcBef>
-              <a:spcAft>
-                <a:spcPts val="0"/>
-              </a:spcAft>
-              <a:buClrTx/>
-              <a:buSzTx/>
-              <a:buFontTx/>
-              <a:buNone/>
-              <a:tabLst/>
-              <a:defRPr/>
+            <a:endParaRPr lang="en-US" dirty="0"/>
+          </a:p>
+          <a:p>
+            <a:pPr marL="0" indent="0">
+              <a:buNone/>
             </a:pPr>
-            <a:endParaRPr lang="en-US" dirty="0"/>
-          </a:p>
-          <a:p>
-            <a:pPr marL="0" marR="0" lvl="0" indent="0" defTabSz="914400" eaLnBrk="1" fontAlgn="auto" latinLnBrk="0" hangingPunct="1">
-              <a:lnSpc>
-                <a:spcPct val="100000"/>
-              </a:lnSpc>
-              <a:spcBef>
-                <a:spcPts val="0"/>
-              </a:spcBef>
-              <a:spcAft>
-                <a:spcPts val="0"/>
-              </a:spcAft>
-              <a:buClrTx/>
-              <a:buSzTx/>
-              <a:buFontTx/>
-              <a:buNone/>
-              <a:tabLst/>
-              <a:defRPr/>
+            <a:r>
+              <a:rPr lang="en-US" dirty="0" smtClean="0"/>
+              <a:t>Created with the </a:t>
+            </a:r>
+            <a:r>
+              <a:rPr lang="en-US" i="1" dirty="0" err="1" smtClean="0"/>
+              <a:t>def</a:t>
+            </a:r>
+            <a:r>
+              <a:rPr lang="en-US" dirty="0" smtClean="0"/>
+              <a:t> keyword followed by an indented block. Between the </a:t>
+            </a:r>
+            <a:r>
+              <a:rPr lang="en-US" i="1" dirty="0" err="1" smtClean="0"/>
+              <a:t>def</a:t>
+            </a:r>
+            <a:r>
+              <a:rPr lang="en-US" dirty="0" smtClean="0"/>
+              <a:t> statement and the body of the function is where you should put a </a:t>
+            </a:r>
+            <a:r>
+              <a:rPr lang="en-US" i="1" dirty="0" err="1" smtClean="0"/>
+              <a:t>docstring</a:t>
+            </a:r>
+            <a:r>
+              <a:rPr lang="en-US" dirty="0" smtClean="0"/>
+              <a:t>. </a:t>
+            </a:r>
+          </a:p>
+          <a:p>
+            <a:pPr marL="0" indent="0">
+              <a:buNone/>
             </a:pPr>
             <a:endParaRPr lang="en-US" dirty="0"/>
           </a:p>
           <a:p>
-            <a:pPr marL="0" marR="0" lvl="0" indent="0" defTabSz="914400" eaLnBrk="1" fontAlgn="auto" latinLnBrk="0" hangingPunct="1">
-              <a:lnSpc>
-                <a:spcPct val="100000"/>
-              </a:lnSpc>
-              <a:spcBef>
-                <a:spcPts val="0"/>
-              </a:spcBef>
-              <a:spcAft>
-                <a:spcPts val="0"/>
-              </a:spcAft>
-              <a:buClrTx/>
-              <a:buSzTx/>
-              <a:buFontTx/>
-              <a:buNone/>
-              <a:tabLst/>
-              <a:defRPr/>
+            <a:pPr marL="0" indent="0">
+              <a:buNone/>
             </a:pPr>
             <a:r>
               <a:rPr lang="en-US" dirty="0" smtClean="0"/>
-              <a:t>Different types of exceptions can be treated differently by specifying them in the except statement. </a:t>
+              <a:t>Astronomers (and scientists in general) are </a:t>
+            </a:r>
+            <a:r>
+              <a:rPr lang="en-US" i="1" dirty="0" smtClean="0"/>
+              <a:t>notorious </a:t>
+            </a:r>
+            <a:r>
+              <a:rPr lang="en-US" dirty="0" smtClean="0"/>
+              <a:t>for thin documentation if they document at all. </a:t>
             </a:r>
             <a:endParaRPr lang="en-US" dirty="0"/>
           </a:p>
@@ -10820,7 +10989,7 @@
       </p:sp>
       <p:pic>
         <p:nvPicPr>
-          <p:cNvPr id="5" name="Picture 4"/>
+          <p:cNvPr id="4" name="Picture 3"/>
           <p:cNvPicPr>
             <a:picLocks noChangeAspect="1"/>
           </p:cNvPicPr>
@@ -10840,8 +11009,8 @@
         </p:blipFill>
         <p:spPr>
           <a:xfrm>
-            <a:off x="6764787" y="2184400"/>
-            <a:ext cx="4597400" cy="4305300"/>
+            <a:off x="7343274" y="889668"/>
+            <a:ext cx="4267200" cy="5511800"/>
           </a:xfrm>
           <a:prstGeom prst="rect">
             <a:avLst/>
@@ -10851,7 +11020,7 @@
     </p:spTree>
     <p:extLst>
       <p:ext uri="{BB962C8B-B14F-4D97-AF65-F5344CB8AC3E}">
-        <p14:creationId xmlns:p14="http://schemas.microsoft.com/office/powerpoint/2010/main" val="1936197508"/>
+        <p14:creationId xmlns:p14="http://schemas.microsoft.com/office/powerpoint/2010/main" val="1274892126"/>
       </p:ext>
     </p:extLst>
   </p:cSld>
@@ -10895,7 +11064,7 @@
           <a:p>
             <a:r>
               <a:rPr lang="en-US" dirty="0" smtClean="0"/>
-              <a:t>Catching Exceptions: try-except-finally </a:t>
+              <a:t>Functions: The Implicit Return </a:t>
             </a:r>
             <a:endParaRPr lang="en-US" dirty="0"/>
           </a:p>
@@ -10913,153 +11082,68 @@
         </p:nvSpPr>
         <p:spPr>
           <a:xfrm>
-            <a:off x="680321" y="2336872"/>
-            <a:ext cx="5354719" cy="4356535"/>
-          </a:xfrm>
-        </p:spPr>
-        <p:txBody>
-          <a:bodyPr/>
+            <a:off x="680321" y="2229257"/>
+            <a:ext cx="6297996" cy="4063259"/>
+          </a:xfrm>
+        </p:spPr>
+        <p:txBody>
+          <a:bodyPr>
+            <a:normAutofit/>
+          </a:bodyPr>
           <a:lstStyle/>
           <a:p>
-            <a:pPr marL="0" marR="0" lvl="0" indent="0" defTabSz="914400" eaLnBrk="1" fontAlgn="auto" latinLnBrk="0" hangingPunct="1">
-              <a:lnSpc>
-                <a:spcPct val="100000"/>
-              </a:lnSpc>
-              <a:spcBef>
-                <a:spcPts val="0"/>
-              </a:spcBef>
-              <a:spcAft>
-                <a:spcPts val="0"/>
-              </a:spcAft>
-              <a:buClrTx/>
-              <a:buSzTx/>
-              <a:buFontTx/>
-              <a:buNone/>
-              <a:tabLst/>
-              <a:defRPr/>
+            <a:pPr marL="0" indent="0">
+              <a:buNone/>
             </a:pPr>
             <a:r>
               <a:rPr lang="en-US" dirty="0" smtClean="0"/>
-              <a:t>Use a </a:t>
+              <a:t>Unless otherwise specified, a function will return </a:t>
             </a:r>
             <a:r>
               <a:rPr lang="en-US" i="1" dirty="0" smtClean="0"/>
-              <a:t>finally</a:t>
-            </a:r>
-            <a:r>
-              <a:rPr lang="en-US" dirty="0" smtClean="0"/>
-              <a:t> block when you need something to </a:t>
+              <a:t>None</a:t>
+            </a:r>
+            <a:r>
+              <a:rPr lang="en-US" dirty="0" smtClean="0"/>
+              <a:t>. </a:t>
+            </a:r>
+          </a:p>
+          <a:p>
+            <a:pPr marL="0" indent="0">
+              <a:buNone/>
+            </a:pPr>
+            <a:endParaRPr lang="en-US" dirty="0"/>
+          </a:p>
+          <a:p>
+            <a:pPr marL="0" indent="0">
+              <a:buNone/>
+            </a:pPr>
+            <a:r>
+              <a:rPr lang="en-US" dirty="0" smtClean="0"/>
+              <a:t>In order to obtain an object from a function, you have to override this with a </a:t>
             </a:r>
             <a:r>
               <a:rPr lang="en-US" i="1" dirty="0" smtClean="0"/>
-              <a:t>always run</a:t>
-            </a:r>
-            <a:r>
-              <a:rPr lang="en-US" dirty="0" smtClean="0"/>
-              <a:t> regardless of the errors that may or may not be raised. </a:t>
-            </a:r>
-          </a:p>
-          <a:p>
-            <a:pPr marL="0" marR="0" lvl="0" indent="0" defTabSz="914400" eaLnBrk="1" fontAlgn="auto" latinLnBrk="0" hangingPunct="1">
-              <a:lnSpc>
-                <a:spcPct val="100000"/>
-              </a:lnSpc>
-              <a:spcBef>
-                <a:spcPts val="0"/>
-              </a:spcBef>
-              <a:spcAft>
-                <a:spcPts val="0"/>
-              </a:spcAft>
-              <a:buClrTx/>
-              <a:buSzTx/>
-              <a:buFontTx/>
-              <a:buNone/>
-              <a:tabLst/>
-              <a:defRPr/>
+              <a:t>return</a:t>
+            </a:r>
+            <a:r>
+              <a:rPr lang="en-US" dirty="0" smtClean="0"/>
+              <a:t> statement </a:t>
+            </a:r>
+          </a:p>
+          <a:p>
+            <a:pPr marL="0" indent="0">
+              <a:buNone/>
             </a:pPr>
             <a:endParaRPr lang="en-US" dirty="0" smtClean="0"/>
           </a:p>
           <a:p>
-            <a:pPr marL="0" marR="0" lvl="0" indent="0" defTabSz="914400" eaLnBrk="1" fontAlgn="auto" latinLnBrk="0" hangingPunct="1">
-              <a:lnSpc>
-                <a:spcPct val="100000"/>
-              </a:lnSpc>
-              <a:spcBef>
-                <a:spcPts val="0"/>
-              </a:spcBef>
-              <a:spcAft>
-                <a:spcPts val="0"/>
-              </a:spcAft>
-              <a:buClrTx/>
-              <a:buSzTx/>
-              <a:buFontTx/>
-              <a:buNone/>
-              <a:tabLst/>
-              <a:defRPr/>
+            <a:pPr marL="0" indent="0">
+              <a:buNone/>
             </a:pPr>
             <a:r>
               <a:rPr lang="en-US" dirty="0" smtClean="0"/>
-              <a:t>Example: freeing up memory</a:t>
-            </a:r>
-            <a:endParaRPr lang="en-US" dirty="0"/>
-          </a:p>
-          <a:p>
-            <a:pPr marL="0" marR="0" lvl="0" indent="0" defTabSz="914400" eaLnBrk="1" fontAlgn="auto" latinLnBrk="0" hangingPunct="1">
-              <a:lnSpc>
-                <a:spcPct val="100000"/>
-              </a:lnSpc>
-              <a:spcBef>
-                <a:spcPts val="0"/>
-              </a:spcBef>
-              <a:spcAft>
-                <a:spcPts val="0"/>
-              </a:spcAft>
-              <a:buClrTx/>
-              <a:buSzTx/>
-              <a:buFontTx/>
-              <a:buNone/>
-              <a:tabLst/>
-              <a:defRPr/>
-            </a:pPr>
-            <a:endParaRPr lang="en-US" dirty="0"/>
-          </a:p>
-          <a:p>
-            <a:pPr marL="0" marR="0" lvl="0" indent="0" defTabSz="914400" eaLnBrk="1" fontAlgn="auto" latinLnBrk="0" hangingPunct="1">
-              <a:lnSpc>
-                <a:spcPct val="100000"/>
-              </a:lnSpc>
-              <a:spcBef>
-                <a:spcPts val="0"/>
-              </a:spcBef>
-              <a:spcAft>
-                <a:spcPts val="0"/>
-              </a:spcAft>
-              <a:buClrTx/>
-              <a:buSzTx/>
-              <a:buFontTx/>
-              <a:buNone/>
-              <a:tabLst/>
-              <a:defRPr/>
-            </a:pPr>
-            <a:r>
-              <a:rPr lang="en-US" dirty="0" smtClean="0"/>
-              <a:t>Disclaimer </a:t>
-            </a:r>
-            <a:r>
-              <a:rPr lang="mr-IN" dirty="0" smtClean="0"/>
-              <a:t>–</a:t>
-            </a:r>
-            <a:r>
-              <a:rPr lang="en-US" dirty="0" smtClean="0"/>
-              <a:t> return statements in a </a:t>
-            </a:r>
-            <a:r>
-              <a:rPr lang="en-US" i="1" dirty="0" smtClean="0"/>
-              <a:t>finally</a:t>
-            </a:r>
-            <a:r>
-              <a:rPr lang="en-US" dirty="0" smtClean="0"/>
-              <a:t> block will always override previous return statements in the try-except block </a:t>
+              <a:t>A note about variable scope: variables declared inside a function cannot be accessed outside the function. </a:t>
             </a:r>
             <a:endParaRPr lang="en-US" dirty="0"/>
           </a:p>
@@ -11067,7 +11151,7 @@
       </p:sp>
       <p:pic>
         <p:nvPicPr>
-          <p:cNvPr id="4" name="Picture 3"/>
+          <p:cNvPr id="6" name="Picture 5"/>
           <p:cNvPicPr>
             <a:picLocks noChangeAspect="1"/>
           </p:cNvPicPr>
@@ -11087,8 +11171,8 @@
         </p:blipFill>
         <p:spPr>
           <a:xfrm>
-            <a:off x="6614160" y="2564384"/>
-            <a:ext cx="4559300" cy="2997200"/>
+            <a:off x="7179733" y="342900"/>
+            <a:ext cx="4673600" cy="6172200"/>
           </a:xfrm>
           <a:prstGeom prst="rect">
             <a:avLst/>
@@ -11098,7 +11182,7 @@
     </p:spTree>
     <p:extLst>
       <p:ext uri="{BB962C8B-B14F-4D97-AF65-F5344CB8AC3E}">
-        <p14:creationId xmlns:p14="http://schemas.microsoft.com/office/powerpoint/2010/main" val="1314873171"/>
+        <p14:creationId xmlns:p14="http://schemas.microsoft.com/office/powerpoint/2010/main" val="1964281485"/>
       </p:ext>
     </p:extLst>
   </p:cSld>
@@ -11142,6 +11226,464 @@
           <a:p>
             <a:r>
               <a:rPr lang="en-US" dirty="0" smtClean="0"/>
+              <a:t>Catching Exceptions: try-except</a:t>
+            </a:r>
+            <a:endParaRPr lang="en-US" dirty="0"/>
+          </a:p>
+        </p:txBody>
+      </p:sp>
+      <p:sp>
+        <p:nvSpPr>
+          <p:cNvPr id="3" name="Content Placeholder 2"/>
+          <p:cNvSpPr>
+            <a:spLocks noGrp="1"/>
+          </p:cNvSpPr>
+          <p:nvPr>
+            <p:ph idx="1"/>
+          </p:nvPr>
+        </p:nvSpPr>
+        <p:spPr>
+          <a:xfrm>
+            <a:off x="680321" y="2336873"/>
+            <a:ext cx="5549791" cy="3599316"/>
+          </a:xfrm>
+        </p:spPr>
+        <p:txBody>
+          <a:bodyPr/>
+          <a:lstStyle/>
+          <a:p>
+            <a:pPr marL="0" marR="0" lvl="0" indent="0" defTabSz="914400" eaLnBrk="1" fontAlgn="auto" latinLnBrk="0" hangingPunct="1">
+              <a:lnSpc>
+                <a:spcPct val="100000"/>
+              </a:lnSpc>
+              <a:spcBef>
+                <a:spcPts val="0"/>
+              </a:spcBef>
+              <a:spcAft>
+                <a:spcPts val="0"/>
+              </a:spcAft>
+              <a:buClrTx/>
+              <a:buSzTx/>
+              <a:buFontTx/>
+              <a:buNone/>
+              <a:tabLst/>
+              <a:defRPr/>
+            </a:pPr>
+            <a:r>
+              <a:rPr lang="en-US" dirty="0" smtClean="0"/>
+              <a:t>Catch exceptions before their raised and handle them. </a:t>
+            </a:r>
+          </a:p>
+          <a:p>
+            <a:pPr marL="0" marR="0" lvl="0" indent="0" defTabSz="914400" eaLnBrk="1" fontAlgn="auto" latinLnBrk="0" hangingPunct="1">
+              <a:lnSpc>
+                <a:spcPct val="100000"/>
+              </a:lnSpc>
+              <a:spcBef>
+                <a:spcPts val="0"/>
+              </a:spcBef>
+              <a:spcAft>
+                <a:spcPts val="0"/>
+              </a:spcAft>
+              <a:buClrTx/>
+              <a:buSzTx/>
+              <a:buFontTx/>
+              <a:buNone/>
+              <a:tabLst/>
+              <a:defRPr/>
+            </a:pPr>
+            <a:endParaRPr lang="en-US" dirty="0" smtClean="0"/>
+          </a:p>
+          <a:p>
+            <a:pPr marL="0" marR="0" lvl="0" indent="0" defTabSz="914400" eaLnBrk="1" fontAlgn="auto" latinLnBrk="0" hangingPunct="1">
+              <a:lnSpc>
+                <a:spcPct val="100000"/>
+              </a:lnSpc>
+              <a:spcBef>
+                <a:spcPts val="0"/>
+              </a:spcBef>
+              <a:spcAft>
+                <a:spcPts val="0"/>
+              </a:spcAft>
+              <a:buClrTx/>
+              <a:buSzTx/>
+              <a:buFontTx/>
+              <a:buNone/>
+              <a:tabLst/>
+              <a:defRPr/>
+            </a:pPr>
+            <a:endParaRPr lang="en-US" dirty="0"/>
+          </a:p>
+          <a:p>
+            <a:pPr marL="0" marR="0" lvl="0" indent="0" defTabSz="914400" eaLnBrk="1" fontAlgn="auto" latinLnBrk="0" hangingPunct="1">
+              <a:lnSpc>
+                <a:spcPct val="100000"/>
+              </a:lnSpc>
+              <a:spcBef>
+                <a:spcPts val="0"/>
+              </a:spcBef>
+              <a:spcAft>
+                <a:spcPts val="0"/>
+              </a:spcAft>
+              <a:buClrTx/>
+              <a:buSzTx/>
+              <a:buFontTx/>
+              <a:buNone/>
+              <a:tabLst/>
+              <a:defRPr/>
+            </a:pPr>
+            <a:endParaRPr lang="en-US" dirty="0"/>
+          </a:p>
+          <a:p>
+            <a:pPr marL="0" marR="0" lvl="0" indent="0" defTabSz="914400" eaLnBrk="1" fontAlgn="auto" latinLnBrk="0" hangingPunct="1">
+              <a:lnSpc>
+                <a:spcPct val="100000"/>
+              </a:lnSpc>
+              <a:spcBef>
+                <a:spcPts val="0"/>
+              </a:spcBef>
+              <a:spcAft>
+                <a:spcPts val="0"/>
+              </a:spcAft>
+              <a:buClrTx/>
+              <a:buSzTx/>
+              <a:buFontTx/>
+              <a:buNone/>
+              <a:tabLst/>
+              <a:defRPr/>
+            </a:pPr>
+            <a:r>
+              <a:rPr lang="en-US" dirty="0" smtClean="0"/>
+              <a:t>Different types of exceptions can be treated differently by specifying them in the except statement. </a:t>
+            </a:r>
+            <a:endParaRPr lang="en-US" dirty="0"/>
+          </a:p>
+        </p:txBody>
+      </p:sp>
+      <p:pic>
+        <p:nvPicPr>
+          <p:cNvPr id="5" name="Picture 4"/>
+          <p:cNvPicPr>
+            <a:picLocks noChangeAspect="1"/>
+          </p:cNvPicPr>
+          <p:nvPr/>
+        </p:nvPicPr>
+        <p:blipFill>
+          <a:blip r:embed="rId2">
+            <a:extLst>
+              <a:ext uri="{28A0092B-C50C-407E-A947-70E740481C1C}">
+                <a14:useLocalDpi xmlns:a14="http://schemas.microsoft.com/office/drawing/2010/main" val="0"/>
+              </a:ext>
+            </a:extLst>
+          </a:blip>
+          <a:stretch>
+            <a:fillRect/>
+          </a:stretch>
+        </p:blipFill>
+        <p:spPr>
+          <a:xfrm>
+            <a:off x="6764787" y="2184400"/>
+            <a:ext cx="4597400" cy="4305300"/>
+          </a:xfrm>
+          <a:prstGeom prst="rect">
+            <a:avLst/>
+          </a:prstGeom>
+        </p:spPr>
+      </p:pic>
+    </p:spTree>
+    <p:extLst>
+      <p:ext uri="{BB962C8B-B14F-4D97-AF65-F5344CB8AC3E}">
+        <p14:creationId xmlns:p14="http://schemas.microsoft.com/office/powerpoint/2010/main" val="1936197508"/>
+      </p:ext>
+    </p:extLst>
+  </p:cSld>
+  <p:clrMapOvr>
+    <a:masterClrMapping/>
+  </p:clrMapOvr>
+</p:sld>
+</file>
+
+<file path=ppt/slides/slide25.xml><?xml version="1.0" encoding="utf-8"?>
+<p:sld xmlns:a="http://schemas.openxmlformats.org/drawingml/2006/main" xmlns:r="http://schemas.openxmlformats.org/officeDocument/2006/relationships" xmlns:p="http://schemas.openxmlformats.org/presentationml/2006/main">
+  <p:cSld>
+    <p:spTree>
+      <p:nvGrpSpPr>
+        <p:cNvPr id="1" name=""/>
+        <p:cNvGrpSpPr/>
+        <p:nvPr/>
+      </p:nvGrpSpPr>
+      <p:grpSpPr>
+        <a:xfrm>
+          <a:off x="0" y="0"/>
+          <a:ext cx="0" cy="0"/>
+          <a:chOff x="0" y="0"/>
+          <a:chExt cx="0" cy="0"/>
+        </a:xfrm>
+      </p:grpSpPr>
+      <p:sp>
+        <p:nvSpPr>
+          <p:cNvPr id="2" name="Title 1"/>
+          <p:cNvSpPr>
+            <a:spLocks noGrp="1"/>
+          </p:cNvSpPr>
+          <p:nvPr>
+            <p:ph type="title"/>
+          </p:nvPr>
+        </p:nvSpPr>
+        <p:spPr/>
+        <p:txBody>
+          <a:bodyPr/>
+          <a:lstStyle/>
+          <a:p>
+            <a:r>
+              <a:rPr lang="en-US" dirty="0" smtClean="0"/>
+              <a:t>Catching Exceptions: try-except-finally </a:t>
+            </a:r>
+            <a:endParaRPr lang="en-US" dirty="0"/>
+          </a:p>
+        </p:txBody>
+      </p:sp>
+      <p:sp>
+        <p:nvSpPr>
+          <p:cNvPr id="3" name="Content Placeholder 2"/>
+          <p:cNvSpPr>
+            <a:spLocks noGrp="1"/>
+          </p:cNvSpPr>
+          <p:nvPr>
+            <p:ph idx="1"/>
+          </p:nvPr>
+        </p:nvSpPr>
+        <p:spPr>
+          <a:xfrm>
+            <a:off x="680321" y="2336872"/>
+            <a:ext cx="5354719" cy="4356535"/>
+          </a:xfrm>
+        </p:spPr>
+        <p:txBody>
+          <a:bodyPr/>
+          <a:lstStyle/>
+          <a:p>
+            <a:pPr marL="0" marR="0" lvl="0" indent="0" defTabSz="914400" eaLnBrk="1" fontAlgn="auto" latinLnBrk="0" hangingPunct="1">
+              <a:lnSpc>
+                <a:spcPct val="100000"/>
+              </a:lnSpc>
+              <a:spcBef>
+                <a:spcPts val="0"/>
+              </a:spcBef>
+              <a:spcAft>
+                <a:spcPts val="0"/>
+              </a:spcAft>
+              <a:buClrTx/>
+              <a:buSzTx/>
+              <a:buFontTx/>
+              <a:buNone/>
+              <a:tabLst/>
+              <a:defRPr/>
+            </a:pPr>
+            <a:r>
+              <a:rPr lang="en-US" dirty="0" smtClean="0"/>
+              <a:t>Use a </a:t>
+            </a:r>
+            <a:r>
+              <a:rPr lang="en-US" i="1" dirty="0" smtClean="0"/>
+              <a:t>finally</a:t>
+            </a:r>
+            <a:r>
+              <a:rPr lang="en-US" dirty="0" smtClean="0"/>
+              <a:t> block when you need something to </a:t>
+            </a:r>
+            <a:r>
+              <a:rPr lang="en-US" i="1" dirty="0" smtClean="0"/>
+              <a:t>always run</a:t>
+            </a:r>
+            <a:r>
+              <a:rPr lang="en-US" dirty="0" smtClean="0"/>
+              <a:t> regardless of the errors that may or may not be raised. </a:t>
+            </a:r>
+          </a:p>
+          <a:p>
+            <a:pPr marL="0" marR="0" lvl="0" indent="0" defTabSz="914400" eaLnBrk="1" fontAlgn="auto" latinLnBrk="0" hangingPunct="1">
+              <a:lnSpc>
+                <a:spcPct val="100000"/>
+              </a:lnSpc>
+              <a:spcBef>
+                <a:spcPts val="0"/>
+              </a:spcBef>
+              <a:spcAft>
+                <a:spcPts val="0"/>
+              </a:spcAft>
+              <a:buClrTx/>
+              <a:buSzTx/>
+              <a:buFontTx/>
+              <a:buNone/>
+              <a:tabLst/>
+              <a:defRPr/>
+            </a:pPr>
+            <a:endParaRPr lang="en-US" dirty="0" smtClean="0"/>
+          </a:p>
+          <a:p>
+            <a:pPr marL="0" marR="0" lvl="0" indent="0" defTabSz="914400" eaLnBrk="1" fontAlgn="auto" latinLnBrk="0" hangingPunct="1">
+              <a:lnSpc>
+                <a:spcPct val="100000"/>
+              </a:lnSpc>
+              <a:spcBef>
+                <a:spcPts val="0"/>
+              </a:spcBef>
+              <a:spcAft>
+                <a:spcPts val="0"/>
+              </a:spcAft>
+              <a:buClrTx/>
+              <a:buSzTx/>
+              <a:buFontTx/>
+              <a:buNone/>
+              <a:tabLst/>
+              <a:defRPr/>
+            </a:pPr>
+            <a:r>
+              <a:rPr lang="en-US" dirty="0" smtClean="0"/>
+              <a:t>Example: freeing up memory</a:t>
+            </a:r>
+            <a:endParaRPr lang="en-US" dirty="0"/>
+          </a:p>
+          <a:p>
+            <a:pPr marL="0" marR="0" lvl="0" indent="0" defTabSz="914400" eaLnBrk="1" fontAlgn="auto" latinLnBrk="0" hangingPunct="1">
+              <a:lnSpc>
+                <a:spcPct val="100000"/>
+              </a:lnSpc>
+              <a:spcBef>
+                <a:spcPts val="0"/>
+              </a:spcBef>
+              <a:spcAft>
+                <a:spcPts val="0"/>
+              </a:spcAft>
+              <a:buClrTx/>
+              <a:buSzTx/>
+              <a:buFontTx/>
+              <a:buNone/>
+              <a:tabLst/>
+              <a:defRPr/>
+            </a:pPr>
+            <a:endParaRPr lang="en-US" dirty="0"/>
+          </a:p>
+          <a:p>
+            <a:pPr marL="0" marR="0" lvl="0" indent="0" defTabSz="914400" eaLnBrk="1" fontAlgn="auto" latinLnBrk="0" hangingPunct="1">
+              <a:lnSpc>
+                <a:spcPct val="100000"/>
+              </a:lnSpc>
+              <a:spcBef>
+                <a:spcPts val="0"/>
+              </a:spcBef>
+              <a:spcAft>
+                <a:spcPts val="0"/>
+              </a:spcAft>
+              <a:buClrTx/>
+              <a:buSzTx/>
+              <a:buFontTx/>
+              <a:buNone/>
+              <a:tabLst/>
+              <a:defRPr/>
+            </a:pPr>
+            <a:r>
+              <a:rPr lang="en-US" dirty="0" smtClean="0"/>
+              <a:t>Disclaimer </a:t>
+            </a:r>
+            <a:r>
+              <a:rPr lang="mr-IN" dirty="0" smtClean="0"/>
+              <a:t>–</a:t>
+            </a:r>
+            <a:r>
+              <a:rPr lang="en-US" dirty="0" smtClean="0"/>
+              <a:t> return statements in a </a:t>
+            </a:r>
+            <a:r>
+              <a:rPr lang="en-US" i="1" dirty="0" smtClean="0"/>
+              <a:t>finally</a:t>
+            </a:r>
+            <a:r>
+              <a:rPr lang="en-US" dirty="0" smtClean="0"/>
+              <a:t> block will always override previous return statements in the try-except block </a:t>
+            </a:r>
+            <a:endParaRPr lang="en-US" dirty="0"/>
+          </a:p>
+        </p:txBody>
+      </p:sp>
+      <p:pic>
+        <p:nvPicPr>
+          <p:cNvPr id="4" name="Picture 3"/>
+          <p:cNvPicPr>
+            <a:picLocks noChangeAspect="1"/>
+          </p:cNvPicPr>
+          <p:nvPr/>
+        </p:nvPicPr>
+        <p:blipFill>
+          <a:blip r:embed="rId2">
+            <a:extLst>
+              <a:ext uri="{28A0092B-C50C-407E-A947-70E740481C1C}">
+                <a14:useLocalDpi xmlns:a14="http://schemas.microsoft.com/office/drawing/2010/main" val="0"/>
+              </a:ext>
+            </a:extLst>
+          </a:blip>
+          <a:stretch>
+            <a:fillRect/>
+          </a:stretch>
+        </p:blipFill>
+        <p:spPr>
+          <a:xfrm>
+            <a:off x="6614160" y="2564384"/>
+            <a:ext cx="4559300" cy="2997200"/>
+          </a:xfrm>
+          <a:prstGeom prst="rect">
+            <a:avLst/>
+          </a:prstGeom>
+        </p:spPr>
+      </p:pic>
+    </p:spTree>
+    <p:extLst>
+      <p:ext uri="{BB962C8B-B14F-4D97-AF65-F5344CB8AC3E}">
+        <p14:creationId xmlns:p14="http://schemas.microsoft.com/office/powerpoint/2010/main" val="1314873171"/>
+      </p:ext>
+    </p:extLst>
+  </p:cSld>
+  <p:clrMapOvr>
+    <a:masterClrMapping/>
+  </p:clrMapOvr>
+</p:sld>
+</file>
+
+<file path=ppt/slides/slide26.xml><?xml version="1.0" encoding="utf-8"?>
+<p:sld xmlns:a="http://schemas.openxmlformats.org/drawingml/2006/main" xmlns:r="http://schemas.openxmlformats.org/officeDocument/2006/relationships" xmlns:p="http://schemas.openxmlformats.org/presentationml/2006/main">
+  <p:cSld>
+    <p:spTree>
+      <p:nvGrpSpPr>
+        <p:cNvPr id="1" name=""/>
+        <p:cNvGrpSpPr/>
+        <p:nvPr/>
+      </p:nvGrpSpPr>
+      <p:grpSpPr>
+        <a:xfrm>
+          <a:off x="0" y="0"/>
+          <a:ext cx="0" cy="0"/>
+          <a:chOff x="0" y="0"/>
+          <a:chExt cx="0" cy="0"/>
+        </a:xfrm>
+      </p:grpSpPr>
+      <p:sp>
+        <p:nvSpPr>
+          <p:cNvPr id="2" name="Title 1"/>
+          <p:cNvSpPr>
+            <a:spLocks noGrp="1"/>
+          </p:cNvSpPr>
+          <p:nvPr>
+            <p:ph type="title"/>
+          </p:nvPr>
+        </p:nvSpPr>
+        <p:spPr/>
+        <p:txBody>
+          <a:bodyPr/>
+          <a:lstStyle/>
+          <a:p>
+            <a:r>
+              <a:rPr lang="en-US" dirty="0" smtClean="0"/>
               <a:t>Useful Built-In Functions </a:t>
             </a:r>
             <a:endParaRPr lang="en-US" dirty="0"/>
@@ -11193,11 +11735,6 @@
               <a:rPr lang="en-US" dirty="0" smtClean="0"/>
               <a:t> </a:t>
             </a:r>
-          </a:p>
-          <a:p>
-            <a:pPr marL="0" indent="0">
-              <a:buNone/>
-            </a:pPr>
             <a:endParaRPr lang="en-US" dirty="0"/>
           </a:p>
           <a:p>
@@ -11224,11 +11761,6 @@
               <a:rPr lang="en-US" dirty="0" smtClean="0"/>
               <a:t> </a:t>
             </a:r>
-          </a:p>
-          <a:p>
-            <a:pPr marL="0" indent="0">
-              <a:buNone/>
-            </a:pPr>
             <a:endParaRPr lang="en-US" i="1" dirty="0"/>
           </a:p>
           <a:p>
@@ -11247,11 +11779,6 @@
               <a:rPr lang="en-US" dirty="0" smtClean="0"/>
               <a:t>: Combine lists/arrays into a 2-D list/array component-wise </a:t>
             </a:r>
-          </a:p>
-          <a:p>
-            <a:pPr marL="0" indent="0">
-              <a:buNone/>
-            </a:pPr>
             <a:endParaRPr lang="en-US" i="1" dirty="0"/>
           </a:p>
           <a:p>
@@ -11270,11 +11797,6 @@
               <a:rPr lang="en-US" dirty="0" smtClean="0"/>
               <a:t>: Iterate a function over an array(s) of values </a:t>
             </a:r>
-          </a:p>
-          <a:p>
-            <a:pPr marL="0" indent="0">
-              <a:buNone/>
-            </a:pPr>
             <a:endParaRPr lang="en-US" i="1" dirty="0"/>
           </a:p>
           <a:p>
@@ -11293,7 +11815,79 @@
               <a:rPr lang="en-US" dirty="0" smtClean="0"/>
               <a:t>: Remove elements from a list/array which don’t meet specific criteria </a:t>
             </a:r>
+          </a:p>
+          <a:p>
+            <a:pPr marL="0" indent="0">
+              <a:buNone/>
+            </a:pPr>
+            <a:r>
+              <a:rPr lang="en-US" i="1" dirty="0"/>
+              <a:t>m</a:t>
+            </a:r>
+            <a:r>
+              <a:rPr lang="en-US" i="1" dirty="0" smtClean="0"/>
+              <a:t>in</a:t>
+            </a:r>
+            <a:r>
+              <a:rPr lang="en-US" dirty="0" smtClean="0"/>
+              <a:t>: Calculate minimum value of some set of numbers </a:t>
+            </a:r>
+            <a:endParaRPr lang="en-US" i="1" dirty="0"/>
+          </a:p>
+          <a:p>
+            <a:pPr marL="0" indent="0">
+              <a:buNone/>
+            </a:pPr>
+            <a:r>
+              <a:rPr lang="en-US" i="1" dirty="0"/>
+              <a:t>m</a:t>
+            </a:r>
+            <a:r>
+              <a:rPr lang="en-US" i="1" dirty="0" smtClean="0"/>
+              <a:t>ax</a:t>
+            </a:r>
+            <a:r>
+              <a:rPr lang="en-US" dirty="0" smtClean="0"/>
+              <a:t>: Calculate maximum value of some set of numbers </a:t>
+            </a:r>
             <a:endParaRPr lang="en-US" i="1" dirty="0" smtClean="0"/>
+          </a:p>
+          <a:p>
+            <a:pPr marL="0" indent="0">
+              <a:buNone/>
+            </a:pPr>
+            <a:r>
+              <a:rPr lang="en-US" dirty="0" smtClean="0"/>
+              <a:t>In python 3, </a:t>
+            </a:r>
+            <a:r>
+              <a:rPr lang="en-US" i="1" dirty="0" smtClean="0"/>
+              <a:t>zip</a:t>
+            </a:r>
+            <a:r>
+              <a:rPr lang="en-US" dirty="0" smtClean="0"/>
+              <a:t>, </a:t>
+            </a:r>
+            <a:r>
+              <a:rPr lang="en-US" i="1" dirty="0" smtClean="0"/>
+              <a:t>map</a:t>
+            </a:r>
+            <a:r>
+              <a:rPr lang="en-US" dirty="0" smtClean="0"/>
+              <a:t>, and </a:t>
+            </a:r>
+            <a:r>
+              <a:rPr lang="en-US" i="1" dirty="0" smtClean="0"/>
+              <a:t>filter </a:t>
+            </a:r>
+            <a:r>
+              <a:rPr lang="en-US" dirty="0" smtClean="0"/>
+              <a:t>return </a:t>
+            </a:r>
+            <a:r>
+              <a:rPr lang="en-US" dirty="0" smtClean="0"/>
+              <a:t>a special type of object which needs to be cast to a list, tuple, etc. </a:t>
+            </a:r>
           </a:p>
           <a:p>
             <a:pPr marL="0" indent="0">

</xml_diff>

<commit_message>
slides: updates to session 2, python 3.10 match-case syntax
</commit_message>
<xml_diff>
--- a/slides/review.pptx
+++ b/slides/review.pptx
@@ -5,7 +5,7 @@
     <p:sldMasterId id="2147484294" r:id="rId1"/>
   </p:sldMasterIdLst>
   <p:notesMasterIdLst>
-    <p:notesMasterId r:id="rId30"/>
+    <p:notesMasterId r:id="rId33"/>
   </p:notesMasterIdLst>
   <p:sldIdLst>
     <p:sldId id="256" r:id="rId2"/>
@@ -26,16 +26,19 @@
     <p:sldId id="276" r:id="rId17"/>
     <p:sldId id="264" r:id="rId18"/>
     <p:sldId id="265" r:id="rId19"/>
-    <p:sldId id="283" r:id="rId20"/>
-    <p:sldId id="267" r:id="rId21"/>
-    <p:sldId id="266" r:id="rId22"/>
-    <p:sldId id="268" r:id="rId23"/>
-    <p:sldId id="269" r:id="rId24"/>
-    <p:sldId id="270" r:id="rId25"/>
-    <p:sldId id="282" r:id="rId26"/>
-    <p:sldId id="277" r:id="rId27"/>
-    <p:sldId id="278" r:id="rId28"/>
-    <p:sldId id="279" r:id="rId29"/>
+    <p:sldId id="267" r:id="rId20"/>
+    <p:sldId id="266" r:id="rId21"/>
+    <p:sldId id="268" r:id="rId22"/>
+    <p:sldId id="269" r:id="rId23"/>
+    <p:sldId id="270" r:id="rId24"/>
+    <p:sldId id="282" r:id="rId25"/>
+    <p:sldId id="277" r:id="rId26"/>
+    <p:sldId id="278" r:id="rId27"/>
+    <p:sldId id="284" r:id="rId28"/>
+    <p:sldId id="285" r:id="rId29"/>
+    <p:sldId id="286" r:id="rId30"/>
+    <p:sldId id="287" r:id="rId31"/>
+    <p:sldId id="279" r:id="rId32"/>
   </p:sldIdLst>
   <p:sldSz cx="12192000" cy="6858000"/>
   <p:notesSz cx="6858000" cy="9144000"/>
@@ -224,7 +227,7 @@
           <a:p>
             <a:fld id="{3E00069D-D4B1-DA43-B156-1FB9179E1249}" type="datetimeFigureOut">
               <a:rPr lang="en-US" smtClean="0"/>
-              <a:t>5/12/21</a:t>
+              <a:t>5/2/22</a:t>
             </a:fld>
             <a:endParaRPr lang="en-US"/>
           </a:p>
@@ -851,7 +854,7 @@
           <a:p>
             <a:fld id="{A10D7ED9-0168-6F49-A704-0689E647D42E}" type="slidenum">
               <a:rPr lang="en-US" smtClean="0"/>
-              <a:t>23</a:t>
+              <a:t>22</a:t>
             </a:fld>
             <a:endParaRPr lang="en-US"/>
           </a:p>
@@ -959,7 +962,7 @@
           <a:p>
             <a:fld id="{A10D7ED9-0168-6F49-A704-0689E647D42E}" type="slidenum">
               <a:rPr lang="en-US" smtClean="0"/>
-              <a:t>26</a:t>
+              <a:t>25</a:t>
             </a:fld>
             <a:endParaRPr lang="en-US"/>
           </a:p>
@@ -1024,6 +1027,93 @@
           <a:p>
             <a:r>
               <a:rPr lang="en-US" dirty="0"/>
+              <a:t>Another difference folks might notice between python’s match-case and C/C++’s switch-case is that the C/C++ switch-case requires a break statement at the end of each case, otherwise it will start to run the subsequent case statement. The break statement is implicitly included in python.</a:t>
+            </a:r>
+          </a:p>
+        </p:txBody>
+      </p:sp>
+      <p:sp>
+        <p:nvSpPr>
+          <p:cNvPr id="4" name="Slide Number Placeholder 3"/>
+          <p:cNvSpPr>
+            <a:spLocks noGrp="1"/>
+          </p:cNvSpPr>
+          <p:nvPr>
+            <p:ph type="sldNum" sz="quarter" idx="5"/>
+          </p:nvPr>
+        </p:nvSpPr>
+        <p:spPr/>
+        <p:txBody>
+          <a:bodyPr/>
+          <a:lstStyle/>
+          <a:p>
+            <a:fld id="{A10D7ED9-0168-6F49-A704-0689E647D42E}" type="slidenum">
+              <a:rPr lang="en-US" smtClean="0"/>
+              <a:t>27</a:t>
+            </a:fld>
+            <a:endParaRPr lang="en-US"/>
+          </a:p>
+        </p:txBody>
+      </p:sp>
+    </p:spTree>
+    <p:extLst>
+      <p:ext uri="{BB962C8B-B14F-4D97-AF65-F5344CB8AC3E}">
+        <p14:creationId xmlns:p14="http://schemas.microsoft.com/office/powerpoint/2010/main" val="1753589505"/>
+      </p:ext>
+    </p:extLst>
+  </p:cSld>
+  <p:clrMapOvr>
+    <a:masterClrMapping/>
+  </p:clrMapOvr>
+</p:notes>
+</file>
+
+<file path=ppt/notesSlides/notesSlide7.xml><?xml version="1.0" encoding="utf-8"?>
+<p:notes xmlns:a="http://schemas.openxmlformats.org/drawingml/2006/main" xmlns:r="http://schemas.openxmlformats.org/officeDocument/2006/relationships" xmlns:p="http://schemas.openxmlformats.org/presentationml/2006/main">
+  <p:cSld>
+    <p:spTree>
+      <p:nvGrpSpPr>
+        <p:cNvPr id="1" name=""/>
+        <p:cNvGrpSpPr/>
+        <p:nvPr/>
+      </p:nvGrpSpPr>
+      <p:grpSpPr>
+        <a:xfrm>
+          <a:off x="0" y="0"/>
+          <a:ext cx="0" cy="0"/>
+          <a:chOff x="0" y="0"/>
+          <a:chExt cx="0" cy="0"/>
+        </a:xfrm>
+      </p:grpSpPr>
+      <p:sp>
+        <p:nvSpPr>
+          <p:cNvPr id="2" name="Slide Image Placeholder 1"/>
+          <p:cNvSpPr>
+            <a:spLocks noGrp="1" noRot="1" noChangeAspect="1"/>
+          </p:cNvSpPr>
+          <p:nvPr>
+            <p:ph type="sldImg"/>
+          </p:nvPr>
+        </p:nvSpPr>
+        <p:spPr/>
+      </p:sp>
+      <p:sp>
+        <p:nvSpPr>
+          <p:cNvPr id="3" name="Notes Placeholder 2"/>
+          <p:cNvSpPr>
+            <a:spLocks noGrp="1"/>
+          </p:cNvSpPr>
+          <p:nvPr>
+            <p:ph type="body" idx="1"/>
+          </p:nvPr>
+        </p:nvSpPr>
+        <p:spPr/>
+        <p:txBody>
+          <a:bodyPr/>
+          <a:lstStyle/>
+          <a:p>
+            <a:r>
+              <a:rPr lang="en-US" dirty="0"/>
               <a:t>Worth</a:t>
             </a:r>
             <a:r>
@@ -1055,7 +1145,7 @@
           <a:p>
             <a:fld id="{A10D7ED9-0168-6F49-A704-0689E647D42E}" type="slidenum">
               <a:rPr lang="en-US" smtClean="0"/>
-              <a:t>28</a:t>
+              <a:t>31</a:t>
             </a:fld>
             <a:endParaRPr lang="en-US"/>
           </a:p>
@@ -1350,7 +1440,7 @@
           <a:p>
             <a:fld id="{51673806-0BCD-1F42-BAA8-2011034B3C6A}" type="datetimeFigureOut">
               <a:rPr lang="en-US" smtClean="0"/>
-              <a:t>5/12/21</a:t>
+              <a:t>5/2/22</a:t>
             </a:fld>
             <a:endParaRPr lang="en-US" dirty="0"/>
           </a:p>
@@ -1763,7 +1853,7 @@
           <a:p>
             <a:fld id="{51673806-0BCD-1F42-BAA8-2011034B3C6A}" type="datetimeFigureOut">
               <a:rPr lang="en-US" smtClean="0"/>
-              <a:t>5/12/21</a:t>
+              <a:t>5/2/22</a:t>
             </a:fld>
             <a:endParaRPr lang="en-US" dirty="0"/>
           </a:p>
@@ -2094,7 +2184,7 @@
           <a:p>
             <a:fld id="{51673806-0BCD-1F42-BAA8-2011034B3C6A}" type="datetimeFigureOut">
               <a:rPr lang="en-US" smtClean="0"/>
-              <a:t>5/12/21</a:t>
+              <a:t>5/2/22</a:t>
             </a:fld>
             <a:endParaRPr lang="en-US" dirty="0"/>
           </a:p>
@@ -2494,7 +2584,7 @@
           <a:p>
             <a:fld id="{51673806-0BCD-1F42-BAA8-2011034B3C6A}" type="datetimeFigureOut">
               <a:rPr lang="en-US" smtClean="0"/>
-              <a:t>5/12/21</a:t>
+              <a:t>5/2/22</a:t>
             </a:fld>
             <a:endParaRPr lang="en-US" dirty="0"/>
           </a:p>
@@ -3057,7 +3147,7 @@
           <a:p>
             <a:fld id="{51673806-0BCD-1F42-BAA8-2011034B3C6A}" type="datetimeFigureOut">
               <a:rPr lang="en-US" smtClean="0"/>
-              <a:t>5/12/21</a:t>
+              <a:t>5/2/22</a:t>
             </a:fld>
             <a:endParaRPr lang="en-US" dirty="0"/>
           </a:p>
@@ -3733,7 +3823,7 @@
           <a:p>
             <a:fld id="{51673806-0BCD-1F42-BAA8-2011034B3C6A}" type="datetimeFigureOut">
               <a:rPr lang="en-US" smtClean="0"/>
-              <a:t>5/12/21</a:t>
+              <a:t>5/2/22</a:t>
             </a:fld>
             <a:endParaRPr lang="en-US" dirty="0"/>
           </a:p>
@@ -4638,7 +4728,7 @@
           <a:p>
             <a:fld id="{51673806-0BCD-1F42-BAA8-2011034B3C6A}" type="datetimeFigureOut">
               <a:rPr lang="en-US" smtClean="0"/>
-              <a:t>5/12/21</a:t>
+              <a:t>5/2/22</a:t>
             </a:fld>
             <a:endParaRPr lang="en-US" dirty="0"/>
           </a:p>
@@ -4946,7 +5036,7 @@
           <a:p>
             <a:fld id="{51673806-0BCD-1F42-BAA8-2011034B3C6A}" type="datetimeFigureOut">
               <a:rPr lang="en-US" smtClean="0"/>
-              <a:t>5/12/21</a:t>
+              <a:t>5/2/22</a:t>
             </a:fld>
             <a:endParaRPr lang="en-US" dirty="0"/>
           </a:p>
@@ -5205,7 +5295,7 @@
           <a:p>
             <a:fld id="{51673806-0BCD-1F42-BAA8-2011034B3C6A}" type="datetimeFigureOut">
               <a:rPr lang="en-US" smtClean="0"/>
-              <a:t>5/12/21</a:t>
+              <a:t>5/2/22</a:t>
             </a:fld>
             <a:endParaRPr lang="en-US" dirty="0"/>
           </a:p>
@@ -5528,7 +5618,7 @@
           <a:p>
             <a:fld id="{51673806-0BCD-1F42-BAA8-2011034B3C6A}" type="datetimeFigureOut">
               <a:rPr lang="en-US" smtClean="0"/>
-              <a:t>5/12/21</a:t>
+              <a:t>5/2/22</a:t>
             </a:fld>
             <a:endParaRPr lang="en-US" dirty="0"/>
           </a:p>
@@ -5912,7 +6002,7 @@
           <a:p>
             <a:fld id="{51673806-0BCD-1F42-BAA8-2011034B3C6A}" type="datetimeFigureOut">
               <a:rPr lang="en-US" smtClean="0"/>
-              <a:t>5/12/21</a:t>
+              <a:t>5/2/22</a:t>
             </a:fld>
             <a:endParaRPr lang="en-US" dirty="0"/>
           </a:p>
@@ -6288,7 +6378,7 @@
           <a:p>
             <a:fld id="{51673806-0BCD-1F42-BAA8-2011034B3C6A}" type="datetimeFigureOut">
               <a:rPr lang="en-US" smtClean="0"/>
-              <a:t>5/12/21</a:t>
+              <a:t>5/2/22</a:t>
             </a:fld>
             <a:endParaRPr lang="en-US" dirty="0"/>
           </a:p>
@@ -6794,7 +6884,7 @@
           <a:p>
             <a:fld id="{51673806-0BCD-1F42-BAA8-2011034B3C6A}" type="datetimeFigureOut">
               <a:rPr lang="en-US" smtClean="0"/>
-              <a:t>5/12/21</a:t>
+              <a:t>5/2/22</a:t>
             </a:fld>
             <a:endParaRPr lang="en-US" dirty="0"/>
           </a:p>
@@ -7051,7 +7141,7 @@
           <a:p>
             <a:fld id="{51673806-0BCD-1F42-BAA8-2011034B3C6A}" type="datetimeFigureOut">
               <a:rPr lang="en-US" smtClean="0"/>
-              <a:t>5/12/21</a:t>
+              <a:t>5/2/22</a:t>
             </a:fld>
             <a:endParaRPr lang="en-US" dirty="0"/>
           </a:p>
@@ -7209,7 +7299,7 @@
           <a:p>
             <a:fld id="{51673806-0BCD-1F42-BAA8-2011034B3C6A}" type="datetimeFigureOut">
               <a:rPr lang="en-US" smtClean="0"/>
-              <a:t>5/12/21</a:t>
+              <a:t>5/2/22</a:t>
             </a:fld>
             <a:endParaRPr lang="en-US" dirty="0"/>
           </a:p>
@@ -7599,7 +7689,7 @@
           <a:p>
             <a:fld id="{51673806-0BCD-1F42-BAA8-2011034B3C6A}" type="datetimeFigureOut">
               <a:rPr lang="en-US" smtClean="0"/>
-              <a:t>5/12/21</a:t>
+              <a:t>5/2/22</a:t>
             </a:fld>
             <a:endParaRPr lang="en-US" dirty="0"/>
           </a:p>
@@ -8007,7 +8097,7 @@
           <a:p>
             <a:fld id="{51673806-0BCD-1F42-BAA8-2011034B3C6A}" type="datetimeFigureOut">
               <a:rPr lang="en-US" smtClean="0"/>
-              <a:t>5/12/21</a:t>
+              <a:t>5/2/22</a:t>
             </a:fld>
             <a:endParaRPr lang="en-US" dirty="0"/>
           </a:p>
@@ -8252,7 +8342,7 @@
             <a:fld id="{51673806-0BCD-1F42-BAA8-2011034B3C6A}" type="datetimeFigureOut">
               <a:rPr lang="en-US" smtClean="0"/>
               <a:pPr/>
-              <a:t>5/12/21</a:t>
+              <a:t>5/2/22</a:t>
             </a:fld>
             <a:endParaRPr lang="en-US" dirty="0"/>
           </a:p>
@@ -10535,13 +10625,7 @@
       </p:grpSpPr>
       <p:sp>
         <p:nvSpPr>
-          <p:cNvPr id="2" name="Title 1">
-            <a:extLst>
-              <a:ext uri="{FF2B5EF4-FFF2-40B4-BE49-F238E27FC236}">
-                <a16:creationId xmlns:a16="http://schemas.microsoft.com/office/drawing/2014/main" id="{CDCA18A1-AFA1-644C-B2C7-ECD421140330}"/>
-              </a:ext>
-            </a:extLst>
-          </p:cNvPr>
+          <p:cNvPr id="2" name="Title 1"/>
           <p:cNvSpPr>
             <a:spLocks noGrp="1"/>
           </p:cNvSpPr>
@@ -10556,20 +10640,14 @@
           <a:p>
             <a:r>
               <a:rPr lang="en-US" dirty="0"/>
-              <a:t>Conditions and Pattern-Matching</a:t>
-            </a:r>
-          </a:p>
-        </p:txBody>
-      </p:sp>
-      <p:sp>
-        <p:nvSpPr>
-          <p:cNvPr id="3" name="Content Placeholder 2">
-            <a:extLst>
-              <a:ext uri="{FF2B5EF4-FFF2-40B4-BE49-F238E27FC236}">
-                <a16:creationId xmlns:a16="http://schemas.microsoft.com/office/drawing/2014/main" id="{127FD841-4A5A-FA41-B7B1-EB2054DBBB84}"/>
-              </a:ext>
-            </a:extLst>
-          </p:cNvPr>
+              <a:t>Loops </a:t>
+            </a:r>
+          </a:p>
+        </p:txBody>
+      </p:sp>
+      <p:sp>
+        <p:nvSpPr>
+          <p:cNvPr id="3" name="Content Placeholder 2"/>
           <p:cNvSpPr>
             <a:spLocks noGrp="1"/>
           </p:cNvSpPr>
@@ -10577,7 +10655,12 @@
             <p:ph idx="1"/>
           </p:nvPr>
         </p:nvSpPr>
-        <p:spPr/>
+        <p:spPr>
+          <a:xfrm>
+            <a:off x="680322" y="2336873"/>
+            <a:ext cx="8367426" cy="3599316"/>
+          </a:xfrm>
+        </p:spPr>
         <p:txBody>
           <a:bodyPr/>
           <a:lstStyle/>
@@ -10587,37 +10670,14 @@
             </a:pPr>
             <a:r>
               <a:rPr lang="en-US" dirty="0"/>
-              <a:t>Python 3.10 will introduce the </a:t>
-            </a:r>
-            <a:r>
-              <a:rPr lang="en-US" i="1" dirty="0"/>
-              <a:t>match-case</a:t>
-            </a:r>
-            <a:r>
-              <a:rPr lang="en-US" dirty="0"/>
-              <a:t> construction </a:t>
+              <a:t>Two types</a:t>
             </a:r>
           </a:p>
           <a:p>
             <a:pPr lvl="1"/>
             <a:r>
               <a:rPr lang="en-US" dirty="0"/>
-              <a:t>Similar to the </a:t>
-            </a:r>
-            <a:r>
-              <a:rPr lang="en-US" i="1" dirty="0"/>
-              <a:t>switch-case</a:t>
-            </a:r>
-            <a:r>
-              <a:rPr lang="en-US" dirty="0"/>
-              <a:t> construction in C/C++ </a:t>
-            </a:r>
-          </a:p>
-          <a:p>
-            <a:pPr lvl="1"/>
-            <a:r>
-              <a:rPr lang="en-US" dirty="0"/>
-              <a:t>Additionally allows some form of type-checking and length-matching for short arrays </a:t>
+              <a:t>For- and while-loops </a:t>
             </a:r>
           </a:p>
           <a:p>
@@ -10630,6 +10690,15 @@
             <a:pPr marL="0" indent="0">
               <a:buNone/>
             </a:pPr>
+            <a:r>
+              <a:rPr lang="en-US" dirty="0"/>
+              <a:t>Both execute the same block of code some number of times </a:t>
+            </a:r>
+          </a:p>
+          <a:p>
+            <a:pPr marL="0" indent="0">
+              <a:buNone/>
+            </a:pPr>
             <a:endParaRPr lang="en-US" dirty="0"/>
           </a:p>
           <a:p>
@@ -10638,7 +10707,7 @@
             </a:pPr>
             <a:r>
               <a:rPr lang="en-US" dirty="0"/>
-              <a:t>Python 3.10 recently finished alpha and is now in beta, with the true release expected in October 2021. </a:t>
+              <a:t>Both types of loops can be forced to terminate with the command “break”, and to start the next iteration with “continue” </a:t>
             </a:r>
           </a:p>
         </p:txBody>
@@ -10646,7 +10715,7 @@
     </p:spTree>
     <p:extLst>
       <p:ext uri="{BB962C8B-B14F-4D97-AF65-F5344CB8AC3E}">
-        <p14:creationId xmlns:p14="http://schemas.microsoft.com/office/powerpoint/2010/main" val="1107735413"/>
+        <p14:creationId xmlns:p14="http://schemas.microsoft.com/office/powerpoint/2010/main" val="501260096"/>
       </p:ext>
     </p:extLst>
   </p:cSld>
@@ -10907,7 +10976,7 @@
           <a:p>
             <a:r>
               <a:rPr lang="en-US" dirty="0"/>
-              <a:t>Loops </a:t>
+              <a:t>For-loops </a:t>
             </a:r>
           </a:p>
         </p:txBody>
@@ -10925,64 +10994,223 @@
         <p:spPr>
           <a:xfrm>
             <a:off x="680322" y="2336873"/>
-            <a:ext cx="8367426" cy="3599316"/>
+            <a:ext cx="6273932" cy="3599316"/>
           </a:xfrm>
         </p:spPr>
         <p:txBody>
           <a:bodyPr/>
           <a:lstStyle/>
           <a:p>
-            <a:pPr marL="0" indent="0">
-              <a:buNone/>
-            </a:pPr>
-            <a:r>
-              <a:rPr lang="en-US" dirty="0"/>
-              <a:t>Two types</a:t>
-            </a:r>
-          </a:p>
-          <a:p>
-            <a:pPr lvl="1"/>
-            <a:r>
-              <a:rPr lang="en-US" dirty="0"/>
-              <a:t>For- and while-loops </a:t>
-            </a:r>
-          </a:p>
-          <a:p>
-            <a:pPr marL="0" indent="0">
-              <a:buNone/>
+            <a:pPr marL="0" marR="0" lvl="0" indent="0" defTabSz="914400" eaLnBrk="1" fontAlgn="auto" latinLnBrk="0" hangingPunct="1">
+              <a:lnSpc>
+                <a:spcPct val="100000"/>
+              </a:lnSpc>
+              <a:spcBef>
+                <a:spcPts val="0"/>
+              </a:spcBef>
+              <a:spcAft>
+                <a:spcPts val="0"/>
+              </a:spcAft>
+              <a:buClrTx/>
+              <a:buSzTx/>
+              <a:buFontTx/>
+              <a:buNone/>
+              <a:tabLst/>
+              <a:defRPr/>
+            </a:pPr>
+            <a:r>
+              <a:rPr lang="en-US" dirty="0"/>
+              <a:t>Should be used when you know </a:t>
+            </a:r>
+            <a:r>
+              <a:rPr lang="en-US" i="1" dirty="0"/>
+              <a:t>exactly </a:t>
+            </a:r>
+            <a:r>
+              <a:rPr lang="en-US" dirty="0"/>
+              <a:t>how many times the block should repeat </a:t>
+            </a:r>
+          </a:p>
+          <a:p>
+            <a:pPr marL="0" marR="0" lvl="0" indent="0" defTabSz="914400" eaLnBrk="1" fontAlgn="auto" latinLnBrk="0" hangingPunct="1">
+              <a:lnSpc>
+                <a:spcPct val="100000"/>
+              </a:lnSpc>
+              <a:spcBef>
+                <a:spcPts val="0"/>
+              </a:spcBef>
+              <a:spcAft>
+                <a:spcPts val="0"/>
+              </a:spcAft>
+              <a:buClrTx/>
+              <a:buSzTx/>
+              <a:buFontTx/>
+              <a:buNone/>
+              <a:tabLst/>
+              <a:defRPr/>
             </a:pPr>
             <a:endParaRPr lang="en-US" dirty="0"/>
           </a:p>
           <a:p>
-            <a:pPr marL="0" indent="0">
-              <a:buNone/>
-            </a:pPr>
-            <a:r>
-              <a:rPr lang="en-US" dirty="0"/>
-              <a:t>Both execute the same block of code some number of times </a:t>
-            </a:r>
-          </a:p>
-          <a:p>
-            <a:pPr marL="0" indent="0">
-              <a:buNone/>
+            <a:pPr marL="0" marR="0" lvl="0" indent="0" defTabSz="914400" eaLnBrk="1" fontAlgn="auto" latinLnBrk="0" hangingPunct="1">
+              <a:lnSpc>
+                <a:spcPct val="100000"/>
+              </a:lnSpc>
+              <a:spcBef>
+                <a:spcPts val="0"/>
+              </a:spcBef>
+              <a:spcAft>
+                <a:spcPts val="0"/>
+              </a:spcAft>
+              <a:buClrTx/>
+              <a:buSzTx/>
+              <a:buFontTx/>
+              <a:buNone/>
+              <a:tabLst/>
+              <a:defRPr/>
             </a:pPr>
             <a:endParaRPr lang="en-US" dirty="0"/>
           </a:p>
           <a:p>
-            <a:pPr marL="0" indent="0">
-              <a:buNone/>
-            </a:pPr>
-            <a:r>
-              <a:rPr lang="en-US" dirty="0"/>
-              <a:t>Both types of loops can be forced to terminate with the command “break”, and to start the next iteration with “continue” </a:t>
-            </a:r>
-          </a:p>
-        </p:txBody>
-      </p:sp>
+            <a:pPr marL="0" marR="0" lvl="0" indent="0" defTabSz="914400" eaLnBrk="1" fontAlgn="auto" latinLnBrk="0" hangingPunct="1">
+              <a:lnSpc>
+                <a:spcPct val="100000"/>
+              </a:lnSpc>
+              <a:spcBef>
+                <a:spcPts val="0"/>
+              </a:spcBef>
+              <a:spcAft>
+                <a:spcPts val="0"/>
+              </a:spcAft>
+              <a:buClrTx/>
+              <a:buSzTx/>
+              <a:buFontTx/>
+              <a:buNone/>
+              <a:tabLst/>
+              <a:defRPr/>
+            </a:pPr>
+            <a:r>
+              <a:rPr lang="en-US" dirty="0"/>
+              <a:t>Come in two flavors: </a:t>
+            </a:r>
+          </a:p>
+          <a:p>
+            <a:pPr lvl="1">
+              <a:lnSpc>
+                <a:spcPct val="100000"/>
+              </a:lnSpc>
+              <a:spcBef>
+                <a:spcPts val="0"/>
+              </a:spcBef>
+            </a:pPr>
+            <a:r>
+              <a:rPr lang="en-US" i="1" dirty="0"/>
+              <a:t>Explicit</a:t>
+            </a:r>
+            <a:r>
+              <a:rPr lang="en-US" dirty="0"/>
+              <a:t> for loop: “</a:t>
+            </a:r>
+            <a:r>
+              <a:rPr lang="en-US" i="1" dirty="0"/>
+              <a:t>for </a:t>
+            </a:r>
+            <a:r>
+              <a:rPr lang="en-US" i="1" dirty="0" err="1"/>
+              <a:t>i</a:t>
+            </a:r>
+            <a:r>
+              <a:rPr lang="en-US" i="1" dirty="0"/>
+              <a:t> in &lt;some </a:t>
+            </a:r>
+            <a:r>
+              <a:rPr lang="en-US" i="1" dirty="0" err="1"/>
+              <a:t>iterable</a:t>
+            </a:r>
+            <a:r>
+              <a:rPr lang="en-US" i="1" dirty="0"/>
+              <a:t>&gt;”</a:t>
+            </a:r>
+            <a:r>
+              <a:rPr lang="en-US" dirty="0"/>
+              <a:t> followed by an indented block (example: top) </a:t>
+            </a:r>
+          </a:p>
+          <a:p>
+            <a:pPr lvl="1">
+              <a:lnSpc>
+                <a:spcPct val="100000"/>
+              </a:lnSpc>
+              <a:spcBef>
+                <a:spcPts val="0"/>
+              </a:spcBef>
+            </a:pPr>
+            <a:r>
+              <a:rPr lang="en-US" i="1" dirty="0"/>
+              <a:t>Implicit</a:t>
+            </a:r>
+            <a:r>
+              <a:rPr lang="en-US" dirty="0"/>
+              <a:t> for loop: occurs within a list comprehension (example: bottom) </a:t>
+            </a:r>
+            <a:endParaRPr lang="en-US" i="1" dirty="0"/>
+          </a:p>
+          <a:p>
+            <a:pPr marL="0" marR="0" lvl="0" indent="0" defTabSz="914400" eaLnBrk="1" fontAlgn="auto" latinLnBrk="0" hangingPunct="1">
+              <a:lnSpc>
+                <a:spcPct val="100000"/>
+              </a:lnSpc>
+              <a:spcBef>
+                <a:spcPts val="0"/>
+              </a:spcBef>
+              <a:spcAft>
+                <a:spcPts val="0"/>
+              </a:spcAft>
+              <a:buClrTx/>
+              <a:buSzTx/>
+              <a:buFontTx/>
+              <a:buNone/>
+              <a:tabLst/>
+              <a:defRPr/>
+            </a:pPr>
+            <a:endParaRPr lang="en-US" dirty="0"/>
+          </a:p>
+        </p:txBody>
+      </p:sp>
+      <p:pic>
+        <p:nvPicPr>
+          <p:cNvPr id="7" name="Picture 6"/>
+          <p:cNvPicPr>
+            <a:picLocks noChangeAspect="1"/>
+          </p:cNvPicPr>
+          <p:nvPr/>
+        </p:nvPicPr>
+        <p:blipFill>
+          <a:blip r:embed="rId2">
+            <a:extLst>
+              <a:ext uri="{28A0092B-C50C-407E-A947-70E740481C1C}">
+                <a14:useLocalDpi xmlns:a14="http://schemas.microsoft.com/office/drawing/2010/main" val="0"/>
+              </a:ext>
+            </a:extLst>
+          </a:blip>
+          <a:stretch>
+            <a:fillRect/>
+          </a:stretch>
+        </p:blipFill>
+        <p:spPr>
+          <a:xfrm>
+            <a:off x="7177505" y="2336873"/>
+            <a:ext cx="4396874" cy="3833860"/>
+          </a:xfrm>
+          <a:prstGeom prst="rect">
+            <a:avLst/>
+          </a:prstGeom>
+        </p:spPr>
+      </p:pic>
     </p:spTree>
     <p:extLst>
       <p:ext uri="{BB962C8B-B14F-4D97-AF65-F5344CB8AC3E}">
-        <p14:creationId xmlns:p14="http://schemas.microsoft.com/office/powerpoint/2010/main" val="501260096"/>
+        <p14:creationId xmlns:p14="http://schemas.microsoft.com/office/powerpoint/2010/main" val="720703814"/>
       </p:ext>
     </p:extLst>
   </p:cSld>
@@ -11026,7 +11254,7 @@
           <a:p>
             <a:r>
               <a:rPr lang="en-US" dirty="0"/>
-              <a:t>For-loops </a:t>
+              <a:t>While-loops </a:t>
             </a:r>
           </a:p>
         </p:txBody>
@@ -11043,8 +11271,8 @@
         </p:nvSpPr>
         <p:spPr>
           <a:xfrm>
-            <a:off x="680322" y="2336873"/>
-            <a:ext cx="6273932" cy="3599316"/>
+            <a:off x="680321" y="2336873"/>
+            <a:ext cx="7092079" cy="3599316"/>
           </a:xfrm>
         </p:spPr>
         <p:txBody>
@@ -11070,78 +11298,66 @@
             </a:pPr>
             <a:r>
               <a:rPr lang="en-US" dirty="0"/>
-              <a:t>Should be used when you know </a:t>
+              <a:t>Should be used when you </a:t>
             </a:r>
             <a:r>
               <a:rPr lang="en-US" i="1" dirty="0"/>
-              <a:t>exactly </a:t>
-            </a:r>
-            <a:r>
-              <a:rPr lang="en-US" dirty="0"/>
-              <a:t>how many times the block should repeat </a:t>
-            </a:r>
-          </a:p>
-          <a:p>
-            <a:pPr marL="0" marR="0" lvl="0" indent="0" defTabSz="914400" eaLnBrk="1" fontAlgn="auto" latinLnBrk="0" hangingPunct="1">
+              <a:t>don’t</a:t>
+            </a:r>
+            <a:r>
+              <a:rPr lang="en-US" dirty="0"/>
+              <a:t> know how many times the block should repeat </a:t>
+            </a:r>
+          </a:p>
+          <a:p>
+            <a:pPr marL="0" indent="0">
               <a:lnSpc>
                 <a:spcPct val="100000"/>
               </a:lnSpc>
               <a:spcBef>
                 <a:spcPts val="0"/>
               </a:spcBef>
-              <a:spcAft>
-                <a:spcPts val="0"/>
-              </a:spcAft>
-              <a:buClrTx/>
-              <a:buSzTx/>
-              <a:buFontTx/>
-              <a:buNone/>
-              <a:tabLst/>
-              <a:defRPr/>
-            </a:pPr>
-            <a:endParaRPr lang="en-US" dirty="0"/>
-          </a:p>
-          <a:p>
-            <a:pPr marL="0" marR="0" lvl="0" indent="0" defTabSz="914400" eaLnBrk="1" fontAlgn="auto" latinLnBrk="0" hangingPunct="1">
+              <a:buNone/>
+            </a:pPr>
+            <a:endParaRPr lang="en-US" i="1" dirty="0"/>
+          </a:p>
+          <a:p>
+            <a:pPr marL="0" indent="0">
               <a:lnSpc>
                 <a:spcPct val="100000"/>
               </a:lnSpc>
               <a:spcBef>
                 <a:spcPts val="0"/>
               </a:spcBef>
-              <a:spcAft>
-                <a:spcPts val="0"/>
-              </a:spcAft>
-              <a:buClrTx/>
-              <a:buSzTx/>
-              <a:buFontTx/>
-              <a:buNone/>
-              <a:tabLst/>
-              <a:defRPr/>
-            </a:pPr>
-            <a:endParaRPr lang="en-US" dirty="0"/>
-          </a:p>
-          <a:p>
-            <a:pPr marL="0" marR="0" lvl="0" indent="0" defTabSz="914400" eaLnBrk="1" fontAlgn="auto" latinLnBrk="0" hangingPunct="1">
+              <a:buNone/>
+            </a:pPr>
+            <a:endParaRPr lang="en-US" i="1" dirty="0"/>
+          </a:p>
+          <a:p>
+            <a:pPr marL="0" indent="0">
               <a:lnSpc>
                 <a:spcPct val="100000"/>
               </a:lnSpc>
               <a:spcBef>
                 <a:spcPts val="0"/>
               </a:spcBef>
-              <a:spcAft>
-                <a:spcPts val="0"/>
-              </a:spcAft>
-              <a:buClrTx/>
-              <a:buSzTx/>
-              <a:buFontTx/>
-              <a:buNone/>
-              <a:tabLst/>
-              <a:defRPr/>
-            </a:pPr>
-            <a:r>
-              <a:rPr lang="en-US" dirty="0"/>
-              <a:t>Come in two flavors: </a:t>
+              <a:buNone/>
+            </a:pPr>
+            <a:r>
+              <a:rPr lang="en-US" i="1" dirty="0"/>
+              <a:t>while True: &lt;</a:t>
+            </a:r>
+            <a:r>
+              <a:rPr lang="mr-IN" i="1" dirty="0"/>
+              <a:t>…</a:t>
+            </a:r>
+            <a:r>
+              <a:rPr lang="en-US" i="1" dirty="0"/>
+              <a:t>&gt; break </a:t>
+            </a:r>
+            <a:r>
+              <a:rPr lang="en-US" dirty="0"/>
+              <a:t>is not uncommon, but considered bad practice by some</a:t>
             </a:r>
           </a:p>
           <a:p>
@@ -11154,82 +11370,55 @@
               </a:spcBef>
             </a:pPr>
             <a:r>
+              <a:rPr lang="en-US" dirty="0"/>
+              <a:t>Advantage: The loop will </a:t>
+            </a:r>
+            <a:r>
               <a:rPr lang="en-US" i="1" dirty="0"/>
-              <a:t>Explicit</a:t>
-            </a:r>
-            <a:r>
-              <a:rPr lang="en-US" dirty="0"/>
-              <a:t> for loop: “</a:t>
+              <a:t>always</a:t>
+            </a:r>
+            <a:r>
+              <a:rPr lang="en-US" dirty="0"/>
+              <a:t> execute at least once. Other languages achieve this with what is called a </a:t>
             </a:r>
             <a:r>
               <a:rPr lang="en-US" i="1" dirty="0"/>
-              <a:t>for </a:t>
-            </a:r>
-            <a:r>
-              <a:rPr lang="en-US" i="1" dirty="0" err="1"/>
-              <a:t>i</a:t>
-            </a:r>
-            <a:r>
-              <a:rPr lang="en-US" i="1" dirty="0"/>
-              <a:t> in &lt;some </a:t>
-            </a:r>
-            <a:r>
-              <a:rPr lang="en-US" i="1" dirty="0" err="1"/>
-              <a:t>iterable</a:t>
-            </a:r>
-            <a:r>
-              <a:rPr lang="en-US" i="1" dirty="0"/>
-              <a:t>&gt;”</a:t>
-            </a:r>
-            <a:r>
-              <a:rPr lang="en-US" dirty="0"/>
-              <a:t> followed by an indented block (example: top) </a:t>
-            </a:r>
-          </a:p>
-          <a:p>
-            <a:pPr lvl="1">
+              <a:t>do-while</a:t>
+            </a:r>
+            <a:r>
+              <a:rPr lang="en-US" dirty="0"/>
+              <a:t> loop. </a:t>
+            </a:r>
+          </a:p>
+          <a:p>
+            <a:pPr marL="0" indent="0">
               <a:lnSpc>
                 <a:spcPct val="100000"/>
               </a:lnSpc>
               <a:spcBef>
                 <a:spcPts val="0"/>
               </a:spcBef>
-            </a:pPr>
-            <a:r>
-              <a:rPr lang="en-US" i="1" dirty="0"/>
-              <a:t>Implicit</a:t>
-            </a:r>
-            <a:r>
-              <a:rPr lang="en-US" dirty="0"/>
-              <a:t> for loop: occurs within a list comprehension (example: bottom) </a:t>
-            </a:r>
+              <a:buNone/>
+            </a:pPr>
             <a:endParaRPr lang="en-US" i="1" dirty="0"/>
           </a:p>
           <a:p>
-            <a:pPr marL="0" marR="0" lvl="0" indent="0" defTabSz="914400" eaLnBrk="1" fontAlgn="auto" latinLnBrk="0" hangingPunct="1">
+            <a:pPr marL="0" indent="0">
               <a:lnSpc>
                 <a:spcPct val="100000"/>
               </a:lnSpc>
               <a:spcBef>
                 <a:spcPts val="0"/>
               </a:spcBef>
-              <a:spcAft>
-                <a:spcPts val="0"/>
-              </a:spcAft>
-              <a:buClrTx/>
-              <a:buSzTx/>
-              <a:buFontTx/>
-              <a:buNone/>
-              <a:tabLst/>
-              <a:defRPr/>
-            </a:pPr>
-            <a:endParaRPr lang="en-US" dirty="0"/>
+              <a:buNone/>
+            </a:pPr>
+            <a:endParaRPr lang="en-US" i="1" dirty="0"/>
           </a:p>
         </p:txBody>
       </p:sp>
       <p:pic>
         <p:nvPicPr>
-          <p:cNvPr id="7" name="Picture 6"/>
+          <p:cNvPr id="4" name="Picture 3"/>
           <p:cNvPicPr>
             <a:picLocks noChangeAspect="1"/>
           </p:cNvPicPr>
@@ -11249,8 +11438,8 @@
         </p:blipFill>
         <p:spPr>
           <a:xfrm>
-            <a:off x="7177505" y="2336873"/>
-            <a:ext cx="4396874" cy="3833860"/>
+            <a:off x="8121984" y="0"/>
+            <a:ext cx="3021806" cy="6858000"/>
           </a:xfrm>
           <a:prstGeom prst="rect">
             <a:avLst/>
@@ -11260,7 +11449,7 @@
     </p:spTree>
     <p:extLst>
       <p:ext uri="{BB962C8B-B14F-4D97-AF65-F5344CB8AC3E}">
-        <p14:creationId xmlns:p14="http://schemas.microsoft.com/office/powerpoint/2010/main" val="720703814"/>
+        <p14:creationId xmlns:p14="http://schemas.microsoft.com/office/powerpoint/2010/main" val="409787854"/>
       </p:ext>
     </p:extLst>
   </p:cSld>
@@ -11304,7 +11493,7 @@
           <a:p>
             <a:r>
               <a:rPr lang="en-US" dirty="0"/>
-              <a:t>While-loops </a:t>
+              <a:t>Functions </a:t>
             </a:r>
           </a:p>
         </p:txBody>
@@ -11321,148 +11510,85 @@
         </p:nvSpPr>
         <p:spPr>
           <a:xfrm>
-            <a:off x="680321" y="2336873"/>
-            <a:ext cx="7092079" cy="3599316"/>
-          </a:xfrm>
-        </p:spPr>
-        <p:txBody>
-          <a:bodyPr/>
+            <a:off x="680321" y="2229257"/>
+            <a:ext cx="6490500" cy="4015132"/>
+          </a:xfrm>
+        </p:spPr>
+        <p:txBody>
+          <a:bodyPr>
+            <a:normAutofit/>
+          </a:bodyPr>
           <a:lstStyle/>
           <a:p>
-            <a:pPr marL="0" marR="0" lvl="0" indent="0" defTabSz="914400" eaLnBrk="1" fontAlgn="auto" latinLnBrk="0" hangingPunct="1">
-              <a:lnSpc>
-                <a:spcPct val="100000"/>
-              </a:lnSpc>
-              <a:spcBef>
-                <a:spcPts val="0"/>
-              </a:spcBef>
-              <a:spcAft>
-                <a:spcPts val="0"/>
-              </a:spcAft>
-              <a:buClrTx/>
-              <a:buSzTx/>
-              <a:buFontTx/>
-              <a:buNone/>
-              <a:tabLst/>
-              <a:defRPr/>
-            </a:pPr>
-            <a:r>
-              <a:rPr lang="en-US" dirty="0"/>
-              <a:t>Should be used when you </a:t>
+            <a:pPr marL="0" indent="0">
+              <a:buNone/>
+            </a:pPr>
+            <a:r>
+              <a:rPr lang="en-US" dirty="0"/>
+              <a:t>Often referred to as “methods” in other languages </a:t>
+            </a:r>
+          </a:p>
+          <a:p>
+            <a:pPr marL="0" indent="0">
+              <a:buNone/>
+            </a:pPr>
+            <a:endParaRPr lang="en-US" dirty="0"/>
+          </a:p>
+          <a:p>
+            <a:pPr marL="0" indent="0">
+              <a:buNone/>
+            </a:pPr>
+            <a:r>
+              <a:rPr lang="en-US" dirty="0"/>
+              <a:t>Created with the </a:t>
+            </a:r>
+            <a:r>
+              <a:rPr lang="en-US" i="1" dirty="0" err="1"/>
+              <a:t>def</a:t>
+            </a:r>
+            <a:r>
+              <a:rPr lang="en-US" dirty="0"/>
+              <a:t> keyword followed by an indented block. Between the </a:t>
+            </a:r>
+            <a:r>
+              <a:rPr lang="en-US" i="1" dirty="0" err="1"/>
+              <a:t>def</a:t>
+            </a:r>
+            <a:r>
+              <a:rPr lang="en-US" dirty="0"/>
+              <a:t> statement and the body of the function is where you should put a </a:t>
+            </a:r>
+            <a:r>
+              <a:rPr lang="en-US" i="1" dirty="0" err="1"/>
+              <a:t>docstring</a:t>
+            </a:r>
+            <a:r>
+              <a:rPr lang="en-US" dirty="0"/>
+              <a:t>. </a:t>
+            </a:r>
+          </a:p>
+          <a:p>
+            <a:pPr marL="0" indent="0">
+              <a:buNone/>
+            </a:pPr>
+            <a:endParaRPr lang="en-US" dirty="0"/>
+          </a:p>
+          <a:p>
+            <a:pPr marL="0" indent="0">
+              <a:buNone/>
+            </a:pPr>
+            <a:r>
+              <a:rPr lang="en-US" dirty="0"/>
+              <a:t>Astronomers (and scientists in general) are </a:t>
             </a:r>
             <a:r>
               <a:rPr lang="en-US" i="1" dirty="0"/>
-              <a:t>don’t</a:t>
-            </a:r>
-            <a:r>
-              <a:rPr lang="en-US" dirty="0"/>
-              <a:t> know how many times the block should repeat </a:t>
-            </a:r>
-          </a:p>
-          <a:p>
-            <a:pPr marL="0" indent="0">
-              <a:lnSpc>
-                <a:spcPct val="100000"/>
-              </a:lnSpc>
-              <a:spcBef>
-                <a:spcPts val="0"/>
-              </a:spcBef>
-              <a:buNone/>
-            </a:pPr>
-            <a:endParaRPr lang="en-US" i="1" dirty="0"/>
-          </a:p>
-          <a:p>
-            <a:pPr marL="0" indent="0">
-              <a:lnSpc>
-                <a:spcPct val="100000"/>
-              </a:lnSpc>
-              <a:spcBef>
-                <a:spcPts val="0"/>
-              </a:spcBef>
-              <a:buNone/>
-            </a:pPr>
-            <a:endParaRPr lang="en-US" i="1" dirty="0"/>
-          </a:p>
-          <a:p>
-            <a:pPr marL="0" indent="0">
-              <a:lnSpc>
-                <a:spcPct val="100000"/>
-              </a:lnSpc>
-              <a:spcBef>
-                <a:spcPts val="0"/>
-              </a:spcBef>
-              <a:buNone/>
-            </a:pPr>
-            <a:r>
-              <a:rPr lang="en-US" i="1" dirty="0"/>
-              <a:t>while True: &lt;</a:t>
-            </a:r>
-            <a:r>
-              <a:rPr lang="mr-IN" i="1" dirty="0"/>
-              <a:t>…</a:t>
-            </a:r>
-            <a:r>
-              <a:rPr lang="en-US" i="1" dirty="0"/>
-              <a:t>&gt; break </a:t>
-            </a:r>
-            <a:r>
-              <a:rPr lang="en-US" dirty="0"/>
-              <a:t>is not uncommon, but generally considered bad practice </a:t>
-            </a:r>
-          </a:p>
-          <a:p>
-            <a:pPr lvl="1">
-              <a:lnSpc>
-                <a:spcPct val="100000"/>
-              </a:lnSpc>
-              <a:spcBef>
-                <a:spcPts val="0"/>
-              </a:spcBef>
-            </a:pPr>
-            <a:r>
-              <a:rPr lang="en-US" dirty="0"/>
-              <a:t>Advantage: The loop will </a:t>
-            </a:r>
-            <a:r>
-              <a:rPr lang="en-US" i="1" dirty="0"/>
-              <a:t>always</a:t>
-            </a:r>
-            <a:r>
-              <a:rPr lang="en-US" dirty="0"/>
-              <a:t> execute at least once. Other languages achieve this with what is called a </a:t>
-            </a:r>
-            <a:r>
-              <a:rPr lang="en-US" i="1" dirty="0"/>
-              <a:t>do-while</a:t>
-            </a:r>
-            <a:r>
-              <a:rPr lang="en-US" dirty="0"/>
-              <a:t> loop. </a:t>
-            </a:r>
-          </a:p>
-          <a:p>
-            <a:pPr marL="0" indent="0">
-              <a:lnSpc>
-                <a:spcPct val="100000"/>
-              </a:lnSpc>
-              <a:spcBef>
-                <a:spcPts val="0"/>
-              </a:spcBef>
-              <a:buNone/>
-            </a:pPr>
-            <a:endParaRPr lang="en-US" i="1" dirty="0"/>
-          </a:p>
-          <a:p>
-            <a:pPr marL="0" indent="0">
-              <a:lnSpc>
-                <a:spcPct val="100000"/>
-              </a:lnSpc>
-              <a:spcBef>
-                <a:spcPts val="0"/>
-              </a:spcBef>
-              <a:buNone/>
-            </a:pPr>
-            <a:endParaRPr lang="en-US" i="1" dirty="0"/>
+              <a:t>notorious </a:t>
+            </a:r>
+            <a:r>
+              <a:rPr lang="en-US" dirty="0"/>
+              <a:t>for thin documentation if they document at all. </a:t>
+            </a:r>
           </a:p>
         </p:txBody>
       </p:sp>
@@ -11475,7 +11601,7 @@
           <p:nvPr/>
         </p:nvPicPr>
         <p:blipFill>
-          <a:blip r:embed="rId2">
+          <a:blip r:embed="rId3">
             <a:extLst>
               <a:ext uri="{28A0092B-C50C-407E-A947-70E740481C1C}">
                 <a14:useLocalDpi xmlns:a14="http://schemas.microsoft.com/office/drawing/2010/main" val="0"/>
@@ -11488,8 +11614,8 @@
         </p:blipFill>
         <p:spPr>
           <a:xfrm>
-            <a:off x="8121984" y="0"/>
-            <a:ext cx="3021806" cy="6858000"/>
+            <a:off x="7343274" y="889668"/>
+            <a:ext cx="4267200" cy="5511800"/>
           </a:xfrm>
           <a:prstGeom prst="rect">
             <a:avLst/>
@@ -11499,7 +11625,7 @@
     </p:spTree>
     <p:extLst>
       <p:ext uri="{BB962C8B-B14F-4D97-AF65-F5344CB8AC3E}">
-        <p14:creationId xmlns:p14="http://schemas.microsoft.com/office/powerpoint/2010/main" val="409787854"/>
+        <p14:creationId xmlns:p14="http://schemas.microsoft.com/office/powerpoint/2010/main" val="1274892126"/>
       </p:ext>
     </p:extLst>
   </p:cSld>
@@ -11543,7 +11669,7 @@
           <a:p>
             <a:r>
               <a:rPr lang="en-US" dirty="0"/>
-              <a:t>Functions </a:t>
+              <a:t>Functions: The Implicit Return </a:t>
             </a:r>
           </a:p>
         </p:txBody>
@@ -11561,7 +11687,7 @@
         <p:spPr>
           <a:xfrm>
             <a:off x="680321" y="2229257"/>
-            <a:ext cx="6490500" cy="4015132"/>
+            <a:ext cx="6297996" cy="4063259"/>
           </a:xfrm>
         </p:spPr>
         <p:txBody>
@@ -11575,7 +11701,15 @@
             </a:pPr>
             <a:r>
               <a:rPr lang="en-US" dirty="0"/>
-              <a:t>Often referred to as “methods” in other languages </a:t>
+              <a:t>Unless otherwise specified, a function will return </a:t>
+            </a:r>
+            <a:r>
+              <a:rPr lang="en-US" i="1" dirty="0"/>
+              <a:t>None</a:t>
+            </a:r>
+            <a:r>
+              <a:rPr lang="en-US" dirty="0"/>
+              <a:t>. </a:t>
             </a:r>
           </a:p>
           <a:p>
@@ -11590,31 +11724,15 @@
             </a:pPr>
             <a:r>
               <a:rPr lang="en-US" dirty="0"/>
-              <a:t>Created with the </a:t>
-            </a:r>
-            <a:r>
-              <a:rPr lang="en-US" i="1" dirty="0" err="1"/>
-              <a:t>def</a:t>
-            </a:r>
-            <a:r>
-              <a:rPr lang="en-US" dirty="0"/>
-              <a:t> keyword followed by an indented block. Between the </a:t>
-            </a:r>
-            <a:r>
-              <a:rPr lang="en-US" i="1" dirty="0" err="1"/>
-              <a:t>def</a:t>
-            </a:r>
-            <a:r>
-              <a:rPr lang="en-US" dirty="0"/>
-              <a:t> statement and the body of the function is where you should put a </a:t>
-            </a:r>
-            <a:r>
-              <a:rPr lang="en-US" i="1" dirty="0" err="1"/>
-              <a:t>docstring</a:t>
-            </a:r>
-            <a:r>
-              <a:rPr lang="en-US" dirty="0"/>
-              <a:t>. </a:t>
+              <a:t>In order to obtain an object from a function, you have to override this with a </a:t>
+            </a:r>
+            <a:r>
+              <a:rPr lang="en-US" i="1" dirty="0"/>
+              <a:t>return</a:t>
+            </a:r>
+            <a:r>
+              <a:rPr lang="en-US" dirty="0"/>
+              <a:t> statement </a:t>
             </a:r>
           </a:p>
           <a:p>
@@ -11629,29 +11747,21 @@
             </a:pPr>
             <a:r>
               <a:rPr lang="en-US" dirty="0"/>
-              <a:t>Astronomers (and scientists in general) are </a:t>
-            </a:r>
-            <a:r>
-              <a:rPr lang="en-US" i="1" dirty="0"/>
-              <a:t>notorious </a:t>
-            </a:r>
-            <a:r>
-              <a:rPr lang="en-US" dirty="0"/>
-              <a:t>for thin documentation if they document at all. </a:t>
+              <a:t>A note about variable scope: variables declared inside a function cannot be accessed outside the function. </a:t>
             </a:r>
           </a:p>
         </p:txBody>
       </p:sp>
       <p:pic>
         <p:nvPicPr>
-          <p:cNvPr id="4" name="Picture 3"/>
+          <p:cNvPr id="6" name="Picture 5"/>
           <p:cNvPicPr>
             <a:picLocks noChangeAspect="1"/>
           </p:cNvPicPr>
           <p:nvPr/>
         </p:nvPicPr>
         <p:blipFill>
-          <a:blip r:embed="rId3">
+          <a:blip r:embed="rId2">
             <a:extLst>
               <a:ext uri="{28A0092B-C50C-407E-A947-70E740481C1C}">
                 <a14:useLocalDpi xmlns:a14="http://schemas.microsoft.com/office/drawing/2010/main" val="0"/>
@@ -11664,8 +11774,8 @@
         </p:blipFill>
         <p:spPr>
           <a:xfrm>
-            <a:off x="7343274" y="889668"/>
-            <a:ext cx="4267200" cy="5511800"/>
+            <a:off x="7179733" y="342900"/>
+            <a:ext cx="4673600" cy="6172200"/>
           </a:xfrm>
           <a:prstGeom prst="rect">
             <a:avLst/>
@@ -11675,7 +11785,7 @@
     </p:spTree>
     <p:extLst>
       <p:ext uri="{BB962C8B-B14F-4D97-AF65-F5344CB8AC3E}">
-        <p14:creationId xmlns:p14="http://schemas.microsoft.com/office/powerpoint/2010/main" val="1274892126"/>
+        <p14:creationId xmlns:p14="http://schemas.microsoft.com/office/powerpoint/2010/main" val="1964281485"/>
       </p:ext>
     </p:extLst>
   </p:cSld>
@@ -11719,7 +11829,7 @@
           <a:p>
             <a:r>
               <a:rPr lang="en-US" dirty="0"/>
-              <a:t>Functions: The Implicit Return </a:t>
+              <a:t>Functions: An Alternative for One-Liners </a:t>
             </a:r>
           </a:p>
         </p:txBody>
@@ -11736,45 +11846,113 @@
         </p:nvSpPr>
         <p:spPr>
           <a:xfrm>
-            <a:off x="680321" y="2229257"/>
-            <a:ext cx="6297996" cy="4063259"/>
-          </a:xfrm>
-        </p:spPr>
-        <p:txBody>
-          <a:bodyPr>
-            <a:normAutofit/>
-          </a:bodyPr>
+            <a:off x="680321" y="2336873"/>
+            <a:ext cx="4781695" cy="3599316"/>
+          </a:xfrm>
+        </p:spPr>
+        <p:txBody>
+          <a:bodyPr/>
           <a:lstStyle/>
           <a:p>
-            <a:pPr marL="0" indent="0">
-              <a:buNone/>
-            </a:pPr>
-            <a:r>
-              <a:rPr lang="en-US" dirty="0"/>
-              <a:t>Unless otherwise specified, a function will return </a:t>
+            <a:pPr marL="0" marR="0" lvl="0" indent="0" defTabSz="914400" eaLnBrk="1" fontAlgn="auto" latinLnBrk="0" hangingPunct="1">
+              <a:lnSpc>
+                <a:spcPct val="100000"/>
+              </a:lnSpc>
+              <a:spcBef>
+                <a:spcPts val="0"/>
+              </a:spcBef>
+              <a:spcAft>
+                <a:spcPts val="0"/>
+              </a:spcAft>
+              <a:buClrTx/>
+              <a:buSzTx/>
+              <a:buFontTx/>
+              <a:buNone/>
+              <a:tabLst/>
+              <a:defRPr/>
+            </a:pPr>
+            <a:r>
+              <a:rPr lang="en-US" dirty="0"/>
+              <a:t>One line function: </a:t>
             </a:r>
             <a:r>
               <a:rPr lang="en-US" i="1" dirty="0"/>
-              <a:t>None</a:t>
-            </a:r>
-            <a:r>
-              <a:rPr lang="en-US" dirty="0"/>
-              <a:t>. </a:t>
-            </a:r>
-          </a:p>
-          <a:p>
-            <a:pPr marL="0" indent="0">
-              <a:buNone/>
+              <a:t>lambda</a:t>
+            </a:r>
+            <a:r>
+              <a:rPr lang="en-US" dirty="0"/>
+              <a:t> </a:t>
+            </a:r>
+          </a:p>
+          <a:p>
+            <a:pPr marL="0" marR="0" lvl="0" indent="0" defTabSz="914400" eaLnBrk="1" fontAlgn="auto" latinLnBrk="0" hangingPunct="1">
+              <a:lnSpc>
+                <a:spcPct val="100000"/>
+              </a:lnSpc>
+              <a:spcBef>
+                <a:spcPts val="0"/>
+              </a:spcBef>
+              <a:spcAft>
+                <a:spcPts val="0"/>
+              </a:spcAft>
+              <a:buClrTx/>
+              <a:buSzTx/>
+              <a:buFontTx/>
+              <a:buNone/>
+              <a:tabLst/>
+              <a:defRPr/>
             </a:pPr>
             <a:endParaRPr lang="en-US" dirty="0"/>
           </a:p>
           <a:p>
-            <a:pPr marL="0" indent="0">
-              <a:buNone/>
-            </a:pPr>
-            <a:r>
-              <a:rPr lang="en-US" dirty="0"/>
-              <a:t>In order to obtain an object from a function, you have to override this with a </a:t>
+            <a:pPr marL="0" marR="0" lvl="0" indent="0" defTabSz="914400" eaLnBrk="1" fontAlgn="auto" latinLnBrk="0" hangingPunct="1">
+              <a:lnSpc>
+                <a:spcPct val="100000"/>
+              </a:lnSpc>
+              <a:spcBef>
+                <a:spcPts val="0"/>
+              </a:spcBef>
+              <a:spcAft>
+                <a:spcPts val="0"/>
+              </a:spcAft>
+              <a:buClrTx/>
+              <a:buSzTx/>
+              <a:buFontTx/>
+              <a:buNone/>
+              <a:tabLst/>
+              <a:defRPr/>
+            </a:pPr>
+            <a:r>
+              <a:rPr lang="en-US" dirty="0"/>
+              <a:t>By nature don’t have any error-handling or documentation attached to them, so should only be used </a:t>
+            </a:r>
+            <a:r>
+              <a:rPr lang="en-US"/>
+              <a:t>when this isn’t necessary </a:t>
+            </a:r>
+            <a:r>
+              <a:rPr lang="mr-IN"/>
+              <a:t>–</a:t>
+            </a:r>
+            <a:r>
+              <a:rPr lang="en-US" dirty="0"/>
+              <a:t> a </a:t>
+            </a:r>
+            <a:r>
+              <a:rPr lang="en-US" i="1" dirty="0"/>
+              <a:t>lambda </a:t>
+            </a:r>
+            <a:r>
+              <a:rPr lang="en-US" dirty="0"/>
+              <a:t>worth documenting is better replaced by a </a:t>
+            </a:r>
+            <a:r>
+              <a:rPr lang="en-US" i="1" dirty="0" err="1"/>
+              <a:t>def</a:t>
+            </a:r>
+            <a:r>
+              <a:rPr lang="en-US" dirty="0"/>
+              <a:t> with a one-line </a:t>
             </a:r>
             <a:r>
               <a:rPr lang="en-US" i="1" dirty="0"/>
@@ -11782,29 +11960,23 @@
             </a:r>
             <a:r>
               <a:rPr lang="en-US" dirty="0"/>
-              <a:t> statement </a:t>
-            </a:r>
-          </a:p>
-          <a:p>
-            <a:pPr marL="0" indent="0">
-              <a:buNone/>
-            </a:pPr>
-            <a:endParaRPr lang="en-US" dirty="0"/>
-          </a:p>
-          <a:p>
-            <a:pPr marL="0" indent="0">
-              <a:buNone/>
-            </a:pPr>
-            <a:r>
-              <a:rPr lang="en-US" dirty="0"/>
-              <a:t>A note about variable scope: variables declared inside a function cannot be accessed outside the function. </a:t>
-            </a:r>
+              <a:t> and a </a:t>
+            </a:r>
+            <a:r>
+              <a:rPr lang="en-US" dirty="0" err="1"/>
+              <a:t>docstring</a:t>
+            </a:r>
+            <a:r>
+              <a:rPr lang="en-US" dirty="0"/>
+              <a:t> </a:t>
+            </a:r>
+            <a:endParaRPr lang="en-US" i="1" dirty="0"/>
           </a:p>
         </p:txBody>
       </p:sp>
       <p:pic>
         <p:nvPicPr>
-          <p:cNvPr id="6" name="Picture 5"/>
+          <p:cNvPr id="4" name="Picture 3"/>
           <p:cNvPicPr>
             <a:picLocks noChangeAspect="1"/>
           </p:cNvPicPr>
@@ -11824,8 +11996,8 @@
         </p:blipFill>
         <p:spPr>
           <a:xfrm>
-            <a:off x="7179733" y="342900"/>
-            <a:ext cx="4673600" cy="6172200"/>
+            <a:off x="7077456" y="2745881"/>
+            <a:ext cx="3352800" cy="2781300"/>
           </a:xfrm>
           <a:prstGeom prst="rect">
             <a:avLst/>
@@ -11835,7 +12007,7 @@
     </p:spTree>
     <p:extLst>
       <p:ext uri="{BB962C8B-B14F-4D97-AF65-F5344CB8AC3E}">
-        <p14:creationId xmlns:p14="http://schemas.microsoft.com/office/powerpoint/2010/main" val="1964281485"/>
+        <p14:creationId xmlns:p14="http://schemas.microsoft.com/office/powerpoint/2010/main" val="1541813553"/>
       </p:ext>
     </p:extLst>
   </p:cSld>
@@ -11879,7 +12051,7 @@
           <a:p>
             <a:r>
               <a:rPr lang="en-US" dirty="0"/>
-              <a:t>Functions: An Alternative for One-Liners </a:t>
+              <a:t>Catching Exceptions: try-except</a:t>
             </a:r>
           </a:p>
         </p:txBody>
@@ -11896,8 +12068,8 @@
         </p:nvSpPr>
         <p:spPr>
           <a:xfrm>
-            <a:off x="680321" y="2336873"/>
-            <a:ext cx="4781695" cy="3599316"/>
+            <a:off x="680321" y="2336872"/>
+            <a:ext cx="5549791" cy="4152827"/>
           </a:xfrm>
         </p:spPr>
         <p:txBody>
@@ -11923,15 +12095,7 @@
             </a:pPr>
             <a:r>
               <a:rPr lang="en-US" dirty="0"/>
-              <a:t>One line function: </a:t>
-            </a:r>
-            <a:r>
-              <a:rPr lang="en-US" i="1" dirty="0"/>
-              <a:t>lambda</a:t>
-            </a:r>
-            <a:r>
-              <a:rPr lang="en-US" dirty="0"/>
-              <a:t> </a:t>
+              <a:t>Catch exceptions before their raised and handle them.</a:t>
             </a:r>
           </a:p>
           <a:p>
@@ -11972,68 +12136,91 @@
               <a:tabLst/>
               <a:defRPr/>
             </a:pPr>
-            <a:r>
-              <a:rPr lang="en-US" dirty="0"/>
-              <a:t>By nature don’t have any error-handling or documentation attached to them, so should only be used </a:t>
-            </a:r>
-            <a:r>
-              <a:rPr lang="en-US"/>
-              <a:t>when this isn’t necessary </a:t>
-            </a:r>
-            <a:r>
-              <a:rPr lang="mr-IN"/>
-              <a:t>–</a:t>
-            </a:r>
-            <a:r>
-              <a:rPr lang="en-US" dirty="0"/>
-              <a:t> a </a:t>
+            <a:endParaRPr lang="en-US" dirty="0"/>
+          </a:p>
+          <a:p>
+            <a:pPr marL="0" marR="0" lvl="0" indent="0" defTabSz="914400" eaLnBrk="1" fontAlgn="auto" latinLnBrk="0" hangingPunct="1">
+              <a:lnSpc>
+                <a:spcPct val="100000"/>
+              </a:lnSpc>
+              <a:spcBef>
+                <a:spcPts val="0"/>
+              </a:spcBef>
+              <a:spcAft>
+                <a:spcPts val="0"/>
+              </a:spcAft>
+              <a:buClrTx/>
+              <a:buSzTx/>
+              <a:buFontTx/>
+              <a:buNone/>
+              <a:tabLst/>
+              <a:defRPr/>
+            </a:pPr>
+            <a:r>
+              <a:rPr lang="en-US" dirty="0"/>
+              <a:t>Different types of exceptions can be treated differently by specifying them in the except statement.</a:t>
+            </a:r>
+          </a:p>
+          <a:p>
+            <a:pPr marL="0" marR="0" lvl="0" indent="0" defTabSz="914400" eaLnBrk="1" fontAlgn="auto" latinLnBrk="0" hangingPunct="1">
+              <a:lnSpc>
+                <a:spcPct val="100000"/>
+              </a:lnSpc>
+              <a:spcBef>
+                <a:spcPts val="0"/>
+              </a:spcBef>
+              <a:spcAft>
+                <a:spcPts val="0"/>
+              </a:spcAft>
+              <a:buClrTx/>
+              <a:buSzTx/>
+              <a:buFontTx/>
+              <a:buNone/>
+              <a:tabLst/>
+              <a:defRPr/>
+            </a:pPr>
+            <a:endParaRPr lang="en-US" dirty="0"/>
+          </a:p>
+          <a:p>
+            <a:pPr marL="0" marR="0" lvl="0" indent="0" defTabSz="914400" eaLnBrk="1" fontAlgn="auto" latinLnBrk="0" hangingPunct="1">
+              <a:lnSpc>
+                <a:spcPct val="100000"/>
+              </a:lnSpc>
+              <a:spcBef>
+                <a:spcPts val="0"/>
+              </a:spcBef>
+              <a:spcAft>
+                <a:spcPts val="0"/>
+              </a:spcAft>
+              <a:buClrTx/>
+              <a:buSzTx/>
+              <a:buFontTx/>
+              <a:buNone/>
+              <a:tabLst/>
+              <a:defRPr/>
+            </a:pPr>
+            <a:r>
+              <a:rPr lang="en-US" dirty="0"/>
+              <a:t>The exception can be raised “as is” with the python keyword </a:t>
             </a:r>
             <a:r>
               <a:rPr lang="en-US" i="1" dirty="0"/>
-              <a:t>lambda </a:t>
-            </a:r>
-            <a:r>
-              <a:rPr lang="en-US" dirty="0"/>
-              <a:t>worth documenting is better replaced by a </a:t>
-            </a:r>
-            <a:r>
-              <a:rPr lang="en-US" i="1" dirty="0" err="1"/>
-              <a:t>def</a:t>
-            </a:r>
-            <a:r>
-              <a:rPr lang="en-US" dirty="0"/>
-              <a:t> with a one-line </a:t>
-            </a:r>
-            <a:r>
-              <a:rPr lang="en-US" i="1" dirty="0"/>
-              <a:t>return</a:t>
-            </a:r>
-            <a:r>
-              <a:rPr lang="en-US" dirty="0"/>
-              <a:t> and a </a:t>
-            </a:r>
-            <a:r>
-              <a:rPr lang="en-US" dirty="0" err="1"/>
-              <a:t>docstring</a:t>
-            </a:r>
-            <a:r>
-              <a:rPr lang="en-US" dirty="0"/>
-              <a:t> </a:t>
-            </a:r>
-            <a:endParaRPr lang="en-US" i="1" dirty="0"/>
+              <a:t>raise</a:t>
+            </a:r>
+            <a:endParaRPr lang="en-US" dirty="0"/>
           </a:p>
         </p:txBody>
       </p:sp>
       <p:pic>
         <p:nvPicPr>
-          <p:cNvPr id="4" name="Picture 3"/>
+          <p:cNvPr id="5" name="Picture 4"/>
           <p:cNvPicPr>
             <a:picLocks noChangeAspect="1"/>
           </p:cNvPicPr>
           <p:nvPr/>
         </p:nvPicPr>
         <p:blipFill>
-          <a:blip r:embed="rId2">
+          <a:blip r:embed="rId3">
             <a:extLst>
               <a:ext uri="{28A0092B-C50C-407E-A947-70E740481C1C}">
                 <a14:useLocalDpi xmlns:a14="http://schemas.microsoft.com/office/drawing/2010/main" val="0"/>
@@ -12046,8 +12233,8 @@
         </p:blipFill>
         <p:spPr>
           <a:xfrm>
-            <a:off x="7077456" y="2745881"/>
-            <a:ext cx="3352800" cy="2781300"/>
+            <a:off x="6764787" y="2184400"/>
+            <a:ext cx="4597400" cy="4305300"/>
           </a:xfrm>
           <a:prstGeom prst="rect">
             <a:avLst/>
@@ -12057,7 +12244,7 @@
     </p:spTree>
     <p:extLst>
       <p:ext uri="{BB962C8B-B14F-4D97-AF65-F5344CB8AC3E}">
-        <p14:creationId xmlns:p14="http://schemas.microsoft.com/office/powerpoint/2010/main" val="1541813553"/>
+        <p14:creationId xmlns:p14="http://schemas.microsoft.com/office/powerpoint/2010/main" val="1936197508"/>
       </p:ext>
     </p:extLst>
   </p:cSld>
@@ -12101,7 +12288,7 @@
           <a:p>
             <a:r>
               <a:rPr lang="en-US" dirty="0"/>
-              <a:t>Catching Exceptions: try-except</a:t>
+              <a:t>Catching Exceptions: try-except-finally </a:t>
             </a:r>
           </a:p>
         </p:txBody>
@@ -12119,7 +12306,7 @@
         <p:spPr>
           <a:xfrm>
             <a:off x="680321" y="2336872"/>
-            <a:ext cx="5549791" cy="4152827"/>
+            <a:ext cx="5354719" cy="4356535"/>
           </a:xfrm>
         </p:spPr>
         <p:txBody>
@@ -12145,7 +12332,23 @@
             </a:pPr>
             <a:r>
               <a:rPr lang="en-US" dirty="0"/>
-              <a:t>Catch exceptions before their raised and handle them. </a:t>
+              <a:t>Use a </a:t>
+            </a:r>
+            <a:r>
+              <a:rPr lang="en-US" i="1" dirty="0"/>
+              <a:t>finally</a:t>
+            </a:r>
+            <a:r>
+              <a:rPr lang="en-US" dirty="0"/>
+              <a:t> block when you need something to </a:t>
+            </a:r>
+            <a:r>
+              <a:rPr lang="en-US" i="1" dirty="0"/>
+              <a:t>always run</a:t>
+            </a:r>
+            <a:r>
+              <a:rPr lang="en-US" dirty="0"/>
+              <a:t> regardless of the errors that may or may not be raised. </a:t>
             </a:r>
           </a:p>
           <a:p>
@@ -12186,7 +12389,10 @@
               <a:tabLst/>
               <a:defRPr/>
             </a:pPr>
-            <a:endParaRPr lang="en-US" dirty="0"/>
+            <a:r>
+              <a:rPr lang="en-US" dirty="0"/>
+              <a:t>Example: freeing up memory</a:t>
+            </a:r>
           </a:p>
           <a:p>
             <a:pPr marL="0" marR="0" lvl="0" indent="0" defTabSz="914400" eaLnBrk="1" fontAlgn="auto" latinLnBrk="0" hangingPunct="1">
@@ -12206,10 +12412,7 @@
               <a:tabLst/>
               <a:defRPr/>
             </a:pPr>
-            <a:r>
-              <a:rPr lang="en-US" dirty="0"/>
-              <a:t>Different types of exceptions can be treated differently by specifying them in the except statement. </a:t>
-            </a:r>
+            <a:endParaRPr lang="en-US" dirty="0"/>
           </a:p>
           <a:p>
             <a:pPr marL="0" marR="0" lvl="0" indent="0" defTabSz="914400" eaLnBrk="1" fontAlgn="auto" latinLnBrk="0" hangingPunct="1">
@@ -12229,51 +12432,39 @@
               <a:tabLst/>
               <a:defRPr/>
             </a:pPr>
-            <a:endParaRPr lang="en-US" dirty="0"/>
-          </a:p>
-          <a:p>
-            <a:pPr marL="0" marR="0" lvl="0" indent="0" defTabSz="914400" eaLnBrk="1" fontAlgn="auto" latinLnBrk="0" hangingPunct="1">
-              <a:lnSpc>
-                <a:spcPct val="100000"/>
-              </a:lnSpc>
-              <a:spcBef>
-                <a:spcPts val="0"/>
-              </a:spcBef>
-              <a:spcAft>
-                <a:spcPts val="0"/>
-              </a:spcAft>
-              <a:buClrTx/>
-              <a:buSzTx/>
-              <a:buFontTx/>
-              <a:buNone/>
-              <a:tabLst/>
-              <a:defRPr/>
-            </a:pPr>
-            <a:r>
-              <a:rPr lang="en-US" dirty="0"/>
-              <a:t>The exception can be raised as is with the python keyword </a:t>
+            <a:r>
+              <a:rPr lang="en-US" dirty="0"/>
+              <a:t>Disclaimer </a:t>
+            </a:r>
+            <a:r>
+              <a:rPr lang="mr-IN" dirty="0"/>
+              <a:t>–</a:t>
+            </a:r>
+            <a:r>
+              <a:rPr lang="en-US" dirty="0"/>
+              <a:t> return statements in a </a:t>
             </a:r>
             <a:r>
               <a:rPr lang="en-US" i="1" dirty="0"/>
-              <a:t>raise</a:t>
-            </a:r>
-            <a:r>
-              <a:rPr lang="en-US" dirty="0"/>
-              <a:t> </a:t>
+              <a:t>finally</a:t>
+            </a:r>
+            <a:r>
+              <a:rPr lang="en-US" dirty="0"/>
+              <a:t> block will always override previous return statements in the try-except block </a:t>
             </a:r>
           </a:p>
         </p:txBody>
       </p:sp>
       <p:pic>
         <p:nvPicPr>
-          <p:cNvPr id="5" name="Picture 4"/>
+          <p:cNvPr id="4" name="Picture 3"/>
           <p:cNvPicPr>
             <a:picLocks noChangeAspect="1"/>
           </p:cNvPicPr>
           <p:nvPr/>
         </p:nvPicPr>
         <p:blipFill>
-          <a:blip r:embed="rId3">
+          <a:blip r:embed="rId2">
             <a:extLst>
               <a:ext uri="{28A0092B-C50C-407E-A947-70E740481C1C}">
                 <a14:useLocalDpi xmlns:a14="http://schemas.microsoft.com/office/drawing/2010/main" val="0"/>
@@ -12286,8 +12477,8 @@
         </p:blipFill>
         <p:spPr>
           <a:xfrm>
-            <a:off x="6764787" y="2184400"/>
-            <a:ext cx="4597400" cy="4305300"/>
+            <a:off x="6614160" y="2564384"/>
+            <a:ext cx="4559300" cy="2997200"/>
           </a:xfrm>
           <a:prstGeom prst="rect">
             <a:avLst/>
@@ -12297,7 +12488,7 @@
     </p:spTree>
     <p:extLst>
       <p:ext uri="{BB962C8B-B14F-4D97-AF65-F5344CB8AC3E}">
-        <p14:creationId xmlns:p14="http://schemas.microsoft.com/office/powerpoint/2010/main" val="1936197508"/>
+        <p14:creationId xmlns:p14="http://schemas.microsoft.com/office/powerpoint/2010/main" val="1314873171"/>
       </p:ext>
     </p:extLst>
   </p:cSld>
@@ -12326,7 +12517,13 @@
       </p:grpSpPr>
       <p:sp>
         <p:nvSpPr>
-          <p:cNvPr id="2" name="Title 1"/>
+          <p:cNvPr id="2" name="Title 1">
+            <a:extLst>
+              <a:ext uri="{FF2B5EF4-FFF2-40B4-BE49-F238E27FC236}">
+                <a16:creationId xmlns:a16="http://schemas.microsoft.com/office/drawing/2014/main" id="{CDCA18A1-AFA1-644C-B2C7-ECD421140330}"/>
+              </a:ext>
+            </a:extLst>
+          </p:cNvPr>
           <p:cNvSpPr>
             <a:spLocks noGrp="1"/>
           </p:cNvSpPr>
@@ -12341,14 +12538,20 @@
           <a:p>
             <a:r>
               <a:rPr lang="en-US" dirty="0"/>
-              <a:t>Catching Exceptions: try-except-finally </a:t>
-            </a:r>
-          </a:p>
-        </p:txBody>
-      </p:sp>
-      <p:sp>
-        <p:nvSpPr>
-          <p:cNvPr id="3" name="Content Placeholder 2"/>
+              <a:t>Pattern-Matching: Python 3.10</a:t>
+            </a:r>
+          </a:p>
+        </p:txBody>
+      </p:sp>
+      <p:sp>
+        <p:nvSpPr>
+          <p:cNvPr id="3" name="Content Placeholder 2">
+            <a:extLst>
+              <a:ext uri="{FF2B5EF4-FFF2-40B4-BE49-F238E27FC236}">
+                <a16:creationId xmlns:a16="http://schemas.microsoft.com/office/drawing/2014/main" id="{127FD841-4A5A-FA41-B7B1-EB2054DBBB84}"/>
+              </a:ext>
+            </a:extLst>
+          </p:cNvPr>
           <p:cNvSpPr>
             <a:spLocks noGrp="1"/>
           </p:cNvSpPr>
@@ -12358,180 +12561,110 @@
         </p:nvSpPr>
         <p:spPr>
           <a:xfrm>
-            <a:off x="680321" y="2336872"/>
-            <a:ext cx="5354719" cy="4356535"/>
-          </a:xfrm>
-        </p:spPr>
-        <p:txBody>
-          <a:bodyPr/>
+            <a:off x="225760" y="2091350"/>
+            <a:ext cx="6174463" cy="4676616"/>
+          </a:xfrm>
+        </p:spPr>
+        <p:txBody>
+          <a:bodyPr>
+            <a:normAutofit/>
+          </a:bodyPr>
           <a:lstStyle/>
           <a:p>
-            <a:pPr marL="0" marR="0" lvl="0" indent="0" defTabSz="914400" eaLnBrk="1" fontAlgn="auto" latinLnBrk="0" hangingPunct="1">
-              <a:lnSpc>
-                <a:spcPct val="100000"/>
-              </a:lnSpc>
-              <a:spcBef>
-                <a:spcPts val="0"/>
-              </a:spcBef>
-              <a:spcAft>
-                <a:spcPts val="0"/>
-              </a:spcAft>
-              <a:buClrTx/>
-              <a:buSzTx/>
-              <a:buFontTx/>
-              <a:buNone/>
-              <a:tabLst/>
-              <a:defRPr/>
-            </a:pPr>
-            <a:r>
-              <a:rPr lang="en-US" dirty="0"/>
-              <a:t>Use a </a:t>
+            <a:pPr marL="0" indent="0">
+              <a:buNone/>
+            </a:pPr>
+            <a:r>
+              <a:rPr lang="en-US" dirty="0"/>
+              <a:t>Python 3.10 (released October 4, 2021) introduced the new </a:t>
             </a:r>
             <a:r>
               <a:rPr lang="en-US" i="1" dirty="0"/>
-              <a:t>finally</a:t>
-            </a:r>
-            <a:r>
-              <a:rPr lang="en-US" dirty="0"/>
-              <a:t> block when you need something to </a:t>
+              <a:t>match-case</a:t>
+            </a:r>
+            <a:r>
+              <a:rPr lang="en-US" dirty="0"/>
+              <a:t> syntax</a:t>
+            </a:r>
+          </a:p>
+          <a:p>
+            <a:pPr lvl="1"/>
+            <a:r>
+              <a:rPr lang="en-US" dirty="0"/>
+              <a:t>Similar to the </a:t>
             </a:r>
             <a:r>
               <a:rPr lang="en-US" i="1" dirty="0"/>
-              <a:t>always run</a:t>
-            </a:r>
-            <a:r>
-              <a:rPr lang="en-US" dirty="0"/>
-              <a:t> regardless of the errors that may or may not be raised. </a:t>
-            </a:r>
-          </a:p>
-          <a:p>
-            <a:pPr marL="0" marR="0" lvl="0" indent="0" defTabSz="914400" eaLnBrk="1" fontAlgn="auto" latinLnBrk="0" hangingPunct="1">
-              <a:lnSpc>
-                <a:spcPct val="100000"/>
-              </a:lnSpc>
-              <a:spcBef>
-                <a:spcPts val="0"/>
-              </a:spcBef>
-              <a:spcAft>
-                <a:spcPts val="0"/>
-              </a:spcAft>
-              <a:buClrTx/>
-              <a:buSzTx/>
-              <a:buFontTx/>
-              <a:buNone/>
-              <a:tabLst/>
-              <a:defRPr/>
+              <a:t>switch-case</a:t>
+            </a:r>
+            <a:r>
+              <a:rPr lang="en-US" dirty="0"/>
+              <a:t> construction in C/C++</a:t>
+            </a:r>
+          </a:p>
+          <a:p>
+            <a:pPr lvl="1"/>
+            <a:r>
+              <a:rPr lang="en-US" dirty="0"/>
+              <a:t>Usually implicitly includes some form of type-checking and length-matching for short arrays</a:t>
+            </a:r>
+          </a:p>
+          <a:p>
+            <a:pPr marL="0" indent="0">
+              <a:buNone/>
             </a:pPr>
             <a:endParaRPr lang="en-US" dirty="0"/>
           </a:p>
           <a:p>
-            <a:pPr marL="0" marR="0" lvl="0" indent="0" defTabSz="914400" eaLnBrk="1" fontAlgn="auto" latinLnBrk="0" hangingPunct="1">
-              <a:lnSpc>
-                <a:spcPct val="100000"/>
-              </a:lnSpc>
-              <a:spcBef>
-                <a:spcPts val="0"/>
-              </a:spcBef>
-              <a:spcAft>
-                <a:spcPts val="0"/>
-              </a:spcAft>
-              <a:buClrTx/>
-              <a:buSzTx/>
-              <a:buFontTx/>
-              <a:buNone/>
-              <a:tabLst/>
-              <a:defRPr/>
-            </a:pPr>
-            <a:r>
-              <a:rPr lang="en-US" dirty="0"/>
-              <a:t>Example: freeing up memory</a:t>
-            </a:r>
-          </a:p>
-          <a:p>
-            <a:pPr marL="0" marR="0" lvl="0" indent="0" defTabSz="914400" eaLnBrk="1" fontAlgn="auto" latinLnBrk="0" hangingPunct="1">
-              <a:lnSpc>
-                <a:spcPct val="100000"/>
-              </a:lnSpc>
-              <a:spcBef>
-                <a:spcPts val="0"/>
-              </a:spcBef>
-              <a:spcAft>
-                <a:spcPts val="0"/>
-              </a:spcAft>
-              <a:buClrTx/>
-              <a:buSzTx/>
-              <a:buFontTx/>
-              <a:buNone/>
-              <a:tabLst/>
-              <a:defRPr/>
+            <a:pPr marL="0" indent="0">
+              <a:buNone/>
+            </a:pPr>
+            <a:r>
+              <a:rPr lang="en-US" dirty="0"/>
+              <a:t>Case statements can introduce new local variables</a:t>
+            </a:r>
+          </a:p>
+          <a:p>
+            <a:pPr marL="0" indent="0">
+              <a:buNone/>
             </a:pPr>
             <a:endParaRPr lang="en-US" dirty="0"/>
           </a:p>
           <a:p>
-            <a:pPr marL="0" marR="0" lvl="0" indent="0" defTabSz="914400" eaLnBrk="1" fontAlgn="auto" latinLnBrk="0" hangingPunct="1">
-              <a:lnSpc>
-                <a:spcPct val="100000"/>
-              </a:lnSpc>
-              <a:spcBef>
-                <a:spcPts val="0"/>
-              </a:spcBef>
-              <a:spcAft>
-                <a:spcPts val="0"/>
-              </a:spcAft>
-              <a:buClrTx/>
-              <a:buSzTx/>
-              <a:buFontTx/>
-              <a:buNone/>
-              <a:tabLst/>
-              <a:defRPr/>
-            </a:pPr>
-            <a:r>
-              <a:rPr lang="en-US" dirty="0"/>
-              <a:t>Disclaimer </a:t>
-            </a:r>
-            <a:r>
-              <a:rPr lang="mr-IN" dirty="0"/>
-              <a:t>–</a:t>
-            </a:r>
-            <a:r>
-              <a:rPr lang="en-US" dirty="0"/>
-              <a:t> return statements in a </a:t>
-            </a:r>
-            <a:r>
-              <a:rPr lang="en-US" i="1" dirty="0"/>
-              <a:t>finally</a:t>
-            </a:r>
-            <a:r>
-              <a:rPr lang="en-US" dirty="0"/>
-              <a:t> block will always override previous return statements in the try-except block </a:t>
+            <a:pPr marL="0" indent="0">
+              <a:buNone/>
+            </a:pPr>
+            <a:r>
+              <a:rPr lang="en-US" dirty="0"/>
+              <a:t>_ represents some default scenario</a:t>
             </a:r>
           </a:p>
         </p:txBody>
       </p:sp>
       <p:pic>
         <p:nvPicPr>
-          <p:cNvPr id="4" name="Picture 3"/>
+          <p:cNvPr id="7" name="Picture 6">
+            <a:extLst>
+              <a:ext uri="{FF2B5EF4-FFF2-40B4-BE49-F238E27FC236}">
+                <a16:creationId xmlns:a16="http://schemas.microsoft.com/office/drawing/2014/main" id="{48509C0C-1507-8D49-B33C-69ECE5F8565D}"/>
+              </a:ext>
+            </a:extLst>
+          </p:cNvPr>
           <p:cNvPicPr>
             <a:picLocks noChangeAspect="1"/>
           </p:cNvPicPr>
           <p:nvPr/>
         </p:nvPicPr>
         <p:blipFill>
-          <a:blip r:embed="rId2">
-            <a:extLst>
-              <a:ext uri="{28A0092B-C50C-407E-A947-70E740481C1C}">
-                <a14:useLocalDpi xmlns:a14="http://schemas.microsoft.com/office/drawing/2010/main" val="0"/>
-              </a:ext>
-            </a:extLst>
-          </a:blip>
+          <a:blip r:embed="rId3"/>
           <a:stretch>
             <a:fillRect/>
           </a:stretch>
         </p:blipFill>
         <p:spPr>
           <a:xfrm>
-            <a:off x="6614160" y="2564384"/>
-            <a:ext cx="4559300" cy="2997200"/>
+            <a:off x="6694186" y="2091350"/>
+            <a:ext cx="5267472" cy="4556781"/>
           </a:xfrm>
           <a:prstGeom prst="rect">
             <a:avLst/>
@@ -12541,7 +12674,7 @@
     </p:spTree>
     <p:extLst>
       <p:ext uri="{BB962C8B-B14F-4D97-AF65-F5344CB8AC3E}">
-        <p14:creationId xmlns:p14="http://schemas.microsoft.com/office/powerpoint/2010/main" val="1314873171"/>
+        <p14:creationId xmlns:p14="http://schemas.microsoft.com/office/powerpoint/2010/main" val="4253850126"/>
       </p:ext>
     </p:extLst>
   </p:cSld>
@@ -12570,7 +12703,13 @@
       </p:grpSpPr>
       <p:sp>
         <p:nvSpPr>
-          <p:cNvPr id="2" name="Title 1"/>
+          <p:cNvPr id="2" name="Title 1">
+            <a:extLst>
+              <a:ext uri="{FF2B5EF4-FFF2-40B4-BE49-F238E27FC236}">
+                <a16:creationId xmlns:a16="http://schemas.microsoft.com/office/drawing/2014/main" id="{CDCA18A1-AFA1-644C-B2C7-ECD421140330}"/>
+              </a:ext>
+            </a:extLst>
+          </p:cNvPr>
           <p:cNvSpPr>
             <a:spLocks noGrp="1"/>
           </p:cNvSpPr>
@@ -12585,14 +12724,20 @@
           <a:p>
             <a:r>
               <a:rPr lang="en-US" dirty="0"/>
-              <a:t>Useful Built-In Functions </a:t>
-            </a:r>
-          </a:p>
-        </p:txBody>
-      </p:sp>
-      <p:sp>
-        <p:nvSpPr>
-          <p:cNvPr id="3" name="Content Placeholder 2"/>
+              <a:t>Pattern-Matching: Python 3.10</a:t>
+            </a:r>
+          </a:p>
+        </p:txBody>
+      </p:sp>
+      <p:sp>
+        <p:nvSpPr>
+          <p:cNvPr id="3" name="Content Placeholder 2">
+            <a:extLst>
+              <a:ext uri="{FF2B5EF4-FFF2-40B4-BE49-F238E27FC236}">
+                <a16:creationId xmlns:a16="http://schemas.microsoft.com/office/drawing/2014/main" id="{127FD841-4A5A-FA41-B7B1-EB2054DBBB84}"/>
+              </a:ext>
+            </a:extLst>
+          </p:cNvPr>
           <p:cNvSpPr>
             <a:spLocks noGrp="1"/>
           </p:cNvSpPr>
@@ -12602,8 +12747,8 @@
         </p:nvSpPr>
         <p:spPr>
           <a:xfrm>
-            <a:off x="680321" y="2336872"/>
-            <a:ext cx="10597279" cy="4234615"/>
+            <a:off x="225760" y="2091350"/>
+            <a:ext cx="6174463" cy="4676616"/>
           </a:xfrm>
         </p:spPr>
         <p:txBody>
@@ -12616,158 +12761,285 @@
               <a:buNone/>
             </a:pPr>
             <a:r>
+              <a:rPr lang="en-US" dirty="0"/>
+              <a:t>Python 3.10 (released October 4, 2021) introduced the new </a:t>
+            </a:r>
+            <a:r>
               <a:rPr lang="en-US" i="1" dirty="0"/>
-              <a:t>any</a:t>
-            </a:r>
-            <a:r>
-              <a:rPr lang="en-US" dirty="0"/>
-              <a:t>: Iterates over a list/array and determines if at least one element is </a:t>
+              <a:t>match-case</a:t>
+            </a:r>
+            <a:r>
+              <a:rPr lang="en-US" dirty="0"/>
+              <a:t> syntax</a:t>
+            </a:r>
+          </a:p>
+          <a:p>
+            <a:pPr lvl="1"/>
+            <a:r>
+              <a:rPr lang="en-US" dirty="0"/>
+              <a:t>Similar to the </a:t>
             </a:r>
             <a:r>
               <a:rPr lang="en-US" i="1" dirty="0"/>
-              <a:t>True</a:t>
-            </a:r>
-            <a:r>
-              <a:rPr lang="en-US" dirty="0"/>
-              <a:t> </a:t>
+              <a:t>switch-case</a:t>
+            </a:r>
+            <a:r>
+              <a:rPr lang="en-US" dirty="0"/>
+              <a:t> construction in C/C++</a:t>
+            </a:r>
+          </a:p>
+          <a:p>
+            <a:pPr lvl="1"/>
+            <a:r>
+              <a:rPr lang="en-US" dirty="0"/>
+              <a:t>Usually implicitly includes some form of type-checking and length-matching for short arrays</a:t>
             </a:r>
           </a:p>
           <a:p>
             <a:pPr marL="0" indent="0">
               <a:buNone/>
             </a:pPr>
-            <a:r>
-              <a:rPr lang="en-US" i="1" dirty="0"/>
-              <a:t>all</a:t>
-            </a:r>
-            <a:r>
-              <a:rPr lang="en-US" dirty="0"/>
-              <a:t>: Iterates over a list/array and determines if all elements are </a:t>
-            </a:r>
-            <a:r>
-              <a:rPr lang="en-US" i="1" dirty="0"/>
-              <a:t>True</a:t>
-            </a:r>
-            <a:r>
-              <a:rPr lang="en-US" dirty="0"/>
-              <a:t> </a:t>
-            </a:r>
-            <a:endParaRPr lang="en-US" i="1" dirty="0"/>
+            <a:endParaRPr lang="en-US" dirty="0"/>
           </a:p>
           <a:p>
             <a:pPr marL="0" indent="0">
               <a:buNone/>
             </a:pPr>
             <a:r>
-              <a:rPr lang="en-US" i="1" dirty="0"/>
-              <a:t>zip</a:t>
-            </a:r>
-            <a:r>
-              <a:rPr lang="en-US" dirty="0"/>
-              <a:t>: Combine lists/arrays into a 2-D list/array component-wise </a:t>
-            </a:r>
-            <a:endParaRPr lang="en-US" i="1" dirty="0"/>
-          </a:p>
-          <a:p>
-            <a:pPr marL="0" indent="0">
-              <a:buNone/>
-            </a:pPr>
-            <a:r>
-              <a:rPr lang="en-US" i="1" dirty="0"/>
-              <a:t>map</a:t>
-            </a:r>
-            <a:r>
-              <a:rPr lang="en-US" dirty="0"/>
-              <a:t>: Iterate a function over an array(s) of values </a:t>
-            </a:r>
-            <a:endParaRPr lang="en-US" i="1" dirty="0"/>
-          </a:p>
-          <a:p>
-            <a:pPr marL="0" indent="0">
-              <a:buNone/>
-            </a:pPr>
-            <a:r>
-              <a:rPr lang="en-US" i="1" dirty="0"/>
-              <a:t>filter</a:t>
-            </a:r>
-            <a:r>
-              <a:rPr lang="en-US" dirty="0"/>
-              <a:t>: Remove elements from a list/array which don’t meet specific criteria </a:t>
-            </a:r>
-          </a:p>
-          <a:p>
-            <a:pPr marL="0" indent="0">
-              <a:buNone/>
-            </a:pPr>
-            <a:r>
-              <a:rPr lang="en-US" i="1" dirty="0"/>
-              <a:t>min</a:t>
-            </a:r>
-            <a:r>
-              <a:rPr lang="en-US" dirty="0"/>
-              <a:t>: Calculate minimum value of some set of numbers </a:t>
-            </a:r>
-            <a:endParaRPr lang="en-US" i="1" dirty="0"/>
-          </a:p>
-          <a:p>
-            <a:pPr marL="0" indent="0">
-              <a:buNone/>
-            </a:pPr>
-            <a:r>
-              <a:rPr lang="en-US" i="1" dirty="0"/>
-              <a:t>max</a:t>
-            </a:r>
-            <a:r>
-              <a:rPr lang="en-US" dirty="0"/>
-              <a:t>: Calculate maximum value of some set of numbers </a:t>
-            </a:r>
-            <a:endParaRPr lang="en-US" i="1" dirty="0"/>
-          </a:p>
-          <a:p>
-            <a:pPr marL="0" indent="0">
-              <a:buNone/>
-            </a:pPr>
-            <a:r>
-              <a:rPr lang="en-US" dirty="0"/>
-              <a:t>In python 3, </a:t>
-            </a:r>
-            <a:r>
-              <a:rPr lang="en-US" i="1" dirty="0"/>
-              <a:t>zip</a:t>
-            </a:r>
-            <a:r>
-              <a:rPr lang="en-US" dirty="0"/>
-              <a:t>, </a:t>
-            </a:r>
-            <a:r>
-              <a:rPr lang="en-US" i="1" dirty="0"/>
-              <a:t>map</a:t>
-            </a:r>
-            <a:r>
-              <a:rPr lang="en-US" dirty="0"/>
-              <a:t>, and </a:t>
-            </a:r>
-            <a:r>
-              <a:rPr lang="en-US" i="1" dirty="0"/>
-              <a:t>filter </a:t>
-            </a:r>
-            <a:r>
-              <a:rPr lang="en-US" dirty="0"/>
-              <a:t>return a special type of object which needs to be cast to a list, tuple, etc. </a:t>
-            </a:r>
-          </a:p>
-          <a:p>
-            <a:pPr marL="0" indent="0">
-              <a:buNone/>
-            </a:pPr>
-            <a:endParaRPr lang="en-US" i="1" dirty="0"/>
-          </a:p>
-        </p:txBody>
-      </p:sp>
+              <a:rPr lang="en-US" dirty="0"/>
+              <a:t>Logical “or” function can be used with | character…</a:t>
+            </a:r>
+          </a:p>
+        </p:txBody>
+      </p:sp>
+      <p:pic>
+        <p:nvPicPr>
+          <p:cNvPr id="8" name="Picture 7">
+            <a:extLst>
+              <a:ext uri="{FF2B5EF4-FFF2-40B4-BE49-F238E27FC236}">
+                <a16:creationId xmlns:a16="http://schemas.microsoft.com/office/drawing/2014/main" id="{A5717878-7AFA-4B42-8792-73F3748BDFBF}"/>
+              </a:ext>
+            </a:extLst>
+          </p:cNvPr>
+          <p:cNvPicPr>
+            <a:picLocks noChangeAspect="1"/>
+          </p:cNvPicPr>
+          <p:nvPr/>
+        </p:nvPicPr>
+        <p:blipFill>
+          <a:blip r:embed="rId2"/>
+          <a:stretch>
+            <a:fillRect/>
+          </a:stretch>
+        </p:blipFill>
+        <p:spPr>
+          <a:xfrm>
+            <a:off x="6980844" y="1628256"/>
+            <a:ext cx="4165600" cy="4914900"/>
+          </a:xfrm>
+          <a:prstGeom prst="rect">
+            <a:avLst/>
+          </a:prstGeom>
+        </p:spPr>
+      </p:pic>
     </p:spTree>
     <p:extLst>
       <p:ext uri="{BB962C8B-B14F-4D97-AF65-F5344CB8AC3E}">
-        <p14:creationId xmlns:p14="http://schemas.microsoft.com/office/powerpoint/2010/main" val="598042637"/>
+        <p14:creationId xmlns:p14="http://schemas.microsoft.com/office/powerpoint/2010/main" val="2969120410"/>
+      </p:ext>
+    </p:extLst>
+  </p:cSld>
+  <p:clrMapOvr>
+    <a:masterClrMapping/>
+  </p:clrMapOvr>
+</p:sld>
+</file>
+
+<file path=ppt/slides/slide29.xml><?xml version="1.0" encoding="utf-8"?>
+<p:sld xmlns:a="http://schemas.openxmlformats.org/drawingml/2006/main" xmlns:r="http://schemas.openxmlformats.org/officeDocument/2006/relationships" xmlns:p="http://schemas.openxmlformats.org/presentationml/2006/main">
+  <p:cSld>
+    <p:spTree>
+      <p:nvGrpSpPr>
+        <p:cNvPr id="1" name=""/>
+        <p:cNvGrpSpPr/>
+        <p:nvPr/>
+      </p:nvGrpSpPr>
+      <p:grpSpPr>
+        <a:xfrm>
+          <a:off x="0" y="0"/>
+          <a:ext cx="0" cy="0"/>
+          <a:chOff x="0" y="0"/>
+          <a:chExt cx="0" cy="0"/>
+        </a:xfrm>
+      </p:grpSpPr>
+      <p:sp>
+        <p:nvSpPr>
+          <p:cNvPr id="2" name="Title 1">
+            <a:extLst>
+              <a:ext uri="{FF2B5EF4-FFF2-40B4-BE49-F238E27FC236}">
+                <a16:creationId xmlns:a16="http://schemas.microsoft.com/office/drawing/2014/main" id="{CDCA18A1-AFA1-644C-B2C7-ECD421140330}"/>
+              </a:ext>
+            </a:extLst>
+          </p:cNvPr>
+          <p:cNvSpPr>
+            <a:spLocks noGrp="1"/>
+          </p:cNvSpPr>
+          <p:nvPr>
+            <p:ph type="title"/>
+          </p:nvPr>
+        </p:nvSpPr>
+        <p:spPr/>
+        <p:txBody>
+          <a:bodyPr/>
+          <a:lstStyle/>
+          <a:p>
+            <a:r>
+              <a:rPr lang="en-US" dirty="0"/>
+              <a:t>Pattern-Matching: Python 3.10</a:t>
+            </a:r>
+          </a:p>
+        </p:txBody>
+      </p:sp>
+      <p:sp>
+        <p:nvSpPr>
+          <p:cNvPr id="3" name="Content Placeholder 2">
+            <a:extLst>
+              <a:ext uri="{FF2B5EF4-FFF2-40B4-BE49-F238E27FC236}">
+                <a16:creationId xmlns:a16="http://schemas.microsoft.com/office/drawing/2014/main" id="{127FD841-4A5A-FA41-B7B1-EB2054DBBB84}"/>
+              </a:ext>
+            </a:extLst>
+          </p:cNvPr>
+          <p:cNvSpPr>
+            <a:spLocks noGrp="1"/>
+          </p:cNvSpPr>
+          <p:nvPr>
+            <p:ph idx="1"/>
+          </p:nvPr>
+        </p:nvSpPr>
+        <p:spPr>
+          <a:xfrm>
+            <a:off x="225761" y="2091350"/>
+            <a:ext cx="5875782" cy="4676616"/>
+          </a:xfrm>
+        </p:spPr>
+        <p:txBody>
+          <a:bodyPr>
+            <a:normAutofit/>
+          </a:bodyPr>
+          <a:lstStyle/>
+          <a:p>
+            <a:pPr marL="0" indent="0">
+              <a:buNone/>
+            </a:pPr>
+            <a:r>
+              <a:rPr lang="en-US" dirty="0"/>
+              <a:t>Python 3.10 (released October 4, 2021) introduced the new </a:t>
+            </a:r>
+            <a:r>
+              <a:rPr lang="en-US" i="1" dirty="0"/>
+              <a:t>match-case</a:t>
+            </a:r>
+            <a:r>
+              <a:rPr lang="en-US" dirty="0"/>
+              <a:t> syntax</a:t>
+            </a:r>
+          </a:p>
+          <a:p>
+            <a:pPr lvl="1"/>
+            <a:r>
+              <a:rPr lang="en-US" dirty="0"/>
+              <a:t>Similar to the </a:t>
+            </a:r>
+            <a:r>
+              <a:rPr lang="en-US" i="1" dirty="0"/>
+              <a:t>switch-case</a:t>
+            </a:r>
+            <a:r>
+              <a:rPr lang="en-US" dirty="0"/>
+              <a:t> construction in C/C++</a:t>
+            </a:r>
+          </a:p>
+          <a:p>
+            <a:pPr lvl="1"/>
+            <a:r>
+              <a:rPr lang="en-US" dirty="0"/>
+              <a:t>Usually implicitly includes some form of type-checking and length-matching for short arrays</a:t>
+            </a:r>
+          </a:p>
+          <a:p>
+            <a:pPr marL="0" indent="0">
+              <a:buNone/>
+            </a:pPr>
+            <a:endParaRPr lang="en-US" dirty="0"/>
+          </a:p>
+          <a:p>
+            <a:pPr marL="0" indent="0">
+              <a:buNone/>
+            </a:pPr>
+            <a:r>
+              <a:rPr lang="en-US" dirty="0"/>
+              <a:t>Logical “or” function can be used with | character…</a:t>
+            </a:r>
+          </a:p>
+          <a:p>
+            <a:pPr marL="0" indent="0">
+              <a:buNone/>
+            </a:pPr>
+            <a:endParaRPr lang="en-US" dirty="0"/>
+          </a:p>
+          <a:p>
+            <a:pPr marL="0" indent="0">
+              <a:buNone/>
+            </a:pPr>
+            <a:r>
+              <a:rPr lang="en-US" dirty="0"/>
+              <a:t>… and can be used with </a:t>
+            </a:r>
+            <a:r>
+              <a:rPr lang="en-US" i="1" dirty="0"/>
+              <a:t>as</a:t>
+            </a:r>
+            <a:r>
+              <a:rPr lang="en-US" dirty="0"/>
+              <a:t> to capture the value as a local variable</a:t>
+            </a:r>
+          </a:p>
+        </p:txBody>
+      </p:sp>
+      <p:pic>
+        <p:nvPicPr>
+          <p:cNvPr id="10" name="Picture 9">
+            <a:extLst>
+              <a:ext uri="{FF2B5EF4-FFF2-40B4-BE49-F238E27FC236}">
+                <a16:creationId xmlns:a16="http://schemas.microsoft.com/office/drawing/2014/main" id="{DC6A2B06-CC18-D44E-B110-FFDAC9A71280}"/>
+              </a:ext>
+            </a:extLst>
+          </p:cNvPr>
+          <p:cNvPicPr>
+            <a:picLocks noChangeAspect="1"/>
+          </p:cNvPicPr>
+          <p:nvPr/>
+        </p:nvPicPr>
+        <p:blipFill>
+          <a:blip r:embed="rId2"/>
+          <a:stretch>
+            <a:fillRect/>
+          </a:stretch>
+        </p:blipFill>
+        <p:spPr>
+          <a:xfrm>
+            <a:off x="6101543" y="2069142"/>
+            <a:ext cx="5978085" cy="4698824"/>
+          </a:xfrm>
+          <a:prstGeom prst="rect">
+            <a:avLst/>
+          </a:prstGeom>
+        </p:spPr>
+      </p:pic>
+    </p:spTree>
+    <p:extLst>
+      <p:ext uri="{BB962C8B-B14F-4D97-AF65-F5344CB8AC3E}">
+        <p14:creationId xmlns:p14="http://schemas.microsoft.com/office/powerpoint/2010/main" val="4106465668"/>
       </p:ext>
     </p:extLst>
   </p:cSld>
@@ -13105,6 +13377,428 @@
     <p:extLst>
       <p:ext uri="{BB962C8B-B14F-4D97-AF65-F5344CB8AC3E}">
         <p14:creationId xmlns:p14="http://schemas.microsoft.com/office/powerpoint/2010/main" val="1268870187"/>
+      </p:ext>
+    </p:extLst>
+  </p:cSld>
+  <p:clrMapOvr>
+    <a:masterClrMapping/>
+  </p:clrMapOvr>
+</p:sld>
+</file>
+
+<file path=ppt/slides/slide30.xml><?xml version="1.0" encoding="utf-8"?>
+<p:sld xmlns:a="http://schemas.openxmlformats.org/drawingml/2006/main" xmlns:r="http://schemas.openxmlformats.org/officeDocument/2006/relationships" xmlns:p="http://schemas.openxmlformats.org/presentationml/2006/main">
+  <p:cSld>
+    <p:spTree>
+      <p:nvGrpSpPr>
+        <p:cNvPr id="1" name=""/>
+        <p:cNvGrpSpPr/>
+        <p:nvPr/>
+      </p:nvGrpSpPr>
+      <p:grpSpPr>
+        <a:xfrm>
+          <a:off x="0" y="0"/>
+          <a:ext cx="0" cy="0"/>
+          <a:chOff x="0" y="0"/>
+          <a:chExt cx="0" cy="0"/>
+        </a:xfrm>
+      </p:grpSpPr>
+      <p:sp>
+        <p:nvSpPr>
+          <p:cNvPr id="2" name="Title 1">
+            <a:extLst>
+              <a:ext uri="{FF2B5EF4-FFF2-40B4-BE49-F238E27FC236}">
+                <a16:creationId xmlns:a16="http://schemas.microsoft.com/office/drawing/2014/main" id="{CDCA18A1-AFA1-644C-B2C7-ECD421140330}"/>
+              </a:ext>
+            </a:extLst>
+          </p:cNvPr>
+          <p:cNvSpPr>
+            <a:spLocks noGrp="1"/>
+          </p:cNvSpPr>
+          <p:nvPr>
+            <p:ph type="title"/>
+          </p:nvPr>
+        </p:nvSpPr>
+        <p:spPr/>
+        <p:txBody>
+          <a:bodyPr/>
+          <a:lstStyle/>
+          <a:p>
+            <a:r>
+              <a:rPr lang="en-US" dirty="0"/>
+              <a:t>Pattern-Matching: Python 3.10</a:t>
+            </a:r>
+          </a:p>
+        </p:txBody>
+      </p:sp>
+      <p:sp>
+        <p:nvSpPr>
+          <p:cNvPr id="3" name="Content Placeholder 2">
+            <a:extLst>
+              <a:ext uri="{FF2B5EF4-FFF2-40B4-BE49-F238E27FC236}">
+                <a16:creationId xmlns:a16="http://schemas.microsoft.com/office/drawing/2014/main" id="{127FD841-4A5A-FA41-B7B1-EB2054DBBB84}"/>
+              </a:ext>
+            </a:extLst>
+          </p:cNvPr>
+          <p:cNvSpPr>
+            <a:spLocks noGrp="1"/>
+          </p:cNvSpPr>
+          <p:nvPr>
+            <p:ph idx="1"/>
+          </p:nvPr>
+        </p:nvSpPr>
+        <p:spPr>
+          <a:xfrm>
+            <a:off x="225761" y="2091350"/>
+            <a:ext cx="5875782" cy="4676616"/>
+          </a:xfrm>
+        </p:spPr>
+        <p:txBody>
+          <a:bodyPr>
+            <a:normAutofit/>
+          </a:bodyPr>
+          <a:lstStyle/>
+          <a:p>
+            <a:pPr marL="0" indent="0">
+              <a:buNone/>
+            </a:pPr>
+            <a:r>
+              <a:rPr lang="en-US" dirty="0"/>
+              <a:t>Python 3.10 (released October 4, 2021) introduced the new </a:t>
+            </a:r>
+            <a:r>
+              <a:rPr lang="en-US" i="1" dirty="0"/>
+              <a:t>match-case</a:t>
+            </a:r>
+            <a:r>
+              <a:rPr lang="en-US" dirty="0"/>
+              <a:t> syntax</a:t>
+            </a:r>
+          </a:p>
+          <a:p>
+            <a:pPr lvl="1"/>
+            <a:r>
+              <a:rPr lang="en-US" dirty="0"/>
+              <a:t>Similar to the </a:t>
+            </a:r>
+            <a:r>
+              <a:rPr lang="en-US" i="1" dirty="0"/>
+              <a:t>switch-case</a:t>
+            </a:r>
+            <a:r>
+              <a:rPr lang="en-US" dirty="0"/>
+              <a:t> construction in C/C++</a:t>
+            </a:r>
+          </a:p>
+          <a:p>
+            <a:pPr lvl="1"/>
+            <a:r>
+              <a:rPr lang="en-US" dirty="0"/>
+              <a:t>Usually implicitly includes some form of type-checking and length-matching for short arrays</a:t>
+            </a:r>
+          </a:p>
+          <a:p>
+            <a:pPr marL="0" indent="0">
+              <a:buNone/>
+            </a:pPr>
+            <a:endParaRPr lang="en-US" dirty="0"/>
+          </a:p>
+          <a:p>
+            <a:pPr marL="0" indent="0">
+              <a:buNone/>
+            </a:pPr>
+            <a:endParaRPr lang="en-US" dirty="0"/>
+          </a:p>
+          <a:p>
+            <a:pPr marL="0" indent="0">
+              <a:buNone/>
+            </a:pPr>
+            <a:endParaRPr lang="en-US" dirty="0"/>
+          </a:p>
+          <a:p>
+            <a:pPr marL="0" indent="0">
+              <a:buNone/>
+            </a:pPr>
+            <a:r>
+              <a:rPr lang="en-US" dirty="0"/>
+              <a:t>PEP 636 presents a comprehensive tutorial</a:t>
+            </a:r>
+          </a:p>
+          <a:p>
+            <a:pPr lvl="1"/>
+            <a:r>
+              <a:rPr lang="en-US" dirty="0">
+                <a:hlinkClick r:id="rId2"/>
+              </a:rPr>
+              <a:t>https://peps.python.org</a:t>
+            </a:r>
+            <a:r>
+              <a:rPr lang="en-US" dirty="0"/>
+              <a:t> or google “pep 636”</a:t>
+            </a:r>
+          </a:p>
+        </p:txBody>
+      </p:sp>
+      <p:pic>
+        <p:nvPicPr>
+          <p:cNvPr id="5" name="Picture 4">
+            <a:extLst>
+              <a:ext uri="{FF2B5EF4-FFF2-40B4-BE49-F238E27FC236}">
+                <a16:creationId xmlns:a16="http://schemas.microsoft.com/office/drawing/2014/main" id="{52DA699F-09C7-A64E-B784-457847EA027B}"/>
+              </a:ext>
+            </a:extLst>
+          </p:cNvPr>
+          <p:cNvPicPr>
+            <a:picLocks noChangeAspect="1"/>
+          </p:cNvPicPr>
+          <p:nvPr/>
+        </p:nvPicPr>
+        <p:blipFill>
+          <a:blip r:embed="rId3"/>
+          <a:stretch>
+            <a:fillRect/>
+          </a:stretch>
+        </p:blipFill>
+        <p:spPr>
+          <a:xfrm>
+            <a:off x="6101543" y="2069142"/>
+            <a:ext cx="5978085" cy="4698824"/>
+          </a:xfrm>
+          <a:prstGeom prst="rect">
+            <a:avLst/>
+          </a:prstGeom>
+        </p:spPr>
+      </p:pic>
+    </p:spTree>
+    <p:extLst>
+      <p:ext uri="{BB962C8B-B14F-4D97-AF65-F5344CB8AC3E}">
+        <p14:creationId xmlns:p14="http://schemas.microsoft.com/office/powerpoint/2010/main" val="180599361"/>
+      </p:ext>
+    </p:extLst>
+  </p:cSld>
+  <p:clrMapOvr>
+    <a:masterClrMapping/>
+  </p:clrMapOvr>
+</p:sld>
+</file>
+
+<file path=ppt/slides/slide31.xml><?xml version="1.0" encoding="utf-8"?>
+<p:sld xmlns:a="http://schemas.openxmlformats.org/drawingml/2006/main" xmlns:r="http://schemas.openxmlformats.org/officeDocument/2006/relationships" xmlns:p="http://schemas.openxmlformats.org/presentationml/2006/main">
+  <p:cSld>
+    <p:spTree>
+      <p:nvGrpSpPr>
+        <p:cNvPr id="1" name=""/>
+        <p:cNvGrpSpPr/>
+        <p:nvPr/>
+      </p:nvGrpSpPr>
+      <p:grpSpPr>
+        <a:xfrm>
+          <a:off x="0" y="0"/>
+          <a:ext cx="0" cy="0"/>
+          <a:chOff x="0" y="0"/>
+          <a:chExt cx="0" cy="0"/>
+        </a:xfrm>
+      </p:grpSpPr>
+      <p:sp>
+        <p:nvSpPr>
+          <p:cNvPr id="2" name="Title 1"/>
+          <p:cNvSpPr>
+            <a:spLocks noGrp="1"/>
+          </p:cNvSpPr>
+          <p:nvPr>
+            <p:ph type="title"/>
+          </p:nvPr>
+        </p:nvSpPr>
+        <p:spPr/>
+        <p:txBody>
+          <a:bodyPr/>
+          <a:lstStyle/>
+          <a:p>
+            <a:r>
+              <a:rPr lang="en-US" dirty="0"/>
+              <a:t>Useful Built-In Functions </a:t>
+            </a:r>
+          </a:p>
+        </p:txBody>
+      </p:sp>
+      <p:sp>
+        <p:nvSpPr>
+          <p:cNvPr id="3" name="Content Placeholder 2"/>
+          <p:cNvSpPr>
+            <a:spLocks noGrp="1"/>
+          </p:cNvSpPr>
+          <p:nvPr>
+            <p:ph idx="1"/>
+          </p:nvPr>
+        </p:nvSpPr>
+        <p:spPr>
+          <a:xfrm>
+            <a:off x="680321" y="2336872"/>
+            <a:ext cx="10597279" cy="4234615"/>
+          </a:xfrm>
+        </p:spPr>
+        <p:txBody>
+          <a:bodyPr>
+            <a:normAutofit/>
+          </a:bodyPr>
+          <a:lstStyle/>
+          <a:p>
+            <a:pPr marL="0" indent="0">
+              <a:buNone/>
+            </a:pPr>
+            <a:r>
+              <a:rPr lang="en-US" i="1" dirty="0"/>
+              <a:t>any</a:t>
+            </a:r>
+            <a:r>
+              <a:rPr lang="en-US" dirty="0"/>
+              <a:t>: Iterates over a list/array and determines if at least one element is </a:t>
+            </a:r>
+            <a:r>
+              <a:rPr lang="en-US" i="1" dirty="0"/>
+              <a:t>True</a:t>
+            </a:r>
+            <a:r>
+              <a:rPr lang="en-US" dirty="0"/>
+              <a:t> </a:t>
+            </a:r>
+          </a:p>
+          <a:p>
+            <a:pPr marL="0" indent="0">
+              <a:buNone/>
+            </a:pPr>
+            <a:r>
+              <a:rPr lang="en-US" i="1" dirty="0"/>
+              <a:t>all</a:t>
+            </a:r>
+            <a:r>
+              <a:rPr lang="en-US" dirty="0"/>
+              <a:t>: Iterates over a list/array and determines if all elements are </a:t>
+            </a:r>
+            <a:r>
+              <a:rPr lang="en-US" i="1" dirty="0"/>
+              <a:t>True</a:t>
+            </a:r>
+            <a:r>
+              <a:rPr lang="en-US" dirty="0"/>
+              <a:t> </a:t>
+            </a:r>
+            <a:endParaRPr lang="en-US" i="1" dirty="0"/>
+          </a:p>
+          <a:p>
+            <a:pPr marL="0" indent="0">
+              <a:buNone/>
+            </a:pPr>
+            <a:r>
+              <a:rPr lang="en-US" i="1" dirty="0"/>
+              <a:t>zip</a:t>
+            </a:r>
+            <a:r>
+              <a:rPr lang="en-US" dirty="0"/>
+              <a:t>: Combine lists/arrays into a 2-D list/array component-wise </a:t>
+            </a:r>
+            <a:endParaRPr lang="en-US" i="1" dirty="0"/>
+          </a:p>
+          <a:p>
+            <a:pPr marL="0" indent="0">
+              <a:buNone/>
+            </a:pPr>
+            <a:r>
+              <a:rPr lang="en-US" i="1" dirty="0"/>
+              <a:t>map</a:t>
+            </a:r>
+            <a:r>
+              <a:rPr lang="en-US" dirty="0"/>
+              <a:t>: Iterate a function over an array(s) of values </a:t>
+            </a:r>
+            <a:endParaRPr lang="en-US" i="1" dirty="0"/>
+          </a:p>
+          <a:p>
+            <a:pPr marL="0" indent="0">
+              <a:buNone/>
+            </a:pPr>
+            <a:r>
+              <a:rPr lang="en-US" i="1" dirty="0"/>
+              <a:t>filter</a:t>
+            </a:r>
+            <a:r>
+              <a:rPr lang="en-US" dirty="0"/>
+              <a:t>: Remove elements from a list/array which don’t meet specific criteria </a:t>
+            </a:r>
+          </a:p>
+          <a:p>
+            <a:pPr marL="0" indent="0">
+              <a:buNone/>
+            </a:pPr>
+            <a:r>
+              <a:rPr lang="en-US" i="1" dirty="0"/>
+              <a:t>min</a:t>
+            </a:r>
+            <a:r>
+              <a:rPr lang="en-US" dirty="0"/>
+              <a:t>: Calculate minimum value of some set of numbers </a:t>
+            </a:r>
+            <a:endParaRPr lang="en-US" i="1" dirty="0"/>
+          </a:p>
+          <a:p>
+            <a:pPr marL="0" indent="0">
+              <a:buNone/>
+            </a:pPr>
+            <a:r>
+              <a:rPr lang="en-US" i="1" dirty="0"/>
+              <a:t>max</a:t>
+            </a:r>
+            <a:r>
+              <a:rPr lang="en-US" dirty="0"/>
+              <a:t>: Calculate maximum value of some set of numbers </a:t>
+            </a:r>
+            <a:endParaRPr lang="en-US" i="1" dirty="0"/>
+          </a:p>
+          <a:p>
+            <a:pPr marL="0" indent="0">
+              <a:buNone/>
+            </a:pPr>
+            <a:r>
+              <a:rPr lang="en-US" dirty="0"/>
+              <a:t>In python 3, </a:t>
+            </a:r>
+            <a:r>
+              <a:rPr lang="en-US" i="1" dirty="0"/>
+              <a:t>zip</a:t>
+            </a:r>
+            <a:r>
+              <a:rPr lang="en-US" dirty="0"/>
+              <a:t>, </a:t>
+            </a:r>
+            <a:r>
+              <a:rPr lang="en-US" i="1" dirty="0"/>
+              <a:t>map</a:t>
+            </a:r>
+            <a:r>
+              <a:rPr lang="en-US" dirty="0"/>
+              <a:t>, and </a:t>
+            </a:r>
+            <a:r>
+              <a:rPr lang="en-US" i="1" dirty="0"/>
+              <a:t>filter </a:t>
+            </a:r>
+            <a:r>
+              <a:rPr lang="en-US" dirty="0"/>
+              <a:t>return a special type of object which needs to be cast to a list, tuple, etc. </a:t>
+            </a:r>
+          </a:p>
+          <a:p>
+            <a:pPr marL="0" indent="0">
+              <a:buNone/>
+            </a:pPr>
+            <a:endParaRPr lang="en-US" i="1" dirty="0"/>
+          </a:p>
+        </p:txBody>
+      </p:sp>
+    </p:spTree>
+    <p:extLst>
+      <p:ext uri="{BB962C8B-B14F-4D97-AF65-F5344CB8AC3E}">
+        <p14:creationId xmlns:p14="http://schemas.microsoft.com/office/powerpoint/2010/main" val="598042637"/>
       </p:ext>
     </p:extLst>
   </p:cSld>

</xml_diff>

<commit_message>
slides: minor session 2 updates
</commit_message>
<xml_diff>
--- a/slides/review.pptx
+++ b/slides/review.pptx
@@ -227,7 +227,7 @@
           <a:p>
             <a:fld id="{3E00069D-D4B1-DA43-B156-1FB9179E1249}" type="datetimeFigureOut">
               <a:rPr lang="en-US" smtClean="0"/>
-              <a:t>5/10/22</a:t>
+              <a:t>5/11/22</a:t>
             </a:fld>
             <a:endParaRPr lang="en-US"/>
           </a:p>
@@ -1611,7 +1611,7 @@
           <a:p>
             <a:fld id="{51673806-0BCD-1F42-BAA8-2011034B3C6A}" type="datetimeFigureOut">
               <a:rPr lang="en-US" smtClean="0"/>
-              <a:t>5/10/22</a:t>
+              <a:t>5/11/22</a:t>
             </a:fld>
             <a:endParaRPr lang="en-US" dirty="0"/>
           </a:p>
@@ -2024,7 +2024,7 @@
           <a:p>
             <a:fld id="{51673806-0BCD-1F42-BAA8-2011034B3C6A}" type="datetimeFigureOut">
               <a:rPr lang="en-US" smtClean="0"/>
-              <a:t>5/10/22</a:t>
+              <a:t>5/11/22</a:t>
             </a:fld>
             <a:endParaRPr lang="en-US" dirty="0"/>
           </a:p>
@@ -2355,7 +2355,7 @@
           <a:p>
             <a:fld id="{51673806-0BCD-1F42-BAA8-2011034B3C6A}" type="datetimeFigureOut">
               <a:rPr lang="en-US" smtClean="0"/>
-              <a:t>5/10/22</a:t>
+              <a:t>5/11/22</a:t>
             </a:fld>
             <a:endParaRPr lang="en-US" dirty="0"/>
           </a:p>
@@ -2755,7 +2755,7 @@
           <a:p>
             <a:fld id="{51673806-0BCD-1F42-BAA8-2011034B3C6A}" type="datetimeFigureOut">
               <a:rPr lang="en-US" smtClean="0"/>
-              <a:t>5/10/22</a:t>
+              <a:t>5/11/22</a:t>
             </a:fld>
             <a:endParaRPr lang="en-US" dirty="0"/>
           </a:p>
@@ -3318,7 +3318,7 @@
           <a:p>
             <a:fld id="{51673806-0BCD-1F42-BAA8-2011034B3C6A}" type="datetimeFigureOut">
               <a:rPr lang="en-US" smtClean="0"/>
-              <a:t>5/10/22</a:t>
+              <a:t>5/11/22</a:t>
             </a:fld>
             <a:endParaRPr lang="en-US" dirty="0"/>
           </a:p>
@@ -3994,7 +3994,7 @@
           <a:p>
             <a:fld id="{51673806-0BCD-1F42-BAA8-2011034B3C6A}" type="datetimeFigureOut">
               <a:rPr lang="en-US" smtClean="0"/>
-              <a:t>5/10/22</a:t>
+              <a:t>5/11/22</a:t>
             </a:fld>
             <a:endParaRPr lang="en-US" dirty="0"/>
           </a:p>
@@ -4899,7 +4899,7 @@
           <a:p>
             <a:fld id="{51673806-0BCD-1F42-BAA8-2011034B3C6A}" type="datetimeFigureOut">
               <a:rPr lang="en-US" smtClean="0"/>
-              <a:t>5/10/22</a:t>
+              <a:t>5/11/22</a:t>
             </a:fld>
             <a:endParaRPr lang="en-US" dirty="0"/>
           </a:p>
@@ -5207,7 +5207,7 @@
           <a:p>
             <a:fld id="{51673806-0BCD-1F42-BAA8-2011034B3C6A}" type="datetimeFigureOut">
               <a:rPr lang="en-US" smtClean="0"/>
-              <a:t>5/10/22</a:t>
+              <a:t>5/11/22</a:t>
             </a:fld>
             <a:endParaRPr lang="en-US" dirty="0"/>
           </a:p>
@@ -5466,7 +5466,7 @@
           <a:p>
             <a:fld id="{51673806-0BCD-1F42-BAA8-2011034B3C6A}" type="datetimeFigureOut">
               <a:rPr lang="en-US" smtClean="0"/>
-              <a:t>5/10/22</a:t>
+              <a:t>5/11/22</a:t>
             </a:fld>
             <a:endParaRPr lang="en-US" dirty="0"/>
           </a:p>
@@ -5789,7 +5789,7 @@
           <a:p>
             <a:fld id="{51673806-0BCD-1F42-BAA8-2011034B3C6A}" type="datetimeFigureOut">
               <a:rPr lang="en-US" smtClean="0"/>
-              <a:t>5/10/22</a:t>
+              <a:t>5/11/22</a:t>
             </a:fld>
             <a:endParaRPr lang="en-US" dirty="0"/>
           </a:p>
@@ -6173,7 +6173,7 @@
           <a:p>
             <a:fld id="{51673806-0BCD-1F42-BAA8-2011034B3C6A}" type="datetimeFigureOut">
               <a:rPr lang="en-US" smtClean="0"/>
-              <a:t>5/10/22</a:t>
+              <a:t>5/11/22</a:t>
             </a:fld>
             <a:endParaRPr lang="en-US" dirty="0"/>
           </a:p>
@@ -6549,7 +6549,7 @@
           <a:p>
             <a:fld id="{51673806-0BCD-1F42-BAA8-2011034B3C6A}" type="datetimeFigureOut">
               <a:rPr lang="en-US" smtClean="0"/>
-              <a:t>5/10/22</a:t>
+              <a:t>5/11/22</a:t>
             </a:fld>
             <a:endParaRPr lang="en-US" dirty="0"/>
           </a:p>
@@ -7055,7 +7055,7 @@
           <a:p>
             <a:fld id="{51673806-0BCD-1F42-BAA8-2011034B3C6A}" type="datetimeFigureOut">
               <a:rPr lang="en-US" smtClean="0"/>
-              <a:t>5/10/22</a:t>
+              <a:t>5/11/22</a:t>
             </a:fld>
             <a:endParaRPr lang="en-US" dirty="0"/>
           </a:p>
@@ -7312,7 +7312,7 @@
           <a:p>
             <a:fld id="{51673806-0BCD-1F42-BAA8-2011034B3C6A}" type="datetimeFigureOut">
               <a:rPr lang="en-US" smtClean="0"/>
-              <a:t>5/10/22</a:t>
+              <a:t>5/11/22</a:t>
             </a:fld>
             <a:endParaRPr lang="en-US" dirty="0"/>
           </a:p>
@@ -7470,7 +7470,7 @@
           <a:p>
             <a:fld id="{51673806-0BCD-1F42-BAA8-2011034B3C6A}" type="datetimeFigureOut">
               <a:rPr lang="en-US" smtClean="0"/>
-              <a:t>5/10/22</a:t>
+              <a:t>5/11/22</a:t>
             </a:fld>
             <a:endParaRPr lang="en-US" dirty="0"/>
           </a:p>
@@ -7860,7 +7860,7 @@
           <a:p>
             <a:fld id="{51673806-0BCD-1F42-BAA8-2011034B3C6A}" type="datetimeFigureOut">
               <a:rPr lang="en-US" smtClean="0"/>
-              <a:t>5/10/22</a:t>
+              <a:t>5/11/22</a:t>
             </a:fld>
             <a:endParaRPr lang="en-US" dirty="0"/>
           </a:p>
@@ -8268,7 +8268,7 @@
           <a:p>
             <a:fld id="{51673806-0BCD-1F42-BAA8-2011034B3C6A}" type="datetimeFigureOut">
               <a:rPr lang="en-US" smtClean="0"/>
-              <a:t>5/10/22</a:t>
+              <a:t>5/11/22</a:t>
             </a:fld>
             <a:endParaRPr lang="en-US" dirty="0"/>
           </a:p>
@@ -8513,7 +8513,7 @@
             <a:fld id="{51673806-0BCD-1F42-BAA8-2011034B3C6A}" type="datetimeFigureOut">
               <a:rPr lang="en-US" smtClean="0"/>
               <a:pPr/>
-              <a:t>5/10/22</a:t>
+              <a:t>5/11/22</a:t>
             </a:fld>
             <a:endParaRPr lang="en-US" dirty="0"/>
           </a:p>
@@ -10565,7 +10565,7 @@
             </a:r>
             <a:r>
               <a:rPr lang="en-US" dirty="0"/>
-              <a:t>is simply </a:t>
+              <a:t>are simply </a:t>
             </a:r>
             <a:r>
               <a:rPr lang="en-US" i="1" dirty="0"/>

</xml_diff>

<commit_message>
presenter notes added to review slides
</commit_message>
<xml_diff>
--- a/slides/review.pptx
+++ b/slides/review.pptx
@@ -227,7 +227,7 @@
           <a:p>
             <a:fld id="{3E00069D-D4B1-DA43-B156-1FB9179E1249}" type="datetimeFigureOut">
               <a:rPr lang="en-US" smtClean="0"/>
-              <a:t>5/11/22</a:t>
+              <a:t>5/17/23</a:t>
             </a:fld>
             <a:endParaRPr lang="en-US"/>
           </a:p>
@@ -538,18 +538,37 @@
           <a:bodyPr/>
           <a:lstStyle/>
           <a:p>
-            <a:r>
-              <a:rPr lang="en-US" dirty="0"/>
-              <a:t>There’s also the </a:t>
+            <a:pPr marL="0" marR="0" lvl="0" indent="0" algn="l" defTabSz="914400" rtl="0" eaLnBrk="1" fontAlgn="auto" latinLnBrk="0" hangingPunct="1">
+              <a:lnSpc>
+                <a:spcPct val="100000"/>
+              </a:lnSpc>
+              <a:spcBef>
+                <a:spcPts val="0"/>
+              </a:spcBef>
+              <a:spcAft>
+                <a:spcPts val="0"/>
+              </a:spcAft>
+              <a:buClrTx/>
+              <a:buSzTx/>
+              <a:buFontTx/>
+              <a:buNone/>
+              <a:tabLst/>
+              <a:defRPr/>
+            </a:pPr>
+            <a:r>
+              <a:rPr lang="en-US" dirty="0"/>
+              <a:t>We will be reviewing some of the basic data types, functions, conditionals </a:t>
             </a:r>
             <a:r>
               <a:rPr lang="en-US" dirty="0" err="1"/>
-              <a:t>str.join</a:t>
-            </a:r>
-            <a:r>
-              <a:rPr lang="en-US" baseline="0" dirty="0"/>
-              <a:t> function, but if all you’re looking for a simple string concatenation, I find that the += operator is simply more straight-forward and more readable. </a:t>
-            </a:r>
+              <a:t>etc</a:t>
+            </a:r>
+            <a:r>
+              <a:rPr lang="en-US" dirty="0"/>
+              <a:t> in python . We expect that most of you are already familiar with the topics today so we will be going through all of the content briefly.</a:t>
+            </a:r>
+          </a:p>
+          <a:p>
             <a:endParaRPr lang="en-US" dirty="0"/>
           </a:p>
         </p:txBody>
@@ -561,7 +580,7 @@
             <a:spLocks noGrp="1"/>
           </p:cNvSpPr>
           <p:nvPr>
-            <p:ph type="sldNum" sz="quarter" idx="10"/>
+            <p:ph type="sldNum" sz="quarter" idx="5"/>
           </p:nvPr>
         </p:nvSpPr>
         <p:spPr/>
@@ -571,7 +590,7 @@
           <a:p>
             <a:fld id="{A10D7ED9-0168-6F49-A704-0689E647D42E}" type="slidenum">
               <a:rPr lang="en-US" smtClean="0"/>
-              <a:t>4</a:t>
+              <a:t>2</a:t>
             </a:fld>
             <a:endParaRPr lang="en-US"/>
           </a:p>
@@ -580,7 +599,1066 @@
     </p:spTree>
     <p:extLst>
       <p:ext uri="{BB962C8B-B14F-4D97-AF65-F5344CB8AC3E}">
-        <p14:creationId xmlns:p14="http://schemas.microsoft.com/office/powerpoint/2010/main" val="1977311223"/>
+        <p14:creationId xmlns:p14="http://schemas.microsoft.com/office/powerpoint/2010/main" val="760826870"/>
+      </p:ext>
+    </p:extLst>
+  </p:cSld>
+  <p:clrMapOvr>
+    <a:masterClrMapping/>
+  </p:clrMapOvr>
+</p:notes>
+</file>
+
+<file path=ppt/notesSlides/notesSlide10.xml><?xml version="1.0" encoding="utf-8"?>
+<p:notes xmlns:a="http://schemas.openxmlformats.org/drawingml/2006/main" xmlns:r="http://schemas.openxmlformats.org/officeDocument/2006/relationships" xmlns:p="http://schemas.openxmlformats.org/presentationml/2006/main">
+  <p:cSld>
+    <p:spTree>
+      <p:nvGrpSpPr>
+        <p:cNvPr id="1" name=""/>
+        <p:cNvGrpSpPr/>
+        <p:nvPr/>
+      </p:nvGrpSpPr>
+      <p:grpSpPr>
+        <a:xfrm>
+          <a:off x="0" y="0"/>
+          <a:ext cx="0" cy="0"/>
+          <a:chOff x="0" y="0"/>
+          <a:chExt cx="0" cy="0"/>
+        </a:xfrm>
+      </p:grpSpPr>
+      <p:sp>
+        <p:nvSpPr>
+          <p:cNvPr id="2" name="Slide Image Placeholder 1"/>
+          <p:cNvSpPr>
+            <a:spLocks noGrp="1" noRot="1" noChangeAspect="1"/>
+          </p:cNvSpPr>
+          <p:nvPr>
+            <p:ph type="sldImg"/>
+          </p:nvPr>
+        </p:nvSpPr>
+        <p:spPr/>
+      </p:sp>
+      <p:sp>
+        <p:nvSpPr>
+          <p:cNvPr id="3" name="Notes Placeholder 2"/>
+          <p:cNvSpPr>
+            <a:spLocks noGrp="1"/>
+          </p:cNvSpPr>
+          <p:nvPr>
+            <p:ph type="body" idx="1"/>
+          </p:nvPr>
+        </p:nvSpPr>
+        <p:spPr/>
+        <p:txBody>
+          <a:bodyPr/>
+          <a:lstStyle/>
+          <a:p>
+            <a:r>
+              <a:rPr lang="en-US" dirty="0"/>
+              <a:t>Have the students parrot this statement back to you </a:t>
+            </a:r>
+          </a:p>
+          <a:p>
+            <a:endParaRPr lang="en-US" dirty="0"/>
+          </a:p>
+          <a:p>
+            <a:pPr marL="0" marR="0" lvl="0" indent="0" algn="l" defTabSz="914400" rtl="0" eaLnBrk="1" fontAlgn="auto" latinLnBrk="0" hangingPunct="1">
+              <a:lnSpc>
+                <a:spcPct val="100000"/>
+              </a:lnSpc>
+              <a:spcBef>
+                <a:spcPts val="0"/>
+              </a:spcBef>
+              <a:spcAft>
+                <a:spcPts val="0"/>
+              </a:spcAft>
+              <a:buClrTx/>
+              <a:buSzTx/>
+              <a:buFontTx/>
+              <a:buNone/>
+              <a:tabLst/>
+              <a:defRPr/>
+            </a:pPr>
+            <a:r>
+              <a:rPr lang="en-US" dirty="0"/>
+              <a:t>arrays are a type of container that can hold a fixed number of elements of the same data type</a:t>
+            </a:r>
+          </a:p>
+          <a:p>
+            <a:endParaRPr lang="en-US" dirty="0"/>
+          </a:p>
+        </p:txBody>
+      </p:sp>
+      <p:sp>
+        <p:nvSpPr>
+          <p:cNvPr id="4" name="Slide Number Placeholder 3"/>
+          <p:cNvSpPr>
+            <a:spLocks noGrp="1"/>
+          </p:cNvSpPr>
+          <p:nvPr>
+            <p:ph type="sldNum" sz="quarter" idx="10"/>
+          </p:nvPr>
+        </p:nvSpPr>
+        <p:spPr/>
+        <p:txBody>
+          <a:bodyPr/>
+          <a:lstStyle/>
+          <a:p>
+            <a:fld id="{A10D7ED9-0168-6F49-A704-0689E647D42E}" type="slidenum">
+              <a:rPr lang="en-US" smtClean="0"/>
+              <a:t>13</a:t>
+            </a:fld>
+            <a:endParaRPr lang="en-US"/>
+          </a:p>
+        </p:txBody>
+      </p:sp>
+    </p:spTree>
+    <p:extLst>
+      <p:ext uri="{BB962C8B-B14F-4D97-AF65-F5344CB8AC3E}">
+        <p14:creationId xmlns:p14="http://schemas.microsoft.com/office/powerpoint/2010/main" val="1857295964"/>
+      </p:ext>
+    </p:extLst>
+  </p:cSld>
+  <p:clrMapOvr>
+    <a:masterClrMapping/>
+  </p:clrMapOvr>
+</p:notes>
+</file>
+
+<file path=ppt/notesSlides/notesSlide11.xml><?xml version="1.0" encoding="utf-8"?>
+<p:notes xmlns:a="http://schemas.openxmlformats.org/drawingml/2006/main" xmlns:r="http://schemas.openxmlformats.org/officeDocument/2006/relationships" xmlns:p="http://schemas.openxmlformats.org/presentationml/2006/main">
+  <p:cSld>
+    <p:spTree>
+      <p:nvGrpSpPr>
+        <p:cNvPr id="1" name=""/>
+        <p:cNvGrpSpPr/>
+        <p:nvPr/>
+      </p:nvGrpSpPr>
+      <p:grpSpPr>
+        <a:xfrm>
+          <a:off x="0" y="0"/>
+          <a:ext cx="0" cy="0"/>
+          <a:chOff x="0" y="0"/>
+          <a:chExt cx="0" cy="0"/>
+        </a:xfrm>
+      </p:grpSpPr>
+      <p:sp>
+        <p:nvSpPr>
+          <p:cNvPr id="2" name="Slide Image Placeholder 1"/>
+          <p:cNvSpPr>
+            <a:spLocks noGrp="1" noRot="1" noChangeAspect="1"/>
+          </p:cNvSpPr>
+          <p:nvPr>
+            <p:ph type="sldImg"/>
+          </p:nvPr>
+        </p:nvSpPr>
+        <p:spPr/>
+      </p:sp>
+      <p:sp>
+        <p:nvSpPr>
+          <p:cNvPr id="3" name="Notes Placeholder 2"/>
+          <p:cNvSpPr>
+            <a:spLocks noGrp="1"/>
+          </p:cNvSpPr>
+          <p:nvPr>
+            <p:ph type="body" idx="1"/>
+          </p:nvPr>
+        </p:nvSpPr>
+        <p:spPr/>
+        <p:txBody>
+          <a:bodyPr/>
+          <a:lstStyle/>
+          <a:p>
+            <a:r>
+              <a:rPr lang="en-US" dirty="0"/>
+              <a:t>NumPy is a library for working with arrays and numerical operations. </a:t>
+            </a:r>
+            <a:r>
+              <a:rPr lang="en-US" dirty="0" err="1"/>
+              <a:t>ndarray</a:t>
+            </a:r>
+            <a:r>
+              <a:rPr lang="en-US" dirty="0"/>
+              <a:t> is the primary data structure in NumPy that represents a multidimensional, homogeneous array of fixed-size items.</a:t>
+            </a:r>
+          </a:p>
+          <a:p>
+            <a:pPr marL="0" marR="0" lvl="0" indent="0" algn="l" defTabSz="914400" rtl="0" eaLnBrk="1" fontAlgn="auto" latinLnBrk="0" hangingPunct="1">
+              <a:lnSpc>
+                <a:spcPct val="100000"/>
+              </a:lnSpc>
+              <a:spcBef>
+                <a:spcPts val="0"/>
+              </a:spcBef>
+              <a:spcAft>
+                <a:spcPts val="0"/>
+              </a:spcAft>
+              <a:buClrTx/>
+              <a:buSzTx/>
+              <a:buFontTx/>
+              <a:buNone/>
+              <a:tabLst/>
+              <a:defRPr/>
+            </a:pPr>
+            <a:r>
+              <a:rPr lang="en-US" dirty="0"/>
+              <a:t>Range creates a sequence of integers from 0 up to, but not including, 10. stop number will not be counted</a:t>
+            </a:r>
+          </a:p>
+          <a:p>
+            <a:endParaRPr lang="en-US" dirty="0"/>
+          </a:p>
+          <a:p>
+            <a:endParaRPr lang="en-US" dirty="0"/>
+          </a:p>
+        </p:txBody>
+      </p:sp>
+      <p:sp>
+        <p:nvSpPr>
+          <p:cNvPr id="4" name="Slide Number Placeholder 3"/>
+          <p:cNvSpPr>
+            <a:spLocks noGrp="1"/>
+          </p:cNvSpPr>
+          <p:nvPr>
+            <p:ph type="sldNum" sz="quarter" idx="5"/>
+          </p:nvPr>
+        </p:nvSpPr>
+        <p:spPr/>
+        <p:txBody>
+          <a:bodyPr/>
+          <a:lstStyle/>
+          <a:p>
+            <a:fld id="{A10D7ED9-0168-6F49-A704-0689E647D42E}" type="slidenum">
+              <a:rPr lang="en-US" smtClean="0"/>
+              <a:t>14</a:t>
+            </a:fld>
+            <a:endParaRPr lang="en-US"/>
+          </a:p>
+        </p:txBody>
+      </p:sp>
+    </p:spTree>
+    <p:extLst>
+      <p:ext uri="{BB962C8B-B14F-4D97-AF65-F5344CB8AC3E}">
+        <p14:creationId xmlns:p14="http://schemas.microsoft.com/office/powerpoint/2010/main" val="2927741606"/>
+      </p:ext>
+    </p:extLst>
+  </p:cSld>
+  <p:clrMapOvr>
+    <a:masterClrMapping/>
+  </p:clrMapOvr>
+</p:notes>
+</file>
+
+<file path=ppt/notesSlides/notesSlide12.xml><?xml version="1.0" encoding="utf-8"?>
+<p:notes xmlns:a="http://schemas.openxmlformats.org/drawingml/2006/main" xmlns:r="http://schemas.openxmlformats.org/officeDocument/2006/relationships" xmlns:p="http://schemas.openxmlformats.org/presentationml/2006/main">
+  <p:cSld>
+    <p:spTree>
+      <p:nvGrpSpPr>
+        <p:cNvPr id="1" name=""/>
+        <p:cNvGrpSpPr/>
+        <p:nvPr/>
+      </p:nvGrpSpPr>
+      <p:grpSpPr>
+        <a:xfrm>
+          <a:off x="0" y="0"/>
+          <a:ext cx="0" cy="0"/>
+          <a:chOff x="0" y="0"/>
+          <a:chExt cx="0" cy="0"/>
+        </a:xfrm>
+      </p:grpSpPr>
+      <p:sp>
+        <p:nvSpPr>
+          <p:cNvPr id="2" name="Slide Image Placeholder 1"/>
+          <p:cNvSpPr>
+            <a:spLocks noGrp="1" noRot="1" noChangeAspect="1"/>
+          </p:cNvSpPr>
+          <p:nvPr>
+            <p:ph type="sldImg"/>
+          </p:nvPr>
+        </p:nvSpPr>
+        <p:spPr/>
+      </p:sp>
+      <p:sp>
+        <p:nvSpPr>
+          <p:cNvPr id="3" name="Notes Placeholder 2"/>
+          <p:cNvSpPr>
+            <a:spLocks noGrp="1"/>
+          </p:cNvSpPr>
+          <p:nvPr>
+            <p:ph type="body" idx="1"/>
+          </p:nvPr>
+        </p:nvSpPr>
+        <p:spPr/>
+        <p:txBody>
+          <a:bodyPr/>
+          <a:lstStyle/>
+          <a:p>
+            <a:pPr marL="0" marR="0" lvl="0" indent="0" algn="l" defTabSz="914400" rtl="0" eaLnBrk="1" fontAlgn="auto" latinLnBrk="0" hangingPunct="1">
+              <a:lnSpc>
+                <a:spcPct val="100000"/>
+              </a:lnSpc>
+              <a:spcBef>
+                <a:spcPts val="0"/>
+              </a:spcBef>
+              <a:spcAft>
+                <a:spcPts val="0"/>
+              </a:spcAft>
+              <a:buClrTx/>
+              <a:buSzTx/>
+              <a:buFontTx/>
+              <a:buNone/>
+              <a:tabLst/>
+              <a:defRPr/>
+            </a:pPr>
+            <a:r>
+              <a:rPr lang="en-US" dirty="0"/>
+              <a:t>Slicing arrays, please pay attention to this slide because this is a frequently occurring concept, and I still have google the syntax sometimes to figure how to do it. So first of all why do we need it. For this I will give an example since there are many astronomers in the room, suppose I am doing a time series analysis of a star for 100 days, I have recorded the luminosity of the star on </a:t>
+            </a:r>
+            <a:r>
+              <a:rPr lang="en-US" dirty="0" err="1"/>
+              <a:t>eah</a:t>
+            </a:r>
+            <a:r>
+              <a:rPr lang="en-US" dirty="0"/>
+              <a:t> day, so I have an array of 100 data points. Now if I only want to see how it varies from day 1 to 20 , or day 50 to 100 , how do I extract only those data points</a:t>
+            </a:r>
+          </a:p>
+          <a:p>
+            <a:endParaRPr lang="en-US" dirty="0"/>
+          </a:p>
+        </p:txBody>
+      </p:sp>
+      <p:sp>
+        <p:nvSpPr>
+          <p:cNvPr id="4" name="Slide Number Placeholder 3"/>
+          <p:cNvSpPr>
+            <a:spLocks noGrp="1"/>
+          </p:cNvSpPr>
+          <p:nvPr>
+            <p:ph type="sldNum" sz="quarter" idx="5"/>
+          </p:nvPr>
+        </p:nvSpPr>
+        <p:spPr/>
+        <p:txBody>
+          <a:bodyPr/>
+          <a:lstStyle/>
+          <a:p>
+            <a:fld id="{A10D7ED9-0168-6F49-A704-0689E647D42E}" type="slidenum">
+              <a:rPr lang="en-US" smtClean="0"/>
+              <a:t>16</a:t>
+            </a:fld>
+            <a:endParaRPr lang="en-US"/>
+          </a:p>
+        </p:txBody>
+      </p:sp>
+    </p:spTree>
+    <p:extLst>
+      <p:ext uri="{BB962C8B-B14F-4D97-AF65-F5344CB8AC3E}">
+        <p14:creationId xmlns:p14="http://schemas.microsoft.com/office/powerpoint/2010/main" val="533132308"/>
+      </p:ext>
+    </p:extLst>
+  </p:cSld>
+  <p:clrMapOvr>
+    <a:masterClrMapping/>
+  </p:clrMapOvr>
+</p:notes>
+</file>
+
+<file path=ppt/notesSlides/notesSlide13.xml><?xml version="1.0" encoding="utf-8"?>
+<p:notes xmlns:a="http://schemas.openxmlformats.org/drawingml/2006/main" xmlns:r="http://schemas.openxmlformats.org/officeDocument/2006/relationships" xmlns:p="http://schemas.openxmlformats.org/presentationml/2006/main">
+  <p:cSld>
+    <p:spTree>
+      <p:nvGrpSpPr>
+        <p:cNvPr id="1" name=""/>
+        <p:cNvGrpSpPr/>
+        <p:nvPr/>
+      </p:nvGrpSpPr>
+      <p:grpSpPr>
+        <a:xfrm>
+          <a:off x="0" y="0"/>
+          <a:ext cx="0" cy="0"/>
+          <a:chOff x="0" y="0"/>
+          <a:chExt cx="0" cy="0"/>
+        </a:xfrm>
+      </p:grpSpPr>
+      <p:sp>
+        <p:nvSpPr>
+          <p:cNvPr id="2" name="Slide Image Placeholder 1"/>
+          <p:cNvSpPr>
+            <a:spLocks noGrp="1" noRot="1" noChangeAspect="1"/>
+          </p:cNvSpPr>
+          <p:nvPr>
+            <p:ph type="sldImg"/>
+          </p:nvPr>
+        </p:nvSpPr>
+        <p:spPr/>
+      </p:sp>
+      <p:sp>
+        <p:nvSpPr>
+          <p:cNvPr id="3" name="Notes Placeholder 2"/>
+          <p:cNvSpPr>
+            <a:spLocks noGrp="1"/>
+          </p:cNvSpPr>
+          <p:nvPr>
+            <p:ph type="body" idx="1"/>
+          </p:nvPr>
+        </p:nvSpPr>
+        <p:spPr/>
+        <p:txBody>
+          <a:bodyPr/>
+          <a:lstStyle/>
+          <a:p>
+            <a:pPr marL="0" marR="0" lvl="0" indent="0" algn="l" defTabSz="914400" rtl="0" eaLnBrk="1" fontAlgn="auto" latinLnBrk="0" hangingPunct="1">
+              <a:lnSpc>
+                <a:spcPct val="100000"/>
+              </a:lnSpc>
+              <a:spcBef>
+                <a:spcPts val="0"/>
+              </a:spcBef>
+              <a:spcAft>
+                <a:spcPts val="0"/>
+              </a:spcAft>
+              <a:buClrTx/>
+              <a:buSzTx/>
+              <a:buFontTx/>
+              <a:buNone/>
+              <a:tabLst/>
+              <a:defRPr/>
+            </a:pPr>
+            <a:r>
+              <a:rPr lang="en-US" dirty="0"/>
+              <a:t>For input [3] we have x= 0, the if statement checks if x&gt;=0 and since that condition is satisfied it printed x is positive, it did not move to the second condition of </a:t>
+            </a:r>
+            <a:r>
+              <a:rPr lang="en-US" dirty="0" err="1"/>
+              <a:t>elif</a:t>
+            </a:r>
+            <a:r>
+              <a:rPr lang="en-US" dirty="0"/>
+              <a:t> x==0, so this means we can get the results from only one out these conditions. It goes in the order of if-</a:t>
+            </a:r>
+            <a:r>
+              <a:rPr lang="en-US" dirty="0" err="1"/>
+              <a:t>elif</a:t>
+            </a:r>
+            <a:r>
+              <a:rPr lang="en-US" dirty="0"/>
+              <a:t>---else</a:t>
+            </a:r>
+          </a:p>
+          <a:p>
+            <a:endParaRPr lang="en-US" dirty="0"/>
+          </a:p>
+        </p:txBody>
+      </p:sp>
+      <p:sp>
+        <p:nvSpPr>
+          <p:cNvPr id="4" name="Slide Number Placeholder 3"/>
+          <p:cNvSpPr>
+            <a:spLocks noGrp="1"/>
+          </p:cNvSpPr>
+          <p:nvPr>
+            <p:ph type="sldNum" sz="quarter" idx="5"/>
+          </p:nvPr>
+        </p:nvSpPr>
+        <p:spPr/>
+        <p:txBody>
+          <a:bodyPr/>
+          <a:lstStyle/>
+          <a:p>
+            <a:fld id="{A10D7ED9-0168-6F49-A704-0689E647D42E}" type="slidenum">
+              <a:rPr lang="en-US" smtClean="0"/>
+              <a:t>17</a:t>
+            </a:fld>
+            <a:endParaRPr lang="en-US"/>
+          </a:p>
+        </p:txBody>
+      </p:sp>
+    </p:spTree>
+    <p:extLst>
+      <p:ext uri="{BB962C8B-B14F-4D97-AF65-F5344CB8AC3E}">
+        <p14:creationId xmlns:p14="http://schemas.microsoft.com/office/powerpoint/2010/main" val="1675841178"/>
+      </p:ext>
+    </p:extLst>
+  </p:cSld>
+  <p:clrMapOvr>
+    <a:masterClrMapping/>
+  </p:clrMapOvr>
+</p:notes>
+</file>
+
+<file path=ppt/notesSlides/notesSlide14.xml><?xml version="1.0" encoding="utf-8"?>
+<p:notes xmlns:a="http://schemas.openxmlformats.org/drawingml/2006/main" xmlns:r="http://schemas.openxmlformats.org/officeDocument/2006/relationships" xmlns:p="http://schemas.openxmlformats.org/presentationml/2006/main">
+  <p:cSld>
+    <p:spTree>
+      <p:nvGrpSpPr>
+        <p:cNvPr id="1" name=""/>
+        <p:cNvGrpSpPr/>
+        <p:nvPr/>
+      </p:nvGrpSpPr>
+      <p:grpSpPr>
+        <a:xfrm>
+          <a:off x="0" y="0"/>
+          <a:ext cx="0" cy="0"/>
+          <a:chOff x="0" y="0"/>
+          <a:chExt cx="0" cy="0"/>
+        </a:xfrm>
+      </p:grpSpPr>
+      <p:sp>
+        <p:nvSpPr>
+          <p:cNvPr id="2" name="Slide Image Placeholder 1"/>
+          <p:cNvSpPr>
+            <a:spLocks noGrp="1" noRot="1" noChangeAspect="1"/>
+          </p:cNvSpPr>
+          <p:nvPr>
+            <p:ph type="sldImg"/>
+          </p:nvPr>
+        </p:nvSpPr>
+        <p:spPr/>
+      </p:sp>
+      <p:sp>
+        <p:nvSpPr>
+          <p:cNvPr id="3" name="Notes Placeholder 2"/>
+          <p:cNvSpPr>
+            <a:spLocks noGrp="1"/>
+          </p:cNvSpPr>
+          <p:nvPr>
+            <p:ph type="body" idx="1"/>
+          </p:nvPr>
+        </p:nvSpPr>
+        <p:spPr/>
+        <p:txBody>
+          <a:bodyPr/>
+          <a:lstStyle/>
+          <a:p>
+            <a:pPr marL="0" marR="0" lvl="0" indent="0" algn="l" defTabSz="914400" rtl="0" eaLnBrk="1" fontAlgn="auto" latinLnBrk="0" hangingPunct="1">
+              <a:lnSpc>
+                <a:spcPct val="100000"/>
+              </a:lnSpc>
+              <a:spcBef>
+                <a:spcPts val="0"/>
+              </a:spcBef>
+              <a:spcAft>
+                <a:spcPts val="0"/>
+              </a:spcAft>
+              <a:buClrTx/>
+              <a:buSzTx/>
+              <a:buFontTx/>
+              <a:buNone/>
+              <a:tabLst/>
+              <a:defRPr/>
+            </a:pPr>
+            <a:r>
+              <a:rPr lang="en-US" dirty="0"/>
+              <a:t>For input [3] we have x= 0, the if statement checks if x&gt;=0 and since that condition is satisfied it printed x is positive, it did not move to the second condition of </a:t>
+            </a:r>
+            <a:r>
+              <a:rPr lang="en-US" dirty="0" err="1"/>
+              <a:t>elif</a:t>
+            </a:r>
+            <a:r>
+              <a:rPr lang="en-US" dirty="0"/>
+              <a:t> x==0, so this means we can get the results from only one out these conditions. It goes in the order of if-</a:t>
+            </a:r>
+            <a:r>
+              <a:rPr lang="en-US" dirty="0" err="1"/>
+              <a:t>elif</a:t>
+            </a:r>
+            <a:r>
+              <a:rPr lang="en-US" dirty="0"/>
+              <a:t>---else</a:t>
+            </a:r>
+          </a:p>
+          <a:p>
+            <a:endParaRPr lang="en-US" dirty="0"/>
+          </a:p>
+        </p:txBody>
+      </p:sp>
+      <p:sp>
+        <p:nvSpPr>
+          <p:cNvPr id="4" name="Slide Number Placeholder 3"/>
+          <p:cNvSpPr>
+            <a:spLocks noGrp="1"/>
+          </p:cNvSpPr>
+          <p:nvPr>
+            <p:ph type="sldNum" sz="quarter" idx="5"/>
+          </p:nvPr>
+        </p:nvSpPr>
+        <p:spPr/>
+        <p:txBody>
+          <a:bodyPr/>
+          <a:lstStyle/>
+          <a:p>
+            <a:fld id="{A10D7ED9-0168-6F49-A704-0689E647D42E}" type="slidenum">
+              <a:rPr lang="en-US" smtClean="0"/>
+              <a:t>18</a:t>
+            </a:fld>
+            <a:endParaRPr lang="en-US"/>
+          </a:p>
+        </p:txBody>
+      </p:sp>
+    </p:spTree>
+    <p:extLst>
+      <p:ext uri="{BB962C8B-B14F-4D97-AF65-F5344CB8AC3E}">
+        <p14:creationId xmlns:p14="http://schemas.microsoft.com/office/powerpoint/2010/main" val="1321508217"/>
+      </p:ext>
+    </p:extLst>
+  </p:cSld>
+  <p:clrMapOvr>
+    <a:masterClrMapping/>
+  </p:clrMapOvr>
+</p:notes>
+</file>
+
+<file path=ppt/notesSlides/notesSlide15.xml><?xml version="1.0" encoding="utf-8"?>
+<p:notes xmlns:a="http://schemas.openxmlformats.org/drawingml/2006/main" xmlns:r="http://schemas.openxmlformats.org/officeDocument/2006/relationships" xmlns:p="http://schemas.openxmlformats.org/presentationml/2006/main">
+  <p:cSld>
+    <p:spTree>
+      <p:nvGrpSpPr>
+        <p:cNvPr id="1" name=""/>
+        <p:cNvGrpSpPr/>
+        <p:nvPr/>
+      </p:nvGrpSpPr>
+      <p:grpSpPr>
+        <a:xfrm>
+          <a:off x="0" y="0"/>
+          <a:ext cx="0" cy="0"/>
+          <a:chOff x="0" y="0"/>
+          <a:chExt cx="0" cy="0"/>
+        </a:xfrm>
+      </p:grpSpPr>
+      <p:sp>
+        <p:nvSpPr>
+          <p:cNvPr id="2" name="Slide Image Placeholder 1"/>
+          <p:cNvSpPr>
+            <a:spLocks noGrp="1" noRot="1" noChangeAspect="1"/>
+          </p:cNvSpPr>
+          <p:nvPr>
+            <p:ph type="sldImg"/>
+          </p:nvPr>
+        </p:nvSpPr>
+        <p:spPr/>
+      </p:sp>
+      <p:sp>
+        <p:nvSpPr>
+          <p:cNvPr id="3" name="Notes Placeholder 2"/>
+          <p:cNvSpPr>
+            <a:spLocks noGrp="1"/>
+          </p:cNvSpPr>
+          <p:nvPr>
+            <p:ph type="body" idx="1"/>
+          </p:nvPr>
+        </p:nvSpPr>
+        <p:spPr/>
+        <p:txBody>
+          <a:bodyPr/>
+          <a:lstStyle/>
+          <a:p>
+            <a:endParaRPr lang="en-US" dirty="0"/>
+          </a:p>
+        </p:txBody>
+      </p:sp>
+      <p:sp>
+        <p:nvSpPr>
+          <p:cNvPr id="4" name="Slide Number Placeholder 3"/>
+          <p:cNvSpPr>
+            <a:spLocks noGrp="1"/>
+          </p:cNvSpPr>
+          <p:nvPr>
+            <p:ph type="sldNum" sz="quarter" idx="5"/>
+          </p:nvPr>
+        </p:nvSpPr>
+        <p:spPr/>
+        <p:txBody>
+          <a:bodyPr/>
+          <a:lstStyle/>
+          <a:p>
+            <a:fld id="{A10D7ED9-0168-6F49-A704-0689E647D42E}" type="slidenum">
+              <a:rPr lang="en-US" smtClean="0"/>
+              <a:t>19</a:t>
+            </a:fld>
+            <a:endParaRPr lang="en-US"/>
+          </a:p>
+        </p:txBody>
+      </p:sp>
+    </p:spTree>
+    <p:extLst>
+      <p:ext uri="{BB962C8B-B14F-4D97-AF65-F5344CB8AC3E}">
+        <p14:creationId xmlns:p14="http://schemas.microsoft.com/office/powerpoint/2010/main" val="705247091"/>
+      </p:ext>
+    </p:extLst>
+  </p:cSld>
+  <p:clrMapOvr>
+    <a:masterClrMapping/>
+  </p:clrMapOvr>
+</p:notes>
+</file>
+
+<file path=ppt/notesSlides/notesSlide16.xml><?xml version="1.0" encoding="utf-8"?>
+<p:notes xmlns:a="http://schemas.openxmlformats.org/drawingml/2006/main" xmlns:r="http://schemas.openxmlformats.org/officeDocument/2006/relationships" xmlns:p="http://schemas.openxmlformats.org/presentationml/2006/main">
+  <p:cSld>
+    <p:spTree>
+      <p:nvGrpSpPr>
+        <p:cNvPr id="1" name=""/>
+        <p:cNvGrpSpPr/>
+        <p:nvPr/>
+      </p:nvGrpSpPr>
+      <p:grpSpPr>
+        <a:xfrm>
+          <a:off x="0" y="0"/>
+          <a:ext cx="0" cy="0"/>
+          <a:chOff x="0" y="0"/>
+          <a:chExt cx="0" cy="0"/>
+        </a:xfrm>
+      </p:grpSpPr>
+      <p:sp>
+        <p:nvSpPr>
+          <p:cNvPr id="2" name="Slide Image Placeholder 1"/>
+          <p:cNvSpPr>
+            <a:spLocks noGrp="1" noRot="1" noChangeAspect="1"/>
+          </p:cNvSpPr>
+          <p:nvPr>
+            <p:ph type="sldImg"/>
+          </p:nvPr>
+        </p:nvSpPr>
+        <p:spPr/>
+      </p:sp>
+      <p:sp>
+        <p:nvSpPr>
+          <p:cNvPr id="3" name="Notes Placeholder 2"/>
+          <p:cNvSpPr>
+            <a:spLocks noGrp="1"/>
+          </p:cNvSpPr>
+          <p:nvPr>
+            <p:ph type="body" idx="1"/>
+          </p:nvPr>
+        </p:nvSpPr>
+        <p:spPr/>
+        <p:txBody>
+          <a:bodyPr/>
+          <a:lstStyle/>
+          <a:p>
+            <a:r>
+              <a:rPr lang="en-US" dirty="0"/>
+              <a:t>Code is read much more often than it is written – this will come up again in the final session. 50 lines of code that are clear and explicit about their functionality are much better than 10 opaque and convoluted lines doing the same operation.</a:t>
+            </a:r>
+          </a:p>
+        </p:txBody>
+      </p:sp>
+      <p:sp>
+        <p:nvSpPr>
+          <p:cNvPr id="4" name="Slide Number Placeholder 3"/>
+          <p:cNvSpPr>
+            <a:spLocks noGrp="1"/>
+          </p:cNvSpPr>
+          <p:nvPr>
+            <p:ph type="sldNum" sz="quarter" idx="5"/>
+          </p:nvPr>
+        </p:nvSpPr>
+        <p:spPr/>
+        <p:txBody>
+          <a:bodyPr/>
+          <a:lstStyle/>
+          <a:p>
+            <a:fld id="{A10D7ED9-0168-6F49-A704-0689E647D42E}" type="slidenum">
+              <a:rPr lang="en-US" smtClean="0"/>
+              <a:t>21</a:t>
+            </a:fld>
+            <a:endParaRPr lang="en-US"/>
+          </a:p>
+        </p:txBody>
+      </p:sp>
+    </p:spTree>
+    <p:extLst>
+      <p:ext uri="{BB962C8B-B14F-4D97-AF65-F5344CB8AC3E}">
+        <p14:creationId xmlns:p14="http://schemas.microsoft.com/office/powerpoint/2010/main" val="944494497"/>
+      </p:ext>
+    </p:extLst>
+  </p:cSld>
+  <p:clrMapOvr>
+    <a:masterClrMapping/>
+  </p:clrMapOvr>
+</p:notes>
+</file>
+
+<file path=ppt/notesSlides/notesSlide17.xml><?xml version="1.0" encoding="utf-8"?>
+<p:notes xmlns:a="http://schemas.openxmlformats.org/drawingml/2006/main" xmlns:r="http://schemas.openxmlformats.org/officeDocument/2006/relationships" xmlns:p="http://schemas.openxmlformats.org/presentationml/2006/main">
+  <p:cSld>
+    <p:spTree>
+      <p:nvGrpSpPr>
+        <p:cNvPr id="1" name=""/>
+        <p:cNvGrpSpPr/>
+        <p:nvPr/>
+      </p:nvGrpSpPr>
+      <p:grpSpPr>
+        <a:xfrm>
+          <a:off x="0" y="0"/>
+          <a:ext cx="0" cy="0"/>
+          <a:chOff x="0" y="0"/>
+          <a:chExt cx="0" cy="0"/>
+        </a:xfrm>
+      </p:grpSpPr>
+      <p:sp>
+        <p:nvSpPr>
+          <p:cNvPr id="2" name="Slide Image Placeholder 1"/>
+          <p:cNvSpPr>
+            <a:spLocks noGrp="1" noRot="1" noChangeAspect="1"/>
+          </p:cNvSpPr>
+          <p:nvPr>
+            <p:ph type="sldImg"/>
+          </p:nvPr>
+        </p:nvSpPr>
+        <p:spPr/>
+      </p:sp>
+      <p:sp>
+        <p:nvSpPr>
+          <p:cNvPr id="3" name="Notes Placeholder 2"/>
+          <p:cNvSpPr>
+            <a:spLocks noGrp="1"/>
+          </p:cNvSpPr>
+          <p:nvPr>
+            <p:ph type="body" idx="1"/>
+          </p:nvPr>
+        </p:nvSpPr>
+        <p:spPr/>
+        <p:txBody>
+          <a:bodyPr/>
+          <a:lstStyle/>
+          <a:p>
+            <a:r>
+              <a:rPr lang="en-US" dirty="0"/>
+              <a:t>As scientists at the</a:t>
+            </a:r>
+            <a:r>
+              <a:rPr lang="en-US" baseline="0" dirty="0"/>
+              <a:t> very beginning of their computational careers, students can make the decision of what kind of code they’re going to write *now*. </a:t>
+            </a:r>
+            <a:endParaRPr lang="en-US" dirty="0"/>
+          </a:p>
+        </p:txBody>
+      </p:sp>
+      <p:sp>
+        <p:nvSpPr>
+          <p:cNvPr id="4" name="Slide Number Placeholder 3"/>
+          <p:cNvSpPr>
+            <a:spLocks noGrp="1"/>
+          </p:cNvSpPr>
+          <p:nvPr>
+            <p:ph type="sldNum" sz="quarter" idx="10"/>
+          </p:nvPr>
+        </p:nvSpPr>
+        <p:spPr/>
+        <p:txBody>
+          <a:bodyPr/>
+          <a:lstStyle/>
+          <a:p>
+            <a:fld id="{A10D7ED9-0168-6F49-A704-0689E647D42E}" type="slidenum">
+              <a:rPr lang="en-US" smtClean="0"/>
+              <a:t>22</a:t>
+            </a:fld>
+            <a:endParaRPr lang="en-US"/>
+          </a:p>
+        </p:txBody>
+      </p:sp>
+    </p:spTree>
+    <p:extLst>
+      <p:ext uri="{BB962C8B-B14F-4D97-AF65-F5344CB8AC3E}">
+        <p14:creationId xmlns:p14="http://schemas.microsoft.com/office/powerpoint/2010/main" val="1317898376"/>
+      </p:ext>
+    </p:extLst>
+  </p:cSld>
+  <p:clrMapOvr>
+    <a:masterClrMapping/>
+  </p:clrMapOvr>
+</p:notes>
+</file>
+
+<file path=ppt/notesSlides/notesSlide18.xml><?xml version="1.0" encoding="utf-8"?>
+<p:notes xmlns:a="http://schemas.openxmlformats.org/drawingml/2006/main" xmlns:r="http://schemas.openxmlformats.org/officeDocument/2006/relationships" xmlns:p="http://schemas.openxmlformats.org/presentationml/2006/main">
+  <p:cSld>
+    <p:spTree>
+      <p:nvGrpSpPr>
+        <p:cNvPr id="1" name=""/>
+        <p:cNvGrpSpPr/>
+        <p:nvPr/>
+      </p:nvGrpSpPr>
+      <p:grpSpPr>
+        <a:xfrm>
+          <a:off x="0" y="0"/>
+          <a:ext cx="0" cy="0"/>
+          <a:chOff x="0" y="0"/>
+          <a:chExt cx="0" cy="0"/>
+        </a:xfrm>
+      </p:grpSpPr>
+      <p:sp>
+        <p:nvSpPr>
+          <p:cNvPr id="2" name="Slide Image Placeholder 1"/>
+          <p:cNvSpPr>
+            <a:spLocks noGrp="1" noRot="1" noChangeAspect="1"/>
+          </p:cNvSpPr>
+          <p:nvPr>
+            <p:ph type="sldImg"/>
+          </p:nvPr>
+        </p:nvSpPr>
+        <p:spPr/>
+      </p:sp>
+      <p:sp>
+        <p:nvSpPr>
+          <p:cNvPr id="3" name="Notes Placeholder 2"/>
+          <p:cNvSpPr>
+            <a:spLocks noGrp="1"/>
+          </p:cNvSpPr>
+          <p:nvPr>
+            <p:ph type="body" idx="1"/>
+          </p:nvPr>
+        </p:nvSpPr>
+        <p:spPr/>
+        <p:txBody>
+          <a:bodyPr/>
+          <a:lstStyle/>
+          <a:p>
+            <a:r>
+              <a:rPr lang="en-US" dirty="0"/>
+              <a:t>The</a:t>
+            </a:r>
+            <a:r>
+              <a:rPr lang="en-US" baseline="0" dirty="0"/>
+              <a:t> bare </a:t>
+            </a:r>
+            <a:r>
+              <a:rPr lang="en-US" i="1" baseline="0" dirty="0"/>
+              <a:t>raise</a:t>
+            </a:r>
+            <a:r>
+              <a:rPr lang="en-US" i="0" baseline="0" dirty="0"/>
+              <a:t> statement works only in an </a:t>
+            </a:r>
+            <a:r>
+              <a:rPr lang="en-US" i="1" baseline="0" dirty="0"/>
+              <a:t>except</a:t>
+            </a:r>
+            <a:r>
+              <a:rPr lang="en-US" i="0" baseline="0" dirty="0"/>
+              <a:t> block where there is an active exception. </a:t>
+            </a:r>
+            <a:endParaRPr lang="en-US" dirty="0"/>
+          </a:p>
+        </p:txBody>
+      </p:sp>
+      <p:sp>
+        <p:nvSpPr>
+          <p:cNvPr id="4" name="Slide Number Placeholder 3"/>
+          <p:cNvSpPr>
+            <a:spLocks noGrp="1"/>
+          </p:cNvSpPr>
+          <p:nvPr>
+            <p:ph type="sldNum" sz="quarter" idx="10"/>
+          </p:nvPr>
+        </p:nvSpPr>
+        <p:spPr/>
+        <p:txBody>
+          <a:bodyPr/>
+          <a:lstStyle/>
+          <a:p>
+            <a:fld id="{A10D7ED9-0168-6F49-A704-0689E647D42E}" type="slidenum">
+              <a:rPr lang="en-US" smtClean="0"/>
+              <a:t>25</a:t>
+            </a:fld>
+            <a:endParaRPr lang="en-US"/>
+          </a:p>
+        </p:txBody>
+      </p:sp>
+    </p:spTree>
+    <p:extLst>
+      <p:ext uri="{BB962C8B-B14F-4D97-AF65-F5344CB8AC3E}">
+        <p14:creationId xmlns:p14="http://schemas.microsoft.com/office/powerpoint/2010/main" val="2046340900"/>
+      </p:ext>
+    </p:extLst>
+  </p:cSld>
+  <p:clrMapOvr>
+    <a:masterClrMapping/>
+  </p:clrMapOvr>
+</p:notes>
+</file>
+
+<file path=ppt/notesSlides/notesSlide19.xml><?xml version="1.0" encoding="utf-8"?>
+<p:notes xmlns:a="http://schemas.openxmlformats.org/drawingml/2006/main" xmlns:r="http://schemas.openxmlformats.org/officeDocument/2006/relationships" xmlns:p="http://schemas.openxmlformats.org/presentationml/2006/main">
+  <p:cSld>
+    <p:spTree>
+      <p:nvGrpSpPr>
+        <p:cNvPr id="1" name=""/>
+        <p:cNvGrpSpPr/>
+        <p:nvPr/>
+      </p:nvGrpSpPr>
+      <p:grpSpPr>
+        <a:xfrm>
+          <a:off x="0" y="0"/>
+          <a:ext cx="0" cy="0"/>
+          <a:chOff x="0" y="0"/>
+          <a:chExt cx="0" cy="0"/>
+        </a:xfrm>
+      </p:grpSpPr>
+      <p:sp>
+        <p:nvSpPr>
+          <p:cNvPr id="2" name="Slide Image Placeholder 1"/>
+          <p:cNvSpPr>
+            <a:spLocks noGrp="1" noRot="1" noChangeAspect="1"/>
+          </p:cNvSpPr>
+          <p:nvPr>
+            <p:ph type="sldImg"/>
+          </p:nvPr>
+        </p:nvSpPr>
+        <p:spPr/>
+      </p:sp>
+      <p:sp>
+        <p:nvSpPr>
+          <p:cNvPr id="3" name="Notes Placeholder 2"/>
+          <p:cNvSpPr>
+            <a:spLocks noGrp="1"/>
+          </p:cNvSpPr>
+          <p:nvPr>
+            <p:ph type="body" idx="1"/>
+          </p:nvPr>
+        </p:nvSpPr>
+        <p:spPr/>
+        <p:txBody>
+          <a:bodyPr/>
+          <a:lstStyle/>
+          <a:p>
+            <a:r>
+              <a:rPr lang="en-US" dirty="0"/>
+              <a:t>Another difference folks might notice between python’s match-case and C/C++’s switch-case is that the C/C++ switch-case requires a break statement at the end of each case, otherwise it will start to run the subsequent case statement. The break statement is implicitly included in python.</a:t>
+            </a:r>
+          </a:p>
+        </p:txBody>
+      </p:sp>
+      <p:sp>
+        <p:nvSpPr>
+          <p:cNvPr id="4" name="Slide Number Placeholder 3"/>
+          <p:cNvSpPr>
+            <a:spLocks noGrp="1"/>
+          </p:cNvSpPr>
+          <p:nvPr>
+            <p:ph type="sldNum" sz="quarter" idx="5"/>
+          </p:nvPr>
+        </p:nvSpPr>
+        <p:spPr/>
+        <p:txBody>
+          <a:bodyPr/>
+          <a:lstStyle/>
+          <a:p>
+            <a:fld id="{A10D7ED9-0168-6F49-A704-0689E647D42E}" type="slidenum">
+              <a:rPr lang="en-US" smtClean="0"/>
+              <a:t>27</a:t>
+            </a:fld>
+            <a:endParaRPr lang="en-US"/>
+          </a:p>
+        </p:txBody>
+      </p:sp>
+    </p:spTree>
+    <p:extLst>
+      <p:ext uri="{BB962C8B-B14F-4D97-AF65-F5344CB8AC3E}">
+        <p14:creationId xmlns:p14="http://schemas.microsoft.com/office/powerpoint/2010/main" val="1753589505"/>
       </p:ext>
     </p:extLst>
   </p:cSld>
@@ -636,24 +1714,16 @@
           <a:p>
             <a:r>
               <a:rPr lang="en-US" dirty="0"/>
-              <a:t>The</a:t>
-            </a:r>
-            <a:r>
-              <a:rPr lang="en-US" baseline="0" dirty="0"/>
-              <a:t> “from ___ import *” construction is considered bad practice as it is often difficult to control the namespace. Think about “from </a:t>
-            </a:r>
-            <a:r>
-              <a:rPr lang="en-US" baseline="0" dirty="0" err="1"/>
-              <a:t>numpy</a:t>
-            </a:r>
-            <a:r>
-              <a:rPr lang="en-US" baseline="0" dirty="0"/>
-              <a:t> import *” followed by “from math import *” versus the opposite order. We’ll come back to this in the </a:t>
-            </a:r>
-            <a:r>
-              <a:rPr lang="en-US" baseline="0"/>
-              <a:t>next session. </a:t>
-            </a:r>
+              <a:t>In Python, the "=" operator is used for assignment, it is used to assign a value to a variable. On the other hand, the "==" operator is used to compare two values for equality. the "//" and "%" operators are used for integer division and modulo operations, respectively.</a:t>
+            </a:r>
+          </a:p>
+          <a:p>
+            <a:r>
+              <a:rPr lang="en-US" dirty="0"/>
+              <a:t>The "//" operator performs integer division, which returns the integer quotient of the division operation. For example, 7 // 3 would return 2,  The "%" operator performs modulo operation, which returns the remainder of the division operation. For example, 7 % 3 would return 1.</a:t>
+            </a:r>
+          </a:p>
+          <a:p>
             <a:endParaRPr lang="en-US" dirty="0"/>
           </a:p>
         </p:txBody>
@@ -665,7 +1735,7 @@
             <a:spLocks noGrp="1"/>
           </p:cNvSpPr>
           <p:nvPr>
-            <p:ph type="sldNum" sz="quarter" idx="10"/>
+            <p:ph type="sldNum" sz="quarter" idx="5"/>
           </p:nvPr>
         </p:nvSpPr>
         <p:spPr/>
@@ -675,7 +1745,7 @@
           <a:p>
             <a:fld id="{A10D7ED9-0168-6F49-A704-0689E647D42E}" type="slidenum">
               <a:rPr lang="en-US" smtClean="0"/>
-              <a:t>7</a:t>
+              <a:t>3</a:t>
             </a:fld>
             <a:endParaRPr lang="en-US"/>
           </a:p>
@@ -684,7 +1754,103 @@
     </p:spTree>
     <p:extLst>
       <p:ext uri="{BB962C8B-B14F-4D97-AF65-F5344CB8AC3E}">
-        <p14:creationId xmlns:p14="http://schemas.microsoft.com/office/powerpoint/2010/main" val="548991652"/>
+        <p14:creationId xmlns:p14="http://schemas.microsoft.com/office/powerpoint/2010/main" val="160997750"/>
+      </p:ext>
+    </p:extLst>
+  </p:cSld>
+  <p:clrMapOvr>
+    <a:masterClrMapping/>
+  </p:clrMapOvr>
+</p:notes>
+</file>
+
+<file path=ppt/notesSlides/notesSlide20.xml><?xml version="1.0" encoding="utf-8"?>
+<p:notes xmlns:a="http://schemas.openxmlformats.org/drawingml/2006/main" xmlns:r="http://schemas.openxmlformats.org/officeDocument/2006/relationships" xmlns:p="http://schemas.openxmlformats.org/presentationml/2006/main">
+  <p:cSld>
+    <p:spTree>
+      <p:nvGrpSpPr>
+        <p:cNvPr id="1" name=""/>
+        <p:cNvGrpSpPr/>
+        <p:nvPr/>
+      </p:nvGrpSpPr>
+      <p:grpSpPr>
+        <a:xfrm>
+          <a:off x="0" y="0"/>
+          <a:ext cx="0" cy="0"/>
+          <a:chOff x="0" y="0"/>
+          <a:chExt cx="0" cy="0"/>
+        </a:xfrm>
+      </p:grpSpPr>
+      <p:sp>
+        <p:nvSpPr>
+          <p:cNvPr id="2" name="Slide Image Placeholder 1"/>
+          <p:cNvSpPr>
+            <a:spLocks noGrp="1" noRot="1" noChangeAspect="1"/>
+          </p:cNvSpPr>
+          <p:nvPr>
+            <p:ph type="sldImg"/>
+          </p:nvPr>
+        </p:nvSpPr>
+        <p:spPr/>
+      </p:sp>
+      <p:sp>
+        <p:nvSpPr>
+          <p:cNvPr id="3" name="Notes Placeholder 2"/>
+          <p:cNvSpPr>
+            <a:spLocks noGrp="1"/>
+          </p:cNvSpPr>
+          <p:nvPr>
+            <p:ph type="body" idx="1"/>
+          </p:nvPr>
+        </p:nvSpPr>
+        <p:spPr/>
+        <p:txBody>
+          <a:bodyPr/>
+          <a:lstStyle/>
+          <a:p>
+            <a:r>
+              <a:rPr lang="en-US" dirty="0"/>
+              <a:t>Worth</a:t>
+            </a:r>
+            <a:r>
+              <a:rPr lang="en-US" baseline="0" dirty="0"/>
+              <a:t> noting here that filter and map were almost removed from Python 3 in favor of list comprehensions, but they’re still </a:t>
+            </a:r>
+            <a:r>
+              <a:rPr lang="en-US" baseline="0"/>
+              <a:t>part of Python. </a:t>
+            </a:r>
+            <a:endParaRPr lang="en-US" dirty="0"/>
+          </a:p>
+        </p:txBody>
+      </p:sp>
+      <p:sp>
+        <p:nvSpPr>
+          <p:cNvPr id="4" name="Slide Number Placeholder 3"/>
+          <p:cNvSpPr>
+            <a:spLocks noGrp="1"/>
+          </p:cNvSpPr>
+          <p:nvPr>
+            <p:ph type="sldNum" sz="quarter" idx="10"/>
+          </p:nvPr>
+        </p:nvSpPr>
+        <p:spPr/>
+        <p:txBody>
+          <a:bodyPr/>
+          <a:lstStyle/>
+          <a:p>
+            <a:fld id="{A10D7ED9-0168-6F49-A704-0689E647D42E}" type="slidenum">
+              <a:rPr lang="en-US" smtClean="0"/>
+              <a:t>31</a:t>
+            </a:fld>
+            <a:endParaRPr lang="en-US"/>
+          </a:p>
+        </p:txBody>
+      </p:sp>
+    </p:spTree>
+    <p:extLst>
+      <p:ext uri="{BB962C8B-B14F-4D97-AF65-F5344CB8AC3E}">
+        <p14:creationId xmlns:p14="http://schemas.microsoft.com/office/powerpoint/2010/main" val="925057836"/>
       </p:ext>
     </p:extLst>
   </p:cSld>
@@ -740,8 +1906,34 @@
           <a:p>
             <a:r>
               <a:rPr lang="en-US" dirty="0"/>
-              <a:t>Have the students parrot this statement back to you </a:t>
-            </a:r>
+              <a:t>There’s also the </a:t>
+            </a:r>
+            <a:r>
+              <a:rPr lang="en-US" dirty="0" err="1"/>
+              <a:t>str.join</a:t>
+            </a:r>
+            <a:r>
+              <a:rPr lang="en-US" baseline="0" dirty="0"/>
+              <a:t> function, but if all you’re looking for a simple string concatenation, I find that the += operator is simply more straight-forward and more readable. </a:t>
+            </a:r>
+          </a:p>
+          <a:p>
+            <a:r>
+              <a:rPr lang="en-US" dirty="0"/>
+              <a:t>Unicode means that each character in the string is represented by a unique number, called a Unicode code point.</a:t>
+            </a:r>
+          </a:p>
+          <a:p>
+            <a:r>
+              <a:rPr lang="en-US" dirty="0"/>
+              <a:t>Unicode is a character encoding standard that provides a unique number for every character, no matter what the platform, device, or program is. This ensures that text in different languages and scripts can be represented correctly and consistently across different systems.</a:t>
+            </a:r>
+          </a:p>
+          <a:p>
+            <a:endParaRPr lang="en-US" dirty="0"/>
+          </a:p>
+          <a:p>
+            <a:endParaRPr lang="en-US" dirty="0"/>
           </a:p>
         </p:txBody>
       </p:sp>
@@ -762,7 +1954,7 @@
           <a:p>
             <a:fld id="{A10D7ED9-0168-6F49-A704-0689E647D42E}" type="slidenum">
               <a:rPr lang="en-US" smtClean="0"/>
-              <a:t>13</a:t>
+              <a:t>4</a:t>
             </a:fld>
             <a:endParaRPr lang="en-US"/>
           </a:p>
@@ -771,7 +1963,7 @@
     </p:spTree>
     <p:extLst>
       <p:ext uri="{BB962C8B-B14F-4D97-AF65-F5344CB8AC3E}">
-        <p14:creationId xmlns:p14="http://schemas.microsoft.com/office/powerpoint/2010/main" val="1857295964"/>
+        <p14:creationId xmlns:p14="http://schemas.microsoft.com/office/powerpoint/2010/main" val="1977311223"/>
       </p:ext>
     </p:extLst>
   </p:cSld>
@@ -825,6 +2017,29 @@
           <a:bodyPr/>
           <a:lstStyle/>
           <a:p>
+            <a:pPr marL="0" marR="0" lvl="0" indent="0" algn="l" defTabSz="914400" rtl="0" eaLnBrk="1" fontAlgn="auto" latinLnBrk="0" hangingPunct="1">
+              <a:lnSpc>
+                <a:spcPct val="100000"/>
+              </a:lnSpc>
+              <a:spcBef>
+                <a:spcPts val="0"/>
+              </a:spcBef>
+              <a:spcAft>
+                <a:spcPts val="0"/>
+              </a:spcAft>
+              <a:buClrTx/>
+              <a:buSzTx/>
+              <a:buFontTx/>
+              <a:buNone/>
+              <a:tabLst/>
+              <a:defRPr/>
+            </a:pPr>
+            <a:r>
+              <a:rPr lang="en-US" dirty="0"/>
+              <a:t>Type casting, also known as type conversion, is the process of converting a value from one data type to another in Python. Conversion is very simple we just call the data type we want to convert as a function. When we apply the int() function to a floating-point number, it will return the integer part of that number by rounding down towards zero. </a:t>
+            </a:r>
+          </a:p>
+          <a:p>
             <a:endParaRPr lang="en-US" dirty="0"/>
           </a:p>
         </p:txBody>
@@ -846,7 +2061,7 @@
           <a:p>
             <a:fld id="{A10D7ED9-0168-6F49-A704-0689E647D42E}" type="slidenum">
               <a:rPr lang="en-US" smtClean="0"/>
-              <a:t>19</a:t>
+              <a:t>6</a:t>
             </a:fld>
             <a:endParaRPr lang="en-US"/>
           </a:p>
@@ -855,7 +2070,7 @@
     </p:spTree>
     <p:extLst>
       <p:ext uri="{BB962C8B-B14F-4D97-AF65-F5344CB8AC3E}">
-        <p14:creationId xmlns:p14="http://schemas.microsoft.com/office/powerpoint/2010/main" val="705247091"/>
+        <p14:creationId xmlns:p14="http://schemas.microsoft.com/office/powerpoint/2010/main" val="3147353577"/>
       </p:ext>
     </p:extLst>
   </p:cSld>
@@ -911,8 +2126,62 @@
           <a:p>
             <a:r>
               <a:rPr lang="en-US" dirty="0"/>
-              <a:t>Code is read much more often than it is written – this will come up again in the final session. 50 lines of code that are clear and explicit about their functionality are much better than 10 opaque and convoluted lines doing the same operation.</a:t>
-            </a:r>
+              <a:t>The</a:t>
+            </a:r>
+            <a:r>
+              <a:rPr lang="en-US" baseline="0" dirty="0"/>
+              <a:t> “from ___ import *” construction is considered bad practice as it is often difficult to control the namespace. Think about “from </a:t>
+            </a:r>
+            <a:r>
+              <a:rPr lang="en-US" baseline="0" dirty="0" err="1"/>
+              <a:t>numpy</a:t>
+            </a:r>
+            <a:r>
+              <a:rPr lang="en-US" baseline="0" dirty="0"/>
+              <a:t> import *” followed by “from math import *” versus the opposite order. We’ll come back to this in the next session. </a:t>
+            </a:r>
+          </a:p>
+          <a:p>
+            <a:endParaRPr lang="en-US" baseline="0" dirty="0"/>
+          </a:p>
+          <a:p>
+            <a:r>
+              <a:rPr lang="en-US" dirty="0"/>
+              <a:t>from </a:t>
+            </a:r>
+            <a:r>
+              <a:rPr lang="en-US" dirty="0" err="1"/>
+              <a:t>numpy</a:t>
+            </a:r>
+            <a:r>
+              <a:rPr lang="en-US" dirty="0"/>
+              <a:t> import *: This imports all the functions and objects from the </a:t>
+            </a:r>
+            <a:r>
+              <a:rPr lang="en-US" dirty="0" err="1"/>
+              <a:t>numpy</a:t>
+            </a:r>
+            <a:r>
+              <a:rPr lang="en-US" dirty="0"/>
+              <a:t> module into the current namespace. This means that you can use all the functions and objects from </a:t>
+            </a:r>
+            <a:r>
+              <a:rPr lang="en-US" dirty="0" err="1"/>
+              <a:t>numpy</a:t>
+            </a:r>
+            <a:r>
+              <a:rPr lang="en-US" dirty="0"/>
+              <a:t> without having to prefix them with the module name. For example, you can use the sin() function directly: sin(3.14). </a:t>
+            </a:r>
+          </a:p>
+          <a:p>
+            <a:r>
+              <a:rPr lang="en-US" dirty="0"/>
+              <a:t>However, this can lead to naming conflicts if the same name is used in different modules, and can make it harder to trace where a particular function or object came from.</a:t>
+            </a:r>
+          </a:p>
+          <a:p>
+            <a:endParaRPr lang="en-US" dirty="0"/>
           </a:p>
         </p:txBody>
       </p:sp>
@@ -923,7 +2192,7 @@
             <a:spLocks noGrp="1"/>
           </p:cNvSpPr>
           <p:nvPr>
-            <p:ph type="sldNum" sz="quarter" idx="5"/>
+            <p:ph type="sldNum" sz="quarter" idx="10"/>
           </p:nvPr>
         </p:nvSpPr>
         <p:spPr/>
@@ -933,7 +2202,7 @@
           <a:p>
             <a:fld id="{A10D7ED9-0168-6F49-A704-0689E647D42E}" type="slidenum">
               <a:rPr lang="en-US" smtClean="0"/>
-              <a:t>21</a:t>
+              <a:t>7</a:t>
             </a:fld>
             <a:endParaRPr lang="en-US"/>
           </a:p>
@@ -942,7 +2211,7 @@
     </p:spTree>
     <p:extLst>
       <p:ext uri="{BB962C8B-B14F-4D97-AF65-F5344CB8AC3E}">
-        <p14:creationId xmlns:p14="http://schemas.microsoft.com/office/powerpoint/2010/main" val="944494497"/>
+        <p14:creationId xmlns:p14="http://schemas.microsoft.com/office/powerpoint/2010/main" val="548991652"/>
       </p:ext>
     </p:extLst>
   </p:cSld>
@@ -996,14 +2265,29 @@
           <a:bodyPr/>
           <a:lstStyle/>
           <a:p>
-            <a:r>
-              <a:rPr lang="en-US" dirty="0"/>
-              <a:t>As scientists at the</a:t>
-            </a:r>
-            <a:r>
-              <a:rPr lang="en-US" baseline="0" dirty="0"/>
-              <a:t> very beginning of their computational careers, students can make the decision of what kind of code they’re going to write *now*. </a:t>
-            </a:r>
+            <a:pPr marL="0" marR="0" lvl="0" indent="0" algn="l" defTabSz="914400" rtl="0" eaLnBrk="1" fontAlgn="auto" latinLnBrk="0" hangingPunct="1">
+              <a:lnSpc>
+                <a:spcPct val="100000"/>
+              </a:lnSpc>
+              <a:spcBef>
+                <a:spcPts val="0"/>
+              </a:spcBef>
+              <a:spcAft>
+                <a:spcPts val="0"/>
+              </a:spcAft>
+              <a:buClrTx/>
+              <a:buSzTx/>
+              <a:buFontTx/>
+              <a:buNone/>
+              <a:tabLst/>
+              <a:defRPr/>
+            </a:pPr>
+            <a:r>
+              <a:rPr lang="en-US" dirty="0"/>
+              <a:t>lists are a versatile data structure in Python that can be used for a variety of tasks., sort list, append to add more objects, remove objects</a:t>
+            </a:r>
+          </a:p>
+          <a:p>
             <a:endParaRPr lang="en-US" dirty="0"/>
           </a:p>
         </p:txBody>
@@ -1015,7 +2299,7 @@
             <a:spLocks noGrp="1"/>
           </p:cNvSpPr>
           <p:nvPr>
-            <p:ph type="sldNum" sz="quarter" idx="10"/>
+            <p:ph type="sldNum" sz="quarter" idx="5"/>
           </p:nvPr>
         </p:nvSpPr>
         <p:spPr/>
@@ -1025,7 +2309,7 @@
           <a:p>
             <a:fld id="{A10D7ED9-0168-6F49-A704-0689E647D42E}" type="slidenum">
               <a:rPr lang="en-US" smtClean="0"/>
-              <a:t>22</a:t>
+              <a:t>8</a:t>
             </a:fld>
             <a:endParaRPr lang="en-US"/>
           </a:p>
@@ -1034,7 +2318,7 @@
     </p:spTree>
     <p:extLst>
       <p:ext uri="{BB962C8B-B14F-4D97-AF65-F5344CB8AC3E}">
-        <p14:creationId xmlns:p14="http://schemas.microsoft.com/office/powerpoint/2010/main" val="1317898376"/>
+        <p14:creationId xmlns:p14="http://schemas.microsoft.com/office/powerpoint/2010/main" val="1090495808"/>
       </p:ext>
     </p:extLst>
   </p:cSld>
@@ -1088,30 +2372,29 @@
           <a:bodyPr/>
           <a:lstStyle/>
           <a:p>
-            <a:r>
-              <a:rPr lang="en-US" dirty="0"/>
-              <a:t>The</a:t>
-            </a:r>
-            <a:r>
-              <a:rPr lang="en-US" baseline="0" dirty="0"/>
-              <a:t> bare </a:t>
-            </a:r>
-            <a:r>
-              <a:rPr lang="en-US" i="1" baseline="0" dirty="0"/>
-              <a:t>raise</a:t>
-            </a:r>
-            <a:r>
-              <a:rPr lang="en-US" i="0" baseline="0" dirty="0"/>
-              <a:t> statement works only in an </a:t>
-            </a:r>
-            <a:r>
-              <a:rPr lang="en-US" i="1" baseline="0" dirty="0"/>
-              <a:t>except</a:t>
-            </a:r>
-            <a:r>
-              <a:rPr lang="en-US" i="0" baseline="0" dirty="0"/>
-              <a:t> block where there is an active exception. </a:t>
-            </a:r>
+            <a:pPr marL="0" marR="0" lvl="0" indent="0" algn="l" defTabSz="914400" rtl="0" eaLnBrk="1" fontAlgn="auto" latinLnBrk="0" hangingPunct="1">
+              <a:lnSpc>
+                <a:spcPct val="100000"/>
+              </a:lnSpc>
+              <a:spcBef>
+                <a:spcPts val="0"/>
+              </a:spcBef>
+              <a:spcAft>
+                <a:spcPts val="0"/>
+              </a:spcAft>
+              <a:buClrTx/>
+              <a:buSzTx/>
+              <a:buFontTx/>
+              <a:buNone/>
+              <a:tabLst/>
+              <a:defRPr/>
+            </a:pPr>
+            <a:r>
+              <a:rPr lang="en-US" dirty="0"/>
+              <a:t>Overall, tuples are a useful data structure in Python when you need to store a collection of related values that should not be changed</a:t>
+            </a:r>
+          </a:p>
+          <a:p>
             <a:endParaRPr lang="en-US" dirty="0"/>
           </a:p>
         </p:txBody>
@@ -1123,7 +2406,7 @@
             <a:spLocks noGrp="1"/>
           </p:cNvSpPr>
           <p:nvPr>
-            <p:ph type="sldNum" sz="quarter" idx="10"/>
+            <p:ph type="sldNum" sz="quarter" idx="5"/>
           </p:nvPr>
         </p:nvSpPr>
         <p:spPr/>
@@ -1133,7 +2416,7 @@
           <a:p>
             <a:fld id="{A10D7ED9-0168-6F49-A704-0689E647D42E}" type="slidenum">
               <a:rPr lang="en-US" smtClean="0"/>
-              <a:t>25</a:t>
+              <a:t>9</a:t>
             </a:fld>
             <a:endParaRPr lang="en-US"/>
           </a:p>
@@ -1142,7 +2425,7 @@
     </p:spTree>
     <p:extLst>
       <p:ext uri="{BB962C8B-B14F-4D97-AF65-F5344CB8AC3E}">
-        <p14:creationId xmlns:p14="http://schemas.microsoft.com/office/powerpoint/2010/main" val="2046340900"/>
+        <p14:creationId xmlns:p14="http://schemas.microsoft.com/office/powerpoint/2010/main" val="3385690396"/>
       </p:ext>
     </p:extLst>
   </p:cSld>
@@ -1196,10 +2479,30 @@
           <a:bodyPr/>
           <a:lstStyle/>
           <a:p>
-            <a:r>
-              <a:rPr lang="en-US" dirty="0"/>
-              <a:t>Another difference folks might notice between python’s match-case and C/C++’s switch-case is that the C/C++ switch-case requires a break statement at the end of each case, otherwise it will start to run the subsequent case statement. The break statement is implicitly included in python.</a:t>
-            </a:r>
+            <a:pPr marL="0" marR="0" lvl="0" indent="0" algn="l" defTabSz="914400" rtl="0" eaLnBrk="1" fontAlgn="auto" latinLnBrk="0" hangingPunct="1">
+              <a:lnSpc>
+                <a:spcPct val="100000"/>
+              </a:lnSpc>
+              <a:spcBef>
+                <a:spcPts val="0"/>
+              </a:spcBef>
+              <a:spcAft>
+                <a:spcPts val="0"/>
+              </a:spcAft>
+              <a:buClrTx/>
+              <a:buSzTx/>
+              <a:buFontTx/>
+              <a:buNone/>
+              <a:tabLst/>
+              <a:defRPr/>
+            </a:pPr>
+            <a:r>
+              <a:rPr lang="en-US" dirty="0"/>
+              <a:t>a set is a built-in data structure that allows you to store a collection of unique and unordered elements in a single variable. Sets support a variety of set operations such as union, intersection, and difference. These operations can be useful in tasks such as finding common elements between two sets, finding elements unique to one set, or combining two sets.</a:t>
+            </a:r>
+          </a:p>
+          <a:p>
+            <a:endParaRPr lang="en-US" dirty="0"/>
           </a:p>
         </p:txBody>
       </p:sp>
@@ -1220,7 +2523,7 @@
           <a:p>
             <a:fld id="{A10D7ED9-0168-6F49-A704-0689E647D42E}" type="slidenum">
               <a:rPr lang="en-US" smtClean="0"/>
-              <a:t>27</a:t>
+              <a:t>10</a:t>
             </a:fld>
             <a:endParaRPr lang="en-US"/>
           </a:p>
@@ -1229,7 +2532,7 @@
     </p:spTree>
     <p:extLst>
       <p:ext uri="{BB962C8B-B14F-4D97-AF65-F5344CB8AC3E}">
-        <p14:creationId xmlns:p14="http://schemas.microsoft.com/office/powerpoint/2010/main" val="1753589505"/>
+        <p14:creationId xmlns:p14="http://schemas.microsoft.com/office/powerpoint/2010/main" val="3768663564"/>
       </p:ext>
     </p:extLst>
   </p:cSld>
@@ -1283,18 +2586,29 @@
           <a:bodyPr/>
           <a:lstStyle/>
           <a:p>
-            <a:r>
-              <a:rPr lang="en-US" dirty="0"/>
-              <a:t>Worth</a:t>
-            </a:r>
-            <a:r>
-              <a:rPr lang="en-US" baseline="0" dirty="0"/>
-              <a:t> noting here that filter and map were almost removed from Python 3 in favor of list comprehensions, but they’re still </a:t>
-            </a:r>
-            <a:r>
-              <a:rPr lang="en-US" baseline="0"/>
-              <a:t>part of Python. </a:t>
-            </a:r>
+            <a:pPr marL="0" marR="0" lvl="0" indent="0" algn="l" defTabSz="914400" rtl="0" eaLnBrk="1" fontAlgn="auto" latinLnBrk="0" hangingPunct="1">
+              <a:lnSpc>
+                <a:spcPct val="100000"/>
+              </a:lnSpc>
+              <a:spcBef>
+                <a:spcPts val="0"/>
+              </a:spcBef>
+              <a:spcAft>
+                <a:spcPts val="0"/>
+              </a:spcAft>
+              <a:buClrTx/>
+              <a:buSzTx/>
+              <a:buFontTx/>
+              <a:buNone/>
+              <a:tabLst/>
+              <a:defRPr/>
+            </a:pPr>
+            <a:r>
+              <a:rPr lang="en-US" dirty="0"/>
+              <a:t>a dictionary is a built-in data structure that allows you to store a collection of key-value pairs in a single variable. Each key in a dictionary must be unique and immutable, and each key is associated with a value</a:t>
+            </a:r>
+          </a:p>
+          <a:p>
             <a:endParaRPr lang="en-US" dirty="0"/>
           </a:p>
         </p:txBody>
@@ -1306,7 +2620,7 @@
             <a:spLocks noGrp="1"/>
           </p:cNvSpPr>
           <p:nvPr>
-            <p:ph type="sldNum" sz="quarter" idx="10"/>
+            <p:ph type="sldNum" sz="quarter" idx="5"/>
           </p:nvPr>
         </p:nvSpPr>
         <p:spPr/>
@@ -1316,7 +2630,7 @@
           <a:p>
             <a:fld id="{A10D7ED9-0168-6F49-A704-0689E647D42E}" type="slidenum">
               <a:rPr lang="en-US" smtClean="0"/>
-              <a:t>31</a:t>
+              <a:t>11</a:t>
             </a:fld>
             <a:endParaRPr lang="en-US"/>
           </a:p>
@@ -1325,7 +2639,7 @@
     </p:spTree>
     <p:extLst>
       <p:ext uri="{BB962C8B-B14F-4D97-AF65-F5344CB8AC3E}">
-        <p14:creationId xmlns:p14="http://schemas.microsoft.com/office/powerpoint/2010/main" val="925057836"/>
+        <p14:creationId xmlns:p14="http://schemas.microsoft.com/office/powerpoint/2010/main" val="1339806011"/>
       </p:ext>
     </p:extLst>
   </p:cSld>
@@ -1611,7 +2925,7 @@
           <a:p>
             <a:fld id="{51673806-0BCD-1F42-BAA8-2011034B3C6A}" type="datetimeFigureOut">
               <a:rPr lang="en-US" smtClean="0"/>
-              <a:t>5/11/22</a:t>
+              <a:t>5/17/23</a:t>
             </a:fld>
             <a:endParaRPr lang="en-US" dirty="0"/>
           </a:p>
@@ -2024,7 +3338,7 @@
           <a:p>
             <a:fld id="{51673806-0BCD-1F42-BAA8-2011034B3C6A}" type="datetimeFigureOut">
               <a:rPr lang="en-US" smtClean="0"/>
-              <a:t>5/11/22</a:t>
+              <a:t>5/17/23</a:t>
             </a:fld>
             <a:endParaRPr lang="en-US" dirty="0"/>
           </a:p>
@@ -2355,7 +3669,7 @@
           <a:p>
             <a:fld id="{51673806-0BCD-1F42-BAA8-2011034B3C6A}" type="datetimeFigureOut">
               <a:rPr lang="en-US" smtClean="0"/>
-              <a:t>5/11/22</a:t>
+              <a:t>5/17/23</a:t>
             </a:fld>
             <a:endParaRPr lang="en-US" dirty="0"/>
           </a:p>
@@ -2755,7 +4069,7 @@
           <a:p>
             <a:fld id="{51673806-0BCD-1F42-BAA8-2011034B3C6A}" type="datetimeFigureOut">
               <a:rPr lang="en-US" smtClean="0"/>
-              <a:t>5/11/22</a:t>
+              <a:t>5/17/23</a:t>
             </a:fld>
             <a:endParaRPr lang="en-US" dirty="0"/>
           </a:p>
@@ -3318,7 +4632,7 @@
           <a:p>
             <a:fld id="{51673806-0BCD-1F42-BAA8-2011034B3C6A}" type="datetimeFigureOut">
               <a:rPr lang="en-US" smtClean="0"/>
-              <a:t>5/11/22</a:t>
+              <a:t>5/17/23</a:t>
             </a:fld>
             <a:endParaRPr lang="en-US" dirty="0"/>
           </a:p>
@@ -3994,7 +5308,7 @@
           <a:p>
             <a:fld id="{51673806-0BCD-1F42-BAA8-2011034B3C6A}" type="datetimeFigureOut">
               <a:rPr lang="en-US" smtClean="0"/>
-              <a:t>5/11/22</a:t>
+              <a:t>5/17/23</a:t>
             </a:fld>
             <a:endParaRPr lang="en-US" dirty="0"/>
           </a:p>
@@ -4899,7 +6213,7 @@
           <a:p>
             <a:fld id="{51673806-0BCD-1F42-BAA8-2011034B3C6A}" type="datetimeFigureOut">
               <a:rPr lang="en-US" smtClean="0"/>
-              <a:t>5/11/22</a:t>
+              <a:t>5/17/23</a:t>
             </a:fld>
             <a:endParaRPr lang="en-US" dirty="0"/>
           </a:p>
@@ -5207,7 +6521,7 @@
           <a:p>
             <a:fld id="{51673806-0BCD-1F42-BAA8-2011034B3C6A}" type="datetimeFigureOut">
               <a:rPr lang="en-US" smtClean="0"/>
-              <a:t>5/11/22</a:t>
+              <a:t>5/17/23</a:t>
             </a:fld>
             <a:endParaRPr lang="en-US" dirty="0"/>
           </a:p>
@@ -5466,7 +6780,7 @@
           <a:p>
             <a:fld id="{51673806-0BCD-1F42-BAA8-2011034B3C6A}" type="datetimeFigureOut">
               <a:rPr lang="en-US" smtClean="0"/>
-              <a:t>5/11/22</a:t>
+              <a:t>5/17/23</a:t>
             </a:fld>
             <a:endParaRPr lang="en-US" dirty="0"/>
           </a:p>
@@ -5789,7 +7103,7 @@
           <a:p>
             <a:fld id="{51673806-0BCD-1F42-BAA8-2011034B3C6A}" type="datetimeFigureOut">
               <a:rPr lang="en-US" smtClean="0"/>
-              <a:t>5/11/22</a:t>
+              <a:t>5/17/23</a:t>
             </a:fld>
             <a:endParaRPr lang="en-US" dirty="0"/>
           </a:p>
@@ -6173,7 +7487,7 @@
           <a:p>
             <a:fld id="{51673806-0BCD-1F42-BAA8-2011034B3C6A}" type="datetimeFigureOut">
               <a:rPr lang="en-US" smtClean="0"/>
-              <a:t>5/11/22</a:t>
+              <a:t>5/17/23</a:t>
             </a:fld>
             <a:endParaRPr lang="en-US" dirty="0"/>
           </a:p>
@@ -6549,7 +7863,7 @@
           <a:p>
             <a:fld id="{51673806-0BCD-1F42-BAA8-2011034B3C6A}" type="datetimeFigureOut">
               <a:rPr lang="en-US" smtClean="0"/>
-              <a:t>5/11/22</a:t>
+              <a:t>5/17/23</a:t>
             </a:fld>
             <a:endParaRPr lang="en-US" dirty="0"/>
           </a:p>
@@ -7055,7 +8369,7 @@
           <a:p>
             <a:fld id="{51673806-0BCD-1F42-BAA8-2011034B3C6A}" type="datetimeFigureOut">
               <a:rPr lang="en-US" smtClean="0"/>
-              <a:t>5/11/22</a:t>
+              <a:t>5/17/23</a:t>
             </a:fld>
             <a:endParaRPr lang="en-US" dirty="0"/>
           </a:p>
@@ -7312,7 +8626,7 @@
           <a:p>
             <a:fld id="{51673806-0BCD-1F42-BAA8-2011034B3C6A}" type="datetimeFigureOut">
               <a:rPr lang="en-US" smtClean="0"/>
-              <a:t>5/11/22</a:t>
+              <a:t>5/17/23</a:t>
             </a:fld>
             <a:endParaRPr lang="en-US" dirty="0"/>
           </a:p>
@@ -7470,7 +8784,7 @@
           <a:p>
             <a:fld id="{51673806-0BCD-1F42-BAA8-2011034B3C6A}" type="datetimeFigureOut">
               <a:rPr lang="en-US" smtClean="0"/>
-              <a:t>5/11/22</a:t>
+              <a:t>5/17/23</a:t>
             </a:fld>
             <a:endParaRPr lang="en-US" dirty="0"/>
           </a:p>
@@ -7860,7 +9174,7 @@
           <a:p>
             <a:fld id="{51673806-0BCD-1F42-BAA8-2011034B3C6A}" type="datetimeFigureOut">
               <a:rPr lang="en-US" smtClean="0"/>
-              <a:t>5/11/22</a:t>
+              <a:t>5/17/23</a:t>
             </a:fld>
             <a:endParaRPr lang="en-US" dirty="0"/>
           </a:p>
@@ -8268,7 +9582,7 @@
           <a:p>
             <a:fld id="{51673806-0BCD-1F42-BAA8-2011034B3C6A}" type="datetimeFigureOut">
               <a:rPr lang="en-US" smtClean="0"/>
-              <a:t>5/11/22</a:t>
+              <a:t>5/17/23</a:t>
             </a:fld>
             <a:endParaRPr lang="en-US" dirty="0"/>
           </a:p>
@@ -8513,7 +9827,7 @@
             <a:fld id="{51673806-0BCD-1F42-BAA8-2011034B3C6A}" type="datetimeFigureOut">
               <a:rPr lang="en-US" smtClean="0"/>
               <a:pPr/>
-              <a:t>5/11/22</a:t>
+              <a:t>5/17/23</a:t>
             </a:fld>
             <a:endParaRPr lang="en-US" dirty="0"/>
           </a:p>
@@ -9183,7 +10497,7 @@
           <p:nvPr/>
         </p:nvPicPr>
         <p:blipFill>
-          <a:blip r:embed="rId2">
+          <a:blip r:embed="rId3">
             <a:extLst>
               <a:ext uri="{28A0092B-C50C-407E-A947-70E740481C1C}">
                 <a14:useLocalDpi xmlns:a14="http://schemas.microsoft.com/office/drawing/2010/main" val="0"/>
@@ -9350,7 +10664,7 @@
           <p:nvPr/>
         </p:nvPicPr>
         <p:blipFill>
-          <a:blip r:embed="rId2">
+          <a:blip r:embed="rId3">
             <a:extLst>
               <a:ext uri="{28A0092B-C50C-407E-A947-70E740481C1C}">
                 <a14:useLocalDpi xmlns:a14="http://schemas.microsoft.com/office/drawing/2010/main" val="0"/>
@@ -9948,7 +11262,7 @@
           <p:nvPr/>
         </p:nvPicPr>
         <p:blipFill>
-          <a:blip r:embed="rId2">
+          <a:blip r:embed="rId3">
             <a:extLst>
               <a:ext uri="{28A0092B-C50C-407E-A947-70E740481C1C}">
                 <a14:useLocalDpi xmlns:a14="http://schemas.microsoft.com/office/drawing/2010/main" val="0"/>
@@ -10375,7 +11689,7 @@
           <p:nvPr/>
         </p:nvPicPr>
         <p:blipFill>
-          <a:blip r:embed="rId2"/>
+          <a:blip r:embed="rId3"/>
           <a:stretch>
             <a:fillRect/>
           </a:stretch>
@@ -10592,7 +11906,7 @@
           <p:nvPr/>
         </p:nvPicPr>
         <p:blipFill>
-          <a:blip r:embed="rId2">
+          <a:blip r:embed="rId3">
             <a:extLst>
               <a:ext uri="{28A0092B-C50C-407E-A947-70E740481C1C}">
                 <a14:useLocalDpi xmlns:a14="http://schemas.microsoft.com/office/drawing/2010/main" val="0"/>
@@ -10801,7 +12115,7 @@
           <p:nvPr/>
         </p:nvPicPr>
         <p:blipFill>
-          <a:blip r:embed="rId2">
+          <a:blip r:embed="rId3">
             <a:extLst>
               <a:ext uri="{28A0092B-C50C-407E-A947-70E740481C1C}">
                 <a14:useLocalDpi xmlns:a14="http://schemas.microsoft.com/office/drawing/2010/main" val="0"/>
@@ -14807,7 +16121,7 @@
           <p:nvPr/>
         </p:nvPicPr>
         <p:blipFill>
-          <a:blip r:embed="rId2">
+          <a:blip r:embed="rId3">
             <a:extLst>
               <a:ext uri="{28A0092B-C50C-407E-A947-70E740481C1C}">
                 <a14:useLocalDpi xmlns:a14="http://schemas.microsoft.com/office/drawing/2010/main" val="0"/>
@@ -15182,7 +16496,7 @@
           <p:nvPr/>
         </p:nvPicPr>
         <p:blipFill>
-          <a:blip r:embed="rId2">
+          <a:blip r:embed="rId3">
             <a:extLst>
               <a:ext uri="{28A0092B-C50C-407E-A947-70E740481C1C}">
                 <a14:useLocalDpi xmlns:a14="http://schemas.microsoft.com/office/drawing/2010/main" val="0"/>
@@ -15360,7 +16674,7 @@
           <p:nvPr/>
         </p:nvPicPr>
         <p:blipFill>
-          <a:blip r:embed="rId2">
+          <a:blip r:embed="rId3">
             <a:extLst>
               <a:ext uri="{28A0092B-C50C-407E-A947-70E740481C1C}">
                 <a14:useLocalDpi xmlns:a14="http://schemas.microsoft.com/office/drawing/2010/main" val="0"/>

</xml_diff>